<commit_message>
Interdiff between v6 and v7
</commit_message>
<xml_diff>
--- a/docs/diagrams/LogicComponentClassDiagram.pptx
+++ b/docs/diagrams/LogicComponentClassDiagram.pptx
@@ -3473,7 +3473,7 @@
         <p:spPr>
           <a:xfrm>
             <a:off x="1066800" y="914400"/>
-            <a:ext cx="6288315" cy="3415166"/>
+            <a:ext cx="7467600" cy="3733800"/>
           </a:xfrm>
           <a:prstGeom prst="roundRect">
             <a:avLst>
@@ -3533,7 +3533,7 @@
         </p:nvSpPr>
         <p:spPr>
           <a:xfrm>
-            <a:off x="2095948" y="1442082"/>
+            <a:off x="2095948" y="1253067"/>
             <a:ext cx="1093635" cy="346760"/>
           </a:xfrm>
           <a:prstGeom prst="rect">
@@ -3592,7 +3592,7 @@
         </p:nvSpPr>
         <p:spPr>
           <a:xfrm flipH="1">
-            <a:off x="5943600" y="2149167"/>
+            <a:off x="6520227" y="2149167"/>
             <a:ext cx="1093635" cy="346760"/>
           </a:xfrm>
           <a:prstGeom prst="rect">
@@ -3703,18 +3703,19 @@
         <p:nvCxnSpPr>
           <p:cNvPr id="6" name="Elbow Connector 63"/>
           <p:cNvCxnSpPr>
+            <a:stCxn id="12" idx="3"/>
             <a:endCxn id="3" idx="3"/>
           </p:cNvCxnSpPr>
           <p:nvPr/>
         </p:nvCxnSpPr>
         <p:spPr>
-          <a:xfrm rot="10800000">
-            <a:off x="3189584" y="1615462"/>
-            <a:ext cx="2296817" cy="2157062"/>
+          <a:xfrm flipH="1" flipV="1">
+            <a:off x="3189583" y="1426447"/>
+            <a:ext cx="5020699" cy="2895973"/>
           </a:xfrm>
           <a:prstGeom prst="bentConnector3">
             <a:avLst>
-              <a:gd name="adj1" fmla="val -1707"/>
+              <a:gd name="adj1" fmla="val -2713"/>
             </a:avLst>
           </a:prstGeom>
           <a:ln w="19050">
@@ -3752,7 +3753,7 @@
         </p:nvCxnSpPr>
         <p:spPr>
           <a:xfrm>
-            <a:off x="1676400" y="1612602"/>
+            <a:off x="1676400" y="1423587"/>
             <a:ext cx="419548" cy="2860"/>
           </a:xfrm>
           <a:prstGeom prst="bentConnector3">
@@ -3793,8 +3794,8 @@
         </p:nvSpPr>
         <p:spPr>
           <a:xfrm>
-            <a:off x="1103085" y="4558098"/>
-            <a:ext cx="6288315" cy="328045"/>
+            <a:off x="1103085" y="4777355"/>
+            <a:ext cx="7431315" cy="328045"/>
           </a:xfrm>
           <a:prstGeom prst="roundRect">
             <a:avLst/>
@@ -3853,7 +3854,7 @@
         </p:nvSpPr>
         <p:spPr>
           <a:xfrm flipH="1">
-            <a:off x="5949738" y="2554920"/>
+            <a:off x="6526365" y="2554920"/>
             <a:ext cx="1093635" cy="346760"/>
           </a:xfrm>
           <a:prstGeom prst="rect">
@@ -3909,7 +3910,7 @@
         </p:nvSpPr>
         <p:spPr>
           <a:xfrm flipH="1">
-            <a:off x="5949738" y="3396383"/>
+            <a:off x="6526365" y="3396383"/>
             <a:ext cx="1093635" cy="346760"/>
           </a:xfrm>
           <a:prstGeom prst="rect">
@@ -3942,12 +3943,27 @@
           <a:p>
             <a:pPr algn="ctr"/>
             <a:r>
-              <a:rPr lang="en-US" sz="1050" b="1" dirty="0">
+              <a:rPr lang="en-US" sz="1050" b="1" dirty="0" smtClean="0">
                 <a:solidFill>
                   <a:srgbClr val="0070C0"/>
                 </a:solidFill>
               </a:rPr>
-              <a:t>…</a:t>
+              <a:t>Incorrect</a:t>
+            </a:r>
+            <a:br>
+              <a:rPr lang="en-US" sz="1050" b="1" dirty="0" smtClean="0">
+                <a:solidFill>
+                  <a:srgbClr val="0070C0"/>
+                </a:solidFill>
+              </a:rPr>
+            </a:br>
+            <a:r>
+              <a:rPr lang="en-US" sz="1050" b="1" dirty="0" smtClean="0">
+                <a:solidFill>
+                  <a:srgbClr val="0070C0"/>
+                </a:solidFill>
+              </a:rPr>
+              <a:t>Command</a:t>
             </a:r>
             <a:endParaRPr lang="en-SG" sz="1050" b="1" dirty="0">
               <a:solidFill>
@@ -3965,7 +3981,7 @@
         </p:nvSpPr>
         <p:spPr>
           <a:xfrm>
-            <a:off x="4815685" y="3775064"/>
+            <a:off x="7438239" y="4149040"/>
             <a:ext cx="772043" cy="346760"/>
           </a:xfrm>
           <a:prstGeom prst="rect">
@@ -4036,31 +4052,27 @@
         </p:nvSpPr>
         <p:spPr>
           <a:xfrm>
-            <a:off x="3098739" y="3775502"/>
+            <a:off x="3529350" y="3775502"/>
             <a:ext cx="585450" cy="346760"/>
           </a:xfrm>
           <a:prstGeom prst="rect">
             <a:avLst/>
           </a:prstGeom>
           <a:solidFill>
-            <a:srgbClr val="0070C0"/>
+            <a:schemeClr val="accent5"/>
           </a:solidFill>
-          <a:ln w="19050">
-            <a:solidFill>
-              <a:srgbClr val="0070C0"/>
-            </a:solidFill>
-          </a:ln>
+          <a:ln/>
           <a:effectLst/>
         </p:spPr>
         <p:style>
           <a:lnRef idx="1">
-            <a:schemeClr val="accent2"/>
+            <a:schemeClr val="accent5"/>
           </a:lnRef>
           <a:fillRef idx="2">
-            <a:schemeClr val="accent2"/>
+            <a:schemeClr val="accent5"/>
           </a:fillRef>
           <a:effectRef idx="1">
-            <a:schemeClr val="accent2"/>
+            <a:schemeClr val="accent5"/>
           </a:effectRef>
           <a:fontRef idx="minor">
             <a:schemeClr val="dk1"/>
@@ -4099,7 +4111,7 @@
         <p:spPr>
           <a:xfrm>
             <a:off x="2874420" y="3946343"/>
-            <a:ext cx="224319" cy="2539"/>
+            <a:ext cx="654930" cy="2539"/>
           </a:xfrm>
           <a:prstGeom prst="bentConnector3">
             <a:avLst>
@@ -4141,8 +4153,8 @@
         </p:nvCxnSpPr>
         <p:spPr>
           <a:xfrm>
-            <a:off x="5201707" y="4121824"/>
-            <a:ext cx="1" cy="436274"/>
+            <a:off x="7824261" y="4495800"/>
+            <a:ext cx="0" cy="281555"/>
           </a:xfrm>
           <a:prstGeom prst="straightConnector1">
             <a:avLst/>
@@ -4180,7 +4192,7 @@
         </p:nvSpPr>
         <p:spPr>
           <a:xfrm rot="16200000">
-            <a:off x="398120" y="2312463"/>
+            <a:off x="398120" y="2150720"/>
             <a:ext cx="2209800" cy="346760"/>
           </a:xfrm>
           <a:prstGeom prst="rect">
@@ -4250,7 +4262,7 @@
         </p:nvSpPr>
         <p:spPr>
           <a:xfrm>
-            <a:off x="1359039" y="3590743"/>
+            <a:off x="1359039" y="3429000"/>
             <a:ext cx="270504" cy="175523"/>
           </a:xfrm>
           <a:prstGeom prst="triangle">
@@ -4307,8 +4319,8 @@
         </p:nvCxnSpPr>
         <p:spPr>
           <a:xfrm rot="10800000">
-            <a:off x="1494291" y="3766267"/>
-            <a:ext cx="286494" cy="180077"/>
+            <a:off x="1494291" y="3604523"/>
+            <a:ext cx="286494" cy="341820"/>
           </a:xfrm>
           <a:prstGeom prst="bentConnector2">
             <a:avLst/>
@@ -4341,15 +4353,13 @@
       <p:cxnSp>
         <p:nvCxnSpPr>
           <p:cNvPr id="23" name="Straight Arrow Connector 57"/>
-          <p:cNvCxnSpPr>
-            <a:stCxn id="5" idx="2"/>
-          </p:cNvCxnSpPr>
+          <p:cNvCxnSpPr/>
           <p:nvPr/>
         </p:nvCxnSpPr>
         <p:spPr>
           <a:xfrm flipH="1">
-            <a:off x="2327602" y="4119723"/>
-            <a:ext cx="1" cy="438375"/>
+            <a:off x="1981201" y="4122262"/>
+            <a:ext cx="1" cy="655093"/>
           </a:xfrm>
           <a:prstGeom prst="straightConnector1">
             <a:avLst/>
@@ -4386,7 +4396,7 @@
         </p:nvCxnSpPr>
         <p:spPr>
           <a:xfrm>
-            <a:off x="893311" y="2994248"/>
+            <a:off x="893311" y="2832505"/>
             <a:ext cx="419548" cy="2860"/>
           </a:xfrm>
           <a:prstGeom prst="bentConnector3">
@@ -4425,20 +4435,18 @@
         <p:nvCxnSpPr>
           <p:cNvPr id="25" name="Elbow Connector 63"/>
           <p:cNvCxnSpPr>
-            <a:stCxn id="5" idx="0"/>
-            <a:endCxn id="12" idx="0"/>
+            <a:stCxn id="5" idx="2"/>
+            <a:endCxn id="12" idx="1"/>
           </p:cNvCxnSpPr>
           <p:nvPr/>
         </p:nvCxnSpPr>
         <p:spPr>
           <a:xfrm rot="16200000" flipH="1">
-            <a:off x="3763604" y="2336961"/>
-            <a:ext cx="2101" cy="2874104"/>
-          </a:xfrm>
-          <a:prstGeom prst="bentConnector3">
-            <a:avLst>
-              <a:gd name="adj1" fmla="val -82532842"/>
-            </a:avLst>
+            <a:off x="4781573" y="1665753"/>
+            <a:ext cx="202697" cy="5110636"/>
+          </a:xfrm>
+          <a:prstGeom prst="bentConnector2">
+            <a:avLst/>
           </a:prstGeom>
           <a:ln w="19050">
             <a:solidFill>
@@ -4473,7 +4481,7 @@
         </p:nvGrpSpPr>
         <p:grpSpPr>
           <a:xfrm>
-            <a:off x="4064583" y="1846294"/>
+            <a:off x="4597400" y="4341168"/>
             <a:ext cx="889000" cy="230832"/>
             <a:chOff x="2895600" y="807932"/>
             <a:chExt cx="889000" cy="230832"/>
@@ -4573,7 +4581,7 @@
         </p:nvGrpSpPr>
         <p:grpSpPr>
           <a:xfrm>
-            <a:off x="4665110" y="1408215"/>
+            <a:off x="4665110" y="1219200"/>
             <a:ext cx="868568" cy="230832"/>
             <a:chOff x="2755838" y="789460"/>
             <a:chExt cx="868568" cy="230832"/>
@@ -4672,7 +4680,7 @@
         </p:nvSpPr>
         <p:spPr>
           <a:xfrm>
-            <a:off x="2301175" y="1807488"/>
+            <a:off x="2301175" y="1618473"/>
             <a:ext cx="131116" cy="230832"/>
           </a:xfrm>
           <a:prstGeom prst="rect">
@@ -4750,7 +4758,7 @@
         </p:nvSpPr>
         <p:spPr>
           <a:xfrm flipH="1">
-            <a:off x="5949738" y="2956137"/>
+            <a:off x="6526365" y="2956137"/>
             <a:ext cx="1093635" cy="346760"/>
           </a:xfrm>
           <a:prstGeom prst="rect">
@@ -4788,18 +4796,7 @@
                   <a:srgbClr val="0070C0"/>
                 </a:solidFill>
               </a:rPr>
-              <a:t>Incorrect</a:t>
-            </a:r>
-          </a:p>
-          <a:p>
-            <a:pPr algn="ctr"/>
-            <a:r>
-              <a:rPr lang="en-US" sz="1050" b="1" dirty="0" smtClean="0">
-                <a:solidFill>
-                  <a:srgbClr val="0070C0"/>
-                </a:solidFill>
-              </a:rPr>
-              <a:t>Command</a:t>
+              <a:t>…</a:t>
             </a:r>
             <a:endParaRPr lang="en-SG" sz="1050" b="1" dirty="0">
               <a:solidFill>
@@ -4817,8 +4814,8 @@
         </p:nvCxnSpPr>
         <p:spPr>
           <a:xfrm rot="16200000" flipV="1">
-            <a:off x="1194071" y="2780902"/>
-            <a:ext cx="1970727" cy="1"/>
+            <a:off x="1105538" y="2692369"/>
+            <a:ext cx="2147794" cy="2"/>
           </a:xfrm>
           <a:prstGeom prst="bentConnector3">
             <a:avLst>
@@ -4858,28 +4855,27 @@
         </p:nvSpPr>
         <p:spPr>
           <a:xfrm flipH="1">
-            <a:off x="3859365" y="2167409"/>
+            <a:off x="4664592" y="2148937"/>
             <a:ext cx="1093635" cy="346760"/>
           </a:xfrm>
           <a:prstGeom prst="rect">
             <a:avLst/>
           </a:prstGeom>
-          <a:ln w="19050">
-            <a:solidFill>
-              <a:srgbClr val="0070C0"/>
-            </a:solidFill>
-          </a:ln>
+          <a:solidFill>
+            <a:schemeClr val="accent5"/>
+          </a:solidFill>
+          <a:ln/>
           <a:effectLst/>
         </p:spPr>
         <p:style>
           <a:lnRef idx="1">
-            <a:schemeClr val="accent1"/>
+            <a:schemeClr val="accent5"/>
           </a:lnRef>
           <a:fillRef idx="2">
-            <a:schemeClr val="accent1"/>
+            <a:schemeClr val="accent5"/>
           </a:fillRef>
           <a:effectRef idx="1">
-            <a:schemeClr val="accent1"/>
+            <a:schemeClr val="accent5"/>
           </a:effectRef>
           <a:fontRef idx="minor">
             <a:schemeClr val="dk1"/>
@@ -4893,14 +4889,14 @@
             <a:r>
               <a:rPr lang="en-US" sz="1050" b="1" dirty="0" err="1">
                 <a:solidFill>
-                  <a:srgbClr val="0070C0"/>
+                  <a:schemeClr val="bg1"/>
                 </a:solidFill>
               </a:rPr>
               <a:t>AddCommand</a:t>
             </a:r>
             <a:endParaRPr lang="en-US" sz="1050" b="1" dirty="0">
               <a:solidFill>
-                <a:srgbClr val="0070C0"/>
+                <a:schemeClr val="bg1"/>
               </a:solidFill>
             </a:endParaRPr>
           </a:p>
@@ -4909,14 +4905,14 @@
             <a:r>
               <a:rPr lang="en-US" sz="1050" b="1" dirty="0">
                 <a:solidFill>
-                  <a:srgbClr val="0070C0"/>
+                  <a:schemeClr val="bg1"/>
                 </a:solidFill>
               </a:rPr>
               <a:t>Parser</a:t>
             </a:r>
             <a:endParaRPr lang="en-SG" sz="1050" b="1" dirty="0">
               <a:solidFill>
-                <a:srgbClr val="0070C0"/>
+                <a:schemeClr val="bg1"/>
               </a:solidFill>
             </a:endParaRPr>
           </a:p>
@@ -4930,28 +4926,27 @@
         </p:nvSpPr>
         <p:spPr>
           <a:xfrm flipH="1">
-            <a:off x="3859365" y="2573809"/>
+            <a:off x="4664592" y="2555337"/>
             <a:ext cx="1093635" cy="346760"/>
           </a:xfrm>
           <a:prstGeom prst="rect">
             <a:avLst/>
           </a:prstGeom>
-          <a:ln w="19050">
-            <a:solidFill>
-              <a:srgbClr val="0070C0"/>
-            </a:solidFill>
-          </a:ln>
+          <a:solidFill>
+            <a:schemeClr val="accent5"/>
+          </a:solidFill>
+          <a:ln/>
           <a:effectLst/>
         </p:spPr>
         <p:style>
           <a:lnRef idx="1">
-            <a:schemeClr val="accent1"/>
+            <a:schemeClr val="accent5"/>
           </a:lnRef>
           <a:fillRef idx="2">
-            <a:schemeClr val="accent1"/>
+            <a:schemeClr val="accent5"/>
           </a:fillRef>
           <a:effectRef idx="1">
-            <a:schemeClr val="accent1"/>
+            <a:schemeClr val="accent5"/>
           </a:effectRef>
           <a:fontRef idx="minor">
             <a:schemeClr val="dk1"/>
@@ -4965,14 +4960,14 @@
             <a:r>
               <a:rPr lang="en-US" sz="1050" b="1" dirty="0" err="1">
                 <a:solidFill>
-                  <a:srgbClr val="0070C0"/>
+                  <a:schemeClr val="bg1"/>
                 </a:solidFill>
               </a:rPr>
               <a:t>FindCommand</a:t>
             </a:r>
             <a:endParaRPr lang="en-US" sz="1050" b="1" dirty="0">
               <a:solidFill>
-                <a:srgbClr val="0070C0"/>
+                <a:schemeClr val="bg1"/>
               </a:solidFill>
             </a:endParaRPr>
           </a:p>
@@ -4981,14 +4976,14 @@
             <a:r>
               <a:rPr lang="en-US" sz="1050" b="1" dirty="0">
                 <a:solidFill>
-                  <a:srgbClr val="0070C0"/>
+                  <a:schemeClr val="bg1"/>
                 </a:solidFill>
               </a:rPr>
               <a:t>Parser</a:t>
             </a:r>
             <a:endParaRPr lang="en-SG" sz="1050" b="1" dirty="0">
               <a:solidFill>
-                <a:srgbClr val="0070C0"/>
+                <a:schemeClr val="bg1"/>
               </a:solidFill>
             </a:endParaRPr>
           </a:p>
@@ -5002,28 +4997,27 @@
         </p:nvSpPr>
         <p:spPr>
           <a:xfrm flipH="1">
-            <a:off x="3859363" y="2977582"/>
+            <a:off x="4664590" y="2977582"/>
             <a:ext cx="1093635" cy="346760"/>
           </a:xfrm>
           <a:prstGeom prst="rect">
             <a:avLst/>
           </a:prstGeom>
-          <a:ln w="19050">
-            <a:solidFill>
-              <a:srgbClr val="0070C0"/>
-            </a:solidFill>
-          </a:ln>
+          <a:solidFill>
+            <a:schemeClr val="accent5"/>
+          </a:solidFill>
+          <a:ln/>
           <a:effectLst/>
         </p:spPr>
         <p:style>
           <a:lnRef idx="1">
-            <a:schemeClr val="accent1"/>
+            <a:schemeClr val="accent5"/>
           </a:lnRef>
           <a:fillRef idx="2">
-            <a:schemeClr val="accent1"/>
+            <a:schemeClr val="accent5"/>
           </a:fillRef>
           <a:effectRef idx="1">
-            <a:schemeClr val="accent1"/>
+            <a:schemeClr val="accent5"/>
           </a:effectRef>
           <a:fontRef idx="minor">
             <a:schemeClr val="dk1"/>
@@ -5037,14 +5031,14 @@
             <a:r>
               <a:rPr lang="en-US" sz="1050" b="1" dirty="0">
                 <a:solidFill>
-                  <a:srgbClr val="0070C0"/>
+                  <a:schemeClr val="bg1"/>
                 </a:solidFill>
               </a:rPr>
               <a:t>…</a:t>
             </a:r>
             <a:endParaRPr lang="en-SG" sz="1050" b="1" dirty="0">
               <a:solidFill>
-                <a:srgbClr val="0070C0"/>
+                <a:schemeClr val="bg1"/>
               </a:solidFill>
             </a:endParaRPr>
           </a:p>
@@ -5058,18 +5052,24 @@
         </p:nvSpPr>
         <p:spPr>
           <a:xfrm>
-            <a:off x="2409537" y="2219143"/>
+            <a:off x="2807288" y="1905000"/>
             <a:ext cx="751107" cy="346760"/>
           </a:xfrm>
           <a:prstGeom prst="rect">
             <a:avLst/>
           </a:prstGeom>
           <a:solidFill>
-            <a:srgbClr val="0070C0"/>
+            <a:schemeClr val="accent5">
+              <a:lumMod val="60000"/>
+              <a:lumOff val="40000"/>
+            </a:schemeClr>
           </a:solidFill>
           <a:ln w="19050">
             <a:solidFill>
-              <a:srgbClr val="0070C0"/>
+              <a:schemeClr val="accent5">
+                <a:lumMod val="60000"/>
+                <a:lumOff val="40000"/>
+              </a:schemeClr>
             </a:solidFill>
           </a:ln>
           <a:effectLst/>
@@ -5132,18 +5132,24 @@
         </p:nvSpPr>
         <p:spPr>
           <a:xfrm>
-            <a:off x="2648137" y="2606322"/>
-            <a:ext cx="510397" cy="346760"/>
+            <a:off x="2813291" y="2432664"/>
+            <a:ext cx="726243" cy="174580"/>
           </a:xfrm>
           <a:prstGeom prst="rect">
             <a:avLst/>
           </a:prstGeom>
           <a:solidFill>
-            <a:srgbClr val="0070C0"/>
+            <a:schemeClr val="accent5">
+              <a:lumMod val="60000"/>
+              <a:lumOff val="40000"/>
+            </a:schemeClr>
           </a:solidFill>
           <a:ln w="19050">
             <a:solidFill>
-              <a:srgbClr val="0070C0"/>
+              <a:schemeClr val="accent5">
+                <a:lumMod val="60000"/>
+                <a:lumOff val="40000"/>
+              </a:schemeClr>
             </a:solidFill>
           </a:ln>
           <a:effectLst/>
@@ -5183,448 +5189,6 @@
           </a:p>
         </p:txBody>
       </p:sp>
-      <p:cxnSp>
-        <p:nvCxnSpPr>
-          <p:cNvPr id="86" name="Straight Arrow Connector 85"/>
-          <p:cNvCxnSpPr>
-            <a:endCxn id="44" idx="3"/>
-          </p:cNvCxnSpPr>
-          <p:nvPr/>
-        </p:nvCxnSpPr>
-        <p:spPr>
-          <a:xfrm flipV="1">
-            <a:off x="3733800" y="2747189"/>
-            <a:ext cx="125565" cy="5354"/>
-          </a:xfrm>
-          <a:prstGeom prst="straightConnector1">
-            <a:avLst/>
-          </a:prstGeom>
-          <a:ln>
-            <a:prstDash val="dash"/>
-            <a:headEnd type="none" w="med" len="med"/>
-            <a:tailEnd type="arrow" w="med" len="med"/>
-          </a:ln>
-        </p:spPr>
-        <p:style>
-          <a:lnRef idx="1">
-            <a:schemeClr val="accent1"/>
-          </a:lnRef>
-          <a:fillRef idx="0">
-            <a:schemeClr val="accent1"/>
-          </a:fillRef>
-          <a:effectRef idx="0">
-            <a:schemeClr val="accent1"/>
-          </a:effectRef>
-          <a:fontRef idx="minor">
-            <a:schemeClr val="tx1"/>
-          </a:fontRef>
-        </p:style>
-      </p:cxnSp>
-      <p:cxnSp>
-        <p:nvCxnSpPr>
-          <p:cNvPr id="94" name="Straight Arrow Connector 93"/>
-          <p:cNvCxnSpPr/>
-          <p:nvPr/>
-        </p:nvCxnSpPr>
-        <p:spPr>
-          <a:xfrm>
-            <a:off x="3733800" y="3178011"/>
-            <a:ext cx="125563" cy="0"/>
-          </a:xfrm>
-          <a:prstGeom prst="straightConnector1">
-            <a:avLst/>
-          </a:prstGeom>
-          <a:ln>
-            <a:prstDash val="dash"/>
-            <a:headEnd type="none" w="med" len="med"/>
-            <a:tailEnd type="arrow" w="med" len="med"/>
-          </a:ln>
-        </p:spPr>
-        <p:style>
-          <a:lnRef idx="1">
-            <a:schemeClr val="accent1"/>
-          </a:lnRef>
-          <a:fillRef idx="0">
-            <a:schemeClr val="accent1"/>
-          </a:fillRef>
-          <a:effectRef idx="0">
-            <a:schemeClr val="accent1"/>
-          </a:effectRef>
-          <a:fontRef idx="minor">
-            <a:schemeClr val="tx1"/>
-          </a:fontRef>
-        </p:style>
-      </p:cxnSp>
-      <p:cxnSp>
-        <p:nvCxnSpPr>
-          <p:cNvPr id="104" name="Straight Connector 103"/>
-          <p:cNvCxnSpPr/>
-          <p:nvPr/>
-        </p:nvCxnSpPr>
-        <p:spPr>
-          <a:xfrm flipV="1">
-            <a:off x="3733800" y="2295343"/>
-            <a:ext cx="0" cy="1653103"/>
-          </a:xfrm>
-          <a:prstGeom prst="line">
-            <a:avLst/>
-          </a:prstGeom>
-          <a:ln>
-            <a:prstDash val="dash"/>
-          </a:ln>
-        </p:spPr>
-        <p:style>
-          <a:lnRef idx="1">
-            <a:schemeClr val="accent1"/>
-          </a:lnRef>
-          <a:fillRef idx="0">
-            <a:schemeClr val="accent1"/>
-          </a:fillRef>
-          <a:effectRef idx="0">
-            <a:schemeClr val="accent1"/>
-          </a:effectRef>
-          <a:fontRef idx="minor">
-            <a:schemeClr val="tx1"/>
-          </a:fontRef>
-        </p:style>
-      </p:cxnSp>
-      <p:cxnSp>
-        <p:nvCxnSpPr>
-          <p:cNvPr id="107" name="Straight Connector 106"/>
-          <p:cNvCxnSpPr>
-            <a:endCxn id="16" idx="3"/>
-          </p:cNvCxnSpPr>
-          <p:nvPr/>
-        </p:nvCxnSpPr>
-        <p:spPr>
-          <a:xfrm flipH="1">
-            <a:off x="3684189" y="3948444"/>
-            <a:ext cx="49611" cy="438"/>
-          </a:xfrm>
-          <a:prstGeom prst="line">
-            <a:avLst/>
-          </a:prstGeom>
-          <a:ln>
-            <a:prstDash val="dash"/>
-          </a:ln>
-        </p:spPr>
-        <p:style>
-          <a:lnRef idx="1">
-            <a:schemeClr val="accent1"/>
-          </a:lnRef>
-          <a:fillRef idx="0">
-            <a:schemeClr val="accent1"/>
-          </a:fillRef>
-          <a:effectRef idx="0">
-            <a:schemeClr val="accent1"/>
-          </a:effectRef>
-          <a:fontRef idx="minor">
-            <a:schemeClr val="tx1"/>
-          </a:fontRef>
-        </p:style>
-      </p:cxnSp>
-      <p:cxnSp>
-        <p:nvCxnSpPr>
-          <p:cNvPr id="109" name="Straight Arrow Connector 108"/>
-          <p:cNvCxnSpPr/>
-          <p:nvPr/>
-        </p:nvCxnSpPr>
-        <p:spPr>
-          <a:xfrm>
-            <a:off x="3733800" y="2295343"/>
-            <a:ext cx="125563" cy="0"/>
-          </a:xfrm>
-          <a:prstGeom prst="straightConnector1">
-            <a:avLst/>
-          </a:prstGeom>
-          <a:ln>
-            <a:prstDash val="dash"/>
-            <a:headEnd type="none" w="med" len="med"/>
-            <a:tailEnd type="arrow" w="med" len="med"/>
-          </a:ln>
-        </p:spPr>
-        <p:style>
-          <a:lnRef idx="1">
-            <a:schemeClr val="accent1"/>
-          </a:lnRef>
-          <a:fillRef idx="0">
-            <a:schemeClr val="accent1"/>
-          </a:fillRef>
-          <a:effectRef idx="0">
-            <a:schemeClr val="accent1"/>
-          </a:effectRef>
-          <a:fontRef idx="minor">
-            <a:schemeClr val="tx1"/>
-          </a:fontRef>
-        </p:style>
-      </p:cxnSp>
-      <p:cxnSp>
-        <p:nvCxnSpPr>
-          <p:cNvPr id="117" name="Straight Arrow Connector 116"/>
-          <p:cNvCxnSpPr>
-            <a:stCxn id="12" idx="3"/>
-          </p:cNvCxnSpPr>
-          <p:nvPr/>
-        </p:nvCxnSpPr>
-        <p:spPr>
-          <a:xfrm flipV="1">
-            <a:off x="5587728" y="3940289"/>
-            <a:ext cx="1651272" cy="8155"/>
-          </a:xfrm>
-          <a:prstGeom prst="straightConnector1">
-            <a:avLst/>
-          </a:prstGeom>
-          <a:ln w="19050">
-            <a:headEnd type="triangle" w="med" len="med"/>
-            <a:tailEnd type="none" w="med" len="med"/>
-          </a:ln>
-        </p:spPr>
-        <p:style>
-          <a:lnRef idx="1">
-            <a:schemeClr val="accent1"/>
-          </a:lnRef>
-          <a:fillRef idx="0">
-            <a:schemeClr val="accent1"/>
-          </a:fillRef>
-          <a:effectRef idx="0">
-            <a:schemeClr val="accent1"/>
-          </a:effectRef>
-          <a:fontRef idx="minor">
-            <a:schemeClr val="tx1"/>
-          </a:fontRef>
-        </p:style>
-      </p:cxnSp>
-      <p:cxnSp>
-        <p:nvCxnSpPr>
-          <p:cNvPr id="119" name="Straight Connector 118"/>
-          <p:cNvCxnSpPr/>
-          <p:nvPr/>
-        </p:nvCxnSpPr>
-        <p:spPr>
-          <a:xfrm flipV="1">
-            <a:off x="7239000" y="2322547"/>
-            <a:ext cx="0" cy="1617744"/>
-          </a:xfrm>
-          <a:prstGeom prst="line">
-            <a:avLst/>
-          </a:prstGeom>
-          <a:ln w="19050"/>
-        </p:spPr>
-        <p:style>
-          <a:lnRef idx="1">
-            <a:schemeClr val="accent1"/>
-          </a:lnRef>
-          <a:fillRef idx="0">
-            <a:schemeClr val="accent1"/>
-          </a:fillRef>
-          <a:effectRef idx="0">
-            <a:schemeClr val="accent1"/>
-          </a:effectRef>
-          <a:fontRef idx="minor">
-            <a:schemeClr val="tx1"/>
-          </a:fontRef>
-        </p:style>
-      </p:cxnSp>
-      <p:cxnSp>
-        <p:nvCxnSpPr>
-          <p:cNvPr id="123" name="Straight Connector 122"/>
-          <p:cNvCxnSpPr>
-            <a:stCxn id="4" idx="1"/>
-          </p:cNvCxnSpPr>
-          <p:nvPr/>
-        </p:nvCxnSpPr>
-        <p:spPr>
-          <a:xfrm>
-            <a:off x="7037235" y="2322547"/>
-            <a:ext cx="201765" cy="0"/>
-          </a:xfrm>
-          <a:prstGeom prst="line">
-            <a:avLst/>
-          </a:prstGeom>
-        </p:spPr>
-        <p:style>
-          <a:lnRef idx="1">
-            <a:schemeClr val="accent1"/>
-          </a:lnRef>
-          <a:fillRef idx="0">
-            <a:schemeClr val="accent1"/>
-          </a:fillRef>
-          <a:effectRef idx="0">
-            <a:schemeClr val="accent1"/>
-          </a:effectRef>
-          <a:fontRef idx="minor">
-            <a:schemeClr val="tx1"/>
-          </a:fontRef>
-        </p:style>
-      </p:cxnSp>
-      <p:cxnSp>
-        <p:nvCxnSpPr>
-          <p:cNvPr id="125" name="Straight Connector 124"/>
-          <p:cNvCxnSpPr>
-            <a:stCxn id="10" idx="1"/>
-          </p:cNvCxnSpPr>
-          <p:nvPr/>
-        </p:nvCxnSpPr>
-        <p:spPr>
-          <a:xfrm>
-            <a:off x="7043373" y="2728300"/>
-            <a:ext cx="195627" cy="0"/>
-          </a:xfrm>
-          <a:prstGeom prst="line">
-            <a:avLst/>
-          </a:prstGeom>
-        </p:spPr>
-        <p:style>
-          <a:lnRef idx="1">
-            <a:schemeClr val="accent1"/>
-          </a:lnRef>
-          <a:fillRef idx="0">
-            <a:schemeClr val="accent1"/>
-          </a:fillRef>
-          <a:effectRef idx="0">
-            <a:schemeClr val="accent1"/>
-          </a:effectRef>
-          <a:fontRef idx="minor">
-            <a:schemeClr val="tx1"/>
-          </a:fontRef>
-        </p:style>
-      </p:cxnSp>
-      <p:cxnSp>
-        <p:nvCxnSpPr>
-          <p:cNvPr id="127" name="Straight Connector 126"/>
-          <p:cNvCxnSpPr>
-            <a:stCxn id="37" idx="1"/>
-          </p:cNvCxnSpPr>
-          <p:nvPr/>
-        </p:nvCxnSpPr>
-        <p:spPr>
-          <a:xfrm>
-            <a:off x="7043373" y="3129517"/>
-            <a:ext cx="195627" cy="0"/>
-          </a:xfrm>
-          <a:prstGeom prst="line">
-            <a:avLst/>
-          </a:prstGeom>
-        </p:spPr>
-        <p:style>
-          <a:lnRef idx="1">
-            <a:schemeClr val="accent1"/>
-          </a:lnRef>
-          <a:fillRef idx="0">
-            <a:schemeClr val="accent1"/>
-          </a:fillRef>
-          <a:effectRef idx="0">
-            <a:schemeClr val="accent1"/>
-          </a:effectRef>
-          <a:fontRef idx="minor">
-            <a:schemeClr val="tx1"/>
-          </a:fontRef>
-        </p:style>
-      </p:cxnSp>
-      <p:cxnSp>
-        <p:nvCxnSpPr>
-          <p:cNvPr id="133" name="Straight Connector 132"/>
-          <p:cNvCxnSpPr>
-            <a:stCxn id="11" idx="1"/>
-          </p:cNvCxnSpPr>
-          <p:nvPr/>
-        </p:nvCxnSpPr>
-        <p:spPr>
-          <a:xfrm>
-            <a:off x="7043373" y="3569763"/>
-            <a:ext cx="195627" cy="0"/>
-          </a:xfrm>
-          <a:prstGeom prst="line">
-            <a:avLst/>
-          </a:prstGeom>
-        </p:spPr>
-        <p:style>
-          <a:lnRef idx="1">
-            <a:schemeClr val="accent1"/>
-          </a:lnRef>
-          <a:fillRef idx="0">
-            <a:schemeClr val="accent1"/>
-          </a:fillRef>
-          <a:effectRef idx="0">
-            <a:schemeClr val="accent1"/>
-          </a:effectRef>
-          <a:fontRef idx="minor">
-            <a:schemeClr val="tx1"/>
-          </a:fontRef>
-        </p:style>
-      </p:cxnSp>
-      <p:cxnSp>
-        <p:nvCxnSpPr>
-          <p:cNvPr id="152" name="Straight Connector 151"/>
-          <p:cNvCxnSpPr>
-            <a:stCxn id="44" idx="1"/>
-          </p:cNvCxnSpPr>
-          <p:nvPr/>
-        </p:nvCxnSpPr>
-        <p:spPr>
-          <a:xfrm>
-            <a:off x="4953000" y="2747189"/>
-            <a:ext cx="990600" cy="0"/>
-          </a:xfrm>
-          <a:prstGeom prst="line">
-            <a:avLst/>
-          </a:prstGeom>
-          <a:ln>
-            <a:prstDash val="dash"/>
-            <a:headEnd type="none" w="med" len="med"/>
-            <a:tailEnd type="arrow" w="med" len="med"/>
-          </a:ln>
-        </p:spPr>
-        <p:style>
-          <a:lnRef idx="1">
-            <a:schemeClr val="accent1"/>
-          </a:lnRef>
-          <a:fillRef idx="0">
-            <a:schemeClr val="accent1"/>
-          </a:fillRef>
-          <a:effectRef idx="0">
-            <a:schemeClr val="accent1"/>
-          </a:effectRef>
-          <a:fontRef idx="minor">
-            <a:schemeClr val="tx1"/>
-          </a:fontRef>
-        </p:style>
-      </p:cxnSp>
-      <p:cxnSp>
-        <p:nvCxnSpPr>
-          <p:cNvPr id="153" name="Straight Connector 152"/>
-          <p:cNvCxnSpPr/>
-          <p:nvPr/>
-        </p:nvCxnSpPr>
-        <p:spPr>
-          <a:xfrm>
-            <a:off x="4953000" y="2371543"/>
-            <a:ext cx="990600" cy="0"/>
-          </a:xfrm>
-          <a:prstGeom prst="line">
-            <a:avLst/>
-          </a:prstGeom>
-          <a:ln>
-            <a:prstDash val="dash"/>
-            <a:headEnd type="none" w="med" len="med"/>
-            <a:tailEnd type="arrow" w="med" len="med"/>
-          </a:ln>
-        </p:spPr>
-        <p:style>
-          <a:lnRef idx="1">
-            <a:schemeClr val="accent1"/>
-          </a:lnRef>
-          <a:fillRef idx="0">
-            <a:schemeClr val="accent1"/>
-          </a:fillRef>
-          <a:effectRef idx="0">
-            <a:schemeClr val="accent1"/>
-          </a:effectRef>
-          <a:fontRef idx="minor">
-            <a:schemeClr val="tx1"/>
-          </a:fontRef>
-        </p:style>
-      </p:cxnSp>
       <p:grpSp>
         <p:nvGrpSpPr>
           <p:cNvPr id="161" name="Group 160"/>
@@ -5633,7 +5197,7 @@
         </p:nvGrpSpPr>
         <p:grpSpPr>
           <a:xfrm rot="5400000">
-            <a:off x="5365168" y="1962201"/>
+            <a:off x="5941795" y="1962201"/>
             <a:ext cx="254462" cy="555486"/>
             <a:chOff x="3949242" y="712012"/>
             <a:chExt cx="254462" cy="503902"/>
@@ -5664,14 +5228,18 @@
               <a:r>
                 <a:rPr lang="en-US" sz="1100" dirty="0" smtClean="0">
                   <a:solidFill>
-                    <a:srgbClr val="0070C0"/>
+                    <a:schemeClr val="accent5">
+                      <a:lumMod val="75000"/>
+                    </a:schemeClr>
                   </a:solidFill>
                 </a:rPr>
                 <a:t>creates</a:t>
               </a:r>
               <a:endParaRPr lang="en-SG" sz="1100" dirty="0">
                 <a:solidFill>
-                  <a:srgbClr val="0070C0"/>
+                  <a:schemeClr val="accent5">
+                    <a:lumMod val="75000"/>
+                  </a:schemeClr>
                 </a:solidFill>
               </a:endParaRPr>
             </a:p>
@@ -5692,7 +5260,9 @@
               <a:avLst/>
             </a:prstGeom>
             <a:solidFill>
-              <a:srgbClr val="0070C0"/>
+              <a:schemeClr val="accent5">
+                <a:lumMod val="75000"/>
+              </a:schemeClr>
             </a:solidFill>
             <a:ln>
               <a:noFill/>
@@ -5732,7 +5302,7 @@
         </p:nvGrpSpPr>
         <p:grpSpPr>
           <a:xfrm rot="5400000">
-            <a:off x="5386226" y="2347569"/>
+            <a:off x="5962853" y="2347569"/>
             <a:ext cx="254462" cy="555486"/>
             <a:chOff x="3949242" y="712012"/>
             <a:chExt cx="254462" cy="503902"/>
@@ -5763,14 +5333,18 @@
               <a:r>
                 <a:rPr lang="en-US" sz="1100" dirty="0" smtClean="0">
                   <a:solidFill>
-                    <a:srgbClr val="0070C0"/>
+                    <a:schemeClr val="accent5">
+                      <a:lumMod val="75000"/>
+                    </a:schemeClr>
                   </a:solidFill>
                 </a:rPr>
                 <a:t>creates</a:t>
               </a:r>
               <a:endParaRPr lang="en-SG" sz="1100" dirty="0">
                 <a:solidFill>
-                  <a:srgbClr val="0070C0"/>
+                  <a:schemeClr val="accent5">
+                    <a:lumMod val="75000"/>
+                  </a:schemeClr>
                 </a:solidFill>
               </a:endParaRPr>
             </a:p>
@@ -5791,7 +5365,9 @@
               <a:avLst/>
             </a:prstGeom>
             <a:solidFill>
-              <a:srgbClr val="0070C0"/>
+              <a:schemeClr val="accent5">
+                <a:lumMod val="75000"/>
+              </a:schemeClr>
             </a:solidFill>
             <a:ln>
               <a:noFill/>
@@ -5831,18 +5407,24 @@
         </p:nvSpPr>
         <p:spPr>
           <a:xfrm>
-            <a:off x="2659828" y="3015383"/>
+            <a:off x="2819400" y="2841725"/>
             <a:ext cx="731636" cy="283820"/>
           </a:xfrm>
           <a:prstGeom prst="rect">
             <a:avLst/>
           </a:prstGeom>
           <a:solidFill>
-            <a:srgbClr val="0070C0"/>
+            <a:schemeClr val="accent5">
+              <a:lumMod val="60000"/>
+              <a:lumOff val="40000"/>
+            </a:schemeClr>
           </a:solidFill>
           <a:ln w="19050">
             <a:solidFill>
-              <a:srgbClr val="0070C0"/>
+              <a:schemeClr val="accent5">
+                <a:lumMod val="60000"/>
+                <a:lumOff val="40000"/>
+              </a:schemeClr>
             </a:solidFill>
           </a:ln>
           <a:effectLst/>
@@ -5890,18 +5472,24 @@
         </p:nvSpPr>
         <p:spPr>
           <a:xfrm>
-            <a:off x="2659250" y="3364540"/>
+            <a:off x="2819400" y="3190882"/>
             <a:ext cx="731636" cy="283820"/>
           </a:xfrm>
           <a:prstGeom prst="rect">
             <a:avLst/>
           </a:prstGeom>
           <a:solidFill>
-            <a:srgbClr val="0070C0"/>
+            <a:schemeClr val="accent5">
+              <a:lumMod val="60000"/>
+              <a:lumOff val="40000"/>
+            </a:schemeClr>
           </a:solidFill>
           <a:ln w="19050">
             <a:solidFill>
-              <a:srgbClr val="0070C0"/>
+              <a:schemeClr val="accent5">
+                <a:lumMod val="60000"/>
+                <a:lumOff val="40000"/>
+              </a:schemeClr>
             </a:solidFill>
           </a:ln>
           <a:effectLst/>
@@ -5943,168 +5531,44 @@
       </p:sp>
       <p:cxnSp>
         <p:nvCxnSpPr>
-          <p:cNvPr id="22" name="Straight Connector 21"/>
-          <p:cNvCxnSpPr/>
+          <p:cNvPr id="100" name="Straight Arrow Connector 99"/>
+          <p:cNvCxnSpPr>
+            <a:endCxn id="60" idx="3"/>
+          </p:cNvCxnSpPr>
           <p:nvPr/>
         </p:nvCxnSpPr>
         <p:spPr>
-          <a:xfrm flipV="1">
-            <a:off x="3505200" y="2209023"/>
-            <a:ext cx="0" cy="1262106"/>
-          </a:xfrm>
-          <a:prstGeom prst="line">
-            <a:avLst/>
-          </a:prstGeom>
-          <a:ln>
-            <a:prstDash val="sysDash"/>
-          </a:ln>
-        </p:spPr>
-        <p:style>
-          <a:lnRef idx="1">
-            <a:schemeClr val="accent1"/>
-          </a:lnRef>
-          <a:fillRef idx="0">
-            <a:schemeClr val="accent1"/>
-          </a:fillRef>
-          <a:effectRef idx="0">
-            <a:schemeClr val="accent1"/>
-          </a:effectRef>
-          <a:fontRef idx="minor">
-            <a:schemeClr val="tx1"/>
-          </a:fontRef>
-        </p:style>
-      </p:cxnSp>
-      <p:cxnSp>
-        <p:nvCxnSpPr>
-          <p:cNvPr id="75" name="Straight Connector 74"/>
-          <p:cNvCxnSpPr/>
-          <p:nvPr/>
-        </p:nvCxnSpPr>
-        <p:spPr>
           <a:xfrm flipH="1">
-            <a:off x="3505200" y="2209023"/>
-            <a:ext cx="344016" cy="0"/>
-          </a:xfrm>
-          <a:prstGeom prst="line">
-            <a:avLst/>
-          </a:prstGeom>
-          <a:ln>
-            <a:prstDash val="sysDash"/>
-          </a:ln>
-        </p:spPr>
-        <p:style>
-          <a:lnRef idx="1">
-            <a:schemeClr val="accent1"/>
-          </a:lnRef>
-          <a:fillRef idx="0">
-            <a:schemeClr val="accent1"/>
-          </a:fillRef>
-          <a:effectRef idx="0">
-            <a:schemeClr val="accent1"/>
-          </a:effectRef>
-          <a:fontRef idx="minor">
-            <a:schemeClr val="tx1"/>
-          </a:fontRef>
-        </p:style>
-      </p:cxnSp>
-      <p:cxnSp>
-        <p:nvCxnSpPr>
-          <p:cNvPr id="79" name="Straight Connector 78"/>
-          <p:cNvCxnSpPr/>
-          <p:nvPr/>
-        </p:nvCxnSpPr>
-        <p:spPr>
-          <a:xfrm flipH="1">
-            <a:off x="3505200" y="2632378"/>
-            <a:ext cx="354163" cy="0"/>
-          </a:xfrm>
-          <a:prstGeom prst="line">
-            <a:avLst/>
-          </a:prstGeom>
-          <a:ln>
-            <a:prstDash val="sysDash"/>
-          </a:ln>
-        </p:spPr>
-        <p:style>
-          <a:lnRef idx="1">
-            <a:schemeClr val="accent1"/>
-          </a:lnRef>
-          <a:fillRef idx="0">
-            <a:schemeClr val="accent1"/>
-          </a:fillRef>
-          <a:effectRef idx="0">
-            <a:schemeClr val="accent1"/>
-          </a:effectRef>
-          <a:fontRef idx="minor">
-            <a:schemeClr val="tx1"/>
-          </a:fontRef>
-        </p:style>
-      </p:cxnSp>
-      <p:cxnSp>
-        <p:nvCxnSpPr>
-          <p:cNvPr id="85" name="Straight Connector 84"/>
-          <p:cNvCxnSpPr/>
-          <p:nvPr/>
-        </p:nvCxnSpPr>
-        <p:spPr>
-          <a:xfrm flipH="1">
-            <a:off x="3505200" y="3015383"/>
-            <a:ext cx="344016" cy="0"/>
-          </a:xfrm>
-          <a:prstGeom prst="line">
-            <a:avLst/>
-          </a:prstGeom>
-          <a:ln>
-            <a:prstDash val="sysDash"/>
-          </a:ln>
-        </p:spPr>
-        <p:style>
-          <a:lnRef idx="1">
-            <a:schemeClr val="accent1"/>
-          </a:lnRef>
-          <a:fillRef idx="0">
-            <a:schemeClr val="accent1"/>
-          </a:fillRef>
-          <a:effectRef idx="0">
-            <a:schemeClr val="accent1"/>
-          </a:effectRef>
-          <a:fontRef idx="minor">
-            <a:schemeClr val="tx1"/>
-          </a:fontRef>
-        </p:style>
-      </p:cxnSp>
-      <p:cxnSp>
-        <p:nvCxnSpPr>
-          <p:cNvPr id="100" name="Straight Arrow Connector 99"/>
-          <p:cNvCxnSpPr/>
-          <p:nvPr/>
-        </p:nvCxnSpPr>
-        <p:spPr>
-          <a:xfrm flipH="1">
-            <a:off x="3390886" y="3178011"/>
-            <a:ext cx="114314" cy="0"/>
+            <a:off x="3551036" y="2983635"/>
+            <a:ext cx="335164" cy="0"/>
           </a:xfrm>
           <a:prstGeom prst="straightConnector1">
             <a:avLst/>
           </a:prstGeom>
-          <a:ln>
+          <a:ln w="19050">
+            <a:solidFill>
+              <a:schemeClr val="accent5">
+                <a:lumMod val="50000"/>
+              </a:schemeClr>
+            </a:solidFill>
             <a:prstDash val="sysDot"/>
             <a:headEnd type="none" w="med" len="med"/>
             <a:tailEnd type="arrow" w="med" len="med"/>
           </a:ln>
+          <a:effectLst/>
         </p:spPr>
         <p:style>
           <a:lnRef idx="1">
-            <a:schemeClr val="accent1"/>
+            <a:schemeClr val="accent2"/>
           </a:lnRef>
-          <a:fillRef idx="0">
-            <a:schemeClr val="accent1"/>
+          <a:fillRef idx="2">
+            <a:schemeClr val="accent2"/>
           </a:fillRef>
-          <a:effectRef idx="0">
-            <a:schemeClr val="accent1"/>
+          <a:effectRef idx="1">
+            <a:schemeClr val="accent2"/>
           </a:effectRef>
           <a:fontRef idx="minor">
-            <a:schemeClr val="tx1"/>
+            <a:schemeClr val="dk1"/>
           </a:fontRef>
         </p:style>
       </p:cxnSp>
@@ -6115,31 +5579,37 @@
           <p:nvPr/>
         </p:nvCxnSpPr>
         <p:spPr>
-          <a:xfrm flipH="1">
-            <a:off x="3390886" y="3471128"/>
-            <a:ext cx="114314" cy="0"/>
+          <a:xfrm flipH="1" flipV="1">
+            <a:off x="3558396" y="3297471"/>
+            <a:ext cx="327804" cy="5426"/>
           </a:xfrm>
           <a:prstGeom prst="straightConnector1">
             <a:avLst/>
           </a:prstGeom>
-          <a:ln>
+          <a:ln w="19050">
+            <a:solidFill>
+              <a:schemeClr val="accent5">
+                <a:lumMod val="50000"/>
+              </a:schemeClr>
+            </a:solidFill>
             <a:prstDash val="sysDot"/>
             <a:headEnd type="none" w="med" len="med"/>
             <a:tailEnd type="arrow" w="med" len="med"/>
           </a:ln>
+          <a:effectLst/>
         </p:spPr>
         <p:style>
           <a:lnRef idx="1">
-            <a:schemeClr val="accent1"/>
+            <a:schemeClr val="accent2"/>
           </a:lnRef>
-          <a:fillRef idx="0">
-            <a:schemeClr val="accent1"/>
+          <a:fillRef idx="2">
+            <a:schemeClr val="accent2"/>
           </a:fillRef>
-          <a:effectRef idx="0">
-            <a:schemeClr val="accent1"/>
+          <a:effectRef idx="1">
+            <a:schemeClr val="accent2"/>
           </a:effectRef>
           <a:fontRef idx="minor">
-            <a:schemeClr val="tx1"/>
+            <a:schemeClr val="dk1"/>
           </a:fontRef>
         </p:style>
       </p:cxnSp>
@@ -6147,36 +5617,45 @@
         <p:nvCxnSpPr>
           <p:cNvPr id="13" name="Elbow Connector 12"/>
           <p:cNvCxnSpPr>
-            <a:endCxn id="58" idx="3"/>
+            <a:stCxn id="60" idx="0"/>
           </p:cNvCxnSpPr>
           <p:nvPr/>
         </p:nvCxnSpPr>
         <p:spPr>
           <a:xfrm rot="16200000" flipV="1">
-            <a:off x="3128310" y="2809926"/>
-            <a:ext cx="234836" cy="174388"/>
-          </a:xfrm>
-          <a:prstGeom prst="bentConnector2">
-            <a:avLst/>
+            <a:off x="3063575" y="2720082"/>
+            <a:ext cx="234481" cy="8806"/>
+          </a:xfrm>
+          <a:prstGeom prst="bentConnector3">
+            <a:avLst>
+              <a:gd name="adj1" fmla="val 50000"/>
+            </a:avLst>
           </a:prstGeom>
-          <a:ln>
-            <a:prstDash val="sysDash"/>
+          <a:ln w="19050">
+            <a:solidFill>
+              <a:schemeClr val="accent5">
+                <a:lumMod val="60000"/>
+                <a:lumOff val="40000"/>
+              </a:schemeClr>
+            </a:solidFill>
+            <a:prstDash val="sysDot"/>
             <a:headEnd type="none" w="med" len="med"/>
             <a:tailEnd type="arrow" w="med" len="med"/>
           </a:ln>
+          <a:effectLst/>
         </p:spPr>
         <p:style>
           <a:lnRef idx="1">
-            <a:schemeClr val="accent1"/>
+            <a:schemeClr val="accent2"/>
           </a:lnRef>
-          <a:fillRef idx="0">
-            <a:schemeClr val="accent1"/>
+          <a:fillRef idx="2">
+            <a:schemeClr val="accent2"/>
           </a:fillRef>
-          <a:effectRef idx="0">
-            <a:schemeClr val="accent1"/>
+          <a:effectRef idx="1">
+            <a:schemeClr val="accent2"/>
           </a:effectRef>
           <a:fontRef idx="minor">
-            <a:schemeClr val="tx1"/>
+            <a:schemeClr val="dk1"/>
           </a:fontRef>
         </p:style>
       </p:cxnSp>
@@ -6188,30 +5667,36 @@
         </p:nvCxnSpPr>
         <p:spPr>
           <a:xfrm>
-            <a:off x="3158534" y="2447743"/>
+            <a:off x="3539534" y="2078487"/>
             <a:ext cx="346666" cy="0"/>
           </a:xfrm>
           <a:prstGeom prst="line">
             <a:avLst/>
           </a:prstGeom>
-          <a:ln>
-            <a:prstDash val="sysDash"/>
+          <a:ln w="19050">
+            <a:solidFill>
+              <a:schemeClr val="accent5">
+                <a:lumMod val="50000"/>
+              </a:schemeClr>
+            </a:solidFill>
+            <a:prstDash val="sysDot"/>
             <a:headEnd type="arrow" w="med" len="med"/>
             <a:tailEnd type="none" w="med" len="med"/>
           </a:ln>
+          <a:effectLst/>
         </p:spPr>
         <p:style>
           <a:lnRef idx="1">
-            <a:schemeClr val="accent1"/>
+            <a:schemeClr val="accent2"/>
           </a:lnRef>
-          <a:fillRef idx="0">
-            <a:schemeClr val="accent1"/>
+          <a:fillRef idx="2">
+            <a:schemeClr val="accent2"/>
           </a:fillRef>
-          <a:effectRef idx="0">
-            <a:schemeClr val="accent1"/>
+          <a:effectRef idx="1">
+            <a:schemeClr val="accent2"/>
           </a:effectRef>
           <a:fontRef idx="minor">
-            <a:schemeClr val="tx1"/>
+            <a:schemeClr val="dk1"/>
           </a:fontRef>
         </p:style>
       </p:cxnSp>
@@ -6219,36 +5704,46 @@
         <p:nvCxnSpPr>
           <p:cNvPr id="50" name="Elbow Connector 49"/>
           <p:cNvCxnSpPr>
-            <a:endCxn id="58" idx="1"/>
+            <a:stCxn id="56" idx="2"/>
+            <a:endCxn id="58" idx="0"/>
           </p:cNvCxnSpPr>
           <p:nvPr/>
         </p:nvCxnSpPr>
         <p:spPr>
-          <a:xfrm rot="16200000" flipH="1">
-            <a:off x="2478422" y="2609986"/>
-            <a:ext cx="205893" cy="133537"/>
-          </a:xfrm>
-          <a:prstGeom prst="bentConnector2">
-            <a:avLst/>
+          <a:xfrm rot="5400000">
+            <a:off x="3089176" y="2338998"/>
+            <a:ext cx="180904" cy="6429"/>
+          </a:xfrm>
+          <a:prstGeom prst="bentConnector3">
+            <a:avLst>
+              <a:gd name="adj1" fmla="val 50000"/>
+            </a:avLst>
           </a:prstGeom>
-          <a:ln>
-            <a:prstDash val="sysDash"/>
+          <a:ln w="19050">
+            <a:solidFill>
+              <a:schemeClr val="accent5">
+                <a:lumMod val="60000"/>
+                <a:lumOff val="40000"/>
+              </a:schemeClr>
+            </a:solidFill>
+            <a:prstDash val="sysDot"/>
             <a:headEnd type="none" w="med" len="med"/>
             <a:tailEnd type="arrow" w="med" len="med"/>
           </a:ln>
+          <a:effectLst/>
         </p:spPr>
         <p:style>
           <a:lnRef idx="1">
-            <a:schemeClr val="accent1"/>
+            <a:schemeClr val="accent2"/>
           </a:lnRef>
-          <a:fillRef idx="0">
-            <a:schemeClr val="accent1"/>
+          <a:fillRef idx="2">
+            <a:schemeClr val="accent2"/>
           </a:fillRef>
-          <a:effectRef idx="0">
-            <a:schemeClr val="accent1"/>
+          <a:effectRef idx="1">
+            <a:schemeClr val="accent2"/>
           </a:effectRef>
           <a:fontRef idx="minor">
-            <a:schemeClr val="tx1"/>
+            <a:schemeClr val="dk1"/>
           </a:fontRef>
         </p:style>
       </p:cxnSp>
@@ -6260,7 +5755,7 @@
         </p:nvGrpSpPr>
         <p:grpSpPr>
           <a:xfrm rot="5400000">
-            <a:off x="3583288" y="3481226"/>
+            <a:off x="4090826" y="3633626"/>
             <a:ext cx="555486" cy="254462"/>
             <a:chOff x="3798139" y="875689"/>
             <a:chExt cx="555486" cy="230832"/>
@@ -6291,14 +5786,18 @@
               <a:r>
                 <a:rPr lang="en-US" sz="1100" dirty="0" smtClean="0">
                   <a:solidFill>
-                    <a:srgbClr val="0070C0"/>
+                    <a:schemeClr val="accent5">
+                      <a:lumMod val="75000"/>
+                    </a:schemeClr>
                   </a:solidFill>
                 </a:rPr>
                 <a:t>creates</a:t>
               </a:r>
               <a:endParaRPr lang="en-SG" sz="1100" dirty="0">
                 <a:solidFill>
-                  <a:srgbClr val="0070C0"/>
+                  <a:schemeClr val="accent5">
+                    <a:lumMod val="75000"/>
+                  </a:schemeClr>
                 </a:solidFill>
               </a:endParaRPr>
             </a:p>
@@ -6312,14 +5811,16 @@
           </p:nvSpPr>
           <p:spPr>
             <a:xfrm rot="5400000" flipV="1">
-              <a:off x="3822835" y="964974"/>
+              <a:off x="3795127" y="973354"/>
               <a:ext cx="119885" cy="88141"/>
             </a:xfrm>
             <a:prstGeom prst="triangle">
               <a:avLst/>
             </a:prstGeom>
             <a:solidFill>
-              <a:srgbClr val="0070C0"/>
+              <a:schemeClr val="accent5">
+                <a:lumMod val="75000"/>
+              </a:schemeClr>
             </a:solidFill>
             <a:ln>
               <a:noFill/>
@@ -6351,6 +5852,602 @@
           </p:txBody>
         </p:sp>
       </p:grpSp>
+      <p:cxnSp>
+        <p:nvCxnSpPr>
+          <p:cNvPr id="84" name="Elbow Connector 83"/>
+          <p:cNvCxnSpPr>
+            <a:stCxn id="87" idx="3"/>
+            <a:endCxn id="37" idx="1"/>
+          </p:cNvCxnSpPr>
+          <p:nvPr/>
+        </p:nvCxnSpPr>
+        <p:spPr>
+          <a:xfrm rot="16200000" flipV="1">
+            <a:off x="7296652" y="3452865"/>
+            <a:ext cx="850958" cy="204262"/>
+          </a:xfrm>
+          <a:prstGeom prst="bentConnector2">
+            <a:avLst/>
+          </a:prstGeom>
+          <a:ln w="19050">
+            <a:headEnd type="none" w="med" len="med"/>
+            <a:tailEnd type="none" w="med" len="med"/>
+          </a:ln>
+        </p:spPr>
+        <p:style>
+          <a:lnRef idx="1">
+            <a:schemeClr val="accent1"/>
+          </a:lnRef>
+          <a:fillRef idx="0">
+            <a:schemeClr val="accent1"/>
+          </a:fillRef>
+          <a:effectRef idx="0">
+            <a:schemeClr val="accent1"/>
+          </a:effectRef>
+          <a:fontRef idx="minor">
+            <a:schemeClr val="tx1"/>
+          </a:fontRef>
+        </p:style>
+      </p:cxnSp>
+      <p:sp>
+        <p:nvSpPr>
+          <p:cNvPr id="87" name="Isosceles Triangle 102"/>
+          <p:cNvSpPr/>
+          <p:nvPr/>
+        </p:nvSpPr>
+        <p:spPr>
+          <a:xfrm flipV="1">
+            <a:off x="7689010" y="3980475"/>
+            <a:ext cx="270504" cy="175523"/>
+          </a:xfrm>
+          <a:prstGeom prst="triangle">
+            <a:avLst/>
+          </a:prstGeom>
+          <a:solidFill>
+            <a:schemeClr val="tx2">
+              <a:lumMod val="60000"/>
+              <a:lumOff val="40000"/>
+            </a:schemeClr>
+          </a:solidFill>
+          <a:ln w="19050">
+            <a:solidFill>
+              <a:srgbClr val="0070C0"/>
+            </a:solidFill>
+          </a:ln>
+          <a:effectLst/>
+        </p:spPr>
+        <p:style>
+          <a:lnRef idx="1">
+            <a:schemeClr val="accent1"/>
+          </a:lnRef>
+          <a:fillRef idx="2">
+            <a:schemeClr val="accent1"/>
+          </a:fillRef>
+          <a:effectRef idx="1">
+            <a:schemeClr val="accent1"/>
+          </a:effectRef>
+          <a:fontRef idx="minor">
+            <a:schemeClr val="dk1"/>
+          </a:fontRef>
+        </p:style>
+        <p:txBody>
+          <a:bodyPr rtlCol="0" anchor="ctr"/>
+          <a:lstStyle/>
+          <a:p>
+            <a:pPr algn="ctr"/>
+            <a:endParaRPr lang="en-SG" sz="1050" b="1">
+              <a:solidFill>
+                <a:srgbClr val="92D050"/>
+              </a:solidFill>
+            </a:endParaRPr>
+          </a:p>
+        </p:txBody>
+      </p:sp>
+      <p:cxnSp>
+        <p:nvCxnSpPr>
+          <p:cNvPr id="90" name="Elbow Connector 89"/>
+          <p:cNvCxnSpPr>
+            <a:stCxn id="87" idx="3"/>
+            <a:endCxn id="11" idx="1"/>
+          </p:cNvCxnSpPr>
+          <p:nvPr/>
+        </p:nvCxnSpPr>
+        <p:spPr>
+          <a:xfrm rot="16200000" flipV="1">
+            <a:off x="7516775" y="3672988"/>
+            <a:ext cx="410712" cy="204262"/>
+          </a:xfrm>
+          <a:prstGeom prst="bentConnector2">
+            <a:avLst/>
+          </a:prstGeom>
+          <a:ln w="19050">
+            <a:headEnd type="none" w="med" len="med"/>
+            <a:tailEnd type="none" w="med" len="med"/>
+          </a:ln>
+        </p:spPr>
+        <p:style>
+          <a:lnRef idx="1">
+            <a:schemeClr val="accent1"/>
+          </a:lnRef>
+          <a:fillRef idx="0">
+            <a:schemeClr val="accent1"/>
+          </a:fillRef>
+          <a:effectRef idx="0">
+            <a:schemeClr val="accent1"/>
+          </a:effectRef>
+          <a:fontRef idx="minor">
+            <a:schemeClr val="tx1"/>
+          </a:fontRef>
+        </p:style>
+      </p:cxnSp>
+      <p:cxnSp>
+        <p:nvCxnSpPr>
+          <p:cNvPr id="93" name="Elbow Connector 92"/>
+          <p:cNvCxnSpPr>
+            <a:stCxn id="87" idx="3"/>
+            <a:endCxn id="10" idx="1"/>
+          </p:cNvCxnSpPr>
+          <p:nvPr/>
+        </p:nvCxnSpPr>
+        <p:spPr>
+          <a:xfrm rot="16200000" flipV="1">
+            <a:off x="7096044" y="3252257"/>
+            <a:ext cx="1252175" cy="204262"/>
+          </a:xfrm>
+          <a:prstGeom prst="bentConnector2">
+            <a:avLst/>
+          </a:prstGeom>
+          <a:ln w="19050">
+            <a:headEnd type="none" w="med" len="med"/>
+            <a:tailEnd type="none" w="med" len="med"/>
+          </a:ln>
+        </p:spPr>
+        <p:style>
+          <a:lnRef idx="1">
+            <a:schemeClr val="accent1"/>
+          </a:lnRef>
+          <a:fillRef idx="0">
+            <a:schemeClr val="accent1"/>
+          </a:fillRef>
+          <a:effectRef idx="0">
+            <a:schemeClr val="accent1"/>
+          </a:effectRef>
+          <a:fontRef idx="minor">
+            <a:schemeClr val="tx1"/>
+          </a:fontRef>
+        </p:style>
+      </p:cxnSp>
+      <p:cxnSp>
+        <p:nvCxnSpPr>
+          <p:cNvPr id="96" name="Elbow Connector 95"/>
+          <p:cNvCxnSpPr>
+            <a:stCxn id="87" idx="3"/>
+            <a:endCxn id="4" idx="1"/>
+          </p:cNvCxnSpPr>
+          <p:nvPr/>
+        </p:nvCxnSpPr>
+        <p:spPr>
+          <a:xfrm rot="16200000" flipV="1">
+            <a:off x="6890098" y="3046311"/>
+            <a:ext cx="1657928" cy="210400"/>
+          </a:xfrm>
+          <a:prstGeom prst="bentConnector2">
+            <a:avLst/>
+          </a:prstGeom>
+          <a:ln w="19050">
+            <a:headEnd type="none" w="med" len="med"/>
+            <a:tailEnd type="none" w="med" len="med"/>
+          </a:ln>
+        </p:spPr>
+        <p:style>
+          <a:lnRef idx="1">
+            <a:schemeClr val="accent1"/>
+          </a:lnRef>
+          <a:fillRef idx="0">
+            <a:schemeClr val="accent1"/>
+          </a:fillRef>
+          <a:effectRef idx="0">
+            <a:schemeClr val="accent1"/>
+          </a:effectRef>
+          <a:fontRef idx="minor">
+            <a:schemeClr val="tx1"/>
+          </a:fontRef>
+        </p:style>
+      </p:cxnSp>
+      <p:cxnSp>
+        <p:nvCxnSpPr>
+          <p:cNvPr id="110" name="Elbow Connector 63"/>
+          <p:cNvCxnSpPr>
+            <a:stCxn id="16" idx="3"/>
+            <a:endCxn id="45" idx="3"/>
+          </p:cNvCxnSpPr>
+          <p:nvPr/>
+        </p:nvCxnSpPr>
+        <p:spPr>
+          <a:xfrm flipV="1">
+            <a:off x="4114800" y="3150962"/>
+            <a:ext cx="549790" cy="797920"/>
+          </a:xfrm>
+          <a:prstGeom prst="bentConnector3">
+            <a:avLst>
+              <a:gd name="adj1" fmla="val 14720"/>
+            </a:avLst>
+          </a:prstGeom>
+          <a:ln w="19050">
+            <a:solidFill>
+              <a:schemeClr val="accent5">
+                <a:lumMod val="75000"/>
+              </a:schemeClr>
+            </a:solidFill>
+            <a:prstDash val="sysDot"/>
+            <a:headEnd type="none" w="med" len="med"/>
+            <a:tailEnd type="arrow" w="med" len="med"/>
+          </a:ln>
+          <a:effectLst/>
+        </p:spPr>
+        <p:style>
+          <a:lnRef idx="1">
+            <a:schemeClr val="accent2"/>
+          </a:lnRef>
+          <a:fillRef idx="2">
+            <a:schemeClr val="accent2"/>
+          </a:fillRef>
+          <a:effectRef idx="1">
+            <a:schemeClr val="accent2"/>
+          </a:effectRef>
+          <a:fontRef idx="minor">
+            <a:schemeClr val="dk1"/>
+          </a:fontRef>
+        </p:style>
+      </p:cxnSp>
+      <p:cxnSp>
+        <p:nvCxnSpPr>
+          <p:cNvPr id="113" name="Elbow Connector 63"/>
+          <p:cNvCxnSpPr>
+            <a:stCxn id="16" idx="3"/>
+            <a:endCxn id="44" idx="3"/>
+          </p:cNvCxnSpPr>
+          <p:nvPr/>
+        </p:nvCxnSpPr>
+        <p:spPr>
+          <a:xfrm flipV="1">
+            <a:off x="4114800" y="2728717"/>
+            <a:ext cx="549792" cy="1220165"/>
+          </a:xfrm>
+          <a:prstGeom prst="bentConnector3">
+            <a:avLst>
+              <a:gd name="adj1" fmla="val 14720"/>
+            </a:avLst>
+          </a:prstGeom>
+          <a:ln w="19050">
+            <a:solidFill>
+              <a:schemeClr val="accent5">
+                <a:lumMod val="75000"/>
+              </a:schemeClr>
+            </a:solidFill>
+            <a:prstDash val="sysDot"/>
+            <a:headEnd type="none" w="med" len="med"/>
+            <a:tailEnd type="arrow" w="med" len="med"/>
+          </a:ln>
+          <a:effectLst/>
+        </p:spPr>
+        <p:style>
+          <a:lnRef idx="1">
+            <a:schemeClr val="accent2"/>
+          </a:lnRef>
+          <a:fillRef idx="2">
+            <a:schemeClr val="accent2"/>
+          </a:fillRef>
+          <a:effectRef idx="1">
+            <a:schemeClr val="accent2"/>
+          </a:effectRef>
+          <a:fontRef idx="minor">
+            <a:schemeClr val="dk1"/>
+          </a:fontRef>
+        </p:style>
+      </p:cxnSp>
+      <p:cxnSp>
+        <p:nvCxnSpPr>
+          <p:cNvPr id="116" name="Elbow Connector 63"/>
+          <p:cNvCxnSpPr>
+            <a:stCxn id="16" idx="3"/>
+            <a:endCxn id="42" idx="3"/>
+          </p:cNvCxnSpPr>
+          <p:nvPr/>
+        </p:nvCxnSpPr>
+        <p:spPr>
+          <a:xfrm flipV="1">
+            <a:off x="4114800" y="2322317"/>
+            <a:ext cx="549792" cy="1626565"/>
+          </a:xfrm>
+          <a:prstGeom prst="bentConnector3">
+            <a:avLst>
+              <a:gd name="adj1" fmla="val 14721"/>
+            </a:avLst>
+          </a:prstGeom>
+          <a:ln w="19050">
+            <a:solidFill>
+              <a:schemeClr val="accent5">
+                <a:lumMod val="75000"/>
+              </a:schemeClr>
+            </a:solidFill>
+            <a:prstDash val="sysDot"/>
+            <a:headEnd type="none" w="med" len="med"/>
+            <a:tailEnd type="arrow" w="med" len="med"/>
+          </a:ln>
+          <a:effectLst/>
+        </p:spPr>
+        <p:style>
+          <a:lnRef idx="1">
+            <a:schemeClr val="accent2"/>
+          </a:lnRef>
+          <a:fillRef idx="2">
+            <a:schemeClr val="accent2"/>
+          </a:fillRef>
+          <a:effectRef idx="1">
+            <a:schemeClr val="accent2"/>
+          </a:effectRef>
+          <a:fontRef idx="minor">
+            <a:schemeClr val="dk1"/>
+          </a:fontRef>
+        </p:style>
+      </p:cxnSp>
+      <p:cxnSp>
+        <p:nvCxnSpPr>
+          <p:cNvPr id="120" name="Elbow Connector 63"/>
+          <p:cNvCxnSpPr>
+            <a:stCxn id="44" idx="1"/>
+            <a:endCxn id="10" idx="3"/>
+          </p:cNvCxnSpPr>
+          <p:nvPr/>
+        </p:nvCxnSpPr>
+        <p:spPr>
+          <a:xfrm flipV="1">
+            <a:off x="5758227" y="2728300"/>
+            <a:ext cx="768138" cy="417"/>
+          </a:xfrm>
+          <a:prstGeom prst="bentConnector3">
+            <a:avLst>
+              <a:gd name="adj1" fmla="val 50000"/>
+            </a:avLst>
+          </a:prstGeom>
+          <a:ln w="19050">
+            <a:solidFill>
+              <a:schemeClr val="accent5">
+                <a:lumMod val="75000"/>
+              </a:schemeClr>
+            </a:solidFill>
+            <a:prstDash val="sysDot"/>
+            <a:headEnd type="none" w="med" len="med"/>
+            <a:tailEnd type="arrow" w="med" len="med"/>
+          </a:ln>
+          <a:effectLst/>
+        </p:spPr>
+        <p:style>
+          <a:lnRef idx="1">
+            <a:schemeClr val="accent2"/>
+          </a:lnRef>
+          <a:fillRef idx="2">
+            <a:schemeClr val="accent2"/>
+          </a:fillRef>
+          <a:effectRef idx="1">
+            <a:schemeClr val="accent2"/>
+          </a:effectRef>
+          <a:fontRef idx="minor">
+            <a:schemeClr val="dk1"/>
+          </a:fontRef>
+        </p:style>
+      </p:cxnSp>
+      <p:cxnSp>
+        <p:nvCxnSpPr>
+          <p:cNvPr id="122" name="Elbow Connector 63"/>
+          <p:cNvCxnSpPr>
+            <a:stCxn id="42" idx="1"/>
+            <a:endCxn id="4" idx="3"/>
+          </p:cNvCxnSpPr>
+          <p:nvPr/>
+        </p:nvCxnSpPr>
+        <p:spPr>
+          <a:xfrm>
+            <a:off x="5758227" y="2322317"/>
+            <a:ext cx="762000" cy="230"/>
+          </a:xfrm>
+          <a:prstGeom prst="bentConnector3">
+            <a:avLst>
+              <a:gd name="adj1" fmla="val 50000"/>
+            </a:avLst>
+          </a:prstGeom>
+          <a:ln w="19050">
+            <a:solidFill>
+              <a:schemeClr val="accent5">
+                <a:lumMod val="75000"/>
+              </a:schemeClr>
+            </a:solidFill>
+            <a:prstDash val="sysDot"/>
+            <a:headEnd type="none" w="med" len="med"/>
+            <a:tailEnd type="arrow" w="med" len="med"/>
+          </a:ln>
+          <a:effectLst/>
+        </p:spPr>
+        <p:style>
+          <a:lnRef idx="1">
+            <a:schemeClr val="accent2"/>
+          </a:lnRef>
+          <a:fillRef idx="2">
+            <a:schemeClr val="accent2"/>
+          </a:fillRef>
+          <a:effectRef idx="1">
+            <a:schemeClr val="accent2"/>
+          </a:effectRef>
+          <a:fontRef idx="minor">
+            <a:schemeClr val="dk1"/>
+          </a:fontRef>
+        </p:style>
+      </p:cxnSp>
+      <p:cxnSp>
+        <p:nvCxnSpPr>
+          <p:cNvPr id="64" name="Straight Connector 63"/>
+          <p:cNvCxnSpPr/>
+          <p:nvPr/>
+        </p:nvCxnSpPr>
+        <p:spPr>
+          <a:xfrm>
+            <a:off x="3886200" y="2078487"/>
+            <a:ext cx="0" cy="1218984"/>
+          </a:xfrm>
+          <a:prstGeom prst="line">
+            <a:avLst/>
+          </a:prstGeom>
+          <a:ln w="19050">
+            <a:solidFill>
+              <a:schemeClr val="accent5">
+                <a:lumMod val="50000"/>
+              </a:schemeClr>
+            </a:solidFill>
+            <a:prstDash val="sysDot"/>
+            <a:headEnd type="none" w="med" len="med"/>
+            <a:tailEnd type="none" w="med" len="med"/>
+          </a:ln>
+          <a:effectLst/>
+        </p:spPr>
+        <p:style>
+          <a:lnRef idx="1">
+            <a:schemeClr val="accent2"/>
+          </a:lnRef>
+          <a:fillRef idx="2">
+            <a:schemeClr val="accent2"/>
+          </a:fillRef>
+          <a:effectRef idx="1">
+            <a:schemeClr val="accent2"/>
+          </a:effectRef>
+          <a:fontRef idx="minor">
+            <a:schemeClr val="dk1"/>
+          </a:fontRef>
+        </p:style>
+      </p:cxnSp>
+      <p:cxnSp>
+        <p:nvCxnSpPr>
+          <p:cNvPr id="66" name="Straight Connector 65"/>
+          <p:cNvCxnSpPr/>
+          <p:nvPr/>
+        </p:nvCxnSpPr>
+        <p:spPr>
+          <a:xfrm>
+            <a:off x="3894672" y="2209800"/>
+            <a:ext cx="769918" cy="0"/>
+          </a:xfrm>
+          <a:prstGeom prst="line">
+            <a:avLst/>
+          </a:prstGeom>
+          <a:ln w="19050">
+            <a:solidFill>
+              <a:schemeClr val="accent5">
+                <a:lumMod val="50000"/>
+              </a:schemeClr>
+            </a:solidFill>
+            <a:prstDash val="sysDot"/>
+            <a:headEnd type="none" w="med" len="med"/>
+            <a:tailEnd type="none" w="med" len="med"/>
+          </a:ln>
+          <a:effectLst/>
+        </p:spPr>
+        <p:style>
+          <a:lnRef idx="1">
+            <a:schemeClr val="accent2"/>
+          </a:lnRef>
+          <a:fillRef idx="2">
+            <a:schemeClr val="accent2"/>
+          </a:fillRef>
+          <a:effectRef idx="1">
+            <a:schemeClr val="accent2"/>
+          </a:effectRef>
+          <a:fontRef idx="minor">
+            <a:schemeClr val="dk1"/>
+          </a:fontRef>
+        </p:style>
+      </p:cxnSp>
+      <p:cxnSp>
+        <p:nvCxnSpPr>
+          <p:cNvPr id="73" name="Straight Connector 72"/>
+          <p:cNvCxnSpPr/>
+          <p:nvPr/>
+        </p:nvCxnSpPr>
+        <p:spPr>
+          <a:xfrm>
+            <a:off x="3886200" y="2607244"/>
+            <a:ext cx="769918" cy="0"/>
+          </a:xfrm>
+          <a:prstGeom prst="line">
+            <a:avLst/>
+          </a:prstGeom>
+          <a:ln w="19050">
+            <a:solidFill>
+              <a:schemeClr val="accent5">
+                <a:lumMod val="50000"/>
+              </a:schemeClr>
+            </a:solidFill>
+            <a:prstDash val="sysDot"/>
+            <a:headEnd type="none" w="med" len="med"/>
+            <a:tailEnd type="none" w="med" len="med"/>
+          </a:ln>
+          <a:effectLst/>
+        </p:spPr>
+        <p:style>
+          <a:lnRef idx="1">
+            <a:schemeClr val="accent2"/>
+          </a:lnRef>
+          <a:fillRef idx="2">
+            <a:schemeClr val="accent2"/>
+          </a:fillRef>
+          <a:effectRef idx="1">
+            <a:schemeClr val="accent2"/>
+          </a:effectRef>
+          <a:fontRef idx="minor">
+            <a:schemeClr val="dk1"/>
+          </a:fontRef>
+        </p:style>
+      </p:cxnSp>
+      <p:cxnSp>
+        <p:nvCxnSpPr>
+          <p:cNvPr id="74" name="Straight Connector 73"/>
+          <p:cNvCxnSpPr/>
+          <p:nvPr/>
+        </p:nvCxnSpPr>
+        <p:spPr>
+          <a:xfrm>
+            <a:off x="3886200" y="3048000"/>
+            <a:ext cx="769918" cy="0"/>
+          </a:xfrm>
+          <a:prstGeom prst="line">
+            <a:avLst/>
+          </a:prstGeom>
+          <a:ln w="19050">
+            <a:solidFill>
+              <a:schemeClr val="accent5">
+                <a:lumMod val="50000"/>
+              </a:schemeClr>
+            </a:solidFill>
+            <a:prstDash val="sysDot"/>
+            <a:headEnd type="none" w="med" len="med"/>
+            <a:tailEnd type="none" w="med" len="med"/>
+          </a:ln>
+          <a:effectLst/>
+        </p:spPr>
+        <p:style>
+          <a:lnRef idx="1">
+            <a:schemeClr val="accent2"/>
+          </a:lnRef>
+          <a:fillRef idx="2">
+            <a:schemeClr val="accent2"/>
+          </a:fillRef>
+          <a:effectRef idx="1">
+            <a:schemeClr val="accent2"/>
+          </a:effectRef>
+          <a:fontRef idx="minor">
+            <a:schemeClr val="dk1"/>
+          </a:fontRef>
+        </p:style>
+      </p:cxnSp>
     </p:spTree>
     <p:extLst>
       <p:ext uri="{BB962C8B-B14F-4D97-AF65-F5344CB8AC3E}">

</xml_diff>

<commit_message>
Interdiff between v5 and v6
</commit_message>
<xml_diff>
--- a/docs/diagrams/LogicComponentClassDiagram.pptx
+++ b/docs/diagrams/LogicComponentClassDiagram.pptx
@@ -6189,13 +6189,15 @@
         <p:spPr>
           <a:xfrm>
             <a:off x="3158534" y="2447743"/>
-            <a:ext cx="575266" cy="0"/>
+            <a:ext cx="346666" cy="0"/>
           </a:xfrm>
           <a:prstGeom prst="line">
             <a:avLst/>
           </a:prstGeom>
           <a:ln>
             <a:prstDash val="sysDash"/>
+            <a:headEnd type="arrow" w="med" len="med"/>
+            <a:tailEnd type="none" w="med" len="med"/>
           </a:ln>
         </p:spPr>
         <p:style>
@@ -6250,6 +6252,105 @@
           </a:fontRef>
         </p:style>
       </p:cxnSp>
+      <p:grpSp>
+        <p:nvGrpSpPr>
+          <p:cNvPr id="68" name="Group 67"/>
+          <p:cNvGrpSpPr/>
+          <p:nvPr/>
+        </p:nvGrpSpPr>
+        <p:grpSpPr>
+          <a:xfrm rot="5400000">
+            <a:off x="3583288" y="3481226"/>
+            <a:ext cx="555486" cy="254462"/>
+            <a:chOff x="3798139" y="875689"/>
+            <a:chExt cx="555486" cy="230832"/>
+          </a:xfrm>
+        </p:grpSpPr>
+        <p:sp>
+          <p:nvSpPr>
+            <p:cNvPr id="69" name="TextBox 68"/>
+            <p:cNvSpPr txBox="1"/>
+            <p:nvPr/>
+          </p:nvSpPr>
+          <p:spPr>
+            <a:xfrm rot="10800000">
+              <a:off x="3798139" y="875689"/>
+              <a:ext cx="555486" cy="230832"/>
+            </a:xfrm>
+            <a:prstGeom prst="rect">
+              <a:avLst/>
+            </a:prstGeom>
+            <a:noFill/>
+          </p:spPr>
+          <p:txBody>
+            <a:bodyPr wrap="square" lIns="0" tIns="0" rIns="0" bIns="0" rtlCol="0">
+              <a:noAutofit/>
+            </a:bodyPr>
+            <a:lstStyle/>
+            <a:p>
+              <a:r>
+                <a:rPr lang="en-US" sz="1100" dirty="0" smtClean="0">
+                  <a:solidFill>
+                    <a:srgbClr val="0070C0"/>
+                  </a:solidFill>
+                </a:rPr>
+                <a:t>creates</a:t>
+              </a:r>
+              <a:endParaRPr lang="en-SG" sz="1100" dirty="0">
+                <a:solidFill>
+                  <a:srgbClr val="0070C0"/>
+                </a:solidFill>
+              </a:endParaRPr>
+            </a:p>
+          </p:txBody>
+        </p:sp>
+        <p:sp>
+          <p:nvSpPr>
+            <p:cNvPr id="70" name="Isosceles Triangle 69"/>
+            <p:cNvSpPr/>
+            <p:nvPr/>
+          </p:nvSpPr>
+          <p:spPr>
+            <a:xfrm rot="5400000" flipV="1">
+              <a:off x="3822835" y="964974"/>
+              <a:ext cx="119885" cy="88141"/>
+            </a:xfrm>
+            <a:prstGeom prst="triangle">
+              <a:avLst/>
+            </a:prstGeom>
+            <a:solidFill>
+              <a:srgbClr val="0070C0"/>
+            </a:solidFill>
+            <a:ln>
+              <a:noFill/>
+            </a:ln>
+          </p:spPr>
+          <p:style>
+            <a:lnRef idx="2">
+              <a:schemeClr val="accent1">
+                <a:shade val="50000"/>
+              </a:schemeClr>
+            </a:lnRef>
+            <a:fillRef idx="1">
+              <a:schemeClr val="accent1"/>
+            </a:fillRef>
+            <a:effectRef idx="0">
+              <a:schemeClr val="accent1"/>
+            </a:effectRef>
+            <a:fontRef idx="minor">
+              <a:schemeClr val="lt1"/>
+            </a:fontRef>
+          </p:style>
+          <p:txBody>
+            <a:bodyPr rtlCol="0" anchor="ctr"/>
+            <a:lstStyle/>
+            <a:p>
+              <a:pPr algn="ctr"/>
+              <a:endParaRPr lang="en-SG"/>
+            </a:p>
+          </p:txBody>
+        </p:sp>
+      </p:grpSp>
     </p:spTree>
     <p:extLst>
       <p:ext uri="{BB962C8B-B14F-4D97-AF65-F5344CB8AC3E}">

</xml_diff>

<commit_message>
Interdiff between v3 and v4
</commit_message>
<xml_diff>
--- a/docs/diagrams/LogicComponentClassDiagram.pptx
+++ b/docs/diagrams/LogicComponentClassDiagram.pptx
@@ -8,7 +8,7 @@
     <p:notesMasterId r:id="rId3"/>
   </p:notesMasterIdLst>
   <p:sldIdLst>
-    <p:sldId id="261" r:id="rId2"/>
+    <p:sldId id="262" r:id="rId2"/>
   </p:sldIdLst>
   <p:sldSz cx="9144000" cy="6858000" type="screen4x3"/>
   <p:notesSz cx="6858000" cy="9144000"/>
@@ -107,6 +107,22 @@
       </a:defRPr>
     </a:lvl9pPr>
   </p:defaultTextStyle>
+  <p:extLst>
+    <p:ext uri="{EFAFB233-063F-42B5-8137-9DF3F51BA10A}">
+      <p15:sldGuideLst xmlns:p15="http://schemas.microsoft.com/office/powerpoint/2012/main">
+        <p15:guide id="1" orient="horz" pos="1488">
+          <p15:clr>
+            <a:srgbClr val="A4A3A4"/>
+          </p15:clr>
+        </p15:guide>
+        <p15:guide id="2" pos="2880">
+          <p15:clr>
+            <a:srgbClr val="A4A3A4"/>
+          </p15:clr>
+        </p15:guide>
+      </p15:sldGuideLst>
+    </p:ext>
+  </p:extLst>
 </p:presentation>
 </file>
 
@@ -192,7 +208,7 @@
           <a:p>
             <a:fld id="{F5CC4B3F-88C1-4FFA-B1B6-F41C21DC6924}" type="datetimeFigureOut">
               <a:rPr lang="en-US" smtClean="0"/>
-              <a:t>10/16/2016</a:t>
+              <a:t>2/1/2017</a:t>
             </a:fld>
             <a:endParaRPr lang="en-US"/>
           </a:p>
@@ -641,7 +657,7 @@
           <a:p>
             <a:fld id="{78C97017-6FC3-485B-9764-EAC9E56C1D49}" type="datetimeFigureOut">
               <a:rPr lang="en-US" smtClean="0"/>
-              <a:t>10/16/2016</a:t>
+              <a:t>2/1/2017</a:t>
             </a:fld>
             <a:endParaRPr lang="en-US"/>
           </a:p>
@@ -811,7 +827,7 @@
           <a:p>
             <a:fld id="{78C97017-6FC3-485B-9764-EAC9E56C1D49}" type="datetimeFigureOut">
               <a:rPr lang="en-US" smtClean="0"/>
-              <a:t>10/16/2016</a:t>
+              <a:t>2/1/2017</a:t>
             </a:fld>
             <a:endParaRPr lang="en-US"/>
           </a:p>
@@ -991,7 +1007,7 @@
           <a:p>
             <a:fld id="{78C97017-6FC3-485B-9764-EAC9E56C1D49}" type="datetimeFigureOut">
               <a:rPr lang="en-US" smtClean="0"/>
-              <a:t>10/16/2016</a:t>
+              <a:t>2/1/2017</a:t>
             </a:fld>
             <a:endParaRPr lang="en-US"/>
           </a:p>
@@ -1161,7 +1177,7 @@
           <a:p>
             <a:fld id="{78C97017-6FC3-485B-9764-EAC9E56C1D49}" type="datetimeFigureOut">
               <a:rPr lang="en-US" smtClean="0"/>
-              <a:t>10/16/2016</a:t>
+              <a:t>2/1/2017</a:t>
             </a:fld>
             <a:endParaRPr lang="en-US"/>
           </a:p>
@@ -1407,7 +1423,7 @@
           <a:p>
             <a:fld id="{78C97017-6FC3-485B-9764-EAC9E56C1D49}" type="datetimeFigureOut">
               <a:rPr lang="en-US" smtClean="0"/>
-              <a:t>10/16/2016</a:t>
+              <a:t>2/1/2017</a:t>
             </a:fld>
             <a:endParaRPr lang="en-US"/>
           </a:p>
@@ -1695,7 +1711,7 @@
           <a:p>
             <a:fld id="{78C97017-6FC3-485B-9764-EAC9E56C1D49}" type="datetimeFigureOut">
               <a:rPr lang="en-US" smtClean="0"/>
-              <a:t>10/16/2016</a:t>
+              <a:t>2/1/2017</a:t>
             </a:fld>
             <a:endParaRPr lang="en-US"/>
           </a:p>
@@ -2117,7 +2133,7 @@
           <a:p>
             <a:fld id="{78C97017-6FC3-485B-9764-EAC9E56C1D49}" type="datetimeFigureOut">
               <a:rPr lang="en-US" smtClean="0"/>
-              <a:t>10/16/2016</a:t>
+              <a:t>2/1/2017</a:t>
             </a:fld>
             <a:endParaRPr lang="en-US"/>
           </a:p>
@@ -2235,7 +2251,7 @@
           <a:p>
             <a:fld id="{78C97017-6FC3-485B-9764-EAC9E56C1D49}" type="datetimeFigureOut">
               <a:rPr lang="en-US" smtClean="0"/>
-              <a:t>10/16/2016</a:t>
+              <a:t>2/1/2017</a:t>
             </a:fld>
             <a:endParaRPr lang="en-US"/>
           </a:p>
@@ -2330,7 +2346,7 @@
           <a:p>
             <a:fld id="{78C97017-6FC3-485B-9764-EAC9E56C1D49}" type="datetimeFigureOut">
               <a:rPr lang="en-US" smtClean="0"/>
-              <a:t>10/16/2016</a:t>
+              <a:t>2/1/2017</a:t>
             </a:fld>
             <a:endParaRPr lang="en-US"/>
           </a:p>
@@ -2607,7 +2623,7 @@
           <a:p>
             <a:fld id="{78C97017-6FC3-485B-9764-EAC9E56C1D49}" type="datetimeFigureOut">
               <a:rPr lang="en-US" smtClean="0"/>
-              <a:t>10/16/2016</a:t>
+              <a:t>2/1/2017</a:t>
             </a:fld>
             <a:endParaRPr lang="en-US"/>
           </a:p>
@@ -2860,7 +2876,7 @@
           <a:p>
             <a:fld id="{78C97017-6FC3-485B-9764-EAC9E56C1D49}" type="datetimeFigureOut">
               <a:rPr lang="en-US" smtClean="0"/>
-              <a:t>10/16/2016</a:t>
+              <a:t>2/1/2017</a:t>
             </a:fld>
             <a:endParaRPr lang="en-US"/>
           </a:p>
@@ -3073,7 +3089,7 @@
           <a:p>
             <a:fld id="{78C97017-6FC3-485B-9764-EAC9E56C1D49}" type="datetimeFigureOut">
               <a:rPr lang="en-US" smtClean="0"/>
-              <a:t>10/16/2016</a:t>
+              <a:t>2/1/2017</a:t>
             </a:fld>
             <a:endParaRPr lang="en-US"/>
           </a:p>
@@ -3450,14 +3466,14 @@
       </p:grpSpPr>
       <p:sp>
         <p:nvSpPr>
-          <p:cNvPr id="3" name="Rectangle 65"/>
+          <p:cNvPr id="2" name="Rectangle 65"/>
           <p:cNvSpPr/>
           <p:nvPr/>
         </p:nvSpPr>
         <p:spPr>
           <a:xfrm>
-            <a:off x="1103085" y="2057399"/>
-            <a:ext cx="6288315" cy="2272167"/>
+            <a:off x="1070744" y="914401"/>
+            <a:ext cx="6288315" cy="3415166"/>
           </a:xfrm>
           <a:prstGeom prst="roundRect">
             <a:avLst>
@@ -3494,7 +3510,7 @@
           <a:lstStyle/>
           <a:p>
             <a:r>
-              <a:rPr lang="en-US" sz="1200" b="1" dirty="0" smtClean="0">
+              <a:rPr lang="en-US" sz="1200" b="1" dirty="0">
                 <a:solidFill>
                   <a:srgbClr val="0070C0"/>
                 </a:solidFill>
@@ -3511,13 +3527,13 @@
       </p:sp>
       <p:sp>
         <p:nvSpPr>
-          <p:cNvPr id="4" name="Rectangle 8"/>
+          <p:cNvPr id="3" name="Rectangle 8"/>
           <p:cNvSpPr/>
           <p:nvPr/>
         </p:nvSpPr>
         <p:spPr>
           <a:xfrm>
-            <a:off x="2095948" y="2548840"/>
+            <a:off x="2095948" y="1432739"/>
             <a:ext cx="1093635" cy="346760"/>
           </a:xfrm>
           <a:prstGeom prst="rect">
@@ -3570,13 +3586,13 @@
       </p:sp>
       <p:sp>
         <p:nvSpPr>
-          <p:cNvPr id="5" name="Rectangle 11"/>
+          <p:cNvPr id="4" name="Rectangle 11"/>
           <p:cNvSpPr/>
           <p:nvPr/>
         </p:nvSpPr>
         <p:spPr>
           <a:xfrm flipH="1">
-            <a:off x="6180592" y="2648528"/>
+            <a:off x="5943600" y="2139824"/>
             <a:ext cx="1093635" cy="346760"/>
           </a:xfrm>
           <a:prstGeom prst="rect">
@@ -3609,7 +3625,7 @@
           <a:p>
             <a:pPr algn="ctr"/>
             <a:r>
-              <a:rPr lang="en-US" sz="1050" b="1" dirty="0" err="1">
+              <a:rPr lang="en-US" sz="1050" b="1" dirty="0" err="1" smtClean="0">
                 <a:solidFill>
                   <a:srgbClr val="0070C0"/>
                 </a:solidFill>
@@ -3626,13 +3642,13 @@
       </p:sp>
       <p:sp>
         <p:nvSpPr>
-          <p:cNvPr id="6" name="Rectangle 62"/>
+          <p:cNvPr id="5" name="Rectangle 62"/>
           <p:cNvSpPr/>
           <p:nvPr/>
         </p:nvSpPr>
         <p:spPr>
           <a:xfrm>
-            <a:off x="2015218" y="3763620"/>
+            <a:off x="1780785" y="3763620"/>
             <a:ext cx="1093635" cy="346760"/>
           </a:xfrm>
           <a:prstGeom prst="rect">
@@ -3668,7 +3684,7 @@
           <a:p>
             <a:pPr algn="ctr"/>
             <a:r>
-              <a:rPr lang="en-US" sz="1050" dirty="0" err="1" smtClean="0">
+              <a:rPr lang="en-US" sz="1050" dirty="0" err="1">
                 <a:solidFill>
                   <a:schemeClr val="bg1"/>
                 </a:solidFill>
@@ -3685,20 +3701,20 @@
       </p:sp>
       <p:cxnSp>
         <p:nvCxnSpPr>
-          <p:cNvPr id="7" name="Elbow Connector 63"/>
+          <p:cNvPr id="6" name="Elbow Connector 63"/>
           <p:cNvCxnSpPr>
-            <a:endCxn id="4" idx="3"/>
+            <a:endCxn id="3" idx="3"/>
           </p:cNvCxnSpPr>
           <p:nvPr/>
         </p:nvCxnSpPr>
         <p:spPr>
           <a:xfrm rot="10800000">
-            <a:off x="3189584" y="2722220"/>
-            <a:ext cx="2296817" cy="1187104"/>
+            <a:off x="3189584" y="1606119"/>
+            <a:ext cx="2296817" cy="2157062"/>
           </a:xfrm>
           <a:prstGeom prst="bentConnector3">
             <a:avLst>
-              <a:gd name="adj1" fmla="val -267"/>
+              <a:gd name="adj1" fmla="val -1707"/>
             </a:avLst>
           </a:prstGeom>
           <a:ln w="19050">
@@ -3708,383 +3724,6 @@
             <a:prstDash val="sysDot"/>
             <a:headEnd type="none" w="med" len="med"/>
             <a:tailEnd type="arrow" w="med" len="med"/>
-          </a:ln>
-          <a:effectLst/>
-        </p:spPr>
-        <p:style>
-          <a:lnRef idx="1">
-            <a:schemeClr val="accent2"/>
-          </a:lnRef>
-          <a:fillRef idx="2">
-            <a:schemeClr val="accent2"/>
-          </a:fillRef>
-          <a:effectRef idx="1">
-            <a:schemeClr val="accent2"/>
-          </a:effectRef>
-          <a:fontRef idx="minor">
-            <a:schemeClr val="dk1"/>
-          </a:fontRef>
-        </p:style>
-      </p:cxnSp>
-      <p:sp>
-        <p:nvSpPr>
-          <p:cNvPr id="8" name="Isosceles Triangle 102"/>
-          <p:cNvSpPr/>
-          <p:nvPr/>
-        </p:nvSpPr>
-        <p:spPr>
-          <a:xfrm rot="5400000" flipV="1">
-            <a:off x="5563388" y="3813212"/>
-            <a:ext cx="270504" cy="175523"/>
-          </a:xfrm>
-          <a:prstGeom prst="triangle">
-            <a:avLst/>
-          </a:prstGeom>
-          <a:ln w="19050">
-            <a:solidFill>
-              <a:srgbClr val="0070C0"/>
-            </a:solidFill>
-          </a:ln>
-          <a:effectLst/>
-        </p:spPr>
-        <p:style>
-          <a:lnRef idx="1">
-            <a:schemeClr val="accent1"/>
-          </a:lnRef>
-          <a:fillRef idx="2">
-            <a:schemeClr val="accent1"/>
-          </a:fillRef>
-          <a:effectRef idx="1">
-            <a:schemeClr val="accent1"/>
-          </a:effectRef>
-          <a:fontRef idx="minor">
-            <a:schemeClr val="dk1"/>
-          </a:fontRef>
-        </p:style>
-        <p:txBody>
-          <a:bodyPr rtlCol="0" anchor="ctr"/>
-          <a:lstStyle/>
-          <a:p>
-            <a:pPr algn="ctr"/>
-            <a:endParaRPr lang="en-SG" sz="1050" b="1">
-              <a:solidFill>
-                <a:srgbClr val="92D050"/>
-              </a:solidFill>
-            </a:endParaRPr>
-          </a:p>
-        </p:txBody>
-      </p:sp>
-      <p:cxnSp>
-        <p:nvCxnSpPr>
-          <p:cNvPr id="9" name="Elbow Connector 122"/>
-          <p:cNvCxnSpPr>
-            <a:endCxn id="4" idx="1"/>
-          </p:cNvCxnSpPr>
-          <p:nvPr/>
-        </p:nvCxnSpPr>
-        <p:spPr>
-          <a:xfrm>
-            <a:off x="1676400" y="2719360"/>
-            <a:ext cx="419548" cy="2860"/>
-          </a:xfrm>
-          <a:prstGeom prst="bentConnector3">
-            <a:avLst>
-              <a:gd name="adj1" fmla="val 50000"/>
-            </a:avLst>
-          </a:prstGeom>
-          <a:ln w="19050">
-            <a:solidFill>
-              <a:srgbClr val="0070C0"/>
-            </a:solidFill>
-            <a:prstDash val="sysDot"/>
-            <a:headEnd type="none" w="med" len="med"/>
-            <a:tailEnd type="arrow" w="med" len="med"/>
-          </a:ln>
-          <a:effectLst/>
-        </p:spPr>
-        <p:style>
-          <a:lnRef idx="1">
-            <a:schemeClr val="accent2"/>
-          </a:lnRef>
-          <a:fillRef idx="2">
-            <a:schemeClr val="accent2"/>
-          </a:fillRef>
-          <a:effectRef idx="1">
-            <a:schemeClr val="accent2"/>
-          </a:effectRef>
-          <a:fontRef idx="minor">
-            <a:schemeClr val="dk1"/>
-          </a:fontRef>
-        </p:style>
-      </p:cxnSp>
-      <p:sp>
-        <p:nvSpPr>
-          <p:cNvPr id="10" name="Rectangle 65"/>
-          <p:cNvSpPr/>
-          <p:nvPr/>
-        </p:nvSpPr>
-        <p:spPr>
-          <a:xfrm>
-            <a:off x="1103085" y="4548755"/>
-            <a:ext cx="6288315" cy="328045"/>
-          </a:xfrm>
-          <a:prstGeom prst="roundRect">
-            <a:avLst/>
-          </a:prstGeom>
-          <a:solidFill>
-            <a:schemeClr val="accent4">
-              <a:lumMod val="20000"/>
-              <a:lumOff val="80000"/>
-            </a:schemeClr>
-          </a:solidFill>
-          <a:ln w="19050">
-            <a:noFill/>
-          </a:ln>
-          <a:effectLst/>
-        </p:spPr>
-        <p:style>
-          <a:lnRef idx="1">
-            <a:schemeClr val="accent2"/>
-          </a:lnRef>
-          <a:fillRef idx="2">
-            <a:schemeClr val="accent2"/>
-          </a:fillRef>
-          <a:effectRef idx="1">
-            <a:schemeClr val="accent2"/>
-          </a:effectRef>
-          <a:fontRef idx="minor">
-            <a:schemeClr val="dk1"/>
-          </a:fontRef>
-        </p:style>
-        <p:txBody>
-          <a:bodyPr rtlCol="0" anchor="ctr"/>
-          <a:lstStyle/>
-          <a:p>
-            <a:pPr algn="ctr"/>
-            <a:r>
-              <a:rPr lang="en-US" sz="1100" b="1" dirty="0">
-                <a:solidFill>
-                  <a:schemeClr val="bg1"/>
-                </a:solidFill>
-              </a:rPr>
-              <a:t>Model</a:t>
-            </a:r>
-            <a:endParaRPr lang="en-SG" sz="1100" b="1" dirty="0">
-              <a:solidFill>
-                <a:schemeClr val="bg1"/>
-              </a:solidFill>
-            </a:endParaRPr>
-          </a:p>
-        </p:txBody>
-      </p:sp>
-      <p:sp>
-        <p:nvSpPr>
-          <p:cNvPr id="11" name="Rectangle 11"/>
-          <p:cNvSpPr/>
-          <p:nvPr/>
-        </p:nvSpPr>
-        <p:spPr>
-          <a:xfrm flipH="1">
-            <a:off x="6180592" y="3054928"/>
-            <a:ext cx="1093635" cy="346760"/>
-          </a:xfrm>
-          <a:prstGeom prst="rect">
-            <a:avLst/>
-          </a:prstGeom>
-          <a:ln w="19050">
-            <a:solidFill>
-              <a:srgbClr val="0070C0"/>
-            </a:solidFill>
-          </a:ln>
-          <a:effectLst/>
-        </p:spPr>
-        <p:style>
-          <a:lnRef idx="1">
-            <a:schemeClr val="accent1"/>
-          </a:lnRef>
-          <a:fillRef idx="2">
-            <a:schemeClr val="accent1"/>
-          </a:fillRef>
-          <a:effectRef idx="1">
-            <a:schemeClr val="accent1"/>
-          </a:effectRef>
-          <a:fontRef idx="minor">
-            <a:schemeClr val="dk1"/>
-          </a:fontRef>
-        </p:style>
-        <p:txBody>
-          <a:bodyPr rtlCol="0" anchor="ctr"/>
-          <a:lstStyle/>
-          <a:p>
-            <a:pPr algn="ctr"/>
-            <a:r>
-              <a:rPr lang="en-US" sz="1050" b="1" dirty="0" err="1">
-                <a:solidFill>
-                  <a:srgbClr val="0070C0"/>
-                </a:solidFill>
-              </a:rPr>
-              <a:t>ListCommand</a:t>
-            </a:r>
-            <a:endParaRPr lang="en-SG" sz="1050" b="1" dirty="0">
-              <a:solidFill>
-                <a:srgbClr val="0070C0"/>
-              </a:solidFill>
-            </a:endParaRPr>
-          </a:p>
-        </p:txBody>
-      </p:sp>
-      <p:sp>
-        <p:nvSpPr>
-          <p:cNvPr id="12" name="Rectangle 11"/>
-          <p:cNvSpPr/>
-          <p:nvPr/>
-        </p:nvSpPr>
-        <p:spPr>
-          <a:xfrm flipH="1">
-            <a:off x="6180590" y="3860800"/>
-            <a:ext cx="1093635" cy="346760"/>
-          </a:xfrm>
-          <a:prstGeom prst="rect">
-            <a:avLst/>
-          </a:prstGeom>
-          <a:ln w="19050">
-            <a:solidFill>
-              <a:srgbClr val="0070C0"/>
-            </a:solidFill>
-          </a:ln>
-          <a:effectLst/>
-        </p:spPr>
-        <p:style>
-          <a:lnRef idx="1">
-            <a:schemeClr val="accent1"/>
-          </a:lnRef>
-          <a:fillRef idx="2">
-            <a:schemeClr val="accent1"/>
-          </a:fillRef>
-          <a:effectRef idx="1">
-            <a:schemeClr val="accent1"/>
-          </a:effectRef>
-          <a:fontRef idx="minor">
-            <a:schemeClr val="dk1"/>
-          </a:fontRef>
-        </p:style>
-        <p:txBody>
-          <a:bodyPr rtlCol="0" anchor="ctr"/>
-          <a:lstStyle/>
-          <a:p>
-            <a:pPr algn="ctr"/>
-            <a:r>
-              <a:rPr lang="en-US" sz="1050" b="1" dirty="0">
-                <a:solidFill>
-                  <a:srgbClr val="0070C0"/>
-                </a:solidFill>
-              </a:rPr>
-              <a:t>…</a:t>
-            </a:r>
-            <a:endParaRPr lang="en-SG" sz="1050" b="1" dirty="0">
-              <a:solidFill>
-                <a:srgbClr val="0070C0"/>
-              </a:solidFill>
-            </a:endParaRPr>
-          </a:p>
-        </p:txBody>
-      </p:sp>
-      <p:sp>
-        <p:nvSpPr>
-          <p:cNvPr id="14" name="Rectangle 62"/>
-          <p:cNvSpPr/>
-          <p:nvPr/>
-        </p:nvSpPr>
-        <p:spPr>
-          <a:xfrm>
-            <a:off x="4815685" y="3765721"/>
-            <a:ext cx="772043" cy="346760"/>
-          </a:xfrm>
-          <a:prstGeom prst="rect">
-            <a:avLst/>
-          </a:prstGeom>
-          <a:ln w="19050">
-            <a:solidFill>
-              <a:srgbClr val="0070C0"/>
-            </a:solidFill>
-          </a:ln>
-          <a:effectLst/>
-        </p:spPr>
-        <p:style>
-          <a:lnRef idx="1">
-            <a:schemeClr val="accent1"/>
-          </a:lnRef>
-          <a:fillRef idx="2">
-            <a:schemeClr val="accent1"/>
-          </a:fillRef>
-          <a:effectRef idx="1">
-            <a:schemeClr val="accent1"/>
-          </a:effectRef>
-          <a:fontRef idx="minor">
-            <a:schemeClr val="dk1"/>
-          </a:fontRef>
-        </p:style>
-        <p:txBody>
-          <a:bodyPr rtlCol="0" anchor="ctr"/>
-          <a:lstStyle/>
-          <a:p>
-            <a:pPr algn="ctr"/>
-            <a:r>
-              <a:rPr lang="en-US" sz="1050" b="1" dirty="0" smtClean="0">
-                <a:solidFill>
-                  <a:srgbClr val="0070C0"/>
-                </a:solidFill>
-              </a:rPr>
-              <a:t>{abstract}</a:t>
-            </a:r>
-            <a:br>
-              <a:rPr lang="en-US" sz="1050" b="1" dirty="0" smtClean="0">
-                <a:solidFill>
-                  <a:srgbClr val="0070C0"/>
-                </a:solidFill>
-              </a:rPr>
-            </a:br>
-            <a:r>
-              <a:rPr lang="en-US" sz="1050" b="1" dirty="0" smtClean="0">
-                <a:solidFill>
-                  <a:srgbClr val="0070C0"/>
-                </a:solidFill>
-              </a:rPr>
-              <a:t>Command</a:t>
-            </a:r>
-            <a:endParaRPr lang="en-SG" sz="1050" b="1" dirty="0">
-              <a:solidFill>
-                <a:srgbClr val="0070C0"/>
-              </a:solidFill>
-            </a:endParaRPr>
-          </a:p>
-        </p:txBody>
-      </p:sp>
-      <p:cxnSp>
-        <p:nvCxnSpPr>
-          <p:cNvPr id="15" name="Elbow Connector 63"/>
-          <p:cNvCxnSpPr>
-            <a:stCxn id="5" idx="3"/>
-            <a:endCxn id="8" idx="3"/>
-          </p:cNvCxnSpPr>
-          <p:nvPr/>
-        </p:nvCxnSpPr>
-        <p:spPr>
-          <a:xfrm rot="10800000" flipV="1">
-            <a:off x="5786402" y="2821908"/>
-            <a:ext cx="394190" cy="1079066"/>
-          </a:xfrm>
-          <a:prstGeom prst="bentConnector3">
-            <a:avLst>
-              <a:gd name="adj1" fmla="val 50000"/>
-            </a:avLst>
-          </a:prstGeom>
-          <a:ln w="19050">
-            <a:solidFill>
-              <a:srgbClr val="0070C0"/>
-            </a:solidFill>
-            <a:headEnd type="none" w="med" len="med"/>
-            <a:tailEnd type="none" w="med" len="med"/>
           </a:ln>
           <a:effectLst/>
         </p:spPr>
@@ -4105,17 +3744,16 @@
       </p:cxnSp>
       <p:cxnSp>
         <p:nvCxnSpPr>
-          <p:cNvPr id="16" name="Elbow Connector 63"/>
+          <p:cNvPr id="8" name="Elbow Connector 122"/>
           <p:cNvCxnSpPr>
-            <a:stCxn id="8" idx="3"/>
-            <a:endCxn id="12" idx="3"/>
+            <a:endCxn id="3" idx="1"/>
           </p:cNvCxnSpPr>
           <p:nvPr/>
         </p:nvCxnSpPr>
         <p:spPr>
           <a:xfrm>
-            <a:off x="5786402" y="3900974"/>
-            <a:ext cx="394188" cy="133206"/>
+            <a:off x="1676400" y="1603259"/>
+            <a:ext cx="419548" cy="2860"/>
           </a:xfrm>
           <a:prstGeom prst="bentConnector3">
             <a:avLst>
@@ -4126,8 +3764,355 @@
             <a:solidFill>
               <a:srgbClr val="0070C0"/>
             </a:solidFill>
+            <a:prstDash val="sysDot"/>
             <a:headEnd type="none" w="med" len="med"/>
-            <a:tailEnd type="none" w="med" len="med"/>
+            <a:tailEnd type="arrow" w="med" len="med"/>
+          </a:ln>
+          <a:effectLst/>
+        </p:spPr>
+        <p:style>
+          <a:lnRef idx="1">
+            <a:schemeClr val="accent2"/>
+          </a:lnRef>
+          <a:fillRef idx="2">
+            <a:schemeClr val="accent2"/>
+          </a:fillRef>
+          <a:effectRef idx="1">
+            <a:schemeClr val="accent2"/>
+          </a:effectRef>
+          <a:fontRef idx="minor">
+            <a:schemeClr val="dk1"/>
+          </a:fontRef>
+        </p:style>
+      </p:cxnSp>
+      <p:sp>
+        <p:nvSpPr>
+          <p:cNvPr id="9" name="Rectangle 65"/>
+          <p:cNvSpPr/>
+          <p:nvPr/>
+        </p:nvSpPr>
+        <p:spPr>
+          <a:xfrm>
+            <a:off x="1103085" y="4548755"/>
+            <a:ext cx="6288315" cy="328045"/>
+          </a:xfrm>
+          <a:prstGeom prst="roundRect">
+            <a:avLst/>
+          </a:prstGeom>
+          <a:solidFill>
+            <a:schemeClr val="accent4">
+              <a:lumMod val="20000"/>
+              <a:lumOff val="80000"/>
+            </a:schemeClr>
+          </a:solidFill>
+          <a:ln w="19050">
+            <a:noFill/>
+          </a:ln>
+          <a:effectLst/>
+        </p:spPr>
+        <p:style>
+          <a:lnRef idx="1">
+            <a:schemeClr val="accent2"/>
+          </a:lnRef>
+          <a:fillRef idx="2">
+            <a:schemeClr val="accent2"/>
+          </a:fillRef>
+          <a:effectRef idx="1">
+            <a:schemeClr val="accent2"/>
+          </a:effectRef>
+          <a:fontRef idx="minor">
+            <a:schemeClr val="dk1"/>
+          </a:fontRef>
+        </p:style>
+        <p:txBody>
+          <a:bodyPr rtlCol="0" anchor="ctr"/>
+          <a:lstStyle/>
+          <a:p>
+            <a:pPr algn="ctr"/>
+            <a:r>
+              <a:rPr lang="en-US" sz="1100" b="1" dirty="0">
+                <a:solidFill>
+                  <a:schemeClr val="bg1"/>
+                </a:solidFill>
+              </a:rPr>
+              <a:t>Model</a:t>
+            </a:r>
+            <a:endParaRPr lang="en-SG" sz="1100" b="1" dirty="0">
+              <a:solidFill>
+                <a:schemeClr val="bg1"/>
+              </a:solidFill>
+            </a:endParaRPr>
+          </a:p>
+        </p:txBody>
+      </p:sp>
+      <p:sp>
+        <p:nvSpPr>
+          <p:cNvPr id="10" name="Rectangle 11"/>
+          <p:cNvSpPr/>
+          <p:nvPr/>
+        </p:nvSpPr>
+        <p:spPr>
+          <a:xfrm flipH="1">
+            <a:off x="5949738" y="2545577"/>
+            <a:ext cx="1093635" cy="346760"/>
+          </a:xfrm>
+          <a:prstGeom prst="rect">
+            <a:avLst/>
+          </a:prstGeom>
+          <a:ln w="19050">
+            <a:solidFill>
+              <a:srgbClr val="0070C0"/>
+            </a:solidFill>
+          </a:ln>
+          <a:effectLst/>
+        </p:spPr>
+        <p:style>
+          <a:lnRef idx="1">
+            <a:schemeClr val="accent1"/>
+          </a:lnRef>
+          <a:fillRef idx="2">
+            <a:schemeClr val="accent1"/>
+          </a:fillRef>
+          <a:effectRef idx="1">
+            <a:schemeClr val="accent1"/>
+          </a:effectRef>
+          <a:fontRef idx="minor">
+            <a:schemeClr val="dk1"/>
+          </a:fontRef>
+        </p:style>
+        <p:txBody>
+          <a:bodyPr rtlCol="0" anchor="ctr"/>
+          <a:lstStyle/>
+          <a:p>
+            <a:pPr algn="ctr"/>
+            <a:r>
+              <a:rPr lang="en-US" sz="1050" b="1" dirty="0" err="1" smtClean="0">
+                <a:solidFill>
+                  <a:srgbClr val="0070C0"/>
+                </a:solidFill>
+              </a:rPr>
+              <a:t>FindCommand</a:t>
+            </a:r>
+            <a:endParaRPr lang="en-SG" sz="1050" b="1" dirty="0">
+              <a:solidFill>
+                <a:srgbClr val="0070C0"/>
+              </a:solidFill>
+            </a:endParaRPr>
+          </a:p>
+        </p:txBody>
+      </p:sp>
+      <p:sp>
+        <p:nvSpPr>
+          <p:cNvPr id="11" name="Rectangle 10"/>
+          <p:cNvSpPr/>
+          <p:nvPr/>
+        </p:nvSpPr>
+        <p:spPr>
+          <a:xfrm flipH="1">
+            <a:off x="5949738" y="3387040"/>
+            <a:ext cx="1093635" cy="346760"/>
+          </a:xfrm>
+          <a:prstGeom prst="rect">
+            <a:avLst/>
+          </a:prstGeom>
+          <a:ln w="19050">
+            <a:solidFill>
+              <a:srgbClr val="0070C0"/>
+            </a:solidFill>
+          </a:ln>
+          <a:effectLst/>
+        </p:spPr>
+        <p:style>
+          <a:lnRef idx="1">
+            <a:schemeClr val="accent1"/>
+          </a:lnRef>
+          <a:fillRef idx="2">
+            <a:schemeClr val="accent1"/>
+          </a:fillRef>
+          <a:effectRef idx="1">
+            <a:schemeClr val="accent1"/>
+          </a:effectRef>
+          <a:fontRef idx="minor">
+            <a:schemeClr val="dk1"/>
+          </a:fontRef>
+        </p:style>
+        <p:txBody>
+          <a:bodyPr rtlCol="0" anchor="ctr"/>
+          <a:lstStyle/>
+          <a:p>
+            <a:pPr algn="ctr"/>
+            <a:r>
+              <a:rPr lang="en-US" sz="1050" b="1" dirty="0">
+                <a:solidFill>
+                  <a:srgbClr val="0070C0"/>
+                </a:solidFill>
+              </a:rPr>
+              <a:t>…</a:t>
+            </a:r>
+            <a:endParaRPr lang="en-SG" sz="1050" b="1" dirty="0">
+              <a:solidFill>
+                <a:srgbClr val="0070C0"/>
+              </a:solidFill>
+            </a:endParaRPr>
+          </a:p>
+        </p:txBody>
+      </p:sp>
+      <p:sp>
+        <p:nvSpPr>
+          <p:cNvPr id="12" name="Rectangle 62"/>
+          <p:cNvSpPr/>
+          <p:nvPr/>
+        </p:nvSpPr>
+        <p:spPr>
+          <a:xfrm>
+            <a:off x="4815685" y="3765721"/>
+            <a:ext cx="772043" cy="346760"/>
+          </a:xfrm>
+          <a:prstGeom prst="rect">
+            <a:avLst/>
+          </a:prstGeom>
+          <a:ln w="19050">
+            <a:solidFill>
+              <a:srgbClr val="0070C0"/>
+            </a:solidFill>
+          </a:ln>
+          <a:effectLst/>
+        </p:spPr>
+        <p:style>
+          <a:lnRef idx="1">
+            <a:schemeClr val="accent1"/>
+          </a:lnRef>
+          <a:fillRef idx="2">
+            <a:schemeClr val="accent1"/>
+          </a:fillRef>
+          <a:effectRef idx="1">
+            <a:schemeClr val="accent1"/>
+          </a:effectRef>
+          <a:fontRef idx="minor">
+            <a:schemeClr val="dk1"/>
+          </a:fontRef>
+        </p:style>
+        <p:txBody>
+          <a:bodyPr rtlCol="0" anchor="ctr"/>
+          <a:lstStyle/>
+          <a:p>
+            <a:pPr algn="ctr"/>
+            <a:r>
+              <a:rPr lang="en-US" sz="1050" b="1" dirty="0">
+                <a:solidFill>
+                  <a:srgbClr val="0070C0"/>
+                </a:solidFill>
+              </a:rPr>
+              <a:t>{abstract}</a:t>
+            </a:r>
+            <a:br>
+              <a:rPr lang="en-US" sz="1050" b="1" dirty="0">
+                <a:solidFill>
+                  <a:srgbClr val="0070C0"/>
+                </a:solidFill>
+              </a:rPr>
+            </a:br>
+            <a:r>
+              <a:rPr lang="en-US" sz="1050" b="1" dirty="0">
+                <a:solidFill>
+                  <a:srgbClr val="0070C0"/>
+                </a:solidFill>
+              </a:rPr>
+              <a:t>Command</a:t>
+            </a:r>
+            <a:endParaRPr lang="en-SG" sz="1050" b="1" dirty="0">
+              <a:solidFill>
+                <a:srgbClr val="0070C0"/>
+              </a:solidFill>
+            </a:endParaRPr>
+          </a:p>
+        </p:txBody>
+      </p:sp>
+      <p:sp>
+        <p:nvSpPr>
+          <p:cNvPr id="16" name="Rectangle 62"/>
+          <p:cNvSpPr/>
+          <p:nvPr/>
+        </p:nvSpPr>
+        <p:spPr>
+          <a:xfrm>
+            <a:off x="3098739" y="3766159"/>
+            <a:ext cx="585450" cy="346760"/>
+          </a:xfrm>
+          <a:prstGeom prst="rect">
+            <a:avLst/>
+          </a:prstGeom>
+          <a:solidFill>
+            <a:srgbClr val="0070C0"/>
+          </a:solidFill>
+          <a:ln w="19050">
+            <a:solidFill>
+              <a:srgbClr val="0070C0"/>
+            </a:solidFill>
+          </a:ln>
+          <a:effectLst/>
+        </p:spPr>
+        <p:style>
+          <a:lnRef idx="1">
+            <a:schemeClr val="accent2"/>
+          </a:lnRef>
+          <a:fillRef idx="2">
+            <a:schemeClr val="accent2"/>
+          </a:fillRef>
+          <a:effectRef idx="1">
+            <a:schemeClr val="accent2"/>
+          </a:effectRef>
+          <a:fontRef idx="minor">
+            <a:schemeClr val="dk1"/>
+          </a:fontRef>
+        </p:style>
+        <p:txBody>
+          <a:bodyPr rtlCol="0" anchor="ctr"/>
+          <a:lstStyle/>
+          <a:p>
+            <a:pPr algn="ctr"/>
+            <a:r>
+              <a:rPr lang="en-US" sz="1050" dirty="0">
+                <a:solidFill>
+                  <a:schemeClr val="bg1"/>
+                </a:solidFill>
+              </a:rPr>
+              <a:t>Parser</a:t>
+            </a:r>
+            <a:endParaRPr lang="en-SG" sz="1050" dirty="0">
+              <a:solidFill>
+                <a:schemeClr val="bg1"/>
+              </a:solidFill>
+            </a:endParaRPr>
+          </a:p>
+        </p:txBody>
+      </p:sp>
+      <p:cxnSp>
+        <p:nvCxnSpPr>
+          <p:cNvPr id="17" name="Elbow Connector 106"/>
+          <p:cNvCxnSpPr>
+            <a:stCxn id="5" idx="3"/>
+            <a:endCxn id="16" idx="1"/>
+          </p:cNvCxnSpPr>
+          <p:nvPr/>
+        </p:nvCxnSpPr>
+        <p:spPr>
+          <a:xfrm>
+            <a:off x="2874420" y="3937000"/>
+            <a:ext cx="224319" cy="2539"/>
+          </a:xfrm>
+          <a:prstGeom prst="bentConnector3">
+            <a:avLst>
+              <a:gd name="adj1" fmla="val 50000"/>
+            </a:avLst>
+          </a:prstGeom>
+          <a:ln w="19050">
+            <a:solidFill>
+              <a:srgbClr val="0070C0"/>
+            </a:solidFill>
+            <a:prstDash val="solid"/>
+            <a:headEnd type="none" w="med" len="med"/>
+            <a:tailEnd type="arrow" w="med" len="med"/>
           </a:ln>
           <a:effectLst/>
         </p:spPr>
@@ -4148,29 +4133,27 @@
       </p:cxnSp>
       <p:cxnSp>
         <p:nvCxnSpPr>
-          <p:cNvPr id="17" name="Elbow Connector 63"/>
+          <p:cNvPr id="18" name="Straight Arrow Connector 110"/>
           <p:cNvCxnSpPr>
-            <a:stCxn id="8" idx="3"/>
-            <a:endCxn id="11" idx="3"/>
+            <a:stCxn id="12" idx="2"/>
           </p:cNvCxnSpPr>
           <p:nvPr/>
         </p:nvCxnSpPr>
         <p:spPr>
-          <a:xfrm flipV="1">
-            <a:off x="5786402" y="3228308"/>
-            <a:ext cx="394190" cy="672666"/>
-          </a:xfrm>
-          <a:prstGeom prst="bentConnector3">
-            <a:avLst>
-              <a:gd name="adj1" fmla="val 50000"/>
-            </a:avLst>
+          <a:xfrm>
+            <a:off x="5201707" y="4112481"/>
+            <a:ext cx="1" cy="436274"/>
+          </a:xfrm>
+          <a:prstGeom prst="straightConnector1">
+            <a:avLst/>
           </a:prstGeom>
           <a:ln w="19050">
             <a:solidFill>
               <a:srgbClr val="0070C0"/>
             </a:solidFill>
+            <a:prstDash val="sysDot"/>
             <a:headEnd type="none" w="med" len="med"/>
-            <a:tailEnd type="none" w="med" len="med"/>
+            <a:tailEnd type="arrow" w="med" len="med"/>
           </a:ln>
           <a:effectLst/>
         </p:spPr>
@@ -4191,14 +4174,14 @@
       </p:cxnSp>
       <p:sp>
         <p:nvSpPr>
-          <p:cNvPr id="18" name="Rectangle 62"/>
+          <p:cNvPr id="19" name="Rectangle 62"/>
           <p:cNvSpPr/>
           <p:nvPr/>
         </p:nvSpPr>
         <p:spPr>
-          <a:xfrm>
-            <a:off x="3527828" y="3766159"/>
-            <a:ext cx="585450" cy="346760"/>
+          <a:xfrm rot="16200000">
+            <a:off x="398120" y="2303120"/>
+            <a:ext cx="2209800" cy="346760"/>
           </a:xfrm>
           <a:prstGeom prst="rect">
             <a:avLst/>
@@ -4238,7 +4221,18 @@
                   <a:schemeClr val="bg1"/>
                 </a:solidFill>
               </a:rPr>
-              <a:t>Parser</a:t>
+              <a:t>&lt;&lt;interface&gt;&gt;</a:t>
+            </a:r>
+          </a:p>
+          <a:p>
+            <a:pPr algn="ctr"/>
+            <a:r>
+              <a:rPr lang="en-US" sz="1050" dirty="0">
+                <a:solidFill>
+                  <a:schemeClr val="bg1"/>
+                </a:solidFill>
+              </a:rPr>
+              <a:t>Logic</a:t>
             </a:r>
             <a:endParaRPr lang="en-SG" sz="1050" dirty="0">
               <a:solidFill>
@@ -4248,32 +4242,84 @@
           </a:p>
         </p:txBody>
       </p:sp>
+      <p:sp>
+        <p:nvSpPr>
+          <p:cNvPr id="20" name="Isosceles Triangle 102"/>
+          <p:cNvSpPr/>
+          <p:nvPr/>
+        </p:nvSpPr>
+        <p:spPr>
+          <a:xfrm>
+            <a:off x="1359039" y="3581400"/>
+            <a:ext cx="270504" cy="175523"/>
+          </a:xfrm>
+          <a:prstGeom prst="triangle">
+            <a:avLst/>
+          </a:prstGeom>
+          <a:solidFill>
+            <a:schemeClr val="tx2">
+              <a:lumMod val="60000"/>
+              <a:lumOff val="40000"/>
+            </a:schemeClr>
+          </a:solidFill>
+          <a:ln w="19050">
+            <a:solidFill>
+              <a:srgbClr val="0070C0"/>
+            </a:solidFill>
+          </a:ln>
+          <a:effectLst/>
+        </p:spPr>
+        <p:style>
+          <a:lnRef idx="1">
+            <a:schemeClr val="accent1"/>
+          </a:lnRef>
+          <a:fillRef idx="2">
+            <a:schemeClr val="accent1"/>
+          </a:fillRef>
+          <a:effectRef idx="1">
+            <a:schemeClr val="accent1"/>
+          </a:effectRef>
+          <a:fontRef idx="minor">
+            <a:schemeClr val="dk1"/>
+          </a:fontRef>
+        </p:style>
+        <p:txBody>
+          <a:bodyPr rtlCol="0" anchor="ctr"/>
+          <a:lstStyle/>
+          <a:p>
+            <a:pPr algn="ctr"/>
+            <a:endParaRPr lang="en-SG" sz="1050" b="1">
+              <a:solidFill>
+                <a:srgbClr val="92D050"/>
+              </a:solidFill>
+            </a:endParaRPr>
+          </a:p>
+        </p:txBody>
+      </p:sp>
       <p:cxnSp>
         <p:nvCxnSpPr>
-          <p:cNvPr id="19" name="Elbow Connector 106"/>
+          <p:cNvPr id="21" name="Elbow Connector 63"/>
           <p:cNvCxnSpPr>
-            <a:stCxn id="6" idx="3"/>
-            <a:endCxn id="18" idx="1"/>
+            <a:stCxn id="5" idx="1"/>
+            <a:endCxn id="20" idx="3"/>
           </p:cNvCxnSpPr>
           <p:nvPr/>
         </p:nvCxnSpPr>
         <p:spPr>
-          <a:xfrm>
-            <a:off x="3108853" y="3937000"/>
-            <a:ext cx="418975" cy="2539"/>
-          </a:xfrm>
-          <a:prstGeom prst="bentConnector3">
-            <a:avLst>
-              <a:gd name="adj1" fmla="val 50000"/>
-            </a:avLst>
+          <a:xfrm rot="10800000">
+            <a:off x="1494291" y="3756924"/>
+            <a:ext cx="286494" cy="180077"/>
+          </a:xfrm>
+          <a:prstGeom prst="bentConnector2">
+            <a:avLst/>
           </a:prstGeom>
           <a:ln w="19050">
             <a:solidFill>
               <a:srgbClr val="0070C0"/>
             </a:solidFill>
-            <a:prstDash val="solid"/>
+            <a:prstDash val="sysDot"/>
             <a:headEnd type="none" w="med" len="med"/>
-            <a:tailEnd type="arrow" w="med" len="med"/>
+            <a:tailEnd type="none" w="med" len="med"/>
           </a:ln>
           <a:effectLst/>
         </p:spPr>
@@ -4294,16 +4340,16 @@
       </p:cxnSp>
       <p:cxnSp>
         <p:nvCxnSpPr>
-          <p:cNvPr id="20" name="Straight Arrow Connector 110"/>
+          <p:cNvPr id="23" name="Straight Arrow Connector 57"/>
           <p:cNvCxnSpPr>
-            <a:stCxn id="14" idx="2"/>
+            <a:stCxn id="5" idx="2"/>
           </p:cNvCxnSpPr>
           <p:nvPr/>
         </p:nvCxnSpPr>
         <p:spPr>
-          <a:xfrm>
-            <a:off x="5201707" y="4112481"/>
-            <a:ext cx="1" cy="436274"/>
+          <a:xfrm flipH="1">
+            <a:off x="2327602" y="4110380"/>
+            <a:ext cx="1" cy="438375"/>
           </a:xfrm>
           <a:prstGeom prst="straightConnector1">
             <a:avLst/>
@@ -4312,175 +4358,8 @@
             <a:solidFill>
               <a:srgbClr val="0070C0"/>
             </a:solidFill>
-            <a:prstDash val="sysDot"/>
             <a:headEnd type="none" w="med" len="med"/>
             <a:tailEnd type="arrow" w="med" len="med"/>
-          </a:ln>
-          <a:effectLst/>
-        </p:spPr>
-        <p:style>
-          <a:lnRef idx="1">
-            <a:schemeClr val="accent2"/>
-          </a:lnRef>
-          <a:fillRef idx="2">
-            <a:schemeClr val="accent2"/>
-          </a:fillRef>
-          <a:effectRef idx="1">
-            <a:schemeClr val="accent2"/>
-          </a:effectRef>
-          <a:fontRef idx="minor">
-            <a:schemeClr val="dk1"/>
-          </a:fontRef>
-        </p:style>
-      </p:cxnSp>
-      <p:sp>
-        <p:nvSpPr>
-          <p:cNvPr id="21" name="Rectangle 62"/>
-          <p:cNvSpPr/>
-          <p:nvPr/>
-        </p:nvSpPr>
-        <p:spPr>
-          <a:xfrm rot="16200000">
-            <a:off x="956202" y="2861202"/>
-            <a:ext cx="1093635" cy="346760"/>
-          </a:xfrm>
-          <a:prstGeom prst="rect">
-            <a:avLst/>
-          </a:prstGeom>
-          <a:solidFill>
-            <a:srgbClr val="0070C0"/>
-          </a:solidFill>
-          <a:ln w="19050">
-            <a:solidFill>
-              <a:srgbClr val="0070C0"/>
-            </a:solidFill>
-          </a:ln>
-          <a:effectLst/>
-        </p:spPr>
-        <p:style>
-          <a:lnRef idx="1">
-            <a:schemeClr val="accent2"/>
-          </a:lnRef>
-          <a:fillRef idx="2">
-            <a:schemeClr val="accent2"/>
-          </a:fillRef>
-          <a:effectRef idx="1">
-            <a:schemeClr val="accent2"/>
-          </a:effectRef>
-          <a:fontRef idx="minor">
-            <a:schemeClr val="dk1"/>
-          </a:fontRef>
-        </p:style>
-        <p:txBody>
-          <a:bodyPr rtlCol="0" anchor="ctr"/>
-          <a:lstStyle/>
-          <a:p>
-            <a:pPr algn="ctr"/>
-            <a:r>
-              <a:rPr lang="en-US" sz="1050" dirty="0">
-                <a:solidFill>
-                  <a:schemeClr val="bg1"/>
-                </a:solidFill>
-              </a:rPr>
-              <a:t>&lt;&lt;interface&gt;&gt;</a:t>
-            </a:r>
-          </a:p>
-          <a:p>
-            <a:pPr algn="ctr"/>
-            <a:r>
-              <a:rPr lang="en-US" sz="1050" dirty="0">
-                <a:solidFill>
-                  <a:schemeClr val="bg1"/>
-                </a:solidFill>
-              </a:rPr>
-              <a:t>Logic</a:t>
-            </a:r>
-            <a:endParaRPr lang="en-SG" sz="1050" dirty="0">
-              <a:solidFill>
-                <a:schemeClr val="bg1"/>
-              </a:solidFill>
-            </a:endParaRPr>
-          </a:p>
-        </p:txBody>
-      </p:sp>
-      <p:sp>
-        <p:nvSpPr>
-          <p:cNvPr id="22" name="Isosceles Triangle 102"/>
-          <p:cNvSpPr/>
-          <p:nvPr/>
-        </p:nvSpPr>
-        <p:spPr>
-          <a:xfrm>
-            <a:off x="1359039" y="3581400"/>
-            <a:ext cx="270504" cy="175523"/>
-          </a:xfrm>
-          <a:prstGeom prst="triangle">
-            <a:avLst/>
-          </a:prstGeom>
-          <a:solidFill>
-            <a:schemeClr val="tx2">
-              <a:lumMod val="60000"/>
-              <a:lumOff val="40000"/>
-            </a:schemeClr>
-          </a:solidFill>
-          <a:ln w="19050">
-            <a:solidFill>
-              <a:srgbClr val="0070C0"/>
-            </a:solidFill>
-          </a:ln>
-          <a:effectLst/>
-        </p:spPr>
-        <p:style>
-          <a:lnRef idx="1">
-            <a:schemeClr val="accent1"/>
-          </a:lnRef>
-          <a:fillRef idx="2">
-            <a:schemeClr val="accent1"/>
-          </a:fillRef>
-          <a:effectRef idx="1">
-            <a:schemeClr val="accent1"/>
-          </a:effectRef>
-          <a:fontRef idx="minor">
-            <a:schemeClr val="dk1"/>
-          </a:fontRef>
-        </p:style>
-        <p:txBody>
-          <a:bodyPr rtlCol="0" anchor="ctr"/>
-          <a:lstStyle/>
-          <a:p>
-            <a:pPr algn="ctr"/>
-            <a:endParaRPr lang="en-SG" sz="1050" b="1">
-              <a:solidFill>
-                <a:srgbClr val="92D050"/>
-              </a:solidFill>
-            </a:endParaRPr>
-          </a:p>
-        </p:txBody>
-      </p:sp>
-      <p:cxnSp>
-        <p:nvCxnSpPr>
-          <p:cNvPr id="23" name="Elbow Connector 63"/>
-          <p:cNvCxnSpPr>
-            <a:stCxn id="6" idx="1"/>
-            <a:endCxn id="22" idx="3"/>
-          </p:cNvCxnSpPr>
-          <p:nvPr/>
-        </p:nvCxnSpPr>
-        <p:spPr>
-          <a:xfrm rot="10800000">
-            <a:off x="1494292" y="3756924"/>
-            <a:ext cx="520927" cy="180077"/>
-          </a:xfrm>
-          <a:prstGeom prst="bentConnector2">
-            <a:avLst/>
-          </a:prstGeom>
-          <a:ln w="19050">
-            <a:solidFill>
-              <a:srgbClr val="0070C0"/>
-            </a:solidFill>
-            <a:prstDash val="sysDot"/>
-            <a:headEnd type="none" w="med" len="med"/>
-            <a:tailEnd type="none" w="med" len="med"/>
           </a:ln>
           <a:effectLst/>
         </p:spPr>
@@ -4501,24 +4380,25 @@
       </p:cxnSp>
       <p:cxnSp>
         <p:nvCxnSpPr>
-          <p:cNvPr id="24" name="Straight Arrow Connector 54"/>
-          <p:cNvCxnSpPr>
-            <a:stCxn id="18" idx="3"/>
-            <a:endCxn id="14" idx="1"/>
-          </p:cNvCxnSpPr>
+          <p:cNvPr id="24" name="Elbow Connector 122"/>
+          <p:cNvCxnSpPr/>
           <p:nvPr/>
         </p:nvCxnSpPr>
         <p:spPr>
-          <a:xfrm flipV="1">
-            <a:off x="4113278" y="3939101"/>
-            <a:ext cx="702407" cy="438"/>
-          </a:xfrm>
-          <a:prstGeom prst="straightConnector1">
-            <a:avLst/>
+          <a:xfrm>
+            <a:off x="893311" y="2984905"/>
+            <a:ext cx="419548" cy="2860"/>
+          </a:xfrm>
+          <a:prstGeom prst="bentConnector3">
+            <a:avLst>
+              <a:gd name="adj1" fmla="val 50000"/>
+            </a:avLst>
           </a:prstGeom>
           <a:ln w="19050">
             <a:solidFill>
-              <a:srgbClr val="0070C0"/>
+              <a:schemeClr val="bg1">
+                <a:lumMod val="75000"/>
+              </a:schemeClr>
             </a:solidFill>
             <a:prstDash val="sysDot"/>
             <a:headEnd type="none" w="med" len="med"/>
@@ -4543,104 +4423,21 @@
       </p:cxnSp>
       <p:cxnSp>
         <p:nvCxnSpPr>
-          <p:cNvPr id="25" name="Straight Arrow Connector 57"/>
+          <p:cNvPr id="25" name="Elbow Connector 63"/>
           <p:cNvCxnSpPr>
-            <a:stCxn id="6" idx="2"/>
+            <a:stCxn id="5" idx="0"/>
+            <a:endCxn id="12" idx="0"/>
           </p:cNvCxnSpPr>
           <p:nvPr/>
         </p:nvCxnSpPr>
         <p:spPr>
-          <a:xfrm flipH="1">
-            <a:off x="2562035" y="4110380"/>
-            <a:ext cx="1" cy="438375"/>
-          </a:xfrm>
-          <a:prstGeom prst="straightConnector1">
-            <a:avLst/>
-          </a:prstGeom>
-          <a:ln w="19050">
-            <a:solidFill>
-              <a:srgbClr val="0070C0"/>
-            </a:solidFill>
-            <a:headEnd type="none" w="med" len="med"/>
-            <a:tailEnd type="arrow" w="med" len="med"/>
-          </a:ln>
-          <a:effectLst/>
-        </p:spPr>
-        <p:style>
-          <a:lnRef idx="1">
-            <a:schemeClr val="accent2"/>
-          </a:lnRef>
-          <a:fillRef idx="2">
-            <a:schemeClr val="accent2"/>
-          </a:fillRef>
-          <a:effectRef idx="1">
-            <a:schemeClr val="accent2"/>
-          </a:effectRef>
-          <a:fontRef idx="minor">
-            <a:schemeClr val="dk1"/>
-          </a:fontRef>
-        </p:style>
-      </p:cxnSp>
-      <p:cxnSp>
-        <p:nvCxnSpPr>
-          <p:cNvPr id="28" name="Elbow Connector 122"/>
-          <p:cNvCxnSpPr/>
-          <p:nvPr/>
-        </p:nvCxnSpPr>
-        <p:spPr>
-          <a:xfrm>
-            <a:off x="893311" y="2984905"/>
-            <a:ext cx="419548" cy="2860"/>
+          <a:xfrm rot="16200000" flipH="1">
+            <a:off x="3763604" y="2327618"/>
+            <a:ext cx="2101" cy="2874104"/>
           </a:xfrm>
           <a:prstGeom prst="bentConnector3">
             <a:avLst>
-              <a:gd name="adj1" fmla="val 50000"/>
-            </a:avLst>
-          </a:prstGeom>
-          <a:ln w="19050">
-            <a:solidFill>
-              <a:schemeClr val="bg1">
-                <a:lumMod val="75000"/>
-              </a:schemeClr>
-            </a:solidFill>
-            <a:prstDash val="sysDot"/>
-            <a:headEnd type="none" w="med" len="med"/>
-            <a:tailEnd type="arrow" w="med" len="med"/>
-          </a:ln>
-          <a:effectLst/>
-        </p:spPr>
-        <p:style>
-          <a:lnRef idx="1">
-            <a:schemeClr val="accent2"/>
-          </a:lnRef>
-          <a:fillRef idx="2">
-            <a:schemeClr val="accent2"/>
-          </a:fillRef>
-          <a:effectRef idx="1">
-            <a:schemeClr val="accent2"/>
-          </a:effectRef>
-          <a:fontRef idx="minor">
-            <a:schemeClr val="dk1"/>
-          </a:fontRef>
-        </p:style>
-      </p:cxnSp>
-      <p:cxnSp>
-        <p:nvCxnSpPr>
-          <p:cNvPr id="29" name="Elbow Connector 63"/>
-          <p:cNvCxnSpPr>
-            <a:stCxn id="6" idx="0"/>
-            <a:endCxn id="14" idx="0"/>
-          </p:cNvCxnSpPr>
-          <p:nvPr/>
-        </p:nvCxnSpPr>
-        <p:spPr>
-          <a:xfrm rot="16200000" flipH="1">
-            <a:off x="3880820" y="2444835"/>
-            <a:ext cx="2101" cy="2639671"/>
-          </a:xfrm>
-          <a:prstGeom prst="bentConnector3">
-            <a:avLst>
-              <a:gd name="adj1" fmla="val -31982199"/>
+              <a:gd name="adj1" fmla="val -82532842"/>
             </a:avLst>
           </a:prstGeom>
           <a:ln w="19050">
@@ -4670,13 +4467,13 @@
       </p:cxnSp>
       <p:grpSp>
         <p:nvGrpSpPr>
-          <p:cNvPr id="35" name="Group 34"/>
+          <p:cNvPr id="26" name="Group 25"/>
           <p:cNvGrpSpPr/>
           <p:nvPr/>
         </p:nvGrpSpPr>
         <p:grpSpPr>
           <a:xfrm>
-            <a:off x="4107656" y="2869489"/>
+            <a:off x="4064583" y="1836951"/>
             <a:ext cx="889000" cy="230832"/>
             <a:chOff x="2895600" y="807932"/>
             <a:chExt cx="889000" cy="230832"/>
@@ -4684,7 +4481,7 @@
         </p:grpSpPr>
         <p:sp>
           <p:nvSpPr>
-            <p:cNvPr id="33" name="TextBox 32"/>
+            <p:cNvPr id="27" name="TextBox 26"/>
             <p:cNvSpPr txBox="1"/>
             <p:nvPr/>
           </p:nvSpPr>
@@ -4706,7 +4503,7 @@
             <a:p>
               <a:pPr algn="r"/>
               <a:r>
-                <a:rPr lang="en-US" sz="1100" dirty="0" smtClean="0">
+                <a:rPr lang="en-US" sz="1100" dirty="0">
                   <a:solidFill>
                     <a:srgbClr val="0070C0"/>
                   </a:solidFill>
@@ -4723,7 +4520,7 @@
         </p:sp>
         <p:sp>
           <p:nvSpPr>
-            <p:cNvPr id="34" name="Isosceles Triangle 33"/>
+            <p:cNvPr id="28" name="Isosceles Triangle 27"/>
             <p:cNvSpPr/>
             <p:nvPr/>
           </p:nvSpPr>
@@ -4770,13 +4567,13 @@
       </p:grpSp>
       <p:grpSp>
         <p:nvGrpSpPr>
-          <p:cNvPr id="36" name="Group 35"/>
+          <p:cNvPr id="29" name="Group 28"/>
           <p:cNvGrpSpPr/>
           <p:nvPr/>
         </p:nvGrpSpPr>
         <p:grpSpPr>
           <a:xfrm>
-            <a:off x="3973516" y="2512368"/>
+            <a:off x="4665110" y="1398872"/>
             <a:ext cx="868568" cy="230832"/>
             <a:chOff x="2755838" y="789460"/>
             <a:chExt cx="868568" cy="230832"/>
@@ -4784,7 +4581,7 @@
         </p:grpSpPr>
         <p:sp>
           <p:nvSpPr>
-            <p:cNvPr id="37" name="TextBox 36"/>
+            <p:cNvPr id="30" name="TextBox 29"/>
             <p:cNvSpPr txBox="1"/>
             <p:nvPr/>
           </p:nvSpPr>
@@ -4805,7 +4602,7 @@
             <a:lstStyle/>
             <a:p>
               <a:r>
-                <a:rPr lang="en-US" sz="1100" dirty="0" smtClean="0">
+                <a:rPr lang="en-US" sz="1100" dirty="0">
                   <a:solidFill>
                     <a:srgbClr val="0070C0"/>
                   </a:solidFill>
@@ -4822,7 +4619,7 @@
         </p:sp>
         <p:sp>
           <p:nvSpPr>
-            <p:cNvPr id="38" name="Isosceles Triangle 37"/>
+            <p:cNvPr id="31" name="Isosceles Triangle 30"/>
             <p:cNvSpPr/>
             <p:nvPr/>
           </p:nvSpPr>
@@ -4869,13 +4666,13 @@
       </p:grpSp>
       <p:sp>
         <p:nvSpPr>
-          <p:cNvPr id="39" name="TextBox 38"/>
+          <p:cNvPr id="32" name="TextBox 31"/>
           <p:cNvSpPr txBox="1"/>
           <p:nvPr/>
         </p:nvSpPr>
         <p:spPr>
           <a:xfrm>
-            <a:off x="3210180" y="2423264"/>
+            <a:off x="2301175" y="1798145"/>
             <a:ext cx="131116" cy="230832"/>
           </a:xfrm>
           <a:prstGeom prst="rect">
@@ -4891,7 +4688,7 @@
           <a:p>
             <a:pPr algn="r"/>
             <a:r>
-              <a:rPr lang="en-US" sz="1100" dirty="0" smtClean="0">
+              <a:rPr lang="en-US" sz="1100" dirty="0">
                 <a:solidFill>
                   <a:srgbClr val="0070C0"/>
                 </a:solidFill>
@@ -4908,13 +4705,13 @@
       </p:sp>
       <p:sp>
         <p:nvSpPr>
-          <p:cNvPr id="40" name="TextBox 39"/>
+          <p:cNvPr id="33" name="TextBox 32"/>
           <p:cNvSpPr txBox="1"/>
           <p:nvPr/>
         </p:nvSpPr>
         <p:spPr>
           <a:xfrm>
-            <a:off x="3341296" y="3700114"/>
+            <a:off x="2912207" y="3700114"/>
             <a:ext cx="131116" cy="230832"/>
           </a:xfrm>
           <a:prstGeom prst="rect">
@@ -4930,7 +4727,7 @@
           <a:p>
             <a:pPr algn="r"/>
             <a:r>
-              <a:rPr lang="en-US" sz="1100" dirty="0" smtClean="0">
+              <a:rPr lang="en-US" sz="1100" dirty="0">
                 <a:solidFill>
                   <a:srgbClr val="0070C0"/>
                 </a:solidFill>
@@ -4947,27 +4744,27 @@
       </p:sp>
       <p:grpSp>
         <p:nvGrpSpPr>
-          <p:cNvPr id="41" name="Group 40"/>
+          <p:cNvPr id="34" name="Group 33"/>
           <p:cNvGrpSpPr/>
           <p:nvPr/>
         </p:nvGrpSpPr>
         <p:grpSpPr>
           <a:xfrm>
-            <a:off x="4038600" y="3962400"/>
-            <a:ext cx="685800" cy="230832"/>
-            <a:chOff x="2797314" y="807932"/>
-            <a:chExt cx="685800" cy="230832"/>
+            <a:off x="3733801" y="3352800"/>
+            <a:ext cx="230832" cy="555487"/>
+            <a:chOff x="3744618" y="724394"/>
+            <a:chExt cx="230832" cy="555487"/>
           </a:xfrm>
         </p:grpSpPr>
         <p:sp>
           <p:nvSpPr>
-            <p:cNvPr id="42" name="TextBox 41"/>
+            <p:cNvPr id="35" name="TextBox 34"/>
             <p:cNvSpPr txBox="1"/>
             <p:nvPr/>
           </p:nvSpPr>
           <p:spPr>
-            <a:xfrm>
-              <a:off x="2797314" y="807932"/>
+            <a:xfrm rot="16200000">
+              <a:off x="3582290" y="886722"/>
               <a:ext cx="555487" cy="230832"/>
             </a:xfrm>
             <a:prstGeom prst="rect">
@@ -4981,7 +4778,6 @@
             </a:bodyPr>
             <a:lstStyle/>
             <a:p>
-              <a:pPr algn="r"/>
               <a:r>
                 <a:rPr lang="en-US" sz="1100" dirty="0" smtClean="0">
                   <a:solidFill>
@@ -5000,14 +4796,14 @@
         </p:sp>
         <p:sp>
           <p:nvSpPr>
-            <p:cNvPr id="43" name="Isosceles Triangle 42"/>
+            <p:cNvPr id="36" name="Isosceles Triangle 35"/>
             <p:cNvSpPr/>
             <p:nvPr/>
           </p:nvSpPr>
           <p:spPr>
-            <a:xfrm rot="5400000">
-              <a:off x="3382038" y="866776"/>
-              <a:ext cx="125951" cy="76201"/>
+            <a:xfrm rot="10800000" flipV="1">
+              <a:off x="3774616" y="762032"/>
+              <a:ext cx="117926" cy="71346"/>
             </a:xfrm>
             <a:prstGeom prst="triangle">
               <a:avLst/>
@@ -5047,13 +4843,13 @@
       </p:grpSp>
       <p:sp>
         <p:nvSpPr>
-          <p:cNvPr id="44" name="Rectangle 11"/>
+          <p:cNvPr id="37" name="Rectangle 11"/>
           <p:cNvSpPr/>
           <p:nvPr/>
         </p:nvSpPr>
         <p:spPr>
           <a:xfrm flipH="1">
-            <a:off x="6185390" y="3458098"/>
+            <a:off x="5949738" y="2946794"/>
             <a:ext cx="1093635" cy="346760"/>
           </a:xfrm>
           <a:prstGeom prst="rect">
@@ -5093,13 +4889,9 @@
               </a:rPr>
               <a:t>Incorrect</a:t>
             </a:r>
-            <a:br>
-              <a:rPr lang="en-US" sz="1050" b="1" dirty="0" smtClean="0">
-                <a:solidFill>
-                  <a:srgbClr val="0070C0"/>
-                </a:solidFill>
-              </a:rPr>
-            </a:br>
+          </a:p>
+          <a:p>
+            <a:pPr algn="ctr"/>
             <a:r>
               <a:rPr lang="en-US" sz="1050" b="1" dirty="0" smtClean="0">
                 <a:solidFill>
@@ -5118,17 +4910,14 @@
       </p:sp>
       <p:cxnSp>
         <p:nvCxnSpPr>
-          <p:cNvPr id="45" name="Elbow Connector 63"/>
-          <p:cNvCxnSpPr>
-            <a:stCxn id="8" idx="3"/>
-            <a:endCxn id="44" idx="3"/>
-          </p:cNvCxnSpPr>
+          <p:cNvPr id="39" name="Elbow Connector 122"/>
+          <p:cNvCxnSpPr/>
           <p:nvPr/>
         </p:nvCxnSpPr>
         <p:spPr>
-          <a:xfrm flipV="1">
-            <a:off x="5786402" y="3631478"/>
-            <a:ext cx="398988" cy="269496"/>
+          <a:xfrm rot="16200000" flipV="1">
+            <a:off x="1194071" y="2771559"/>
+            <a:ext cx="1970727" cy="1"/>
           </a:xfrm>
           <a:prstGeom prst="bentConnector3">
             <a:avLst>
@@ -5139,8 +4928,9 @@
             <a:solidFill>
               <a:srgbClr val="0070C0"/>
             </a:solidFill>
+            <a:prstDash val="sysDot"/>
             <a:headEnd type="none" w="med" len="med"/>
-            <a:tailEnd type="none" w="med" len="med"/>
+            <a:tailEnd type="arrow" w="med" len="med"/>
           </a:ln>
           <a:effectLst/>
         </p:spPr>
@@ -5159,29 +4949,227 @@
           </a:fontRef>
         </p:style>
       </p:cxnSp>
-      <p:cxnSp>
-        <p:nvCxnSpPr>
-          <p:cNvPr id="46" name="Elbow Connector 122"/>
-          <p:cNvCxnSpPr/>
+      <p:sp>
+        <p:nvSpPr>
+          <p:cNvPr id="42" name="Rectangle 11"/>
+          <p:cNvSpPr/>
           <p:nvPr/>
-        </p:nvCxnSpPr>
-        <p:spPr>
-          <a:xfrm rot="5400000" flipH="1" flipV="1">
-            <a:off x="1807196" y="3315772"/>
-            <a:ext cx="882304" cy="12700"/>
-          </a:xfrm>
-          <a:prstGeom prst="bentConnector3">
-            <a:avLst>
-              <a:gd name="adj1" fmla="val 50000"/>
-            </a:avLst>
+        </p:nvSpPr>
+        <p:spPr>
+          <a:xfrm flipH="1">
+            <a:off x="3859365" y="2158066"/>
+            <a:ext cx="1093635" cy="346760"/>
+          </a:xfrm>
+          <a:prstGeom prst="rect">
+            <a:avLst/>
           </a:prstGeom>
           <a:ln w="19050">
             <a:solidFill>
               <a:srgbClr val="0070C0"/>
             </a:solidFill>
-            <a:prstDash val="sysDot"/>
-            <a:headEnd type="none" w="med" len="med"/>
-            <a:tailEnd type="arrow" w="med" len="med"/>
+          </a:ln>
+          <a:effectLst/>
+        </p:spPr>
+        <p:style>
+          <a:lnRef idx="1">
+            <a:schemeClr val="accent1"/>
+          </a:lnRef>
+          <a:fillRef idx="2">
+            <a:schemeClr val="accent1"/>
+          </a:fillRef>
+          <a:effectRef idx="1">
+            <a:schemeClr val="accent1"/>
+          </a:effectRef>
+          <a:fontRef idx="minor">
+            <a:schemeClr val="dk1"/>
+          </a:fontRef>
+        </p:style>
+        <p:txBody>
+          <a:bodyPr rtlCol="0" anchor="ctr"/>
+          <a:lstStyle/>
+          <a:p>
+            <a:pPr algn="ctr"/>
+            <a:r>
+              <a:rPr lang="en-US" sz="1050" b="1" dirty="0" err="1">
+                <a:solidFill>
+                  <a:srgbClr val="0070C0"/>
+                </a:solidFill>
+              </a:rPr>
+              <a:t>AddCommand</a:t>
+            </a:r>
+            <a:endParaRPr lang="en-US" sz="1050" b="1" dirty="0">
+              <a:solidFill>
+                <a:srgbClr val="0070C0"/>
+              </a:solidFill>
+            </a:endParaRPr>
+          </a:p>
+          <a:p>
+            <a:pPr algn="ctr"/>
+            <a:r>
+              <a:rPr lang="en-US" sz="1050" b="1" dirty="0">
+                <a:solidFill>
+                  <a:srgbClr val="0070C0"/>
+                </a:solidFill>
+              </a:rPr>
+              <a:t>Parser</a:t>
+            </a:r>
+            <a:endParaRPr lang="en-SG" sz="1050" b="1" dirty="0">
+              <a:solidFill>
+                <a:srgbClr val="0070C0"/>
+              </a:solidFill>
+            </a:endParaRPr>
+          </a:p>
+        </p:txBody>
+      </p:sp>
+      <p:sp>
+        <p:nvSpPr>
+          <p:cNvPr id="44" name="Rectangle 11"/>
+          <p:cNvSpPr/>
+          <p:nvPr/>
+        </p:nvSpPr>
+        <p:spPr>
+          <a:xfrm flipH="1">
+            <a:off x="3859365" y="2564466"/>
+            <a:ext cx="1093635" cy="346760"/>
+          </a:xfrm>
+          <a:prstGeom prst="rect">
+            <a:avLst/>
+          </a:prstGeom>
+          <a:ln w="19050">
+            <a:solidFill>
+              <a:srgbClr val="0070C0"/>
+            </a:solidFill>
+          </a:ln>
+          <a:effectLst/>
+        </p:spPr>
+        <p:style>
+          <a:lnRef idx="1">
+            <a:schemeClr val="accent1"/>
+          </a:lnRef>
+          <a:fillRef idx="2">
+            <a:schemeClr val="accent1"/>
+          </a:fillRef>
+          <a:effectRef idx="1">
+            <a:schemeClr val="accent1"/>
+          </a:effectRef>
+          <a:fontRef idx="minor">
+            <a:schemeClr val="dk1"/>
+          </a:fontRef>
+        </p:style>
+        <p:txBody>
+          <a:bodyPr rtlCol="0" anchor="ctr"/>
+          <a:lstStyle/>
+          <a:p>
+            <a:pPr algn="ctr"/>
+            <a:r>
+              <a:rPr lang="en-US" sz="1050" b="1" dirty="0" err="1">
+                <a:solidFill>
+                  <a:srgbClr val="0070C0"/>
+                </a:solidFill>
+              </a:rPr>
+              <a:t>FindCommand</a:t>
+            </a:r>
+            <a:endParaRPr lang="en-US" sz="1050" b="1" dirty="0">
+              <a:solidFill>
+                <a:srgbClr val="0070C0"/>
+              </a:solidFill>
+            </a:endParaRPr>
+          </a:p>
+          <a:p>
+            <a:pPr algn="ctr"/>
+            <a:r>
+              <a:rPr lang="en-US" sz="1050" b="1" dirty="0">
+                <a:solidFill>
+                  <a:srgbClr val="0070C0"/>
+                </a:solidFill>
+              </a:rPr>
+              <a:t>Parser</a:t>
+            </a:r>
+            <a:endParaRPr lang="en-SG" sz="1050" b="1" dirty="0">
+              <a:solidFill>
+                <a:srgbClr val="0070C0"/>
+              </a:solidFill>
+            </a:endParaRPr>
+          </a:p>
+        </p:txBody>
+      </p:sp>
+      <p:sp>
+        <p:nvSpPr>
+          <p:cNvPr id="45" name="Rectangle 44"/>
+          <p:cNvSpPr/>
+          <p:nvPr/>
+        </p:nvSpPr>
+        <p:spPr>
+          <a:xfrm flipH="1">
+            <a:off x="3859363" y="2968239"/>
+            <a:ext cx="1093635" cy="346760"/>
+          </a:xfrm>
+          <a:prstGeom prst="rect">
+            <a:avLst/>
+          </a:prstGeom>
+          <a:ln w="19050">
+            <a:solidFill>
+              <a:srgbClr val="0070C0"/>
+            </a:solidFill>
+          </a:ln>
+          <a:effectLst/>
+        </p:spPr>
+        <p:style>
+          <a:lnRef idx="1">
+            <a:schemeClr val="accent1"/>
+          </a:lnRef>
+          <a:fillRef idx="2">
+            <a:schemeClr val="accent1"/>
+          </a:fillRef>
+          <a:effectRef idx="1">
+            <a:schemeClr val="accent1"/>
+          </a:effectRef>
+          <a:fontRef idx="minor">
+            <a:schemeClr val="dk1"/>
+          </a:fontRef>
+        </p:style>
+        <p:txBody>
+          <a:bodyPr rtlCol="0" anchor="ctr"/>
+          <a:lstStyle/>
+          <a:p>
+            <a:pPr algn="ctr"/>
+            <a:r>
+              <a:rPr lang="en-US" sz="1050" b="1" dirty="0">
+                <a:solidFill>
+                  <a:srgbClr val="0070C0"/>
+                </a:solidFill>
+              </a:rPr>
+              <a:t>…</a:t>
+            </a:r>
+            <a:endParaRPr lang="en-SG" sz="1050" b="1" dirty="0">
+              <a:solidFill>
+                <a:srgbClr val="0070C0"/>
+              </a:solidFill>
+            </a:endParaRPr>
+          </a:p>
+        </p:txBody>
+      </p:sp>
+      <p:sp>
+        <p:nvSpPr>
+          <p:cNvPr id="56" name="Rectangle 62"/>
+          <p:cNvSpPr/>
+          <p:nvPr/>
+        </p:nvSpPr>
+        <p:spPr>
+          <a:xfrm>
+            <a:off x="2667000" y="3218188"/>
+            <a:ext cx="751107" cy="346760"/>
+          </a:xfrm>
+          <a:prstGeom prst="rect">
+            <a:avLst/>
+          </a:prstGeom>
+          <a:solidFill>
+            <a:srgbClr val="0070C0"/>
+          </a:solidFill>
+          <a:ln w="19050">
+            <a:solidFill>
+              <a:srgbClr val="0070C0"/>
+            </a:solidFill>
           </a:ln>
           <a:effectLst/>
         </p:spPr>
@@ -5199,17 +5187,52 @@
             <a:schemeClr val="dk1"/>
           </a:fontRef>
         </p:style>
-      </p:cxnSp>
-      <p:sp>
-        <p:nvSpPr>
-          <p:cNvPr id="47" name="Rectangle 62"/>
+        <p:txBody>
+          <a:bodyPr rtlCol="0" anchor="ctr"/>
+          <a:lstStyle/>
+          <a:p>
+            <a:pPr algn="ctr"/>
+            <a:r>
+              <a:rPr lang="en-US" sz="1050" dirty="0" smtClean="0">
+                <a:solidFill>
+                  <a:schemeClr val="bg1"/>
+                </a:solidFill>
+              </a:rPr>
+              <a:t>Argument</a:t>
+            </a:r>
+            <a:br>
+              <a:rPr lang="en-US" sz="1050" dirty="0" smtClean="0">
+                <a:solidFill>
+                  <a:schemeClr val="bg1"/>
+                </a:solidFill>
+              </a:rPr>
+            </a:br>
+            <a:r>
+              <a:rPr lang="en-US" sz="1050" dirty="0" smtClean="0">
+                <a:solidFill>
+                  <a:schemeClr val="bg1"/>
+                </a:solidFill>
+              </a:rPr>
+              <a:t>Tokenizer</a:t>
+            </a:r>
+            <a:endParaRPr lang="en-SG" sz="1050" dirty="0">
+              <a:solidFill>
+                <a:schemeClr val="bg1"/>
+              </a:solidFill>
+            </a:endParaRPr>
+          </a:p>
+        </p:txBody>
+      </p:sp>
+      <p:sp>
+        <p:nvSpPr>
+          <p:cNvPr id="58" name="Rectangle 62"/>
           <p:cNvSpPr/>
           <p:nvPr/>
         </p:nvSpPr>
         <p:spPr>
           <a:xfrm>
-            <a:off x="3048000" y="3183650"/>
-            <a:ext cx="751107" cy="346760"/>
+            <a:off x="2907710" y="2821908"/>
+            <a:ext cx="510397" cy="346760"/>
           </a:xfrm>
           <a:prstGeom prst="rect">
             <a:avLst/>
@@ -5249,22 +5272,7 @@
                   <a:schemeClr val="bg1"/>
                 </a:solidFill>
               </a:rPr>
-              <a:t>Argument</a:t>
-            </a:r>
-            <a:br>
-              <a:rPr lang="en-US" sz="1050" dirty="0" smtClean="0">
-                <a:solidFill>
-                  <a:schemeClr val="bg1"/>
-                </a:solidFill>
-              </a:rPr>
-            </a:br>
-            <a:r>
-              <a:rPr lang="en-US" sz="1050" dirty="0" smtClean="0">
-                <a:solidFill>
-                  <a:schemeClr val="bg1"/>
-                </a:solidFill>
-              </a:rPr>
-              <a:t>Tokenizer</a:t>
+              <a:t>Prefix</a:t>
             </a:r>
             <a:endParaRPr lang="en-SG" sz="1050" dirty="0">
               <a:solidFill>
@@ -5276,200 +5284,723 @@
       </p:sp>
       <p:cxnSp>
         <p:nvCxnSpPr>
-          <p:cNvPr id="48" name="Straight Arrow Connector 110"/>
-          <p:cNvCxnSpPr/>
+          <p:cNvPr id="72" name="Straight Arrow Connector 71"/>
+          <p:cNvCxnSpPr>
+            <a:endCxn id="58" idx="3"/>
+          </p:cNvCxnSpPr>
           <p:nvPr/>
         </p:nvCxnSpPr>
         <p:spPr>
-          <a:xfrm flipV="1">
-            <a:off x="3581400" y="3511872"/>
-            <a:ext cx="0" cy="245052"/>
-          </a:xfrm>
-          <a:prstGeom prst="straightConnector1">
+          <a:xfrm rot="16200000" flipV="1">
+            <a:off x="3106339" y="3307056"/>
+            <a:ext cx="786830" cy="163294"/>
+          </a:xfrm>
+          <a:prstGeom prst="bentConnector2">
             <a:avLst/>
           </a:prstGeom>
-          <a:ln w="19050">
-            <a:solidFill>
-              <a:srgbClr val="0070C0"/>
-            </a:solidFill>
-            <a:prstDash val="sysDot"/>
+          <a:ln>
+            <a:prstDash val="dash"/>
             <a:headEnd type="none" w="med" len="med"/>
             <a:tailEnd type="arrow" w="med" len="med"/>
           </a:ln>
-          <a:effectLst/>
         </p:spPr>
         <p:style>
           <a:lnRef idx="1">
-            <a:schemeClr val="accent2"/>
+            <a:schemeClr val="accent1"/>
           </a:lnRef>
-          <a:fillRef idx="2">
-            <a:schemeClr val="accent2"/>
+          <a:fillRef idx="0">
+            <a:schemeClr val="accent1"/>
           </a:fillRef>
-          <a:effectRef idx="1">
-            <a:schemeClr val="accent2"/>
+          <a:effectRef idx="0">
+            <a:schemeClr val="accent1"/>
           </a:effectRef>
           <a:fontRef idx="minor">
-            <a:schemeClr val="dk1"/>
-          </a:fontRef>
-        </p:style>
-      </p:cxnSp>
-      <p:sp>
-        <p:nvSpPr>
-          <p:cNvPr id="49" name="Rectangle 62"/>
-          <p:cNvSpPr/>
-          <p:nvPr/>
-        </p:nvSpPr>
-        <p:spPr>
-          <a:xfrm>
-            <a:off x="3990437" y="3188061"/>
-            <a:ext cx="510397" cy="346760"/>
-          </a:xfrm>
-          <a:prstGeom prst="rect">
-            <a:avLst/>
-          </a:prstGeom>
-          <a:solidFill>
-            <a:srgbClr val="0070C0"/>
-          </a:solidFill>
-          <a:ln w="19050">
-            <a:solidFill>
-              <a:srgbClr val="0070C0"/>
-            </a:solidFill>
-          </a:ln>
-          <a:effectLst/>
-        </p:spPr>
-        <p:style>
-          <a:lnRef idx="1">
-            <a:schemeClr val="accent2"/>
-          </a:lnRef>
-          <a:fillRef idx="2">
-            <a:schemeClr val="accent2"/>
-          </a:fillRef>
-          <a:effectRef idx="1">
-            <a:schemeClr val="accent2"/>
-          </a:effectRef>
-          <a:fontRef idx="minor">
-            <a:schemeClr val="dk1"/>
-          </a:fontRef>
-        </p:style>
-        <p:txBody>
-          <a:bodyPr rtlCol="0" anchor="ctr"/>
-          <a:lstStyle/>
-          <a:p>
-            <a:pPr algn="ctr"/>
-            <a:r>
-              <a:rPr lang="en-US" sz="1050" dirty="0" smtClean="0">
-                <a:solidFill>
-                  <a:schemeClr val="bg1"/>
-                </a:solidFill>
-              </a:rPr>
-              <a:t>Prefix</a:t>
-            </a:r>
-            <a:endParaRPr lang="en-SG" sz="1050" dirty="0">
-              <a:solidFill>
-                <a:schemeClr val="bg1"/>
-              </a:solidFill>
-            </a:endParaRPr>
-          </a:p>
-        </p:txBody>
-      </p:sp>
-      <p:cxnSp>
-        <p:nvCxnSpPr>
-          <p:cNvPr id="50" name="Straight Arrow Connector 110"/>
-          <p:cNvCxnSpPr>
-            <a:stCxn id="47" idx="3"/>
-            <a:endCxn id="49" idx="1"/>
-          </p:cNvCxnSpPr>
-          <p:nvPr/>
-        </p:nvCxnSpPr>
-        <p:spPr>
-          <a:xfrm>
-            <a:off x="3799107" y="3357030"/>
-            <a:ext cx="191330" cy="4411"/>
-          </a:xfrm>
-          <a:prstGeom prst="straightConnector1">
-            <a:avLst/>
-          </a:prstGeom>
-          <a:ln w="19050">
-            <a:solidFill>
-              <a:srgbClr val="0070C0"/>
-            </a:solidFill>
-            <a:prstDash val="sysDot"/>
-            <a:headEnd type="none" w="med" len="med"/>
-            <a:tailEnd type="arrow" w="med" len="med"/>
-          </a:ln>
-          <a:effectLst/>
-        </p:spPr>
-        <p:style>
-          <a:lnRef idx="1">
-            <a:schemeClr val="accent2"/>
-          </a:lnRef>
-          <a:fillRef idx="2">
-            <a:schemeClr val="accent2"/>
-          </a:fillRef>
-          <a:effectRef idx="1">
-            <a:schemeClr val="accent2"/>
-          </a:effectRef>
-          <a:fontRef idx="minor">
-            <a:schemeClr val="dk1"/>
+            <a:schemeClr val="tx1"/>
           </a:fontRef>
         </p:style>
       </p:cxnSp>
       <p:cxnSp>
         <p:nvCxnSpPr>
-          <p:cNvPr id="52" name="Straight Arrow Connector 110"/>
+          <p:cNvPr id="86" name="Straight Arrow Connector 85"/>
+          <p:cNvCxnSpPr>
+            <a:endCxn id="44" idx="3"/>
+          </p:cNvCxnSpPr>
+          <p:nvPr/>
+        </p:nvCxnSpPr>
+        <p:spPr>
+          <a:xfrm flipV="1">
+            <a:off x="3733800" y="2737846"/>
+            <a:ext cx="125565" cy="5354"/>
+          </a:xfrm>
+          <a:prstGeom prst="straightConnector1">
+            <a:avLst/>
+          </a:prstGeom>
+          <a:ln>
+            <a:prstDash val="dash"/>
+            <a:tailEnd type="triangle"/>
+          </a:ln>
+        </p:spPr>
+        <p:style>
+          <a:lnRef idx="1">
+            <a:schemeClr val="accent1"/>
+          </a:lnRef>
+          <a:fillRef idx="0">
+            <a:schemeClr val="accent1"/>
+          </a:fillRef>
+          <a:effectRef idx="0">
+            <a:schemeClr val="accent1"/>
+          </a:effectRef>
+          <a:fontRef idx="minor">
+            <a:schemeClr val="tx1"/>
+          </a:fontRef>
+        </p:style>
+      </p:cxnSp>
+      <p:cxnSp>
+        <p:nvCxnSpPr>
+          <p:cNvPr id="94" name="Straight Arrow Connector 93"/>
           <p:cNvCxnSpPr/>
           <p:nvPr/>
         </p:nvCxnSpPr>
         <p:spPr>
+          <a:xfrm>
+            <a:off x="3733800" y="3168668"/>
+            <a:ext cx="125563" cy="0"/>
+          </a:xfrm>
+          <a:prstGeom prst="straightConnector1">
+            <a:avLst/>
+          </a:prstGeom>
+          <a:ln>
+            <a:prstDash val="dash"/>
+            <a:tailEnd type="triangle"/>
+          </a:ln>
+        </p:spPr>
+        <p:style>
+          <a:lnRef idx="1">
+            <a:schemeClr val="accent1"/>
+          </a:lnRef>
+          <a:fillRef idx="0">
+            <a:schemeClr val="accent1"/>
+          </a:fillRef>
+          <a:effectRef idx="0">
+            <a:schemeClr val="accent1"/>
+          </a:effectRef>
+          <a:fontRef idx="minor">
+            <a:schemeClr val="tx1"/>
+          </a:fontRef>
+        </p:style>
+      </p:cxnSp>
+      <p:cxnSp>
+        <p:nvCxnSpPr>
+          <p:cNvPr id="104" name="Straight Connector 103"/>
+          <p:cNvCxnSpPr/>
+          <p:nvPr/>
+        </p:nvCxnSpPr>
+        <p:spPr>
           <a:xfrm flipV="1">
-            <a:off x="4049717" y="3530410"/>
-            <a:ext cx="0" cy="245052"/>
+            <a:off x="3733800" y="2286000"/>
+            <a:ext cx="0" cy="1653101"/>
+          </a:xfrm>
+          <a:prstGeom prst="line">
+            <a:avLst/>
+          </a:prstGeom>
+          <a:ln>
+            <a:prstDash val="dash"/>
+          </a:ln>
+        </p:spPr>
+        <p:style>
+          <a:lnRef idx="1">
+            <a:schemeClr val="accent1"/>
+          </a:lnRef>
+          <a:fillRef idx="0">
+            <a:schemeClr val="accent1"/>
+          </a:fillRef>
+          <a:effectRef idx="0">
+            <a:schemeClr val="accent1"/>
+          </a:effectRef>
+          <a:fontRef idx="minor">
+            <a:schemeClr val="tx1"/>
+          </a:fontRef>
+        </p:style>
+      </p:cxnSp>
+      <p:cxnSp>
+        <p:nvCxnSpPr>
+          <p:cNvPr id="107" name="Straight Connector 106"/>
+          <p:cNvCxnSpPr>
+            <a:endCxn id="16" idx="3"/>
+          </p:cNvCxnSpPr>
+          <p:nvPr/>
+        </p:nvCxnSpPr>
+        <p:spPr>
+          <a:xfrm flipH="1">
+            <a:off x="3684189" y="3939101"/>
+            <a:ext cx="49611" cy="438"/>
+          </a:xfrm>
+          <a:prstGeom prst="line">
+            <a:avLst/>
+          </a:prstGeom>
+          <a:ln>
+            <a:prstDash val="dash"/>
+          </a:ln>
+        </p:spPr>
+        <p:style>
+          <a:lnRef idx="1">
+            <a:schemeClr val="accent1"/>
+          </a:lnRef>
+          <a:fillRef idx="0">
+            <a:schemeClr val="accent1"/>
+          </a:fillRef>
+          <a:effectRef idx="0">
+            <a:schemeClr val="accent1"/>
+          </a:effectRef>
+          <a:fontRef idx="minor">
+            <a:schemeClr val="tx1"/>
+          </a:fontRef>
+        </p:style>
+      </p:cxnSp>
+      <p:cxnSp>
+        <p:nvCxnSpPr>
+          <p:cNvPr id="109" name="Straight Arrow Connector 108"/>
+          <p:cNvCxnSpPr/>
+          <p:nvPr/>
+        </p:nvCxnSpPr>
+        <p:spPr>
+          <a:xfrm>
+            <a:off x="3733800" y="2286000"/>
+            <a:ext cx="125563" cy="0"/>
+          </a:xfrm>
+          <a:prstGeom prst="straightConnector1">
+            <a:avLst/>
+          </a:prstGeom>
+          <a:ln>
+            <a:prstDash val="dash"/>
+            <a:tailEnd type="triangle"/>
+          </a:ln>
+        </p:spPr>
+        <p:style>
+          <a:lnRef idx="1">
+            <a:schemeClr val="accent1"/>
+          </a:lnRef>
+          <a:fillRef idx="0">
+            <a:schemeClr val="accent1"/>
+          </a:fillRef>
+          <a:effectRef idx="0">
+            <a:schemeClr val="accent1"/>
+          </a:effectRef>
+          <a:fontRef idx="minor">
+            <a:schemeClr val="tx1"/>
+          </a:fontRef>
+        </p:style>
+      </p:cxnSp>
+      <p:cxnSp>
+        <p:nvCxnSpPr>
+          <p:cNvPr id="117" name="Straight Arrow Connector 116"/>
+          <p:cNvCxnSpPr>
+            <a:stCxn id="12" idx="3"/>
+          </p:cNvCxnSpPr>
+          <p:nvPr/>
+        </p:nvCxnSpPr>
+        <p:spPr>
+          <a:xfrm flipV="1">
+            <a:off x="5587728" y="3930946"/>
+            <a:ext cx="1651272" cy="8155"/>
           </a:xfrm>
           <a:prstGeom prst="straightConnector1">
             <a:avLst/>
           </a:prstGeom>
           <a:ln w="19050">
+            <a:headEnd type="triangle" w="med" len="med"/>
+            <a:tailEnd type="none" w="med" len="med"/>
+          </a:ln>
+        </p:spPr>
+        <p:style>
+          <a:lnRef idx="1">
+            <a:schemeClr val="accent1"/>
+          </a:lnRef>
+          <a:fillRef idx="0">
+            <a:schemeClr val="accent1"/>
+          </a:fillRef>
+          <a:effectRef idx="0">
+            <a:schemeClr val="accent1"/>
+          </a:effectRef>
+          <a:fontRef idx="minor">
+            <a:schemeClr val="tx1"/>
+          </a:fontRef>
+        </p:style>
+      </p:cxnSp>
+      <p:cxnSp>
+        <p:nvCxnSpPr>
+          <p:cNvPr id="119" name="Straight Connector 118"/>
+          <p:cNvCxnSpPr/>
+          <p:nvPr/>
+        </p:nvCxnSpPr>
+        <p:spPr>
+          <a:xfrm flipV="1">
+            <a:off x="7239000" y="2313204"/>
+            <a:ext cx="0" cy="1617744"/>
+          </a:xfrm>
+          <a:prstGeom prst="line">
+            <a:avLst/>
+          </a:prstGeom>
+          <a:ln w="19050"/>
+        </p:spPr>
+        <p:style>
+          <a:lnRef idx="1">
+            <a:schemeClr val="accent1"/>
+          </a:lnRef>
+          <a:fillRef idx="0">
+            <a:schemeClr val="accent1"/>
+          </a:fillRef>
+          <a:effectRef idx="0">
+            <a:schemeClr val="accent1"/>
+          </a:effectRef>
+          <a:fontRef idx="minor">
+            <a:schemeClr val="tx1"/>
+          </a:fontRef>
+        </p:style>
+      </p:cxnSp>
+      <p:cxnSp>
+        <p:nvCxnSpPr>
+          <p:cNvPr id="123" name="Straight Connector 122"/>
+          <p:cNvCxnSpPr>
+            <a:stCxn id="4" idx="1"/>
+          </p:cNvCxnSpPr>
+          <p:nvPr/>
+        </p:nvCxnSpPr>
+        <p:spPr>
+          <a:xfrm>
+            <a:off x="7037235" y="2313204"/>
+            <a:ext cx="201765" cy="0"/>
+          </a:xfrm>
+          <a:prstGeom prst="line">
+            <a:avLst/>
+          </a:prstGeom>
+        </p:spPr>
+        <p:style>
+          <a:lnRef idx="1">
+            <a:schemeClr val="accent1"/>
+          </a:lnRef>
+          <a:fillRef idx="0">
+            <a:schemeClr val="accent1"/>
+          </a:fillRef>
+          <a:effectRef idx="0">
+            <a:schemeClr val="accent1"/>
+          </a:effectRef>
+          <a:fontRef idx="minor">
+            <a:schemeClr val="tx1"/>
+          </a:fontRef>
+        </p:style>
+      </p:cxnSp>
+      <p:cxnSp>
+        <p:nvCxnSpPr>
+          <p:cNvPr id="125" name="Straight Connector 124"/>
+          <p:cNvCxnSpPr>
+            <a:stCxn id="10" idx="1"/>
+          </p:cNvCxnSpPr>
+          <p:nvPr/>
+        </p:nvCxnSpPr>
+        <p:spPr>
+          <a:xfrm>
+            <a:off x="7043373" y="2718957"/>
+            <a:ext cx="195627" cy="0"/>
+          </a:xfrm>
+          <a:prstGeom prst="line">
+            <a:avLst/>
+          </a:prstGeom>
+        </p:spPr>
+        <p:style>
+          <a:lnRef idx="1">
+            <a:schemeClr val="accent1"/>
+          </a:lnRef>
+          <a:fillRef idx="0">
+            <a:schemeClr val="accent1"/>
+          </a:fillRef>
+          <a:effectRef idx="0">
+            <a:schemeClr val="accent1"/>
+          </a:effectRef>
+          <a:fontRef idx="minor">
+            <a:schemeClr val="tx1"/>
+          </a:fontRef>
+        </p:style>
+      </p:cxnSp>
+      <p:cxnSp>
+        <p:nvCxnSpPr>
+          <p:cNvPr id="127" name="Straight Connector 126"/>
+          <p:cNvCxnSpPr>
+            <a:stCxn id="37" idx="1"/>
+          </p:cNvCxnSpPr>
+          <p:nvPr/>
+        </p:nvCxnSpPr>
+        <p:spPr>
+          <a:xfrm>
+            <a:off x="7043373" y="3120174"/>
+            <a:ext cx="195627" cy="0"/>
+          </a:xfrm>
+          <a:prstGeom prst="line">
+            <a:avLst/>
+          </a:prstGeom>
+        </p:spPr>
+        <p:style>
+          <a:lnRef idx="1">
+            <a:schemeClr val="accent1"/>
+          </a:lnRef>
+          <a:fillRef idx="0">
+            <a:schemeClr val="accent1"/>
+          </a:fillRef>
+          <a:effectRef idx="0">
+            <a:schemeClr val="accent1"/>
+          </a:effectRef>
+          <a:fontRef idx="minor">
+            <a:schemeClr val="tx1"/>
+          </a:fontRef>
+        </p:style>
+      </p:cxnSp>
+      <p:cxnSp>
+        <p:nvCxnSpPr>
+          <p:cNvPr id="133" name="Straight Connector 132"/>
+          <p:cNvCxnSpPr>
+            <a:stCxn id="11" idx="1"/>
+          </p:cNvCxnSpPr>
+          <p:nvPr/>
+        </p:nvCxnSpPr>
+        <p:spPr>
+          <a:xfrm>
+            <a:off x="7043373" y="3560420"/>
+            <a:ext cx="195627" cy="0"/>
+          </a:xfrm>
+          <a:prstGeom prst="line">
+            <a:avLst/>
+          </a:prstGeom>
+        </p:spPr>
+        <p:style>
+          <a:lnRef idx="1">
+            <a:schemeClr val="accent1"/>
+          </a:lnRef>
+          <a:fillRef idx="0">
+            <a:schemeClr val="accent1"/>
+          </a:fillRef>
+          <a:effectRef idx="0">
+            <a:schemeClr val="accent1"/>
+          </a:effectRef>
+          <a:fontRef idx="minor">
+            <a:schemeClr val="tx1"/>
+          </a:fontRef>
+        </p:style>
+      </p:cxnSp>
+      <p:cxnSp>
+        <p:nvCxnSpPr>
+          <p:cNvPr id="152" name="Straight Connector 151"/>
+          <p:cNvCxnSpPr>
+            <a:stCxn id="44" idx="1"/>
+          </p:cNvCxnSpPr>
+          <p:nvPr/>
+        </p:nvCxnSpPr>
+        <p:spPr>
+          <a:xfrm>
+            <a:off x="4953000" y="2737846"/>
+            <a:ext cx="990600" cy="0"/>
+          </a:xfrm>
+          <a:prstGeom prst="line">
+            <a:avLst/>
+          </a:prstGeom>
+          <a:ln>
+            <a:prstDash val="dash"/>
+            <a:headEnd type="none" w="med" len="med"/>
+            <a:tailEnd type="arrow" w="med" len="med"/>
+          </a:ln>
+        </p:spPr>
+        <p:style>
+          <a:lnRef idx="1">
+            <a:schemeClr val="accent1"/>
+          </a:lnRef>
+          <a:fillRef idx="0">
+            <a:schemeClr val="accent1"/>
+          </a:fillRef>
+          <a:effectRef idx="0">
+            <a:schemeClr val="accent1"/>
+          </a:effectRef>
+          <a:fontRef idx="minor">
+            <a:schemeClr val="tx1"/>
+          </a:fontRef>
+        </p:style>
+      </p:cxnSp>
+      <p:cxnSp>
+        <p:nvCxnSpPr>
+          <p:cNvPr id="153" name="Straight Connector 152"/>
+          <p:cNvCxnSpPr/>
+          <p:nvPr/>
+        </p:nvCxnSpPr>
+        <p:spPr>
+          <a:xfrm>
+            <a:off x="4953000" y="2362200"/>
+            <a:ext cx="990600" cy="0"/>
+          </a:xfrm>
+          <a:prstGeom prst="line">
+            <a:avLst/>
+          </a:prstGeom>
+          <a:ln>
+            <a:prstDash val="dash"/>
+            <a:headEnd type="none" w="med" len="med"/>
+            <a:tailEnd type="arrow" w="med" len="med"/>
+          </a:ln>
+        </p:spPr>
+        <p:style>
+          <a:lnRef idx="1">
+            <a:schemeClr val="accent1"/>
+          </a:lnRef>
+          <a:fillRef idx="0">
+            <a:schemeClr val="accent1"/>
+          </a:fillRef>
+          <a:effectRef idx="0">
+            <a:schemeClr val="accent1"/>
+          </a:effectRef>
+          <a:fontRef idx="minor">
+            <a:schemeClr val="tx1"/>
+          </a:fontRef>
+        </p:style>
+      </p:cxnSp>
+      <p:grpSp>
+        <p:nvGrpSpPr>
+          <p:cNvPr id="161" name="Group 160"/>
+          <p:cNvGrpSpPr/>
+          <p:nvPr/>
+        </p:nvGrpSpPr>
+        <p:grpSpPr>
+          <a:xfrm rot="5400000">
+            <a:off x="5365168" y="1952858"/>
+            <a:ext cx="254462" cy="555486"/>
+            <a:chOff x="3949242" y="712012"/>
+            <a:chExt cx="254462" cy="503902"/>
+          </a:xfrm>
+        </p:grpSpPr>
+        <p:sp>
+          <p:nvSpPr>
+            <p:cNvPr id="162" name="TextBox 161"/>
+            <p:cNvSpPr txBox="1"/>
+            <p:nvPr/>
+          </p:nvSpPr>
+          <p:spPr>
+            <a:xfrm rot="16200000">
+              <a:off x="3824522" y="836732"/>
+              <a:ext cx="503902" cy="254462"/>
+            </a:xfrm>
+            <a:prstGeom prst="rect">
+              <a:avLst/>
+            </a:prstGeom>
+            <a:noFill/>
+          </p:spPr>
+          <p:txBody>
+            <a:bodyPr wrap="square" lIns="0" tIns="0" rIns="0" bIns="0" rtlCol="0">
+              <a:noAutofit/>
+            </a:bodyPr>
+            <a:lstStyle/>
+            <a:p>
+              <a:r>
+                <a:rPr lang="en-US" sz="1100" dirty="0" smtClean="0">
+                  <a:solidFill>
+                    <a:srgbClr val="0070C0"/>
+                  </a:solidFill>
+                </a:rPr>
+                <a:t>creates</a:t>
+              </a:r>
+              <a:endParaRPr lang="en-SG" sz="1100" dirty="0">
+                <a:solidFill>
+                  <a:srgbClr val="0070C0"/>
+                </a:solidFill>
+              </a:endParaRPr>
+            </a:p>
+          </p:txBody>
+        </p:sp>
+        <p:sp>
+          <p:nvSpPr>
+            <p:cNvPr id="163" name="Isosceles Triangle 162"/>
+            <p:cNvSpPr/>
+            <p:nvPr/>
+          </p:nvSpPr>
+          <p:spPr>
+            <a:xfrm rot="10800000" flipV="1">
+              <a:off x="3979474" y="751200"/>
+              <a:ext cx="132157" cy="79956"/>
+            </a:xfrm>
+            <a:prstGeom prst="triangle">
+              <a:avLst/>
+            </a:prstGeom>
             <a:solidFill>
               <a:srgbClr val="0070C0"/>
             </a:solidFill>
-            <a:prstDash val="sysDot"/>
+            <a:ln>
+              <a:noFill/>
+            </a:ln>
+          </p:spPr>
+          <p:style>
+            <a:lnRef idx="2">
+              <a:schemeClr val="accent1">
+                <a:shade val="50000"/>
+              </a:schemeClr>
+            </a:lnRef>
+            <a:fillRef idx="1">
+              <a:schemeClr val="accent1"/>
+            </a:fillRef>
+            <a:effectRef idx="0">
+              <a:schemeClr val="accent1"/>
+            </a:effectRef>
+            <a:fontRef idx="minor">
+              <a:schemeClr val="lt1"/>
+            </a:fontRef>
+          </p:style>
+          <p:txBody>
+            <a:bodyPr rtlCol="0" anchor="ctr"/>
+            <a:lstStyle/>
+            <a:p>
+              <a:pPr algn="ctr"/>
+              <a:endParaRPr lang="en-SG"/>
+            </a:p>
+          </p:txBody>
+        </p:sp>
+      </p:grpSp>
+      <p:grpSp>
+        <p:nvGrpSpPr>
+          <p:cNvPr id="164" name="Group 163"/>
+          <p:cNvGrpSpPr/>
+          <p:nvPr/>
+        </p:nvGrpSpPr>
+        <p:grpSpPr>
+          <a:xfrm rot="5400000">
+            <a:off x="5386226" y="2338226"/>
+            <a:ext cx="254462" cy="555486"/>
+            <a:chOff x="3949242" y="712012"/>
+            <a:chExt cx="254462" cy="503902"/>
+          </a:xfrm>
+        </p:grpSpPr>
+        <p:sp>
+          <p:nvSpPr>
+            <p:cNvPr id="165" name="TextBox 164"/>
+            <p:cNvSpPr txBox="1"/>
+            <p:nvPr/>
+          </p:nvSpPr>
+          <p:spPr>
+            <a:xfrm rot="16200000">
+              <a:off x="3824522" y="836732"/>
+              <a:ext cx="503902" cy="254462"/>
+            </a:xfrm>
+            <a:prstGeom prst="rect">
+              <a:avLst/>
+            </a:prstGeom>
+            <a:noFill/>
+          </p:spPr>
+          <p:txBody>
+            <a:bodyPr wrap="square" lIns="0" tIns="0" rIns="0" bIns="0" rtlCol="0">
+              <a:noAutofit/>
+            </a:bodyPr>
+            <a:lstStyle/>
+            <a:p>
+              <a:r>
+                <a:rPr lang="en-US" sz="1100" dirty="0" smtClean="0">
+                  <a:solidFill>
+                    <a:srgbClr val="0070C0"/>
+                  </a:solidFill>
+                </a:rPr>
+                <a:t>creates</a:t>
+              </a:r>
+              <a:endParaRPr lang="en-SG" sz="1100" dirty="0">
+                <a:solidFill>
+                  <a:srgbClr val="0070C0"/>
+                </a:solidFill>
+              </a:endParaRPr>
+            </a:p>
+          </p:txBody>
+        </p:sp>
+        <p:sp>
+          <p:nvSpPr>
+            <p:cNvPr id="166" name="Isosceles Triangle 165"/>
+            <p:cNvSpPr/>
+            <p:nvPr/>
+          </p:nvSpPr>
+          <p:spPr>
+            <a:xfrm rot="10800000" flipV="1">
+              <a:off x="3979474" y="751200"/>
+              <a:ext cx="132157" cy="79956"/>
+            </a:xfrm>
+            <a:prstGeom prst="triangle">
+              <a:avLst/>
+            </a:prstGeom>
+            <a:solidFill>
+              <a:srgbClr val="0070C0"/>
+            </a:solidFill>
+            <a:ln>
+              <a:noFill/>
+            </a:ln>
+          </p:spPr>
+          <p:style>
+            <a:lnRef idx="2">
+              <a:schemeClr val="accent1">
+                <a:shade val="50000"/>
+              </a:schemeClr>
+            </a:lnRef>
+            <a:fillRef idx="1">
+              <a:schemeClr val="accent1"/>
+            </a:fillRef>
+            <a:effectRef idx="0">
+              <a:schemeClr val="accent1"/>
+            </a:effectRef>
+            <a:fontRef idx="minor">
+              <a:schemeClr val="lt1"/>
+            </a:fontRef>
+          </p:style>
+          <p:txBody>
+            <a:bodyPr rtlCol="0" anchor="ctr"/>
+            <a:lstStyle/>
+            <a:p>
+              <a:pPr algn="ctr"/>
+              <a:endParaRPr lang="en-SG"/>
+            </a:p>
+          </p:txBody>
+        </p:sp>
+      </p:grpSp>
+      <p:cxnSp>
+        <p:nvCxnSpPr>
+          <p:cNvPr id="15" name="Straight Arrow Connector 14"/>
+          <p:cNvCxnSpPr/>
+          <p:nvPr/>
+        </p:nvCxnSpPr>
+        <p:spPr>
+          <a:xfrm flipH="1">
+            <a:off x="3418106" y="3387040"/>
+            <a:ext cx="163295" cy="0"/>
+          </a:xfrm>
+          <a:prstGeom prst="straightConnector1">
+            <a:avLst/>
+          </a:prstGeom>
+          <a:ln>
+            <a:prstDash val="dash"/>
             <a:headEnd type="none" w="med" len="med"/>
             <a:tailEnd type="arrow" w="med" len="med"/>
           </a:ln>
-          <a:effectLst/>
         </p:spPr>
         <p:style>
           <a:lnRef idx="1">
-            <a:schemeClr val="accent2"/>
+            <a:schemeClr val="accent1"/>
           </a:lnRef>
-          <a:fillRef idx="2">
-            <a:schemeClr val="accent2"/>
+          <a:fillRef idx="0">
+            <a:schemeClr val="accent1"/>
           </a:fillRef>
-          <a:effectRef idx="1">
-            <a:schemeClr val="accent2"/>
+          <a:effectRef idx="0">
+            <a:schemeClr val="accent1"/>
           </a:effectRef>
           <a:fontRef idx="minor">
-            <a:schemeClr val="dk1"/>
+            <a:schemeClr val="tx1"/>
           </a:fontRef>
         </p:style>
       </p:cxnSp>
     </p:spTree>
     <p:extLst>
       <p:ext uri="{BB962C8B-B14F-4D97-AF65-F5344CB8AC3E}">
-        <p14:creationId xmlns:p14="http://schemas.microsoft.com/office/powerpoint/2010/main" val="599777654"/>
+        <p14:creationId xmlns:p14="http://schemas.microsoft.com/office/powerpoint/2010/main" val="211586602"/>
       </p:ext>
     </p:extLst>
   </p:cSld>
   <p:clrMapOvr>
     <a:masterClrMapping/>
   </p:clrMapOvr>
-  <p:timing>
-    <p:tnLst>
-      <p:par>
-        <p:cTn id="1" dur="indefinite" restart="never" nodeType="tmRoot"/>
-      </p:par>
-    </p:tnLst>
-  </p:timing>
 </p:sld>
 </file>
 

</xml_diff>

<commit_message>
Interdiff between v4 and v5
</commit_message>
<xml_diff>
--- a/docs/diagrams/LogicComponentClassDiagram.pptx
+++ b/docs/diagrams/LogicComponentClassDiagram.pptx
@@ -208,7 +208,7 @@
           <a:p>
             <a:fld id="{F5CC4B3F-88C1-4FFA-B1B6-F41C21DC6924}" type="datetimeFigureOut">
               <a:rPr lang="en-US" smtClean="0"/>
-              <a:t>2/1/2017</a:t>
+              <a:t>2/2/2017</a:t>
             </a:fld>
             <a:endParaRPr lang="en-US"/>
           </a:p>
@@ -657,7 +657,7 @@
           <a:p>
             <a:fld id="{78C97017-6FC3-485B-9764-EAC9E56C1D49}" type="datetimeFigureOut">
               <a:rPr lang="en-US" smtClean="0"/>
-              <a:t>2/1/2017</a:t>
+              <a:t>2/2/2017</a:t>
             </a:fld>
             <a:endParaRPr lang="en-US"/>
           </a:p>
@@ -827,7 +827,7 @@
           <a:p>
             <a:fld id="{78C97017-6FC3-485B-9764-EAC9E56C1D49}" type="datetimeFigureOut">
               <a:rPr lang="en-US" smtClean="0"/>
-              <a:t>2/1/2017</a:t>
+              <a:t>2/2/2017</a:t>
             </a:fld>
             <a:endParaRPr lang="en-US"/>
           </a:p>
@@ -1007,7 +1007,7 @@
           <a:p>
             <a:fld id="{78C97017-6FC3-485B-9764-EAC9E56C1D49}" type="datetimeFigureOut">
               <a:rPr lang="en-US" smtClean="0"/>
-              <a:t>2/1/2017</a:t>
+              <a:t>2/2/2017</a:t>
             </a:fld>
             <a:endParaRPr lang="en-US"/>
           </a:p>
@@ -1177,7 +1177,7 @@
           <a:p>
             <a:fld id="{78C97017-6FC3-485B-9764-EAC9E56C1D49}" type="datetimeFigureOut">
               <a:rPr lang="en-US" smtClean="0"/>
-              <a:t>2/1/2017</a:t>
+              <a:t>2/2/2017</a:t>
             </a:fld>
             <a:endParaRPr lang="en-US"/>
           </a:p>
@@ -1423,7 +1423,7 @@
           <a:p>
             <a:fld id="{78C97017-6FC3-485B-9764-EAC9E56C1D49}" type="datetimeFigureOut">
               <a:rPr lang="en-US" smtClean="0"/>
-              <a:t>2/1/2017</a:t>
+              <a:t>2/2/2017</a:t>
             </a:fld>
             <a:endParaRPr lang="en-US"/>
           </a:p>
@@ -1711,7 +1711,7 @@
           <a:p>
             <a:fld id="{78C97017-6FC3-485B-9764-EAC9E56C1D49}" type="datetimeFigureOut">
               <a:rPr lang="en-US" smtClean="0"/>
-              <a:t>2/1/2017</a:t>
+              <a:t>2/2/2017</a:t>
             </a:fld>
             <a:endParaRPr lang="en-US"/>
           </a:p>
@@ -2133,7 +2133,7 @@
           <a:p>
             <a:fld id="{78C97017-6FC3-485B-9764-EAC9E56C1D49}" type="datetimeFigureOut">
               <a:rPr lang="en-US" smtClean="0"/>
-              <a:t>2/1/2017</a:t>
+              <a:t>2/2/2017</a:t>
             </a:fld>
             <a:endParaRPr lang="en-US"/>
           </a:p>
@@ -2251,7 +2251,7 @@
           <a:p>
             <a:fld id="{78C97017-6FC3-485B-9764-EAC9E56C1D49}" type="datetimeFigureOut">
               <a:rPr lang="en-US" smtClean="0"/>
-              <a:t>2/1/2017</a:t>
+              <a:t>2/2/2017</a:t>
             </a:fld>
             <a:endParaRPr lang="en-US"/>
           </a:p>
@@ -2346,7 +2346,7 @@
           <a:p>
             <a:fld id="{78C97017-6FC3-485B-9764-EAC9E56C1D49}" type="datetimeFigureOut">
               <a:rPr lang="en-US" smtClean="0"/>
-              <a:t>2/1/2017</a:t>
+              <a:t>2/2/2017</a:t>
             </a:fld>
             <a:endParaRPr lang="en-US"/>
           </a:p>
@@ -2623,7 +2623,7 @@
           <a:p>
             <a:fld id="{78C97017-6FC3-485B-9764-EAC9E56C1D49}" type="datetimeFigureOut">
               <a:rPr lang="en-US" smtClean="0"/>
-              <a:t>2/1/2017</a:t>
+              <a:t>2/2/2017</a:t>
             </a:fld>
             <a:endParaRPr lang="en-US"/>
           </a:p>
@@ -2876,7 +2876,7 @@
           <a:p>
             <a:fld id="{78C97017-6FC3-485B-9764-EAC9E56C1D49}" type="datetimeFigureOut">
               <a:rPr lang="en-US" smtClean="0"/>
-              <a:t>2/1/2017</a:t>
+              <a:t>2/2/2017</a:t>
             </a:fld>
             <a:endParaRPr lang="en-US"/>
           </a:p>
@@ -3089,7 +3089,7 @@
           <a:p>
             <a:fld id="{78C97017-6FC3-485B-9764-EAC9E56C1D49}" type="datetimeFigureOut">
               <a:rPr lang="en-US" smtClean="0"/>
-              <a:t>2/1/2017</a:t>
+              <a:t>2/2/2017</a:t>
             </a:fld>
             <a:endParaRPr lang="en-US"/>
           </a:p>
@@ -3472,7 +3472,7 @@
         </p:nvSpPr>
         <p:spPr>
           <a:xfrm>
-            <a:off x="1070744" y="914401"/>
+            <a:off x="1066800" y="914400"/>
             <a:ext cx="6288315" cy="3415166"/>
           </a:xfrm>
           <a:prstGeom prst="roundRect">
@@ -3533,7 +3533,7 @@
         </p:nvSpPr>
         <p:spPr>
           <a:xfrm>
-            <a:off x="2095948" y="1432739"/>
+            <a:off x="2095948" y="1442082"/>
             <a:ext cx="1093635" cy="346760"/>
           </a:xfrm>
           <a:prstGeom prst="rect">
@@ -3592,7 +3592,7 @@
         </p:nvSpPr>
         <p:spPr>
           <a:xfrm flipH="1">
-            <a:off x="5943600" y="2139824"/>
+            <a:off x="5943600" y="2149167"/>
             <a:ext cx="1093635" cy="346760"/>
           </a:xfrm>
           <a:prstGeom prst="rect">
@@ -3648,7 +3648,7 @@
         </p:nvSpPr>
         <p:spPr>
           <a:xfrm>
-            <a:off x="1780785" y="3763620"/>
+            <a:off x="1780785" y="3772963"/>
             <a:ext cx="1093635" cy="346760"/>
           </a:xfrm>
           <a:prstGeom prst="rect">
@@ -3709,7 +3709,7 @@
         </p:nvCxnSpPr>
         <p:spPr>
           <a:xfrm rot="10800000">
-            <a:off x="3189584" y="1606119"/>
+            <a:off x="3189584" y="1615462"/>
             <a:ext cx="2296817" cy="2157062"/>
           </a:xfrm>
           <a:prstGeom prst="bentConnector3">
@@ -3752,7 +3752,7 @@
         </p:nvCxnSpPr>
         <p:spPr>
           <a:xfrm>
-            <a:off x="1676400" y="1603259"/>
+            <a:off x="1676400" y="1612602"/>
             <a:ext cx="419548" cy="2860"/>
           </a:xfrm>
           <a:prstGeom prst="bentConnector3">
@@ -3793,7 +3793,7 @@
         </p:nvSpPr>
         <p:spPr>
           <a:xfrm>
-            <a:off x="1103085" y="4548755"/>
+            <a:off x="1103085" y="4558098"/>
             <a:ext cx="6288315" cy="328045"/>
           </a:xfrm>
           <a:prstGeom prst="roundRect">
@@ -3853,7 +3853,7 @@
         </p:nvSpPr>
         <p:spPr>
           <a:xfrm flipH="1">
-            <a:off x="5949738" y="2545577"/>
+            <a:off x="5949738" y="2554920"/>
             <a:ext cx="1093635" cy="346760"/>
           </a:xfrm>
           <a:prstGeom prst="rect">
@@ -3909,7 +3909,7 @@
         </p:nvSpPr>
         <p:spPr>
           <a:xfrm flipH="1">
-            <a:off x="5949738" y="3387040"/>
+            <a:off x="5949738" y="3396383"/>
             <a:ext cx="1093635" cy="346760"/>
           </a:xfrm>
           <a:prstGeom prst="rect">
@@ -3965,7 +3965,7 @@
         </p:nvSpPr>
         <p:spPr>
           <a:xfrm>
-            <a:off x="4815685" y="3765721"/>
+            <a:off x="4815685" y="3775064"/>
             <a:ext cx="772043" cy="346760"/>
           </a:xfrm>
           <a:prstGeom prst="rect">
@@ -4036,7 +4036,7 @@
         </p:nvSpPr>
         <p:spPr>
           <a:xfrm>
-            <a:off x="3098739" y="3766159"/>
+            <a:off x="3098739" y="3775502"/>
             <a:ext cx="585450" cy="346760"/>
           </a:xfrm>
           <a:prstGeom prst="rect">
@@ -4098,7 +4098,7 @@
         </p:nvCxnSpPr>
         <p:spPr>
           <a:xfrm>
-            <a:off x="2874420" y="3937000"/>
+            <a:off x="2874420" y="3946343"/>
             <a:ext cx="224319" cy="2539"/>
           </a:xfrm>
           <a:prstGeom prst="bentConnector3">
@@ -4141,7 +4141,7 @@
         </p:nvCxnSpPr>
         <p:spPr>
           <a:xfrm>
-            <a:off x="5201707" y="4112481"/>
+            <a:off x="5201707" y="4121824"/>
             <a:ext cx="1" cy="436274"/>
           </a:xfrm>
           <a:prstGeom prst="straightConnector1">
@@ -4180,7 +4180,7 @@
         </p:nvSpPr>
         <p:spPr>
           <a:xfrm rot="16200000">
-            <a:off x="398120" y="2303120"/>
+            <a:off x="398120" y="2312463"/>
             <a:ext cx="2209800" cy="346760"/>
           </a:xfrm>
           <a:prstGeom prst="rect">
@@ -4250,7 +4250,7 @@
         </p:nvSpPr>
         <p:spPr>
           <a:xfrm>
-            <a:off x="1359039" y="3581400"/>
+            <a:off x="1359039" y="3590743"/>
             <a:ext cx="270504" cy="175523"/>
           </a:xfrm>
           <a:prstGeom prst="triangle">
@@ -4307,7 +4307,7 @@
         </p:nvCxnSpPr>
         <p:spPr>
           <a:xfrm rot="10800000">
-            <a:off x="1494291" y="3756924"/>
+            <a:off x="1494291" y="3766267"/>
             <a:ext cx="286494" cy="180077"/>
           </a:xfrm>
           <a:prstGeom prst="bentConnector2">
@@ -4348,7 +4348,7 @@
         </p:nvCxnSpPr>
         <p:spPr>
           <a:xfrm flipH="1">
-            <a:off x="2327602" y="4110380"/>
+            <a:off x="2327602" y="4119723"/>
             <a:ext cx="1" cy="438375"/>
           </a:xfrm>
           <a:prstGeom prst="straightConnector1">
@@ -4386,7 +4386,7 @@
         </p:nvCxnSpPr>
         <p:spPr>
           <a:xfrm>
-            <a:off x="893311" y="2984905"/>
+            <a:off x="893311" y="2994248"/>
             <a:ext cx="419548" cy="2860"/>
           </a:xfrm>
           <a:prstGeom prst="bentConnector3">
@@ -4432,7 +4432,7 @@
         </p:nvCxnSpPr>
         <p:spPr>
           <a:xfrm rot="16200000" flipH="1">
-            <a:off x="3763604" y="2327618"/>
+            <a:off x="3763604" y="2336961"/>
             <a:ext cx="2101" cy="2874104"/>
           </a:xfrm>
           <a:prstGeom prst="bentConnector3">
@@ -4473,7 +4473,7 @@
         </p:nvGrpSpPr>
         <p:grpSpPr>
           <a:xfrm>
-            <a:off x="4064583" y="1836951"/>
+            <a:off x="4064583" y="1846294"/>
             <a:ext cx="889000" cy="230832"/>
             <a:chOff x="2895600" y="807932"/>
             <a:chExt cx="889000" cy="230832"/>
@@ -4573,7 +4573,7 @@
         </p:nvGrpSpPr>
         <p:grpSpPr>
           <a:xfrm>
-            <a:off x="4665110" y="1398872"/>
+            <a:off x="4665110" y="1408215"/>
             <a:ext cx="868568" cy="230832"/>
             <a:chOff x="2755838" y="789460"/>
             <a:chExt cx="868568" cy="230832"/>
@@ -4672,7 +4672,7 @@
         </p:nvSpPr>
         <p:spPr>
           <a:xfrm>
-            <a:off x="2301175" y="1798145"/>
+            <a:off x="2301175" y="1807488"/>
             <a:ext cx="131116" cy="230832"/>
           </a:xfrm>
           <a:prstGeom prst="rect">
@@ -4711,7 +4711,7 @@
         </p:nvSpPr>
         <p:spPr>
           <a:xfrm>
-            <a:off x="2912207" y="3700114"/>
+            <a:off x="2912207" y="3709457"/>
             <a:ext cx="131116" cy="230832"/>
           </a:xfrm>
           <a:prstGeom prst="rect">
@@ -4742,105 +4742,6 @@
           </a:p>
         </p:txBody>
       </p:sp>
-      <p:grpSp>
-        <p:nvGrpSpPr>
-          <p:cNvPr id="34" name="Group 33"/>
-          <p:cNvGrpSpPr/>
-          <p:nvPr/>
-        </p:nvGrpSpPr>
-        <p:grpSpPr>
-          <a:xfrm>
-            <a:off x="3733801" y="3352800"/>
-            <a:ext cx="230832" cy="555487"/>
-            <a:chOff x="3744618" y="724394"/>
-            <a:chExt cx="230832" cy="555487"/>
-          </a:xfrm>
-        </p:grpSpPr>
-        <p:sp>
-          <p:nvSpPr>
-            <p:cNvPr id="35" name="TextBox 34"/>
-            <p:cNvSpPr txBox="1"/>
-            <p:nvPr/>
-          </p:nvSpPr>
-          <p:spPr>
-            <a:xfrm rot="16200000">
-              <a:off x="3582290" y="886722"/>
-              <a:ext cx="555487" cy="230832"/>
-            </a:xfrm>
-            <a:prstGeom prst="rect">
-              <a:avLst/>
-            </a:prstGeom>
-            <a:noFill/>
-          </p:spPr>
-          <p:txBody>
-            <a:bodyPr wrap="square" lIns="0" tIns="0" rIns="0" bIns="0" rtlCol="0">
-              <a:noAutofit/>
-            </a:bodyPr>
-            <a:lstStyle/>
-            <a:p>
-              <a:r>
-                <a:rPr lang="en-US" sz="1100" dirty="0" smtClean="0">
-                  <a:solidFill>
-                    <a:srgbClr val="0070C0"/>
-                  </a:solidFill>
-                </a:rPr>
-                <a:t>creates</a:t>
-              </a:r>
-              <a:endParaRPr lang="en-SG" sz="1100" dirty="0">
-                <a:solidFill>
-                  <a:srgbClr val="0070C0"/>
-                </a:solidFill>
-              </a:endParaRPr>
-            </a:p>
-          </p:txBody>
-        </p:sp>
-        <p:sp>
-          <p:nvSpPr>
-            <p:cNvPr id="36" name="Isosceles Triangle 35"/>
-            <p:cNvSpPr/>
-            <p:nvPr/>
-          </p:nvSpPr>
-          <p:spPr>
-            <a:xfrm rot="10800000" flipV="1">
-              <a:off x="3774616" y="762032"/>
-              <a:ext cx="117926" cy="71346"/>
-            </a:xfrm>
-            <a:prstGeom prst="triangle">
-              <a:avLst/>
-            </a:prstGeom>
-            <a:solidFill>
-              <a:srgbClr val="0070C0"/>
-            </a:solidFill>
-            <a:ln>
-              <a:noFill/>
-            </a:ln>
-          </p:spPr>
-          <p:style>
-            <a:lnRef idx="2">
-              <a:schemeClr val="accent1">
-                <a:shade val="50000"/>
-              </a:schemeClr>
-            </a:lnRef>
-            <a:fillRef idx="1">
-              <a:schemeClr val="accent1"/>
-            </a:fillRef>
-            <a:effectRef idx="0">
-              <a:schemeClr val="accent1"/>
-            </a:effectRef>
-            <a:fontRef idx="minor">
-              <a:schemeClr val="lt1"/>
-            </a:fontRef>
-          </p:style>
-          <p:txBody>
-            <a:bodyPr rtlCol="0" anchor="ctr"/>
-            <a:lstStyle/>
-            <a:p>
-              <a:pPr algn="ctr"/>
-              <a:endParaRPr lang="en-SG"/>
-            </a:p>
-          </p:txBody>
-        </p:sp>
-      </p:grpSp>
       <p:sp>
         <p:nvSpPr>
           <p:cNvPr id="37" name="Rectangle 11"/>
@@ -4849,7 +4750,7 @@
         </p:nvSpPr>
         <p:spPr>
           <a:xfrm flipH="1">
-            <a:off x="5949738" y="2946794"/>
+            <a:off x="5949738" y="2956137"/>
             <a:ext cx="1093635" cy="346760"/>
           </a:xfrm>
           <a:prstGeom prst="rect">
@@ -4916,7 +4817,7 @@
         </p:nvCxnSpPr>
         <p:spPr>
           <a:xfrm rot="16200000" flipV="1">
-            <a:off x="1194071" y="2771559"/>
+            <a:off x="1194071" y="2780902"/>
             <a:ext cx="1970727" cy="1"/>
           </a:xfrm>
           <a:prstGeom prst="bentConnector3">
@@ -4957,7 +4858,7 @@
         </p:nvSpPr>
         <p:spPr>
           <a:xfrm flipH="1">
-            <a:off x="3859365" y="2158066"/>
+            <a:off x="3859365" y="2167409"/>
             <a:ext cx="1093635" cy="346760"/>
           </a:xfrm>
           <a:prstGeom prst="rect">
@@ -5029,7 +4930,7 @@
         </p:nvSpPr>
         <p:spPr>
           <a:xfrm flipH="1">
-            <a:off x="3859365" y="2564466"/>
+            <a:off x="3859365" y="2573809"/>
             <a:ext cx="1093635" cy="346760"/>
           </a:xfrm>
           <a:prstGeom prst="rect">
@@ -5101,7 +5002,7 @@
         </p:nvSpPr>
         <p:spPr>
           <a:xfrm flipH="1">
-            <a:off x="3859363" y="2968239"/>
+            <a:off x="3859363" y="2977582"/>
             <a:ext cx="1093635" cy="346760"/>
           </a:xfrm>
           <a:prstGeom prst="rect">
@@ -5157,7 +5058,7 @@
         </p:nvSpPr>
         <p:spPr>
           <a:xfrm>
-            <a:off x="2667000" y="3218188"/>
+            <a:off x="2409537" y="2219143"/>
             <a:ext cx="751107" cy="346760"/>
           </a:xfrm>
           <a:prstGeom prst="rect">
@@ -5231,7 +5132,7 @@
         </p:nvSpPr>
         <p:spPr>
           <a:xfrm>
-            <a:off x="2907710" y="2821908"/>
+            <a:off x="2648137" y="2606322"/>
             <a:ext cx="510397" cy="346760"/>
           </a:xfrm>
           <a:prstGeom prst="rect">
@@ -5284,60 +5185,24 @@
       </p:sp>
       <p:cxnSp>
         <p:nvCxnSpPr>
-          <p:cNvPr id="72" name="Straight Arrow Connector 71"/>
+          <p:cNvPr id="86" name="Straight Arrow Connector 85"/>
           <p:cNvCxnSpPr>
-            <a:endCxn id="58" idx="3"/>
+            <a:endCxn id="44" idx="3"/>
           </p:cNvCxnSpPr>
           <p:nvPr/>
         </p:nvCxnSpPr>
         <p:spPr>
-          <a:xfrm rot="16200000" flipV="1">
-            <a:off x="3106339" y="3307056"/>
-            <a:ext cx="786830" cy="163294"/>
-          </a:xfrm>
-          <a:prstGeom prst="bentConnector2">
+          <a:xfrm flipV="1">
+            <a:off x="3733800" y="2747189"/>
+            <a:ext cx="125565" cy="5354"/>
+          </a:xfrm>
+          <a:prstGeom prst="straightConnector1">
             <a:avLst/>
           </a:prstGeom>
           <a:ln>
             <a:prstDash val="dash"/>
             <a:headEnd type="none" w="med" len="med"/>
             <a:tailEnd type="arrow" w="med" len="med"/>
-          </a:ln>
-        </p:spPr>
-        <p:style>
-          <a:lnRef idx="1">
-            <a:schemeClr val="accent1"/>
-          </a:lnRef>
-          <a:fillRef idx="0">
-            <a:schemeClr val="accent1"/>
-          </a:fillRef>
-          <a:effectRef idx="0">
-            <a:schemeClr val="accent1"/>
-          </a:effectRef>
-          <a:fontRef idx="minor">
-            <a:schemeClr val="tx1"/>
-          </a:fontRef>
-        </p:style>
-      </p:cxnSp>
-      <p:cxnSp>
-        <p:nvCxnSpPr>
-          <p:cNvPr id="86" name="Straight Arrow Connector 85"/>
-          <p:cNvCxnSpPr>
-            <a:endCxn id="44" idx="3"/>
-          </p:cNvCxnSpPr>
-          <p:nvPr/>
-        </p:nvCxnSpPr>
-        <p:spPr>
-          <a:xfrm flipV="1">
-            <a:off x="3733800" y="2737846"/>
-            <a:ext cx="125565" cy="5354"/>
-          </a:xfrm>
-          <a:prstGeom prst="straightConnector1">
-            <a:avLst/>
-          </a:prstGeom>
-          <a:ln>
-            <a:prstDash val="dash"/>
-            <a:tailEnd type="triangle"/>
           </a:ln>
         </p:spPr>
         <p:style>
@@ -5363,7 +5228,7 @@
         </p:nvCxnSpPr>
         <p:spPr>
           <a:xfrm>
-            <a:off x="3733800" y="3168668"/>
+            <a:off x="3733800" y="3178011"/>
             <a:ext cx="125563" cy="0"/>
           </a:xfrm>
           <a:prstGeom prst="straightConnector1">
@@ -5371,7 +5236,8 @@
           </a:prstGeom>
           <a:ln>
             <a:prstDash val="dash"/>
-            <a:tailEnd type="triangle"/>
+            <a:headEnd type="none" w="med" len="med"/>
+            <a:tailEnd type="arrow" w="med" len="med"/>
           </a:ln>
         </p:spPr>
         <p:style>
@@ -5397,8 +5263,8 @@
         </p:nvCxnSpPr>
         <p:spPr>
           <a:xfrm flipV="1">
-            <a:off x="3733800" y="2286000"/>
-            <a:ext cx="0" cy="1653101"/>
+            <a:off x="3733800" y="2295343"/>
+            <a:ext cx="0" cy="1653103"/>
           </a:xfrm>
           <a:prstGeom prst="line">
             <a:avLst/>
@@ -5432,7 +5298,7 @@
         </p:nvCxnSpPr>
         <p:spPr>
           <a:xfrm flipH="1">
-            <a:off x="3684189" y="3939101"/>
+            <a:off x="3684189" y="3948444"/>
             <a:ext cx="49611" cy="438"/>
           </a:xfrm>
           <a:prstGeom prst="line">
@@ -5465,7 +5331,7 @@
         </p:nvCxnSpPr>
         <p:spPr>
           <a:xfrm>
-            <a:off x="3733800" y="2286000"/>
+            <a:off x="3733800" y="2295343"/>
             <a:ext cx="125563" cy="0"/>
           </a:xfrm>
           <a:prstGeom prst="straightConnector1">
@@ -5473,7 +5339,8 @@
           </a:prstGeom>
           <a:ln>
             <a:prstDash val="dash"/>
-            <a:tailEnd type="triangle"/>
+            <a:headEnd type="none" w="med" len="med"/>
+            <a:tailEnd type="arrow" w="med" len="med"/>
           </a:ln>
         </p:spPr>
         <p:style>
@@ -5501,7 +5368,7 @@
         </p:nvCxnSpPr>
         <p:spPr>
           <a:xfrm flipV="1">
-            <a:off x="5587728" y="3930946"/>
+            <a:off x="5587728" y="3940289"/>
             <a:ext cx="1651272" cy="8155"/>
           </a:xfrm>
           <a:prstGeom prst="straightConnector1">
@@ -5535,7 +5402,7 @@
         </p:nvCxnSpPr>
         <p:spPr>
           <a:xfrm flipV="1">
-            <a:off x="7239000" y="2313204"/>
+            <a:off x="7239000" y="2322547"/>
             <a:ext cx="0" cy="1617744"/>
           </a:xfrm>
           <a:prstGeom prst="line">
@@ -5568,7 +5435,7 @@
         </p:nvCxnSpPr>
         <p:spPr>
           <a:xfrm>
-            <a:off x="7037235" y="2313204"/>
+            <a:off x="7037235" y="2322547"/>
             <a:ext cx="201765" cy="0"/>
           </a:xfrm>
           <a:prstGeom prst="line">
@@ -5600,7 +5467,7 @@
         </p:nvCxnSpPr>
         <p:spPr>
           <a:xfrm>
-            <a:off x="7043373" y="2718957"/>
+            <a:off x="7043373" y="2728300"/>
             <a:ext cx="195627" cy="0"/>
           </a:xfrm>
           <a:prstGeom prst="line">
@@ -5632,7 +5499,7 @@
         </p:nvCxnSpPr>
         <p:spPr>
           <a:xfrm>
-            <a:off x="7043373" y="3120174"/>
+            <a:off x="7043373" y="3129517"/>
             <a:ext cx="195627" cy="0"/>
           </a:xfrm>
           <a:prstGeom prst="line">
@@ -5664,7 +5531,7 @@
         </p:nvCxnSpPr>
         <p:spPr>
           <a:xfrm>
-            <a:off x="7043373" y="3560420"/>
+            <a:off x="7043373" y="3569763"/>
             <a:ext cx="195627" cy="0"/>
           </a:xfrm>
           <a:prstGeom prst="line">
@@ -5696,7 +5563,7 @@
         </p:nvCxnSpPr>
         <p:spPr>
           <a:xfrm>
-            <a:off x="4953000" y="2737846"/>
+            <a:off x="4953000" y="2747189"/>
             <a:ext cx="990600" cy="0"/>
           </a:xfrm>
           <a:prstGeom prst="line">
@@ -5731,7 +5598,7 @@
         </p:nvCxnSpPr>
         <p:spPr>
           <a:xfrm>
-            <a:off x="4953000" y="2362200"/>
+            <a:off x="4953000" y="2371543"/>
             <a:ext cx="990600" cy="0"/>
           </a:xfrm>
           <a:prstGeom prst="line">
@@ -5766,7 +5633,7 @@
         </p:nvGrpSpPr>
         <p:grpSpPr>
           <a:xfrm rot="5400000">
-            <a:off x="5365168" y="1952858"/>
+            <a:off x="5365168" y="1962201"/>
             <a:ext cx="254462" cy="555486"/>
             <a:chOff x="3949242" y="712012"/>
             <a:chExt cx="254462" cy="503902"/>
@@ -5865,7 +5732,7 @@
         </p:nvGrpSpPr>
         <p:grpSpPr>
           <a:xfrm rot="5400000">
-            <a:off x="5386226" y="2338226"/>
+            <a:off x="5386226" y="2347569"/>
             <a:ext cx="254462" cy="555486"/>
             <a:chOff x="3949242" y="712012"/>
             <a:chExt cx="254462" cy="503902"/>
@@ -5956,22 +5823,414 @@
           </p:txBody>
         </p:sp>
       </p:grpSp>
+      <p:sp>
+        <p:nvSpPr>
+          <p:cNvPr id="60" name="Rectangle 62"/>
+          <p:cNvSpPr/>
+          <p:nvPr/>
+        </p:nvSpPr>
+        <p:spPr>
+          <a:xfrm>
+            <a:off x="2659828" y="3015383"/>
+            <a:ext cx="731636" cy="283820"/>
+          </a:xfrm>
+          <a:prstGeom prst="rect">
+            <a:avLst/>
+          </a:prstGeom>
+          <a:solidFill>
+            <a:srgbClr val="0070C0"/>
+          </a:solidFill>
+          <a:ln w="19050">
+            <a:solidFill>
+              <a:srgbClr val="0070C0"/>
+            </a:solidFill>
+          </a:ln>
+          <a:effectLst/>
+        </p:spPr>
+        <p:style>
+          <a:lnRef idx="1">
+            <a:schemeClr val="accent2"/>
+          </a:lnRef>
+          <a:fillRef idx="2">
+            <a:schemeClr val="accent2"/>
+          </a:fillRef>
+          <a:effectRef idx="1">
+            <a:schemeClr val="accent2"/>
+          </a:effectRef>
+          <a:fontRef idx="minor">
+            <a:schemeClr val="dk1"/>
+          </a:fontRef>
+        </p:style>
+        <p:txBody>
+          <a:bodyPr rtlCol="0" anchor="ctr"/>
+          <a:lstStyle/>
+          <a:p>
+            <a:pPr algn="ctr"/>
+            <a:r>
+              <a:rPr lang="en-SG" sz="1050" dirty="0" err="1" smtClean="0">
+                <a:solidFill>
+                  <a:schemeClr val="bg1"/>
+                </a:solidFill>
+              </a:rPr>
+              <a:t>CliSyntax</a:t>
+            </a:r>
+            <a:endParaRPr lang="en-SG" sz="1050" dirty="0">
+              <a:solidFill>
+                <a:schemeClr val="bg1"/>
+              </a:solidFill>
+            </a:endParaRPr>
+          </a:p>
+        </p:txBody>
+      </p:sp>
+      <p:sp>
+        <p:nvSpPr>
+          <p:cNvPr id="62" name="Rectangle 62"/>
+          <p:cNvSpPr/>
+          <p:nvPr/>
+        </p:nvSpPr>
+        <p:spPr>
+          <a:xfrm>
+            <a:off x="2659250" y="3364540"/>
+            <a:ext cx="731636" cy="283820"/>
+          </a:xfrm>
+          <a:prstGeom prst="rect">
+            <a:avLst/>
+          </a:prstGeom>
+          <a:solidFill>
+            <a:srgbClr val="0070C0"/>
+          </a:solidFill>
+          <a:ln w="19050">
+            <a:solidFill>
+              <a:srgbClr val="0070C0"/>
+            </a:solidFill>
+          </a:ln>
+          <a:effectLst/>
+        </p:spPr>
+        <p:style>
+          <a:lnRef idx="1">
+            <a:schemeClr val="accent2"/>
+          </a:lnRef>
+          <a:fillRef idx="2">
+            <a:schemeClr val="accent2"/>
+          </a:fillRef>
+          <a:effectRef idx="1">
+            <a:schemeClr val="accent2"/>
+          </a:effectRef>
+          <a:fontRef idx="minor">
+            <a:schemeClr val="dk1"/>
+          </a:fontRef>
+        </p:style>
+        <p:txBody>
+          <a:bodyPr rtlCol="0" anchor="ctr"/>
+          <a:lstStyle/>
+          <a:p>
+            <a:pPr algn="ctr"/>
+            <a:r>
+              <a:rPr lang="en-SG" sz="1050" dirty="0" err="1" smtClean="0">
+                <a:solidFill>
+                  <a:schemeClr val="bg1"/>
+                </a:solidFill>
+              </a:rPr>
+              <a:t>ParserUtil</a:t>
+            </a:r>
+            <a:endParaRPr lang="en-SG" sz="1050" dirty="0">
+              <a:solidFill>
+                <a:schemeClr val="bg1"/>
+              </a:solidFill>
+            </a:endParaRPr>
+          </a:p>
+        </p:txBody>
+      </p:sp>
       <p:cxnSp>
         <p:nvCxnSpPr>
-          <p:cNvPr id="15" name="Straight Arrow Connector 14"/>
+          <p:cNvPr id="22" name="Straight Connector 21"/>
           <p:cNvCxnSpPr/>
           <p:nvPr/>
         </p:nvCxnSpPr>
         <p:spPr>
+          <a:xfrm flipV="1">
+            <a:off x="3505200" y="2209023"/>
+            <a:ext cx="0" cy="1262106"/>
+          </a:xfrm>
+          <a:prstGeom prst="line">
+            <a:avLst/>
+          </a:prstGeom>
+          <a:ln>
+            <a:prstDash val="sysDash"/>
+          </a:ln>
+        </p:spPr>
+        <p:style>
+          <a:lnRef idx="1">
+            <a:schemeClr val="accent1"/>
+          </a:lnRef>
+          <a:fillRef idx="0">
+            <a:schemeClr val="accent1"/>
+          </a:fillRef>
+          <a:effectRef idx="0">
+            <a:schemeClr val="accent1"/>
+          </a:effectRef>
+          <a:fontRef idx="minor">
+            <a:schemeClr val="tx1"/>
+          </a:fontRef>
+        </p:style>
+      </p:cxnSp>
+      <p:cxnSp>
+        <p:nvCxnSpPr>
+          <p:cNvPr id="75" name="Straight Connector 74"/>
+          <p:cNvCxnSpPr/>
+          <p:nvPr/>
+        </p:nvCxnSpPr>
+        <p:spPr>
           <a:xfrm flipH="1">
-            <a:off x="3418106" y="3387040"/>
-            <a:ext cx="163295" cy="0"/>
+            <a:off x="3505200" y="2209023"/>
+            <a:ext cx="344016" cy="0"/>
+          </a:xfrm>
+          <a:prstGeom prst="line">
+            <a:avLst/>
+          </a:prstGeom>
+          <a:ln>
+            <a:prstDash val="sysDash"/>
+          </a:ln>
+        </p:spPr>
+        <p:style>
+          <a:lnRef idx="1">
+            <a:schemeClr val="accent1"/>
+          </a:lnRef>
+          <a:fillRef idx="0">
+            <a:schemeClr val="accent1"/>
+          </a:fillRef>
+          <a:effectRef idx="0">
+            <a:schemeClr val="accent1"/>
+          </a:effectRef>
+          <a:fontRef idx="minor">
+            <a:schemeClr val="tx1"/>
+          </a:fontRef>
+        </p:style>
+      </p:cxnSp>
+      <p:cxnSp>
+        <p:nvCxnSpPr>
+          <p:cNvPr id="79" name="Straight Connector 78"/>
+          <p:cNvCxnSpPr/>
+          <p:nvPr/>
+        </p:nvCxnSpPr>
+        <p:spPr>
+          <a:xfrm flipH="1">
+            <a:off x="3505200" y="2632378"/>
+            <a:ext cx="354163" cy="0"/>
+          </a:xfrm>
+          <a:prstGeom prst="line">
+            <a:avLst/>
+          </a:prstGeom>
+          <a:ln>
+            <a:prstDash val="sysDash"/>
+          </a:ln>
+        </p:spPr>
+        <p:style>
+          <a:lnRef idx="1">
+            <a:schemeClr val="accent1"/>
+          </a:lnRef>
+          <a:fillRef idx="0">
+            <a:schemeClr val="accent1"/>
+          </a:fillRef>
+          <a:effectRef idx="0">
+            <a:schemeClr val="accent1"/>
+          </a:effectRef>
+          <a:fontRef idx="minor">
+            <a:schemeClr val="tx1"/>
+          </a:fontRef>
+        </p:style>
+      </p:cxnSp>
+      <p:cxnSp>
+        <p:nvCxnSpPr>
+          <p:cNvPr id="85" name="Straight Connector 84"/>
+          <p:cNvCxnSpPr/>
+          <p:nvPr/>
+        </p:nvCxnSpPr>
+        <p:spPr>
+          <a:xfrm flipH="1">
+            <a:off x="3505200" y="3015383"/>
+            <a:ext cx="344016" cy="0"/>
+          </a:xfrm>
+          <a:prstGeom prst="line">
+            <a:avLst/>
+          </a:prstGeom>
+          <a:ln>
+            <a:prstDash val="sysDash"/>
+          </a:ln>
+        </p:spPr>
+        <p:style>
+          <a:lnRef idx="1">
+            <a:schemeClr val="accent1"/>
+          </a:lnRef>
+          <a:fillRef idx="0">
+            <a:schemeClr val="accent1"/>
+          </a:fillRef>
+          <a:effectRef idx="0">
+            <a:schemeClr val="accent1"/>
+          </a:effectRef>
+          <a:fontRef idx="minor">
+            <a:schemeClr val="tx1"/>
+          </a:fontRef>
+        </p:style>
+      </p:cxnSp>
+      <p:cxnSp>
+        <p:nvCxnSpPr>
+          <p:cNvPr id="100" name="Straight Arrow Connector 99"/>
+          <p:cNvCxnSpPr/>
+          <p:nvPr/>
+        </p:nvCxnSpPr>
+        <p:spPr>
+          <a:xfrm flipH="1">
+            <a:off x="3390886" y="3178011"/>
+            <a:ext cx="114314" cy="0"/>
           </a:xfrm>
           <a:prstGeom prst="straightConnector1">
             <a:avLst/>
           </a:prstGeom>
           <a:ln>
-            <a:prstDash val="dash"/>
+            <a:prstDash val="sysDot"/>
+            <a:headEnd type="none" w="med" len="med"/>
+            <a:tailEnd type="arrow" w="med" len="med"/>
+          </a:ln>
+        </p:spPr>
+        <p:style>
+          <a:lnRef idx="1">
+            <a:schemeClr val="accent1"/>
+          </a:lnRef>
+          <a:fillRef idx="0">
+            <a:schemeClr val="accent1"/>
+          </a:fillRef>
+          <a:effectRef idx="0">
+            <a:schemeClr val="accent1"/>
+          </a:effectRef>
+          <a:fontRef idx="minor">
+            <a:schemeClr val="tx1"/>
+          </a:fontRef>
+        </p:style>
+      </p:cxnSp>
+      <p:cxnSp>
+        <p:nvCxnSpPr>
+          <p:cNvPr id="105" name="Straight Arrow Connector 104"/>
+          <p:cNvCxnSpPr/>
+          <p:nvPr/>
+        </p:nvCxnSpPr>
+        <p:spPr>
+          <a:xfrm flipH="1">
+            <a:off x="3390886" y="3471128"/>
+            <a:ext cx="114314" cy="0"/>
+          </a:xfrm>
+          <a:prstGeom prst="straightConnector1">
+            <a:avLst/>
+          </a:prstGeom>
+          <a:ln>
+            <a:prstDash val="sysDot"/>
+            <a:headEnd type="none" w="med" len="med"/>
+            <a:tailEnd type="arrow" w="med" len="med"/>
+          </a:ln>
+        </p:spPr>
+        <p:style>
+          <a:lnRef idx="1">
+            <a:schemeClr val="accent1"/>
+          </a:lnRef>
+          <a:fillRef idx="0">
+            <a:schemeClr val="accent1"/>
+          </a:fillRef>
+          <a:effectRef idx="0">
+            <a:schemeClr val="accent1"/>
+          </a:effectRef>
+          <a:fontRef idx="minor">
+            <a:schemeClr val="tx1"/>
+          </a:fontRef>
+        </p:style>
+      </p:cxnSp>
+      <p:cxnSp>
+        <p:nvCxnSpPr>
+          <p:cNvPr id="13" name="Elbow Connector 12"/>
+          <p:cNvCxnSpPr>
+            <a:endCxn id="58" idx="3"/>
+          </p:cNvCxnSpPr>
+          <p:nvPr/>
+        </p:nvCxnSpPr>
+        <p:spPr>
+          <a:xfrm rot="16200000" flipV="1">
+            <a:off x="3128310" y="2809926"/>
+            <a:ext cx="234836" cy="174388"/>
+          </a:xfrm>
+          <a:prstGeom prst="bentConnector2">
+            <a:avLst/>
+          </a:prstGeom>
+          <a:ln>
+            <a:prstDash val="sysDash"/>
+            <a:headEnd type="none" w="med" len="med"/>
+            <a:tailEnd type="arrow" w="med" len="med"/>
+          </a:ln>
+        </p:spPr>
+        <p:style>
+          <a:lnRef idx="1">
+            <a:schemeClr val="accent1"/>
+          </a:lnRef>
+          <a:fillRef idx="0">
+            <a:schemeClr val="accent1"/>
+          </a:fillRef>
+          <a:effectRef idx="0">
+            <a:schemeClr val="accent1"/>
+          </a:effectRef>
+          <a:fontRef idx="minor">
+            <a:schemeClr val="tx1"/>
+          </a:fontRef>
+        </p:style>
+      </p:cxnSp>
+      <p:cxnSp>
+        <p:nvCxnSpPr>
+          <p:cNvPr id="47" name="Straight Connector 46"/>
+          <p:cNvCxnSpPr/>
+          <p:nvPr/>
+        </p:nvCxnSpPr>
+        <p:spPr>
+          <a:xfrm>
+            <a:off x="3158534" y="2447743"/>
+            <a:ext cx="575266" cy="0"/>
+          </a:xfrm>
+          <a:prstGeom prst="line">
+            <a:avLst/>
+          </a:prstGeom>
+          <a:ln>
+            <a:prstDash val="sysDash"/>
+          </a:ln>
+        </p:spPr>
+        <p:style>
+          <a:lnRef idx="1">
+            <a:schemeClr val="accent1"/>
+          </a:lnRef>
+          <a:fillRef idx="0">
+            <a:schemeClr val="accent1"/>
+          </a:fillRef>
+          <a:effectRef idx="0">
+            <a:schemeClr val="accent1"/>
+          </a:effectRef>
+          <a:fontRef idx="minor">
+            <a:schemeClr val="tx1"/>
+          </a:fontRef>
+        </p:style>
+      </p:cxnSp>
+      <p:cxnSp>
+        <p:nvCxnSpPr>
+          <p:cNvPr id="50" name="Elbow Connector 49"/>
+          <p:cNvCxnSpPr>
+            <a:endCxn id="58" idx="1"/>
+          </p:cNvCxnSpPr>
+          <p:nvPr/>
+        </p:nvCxnSpPr>
+        <p:spPr>
+          <a:xfrm rot="16200000" flipH="1">
+            <a:off x="2478422" y="2609986"/>
+            <a:ext cx="205893" cy="133537"/>
+          </a:xfrm>
+          <a:prstGeom prst="bentConnector2">
+            <a:avLst/>
+          </a:prstGeom>
+          <a:ln>
+            <a:prstDash val="sysDash"/>
             <a:headEnd type="none" w="med" len="med"/>
             <a:tailEnd type="arrow" w="med" len="med"/>
           </a:ln>

</xml_diff>

<commit_message>
Interdiff between v14 and v15
</commit_message>
<xml_diff>
--- a/docs/diagrams/LogicComponentClassDiagram.pptx
+++ b/docs/diagrams/LogicComponentClassDiagram.pptx
@@ -208,7 +208,7 @@
           <a:p>
             <a:fld id="{F5CC4B3F-88C1-4FFA-B1B6-F41C21DC6924}" type="datetimeFigureOut">
               <a:rPr lang="en-US" smtClean="0"/>
-              <a:t>3/14/2017</a:t>
+              <a:t>3/19/2017</a:t>
             </a:fld>
             <a:endParaRPr lang="en-US"/>
           </a:p>
@@ -654,7 +654,7 @@
           <a:p>
             <a:fld id="{78C97017-6FC3-485B-9764-EAC9E56C1D49}" type="datetimeFigureOut">
               <a:rPr lang="en-US" smtClean="0"/>
-              <a:t>3/14/2017</a:t>
+              <a:t>3/19/2017</a:t>
             </a:fld>
             <a:endParaRPr lang="en-US"/>
           </a:p>
@@ -822,7 +822,7 @@
           <a:p>
             <a:fld id="{78C97017-6FC3-485B-9764-EAC9E56C1D49}" type="datetimeFigureOut">
               <a:rPr lang="en-US" smtClean="0"/>
-              <a:t>3/14/2017</a:t>
+              <a:t>3/19/2017</a:t>
             </a:fld>
             <a:endParaRPr lang="en-US"/>
           </a:p>
@@ -1000,7 +1000,7 @@
           <a:p>
             <a:fld id="{78C97017-6FC3-485B-9764-EAC9E56C1D49}" type="datetimeFigureOut">
               <a:rPr lang="en-US" smtClean="0"/>
-              <a:t>3/14/2017</a:t>
+              <a:t>3/19/2017</a:t>
             </a:fld>
             <a:endParaRPr lang="en-US"/>
           </a:p>
@@ -1168,7 +1168,7 @@
           <a:p>
             <a:fld id="{78C97017-6FC3-485B-9764-EAC9E56C1D49}" type="datetimeFigureOut">
               <a:rPr lang="en-US" smtClean="0"/>
-              <a:t>3/14/2017</a:t>
+              <a:t>3/19/2017</a:t>
             </a:fld>
             <a:endParaRPr lang="en-US"/>
           </a:p>
@@ -1413,7 +1413,7 @@
           <a:p>
             <a:fld id="{78C97017-6FC3-485B-9764-EAC9E56C1D49}" type="datetimeFigureOut">
               <a:rPr lang="en-US" smtClean="0"/>
-              <a:t>3/14/2017</a:t>
+              <a:t>3/19/2017</a:t>
             </a:fld>
             <a:endParaRPr lang="en-US"/>
           </a:p>
@@ -1698,7 +1698,7 @@
           <a:p>
             <a:fld id="{78C97017-6FC3-485B-9764-EAC9E56C1D49}" type="datetimeFigureOut">
               <a:rPr lang="en-US" smtClean="0"/>
-              <a:t>3/14/2017</a:t>
+              <a:t>3/19/2017</a:t>
             </a:fld>
             <a:endParaRPr lang="en-US"/>
           </a:p>
@@ -2117,7 +2117,7 @@
           <a:p>
             <a:fld id="{78C97017-6FC3-485B-9764-EAC9E56C1D49}" type="datetimeFigureOut">
               <a:rPr lang="en-US" smtClean="0"/>
-              <a:t>3/14/2017</a:t>
+              <a:t>3/19/2017</a:t>
             </a:fld>
             <a:endParaRPr lang="en-US"/>
           </a:p>
@@ -2234,7 +2234,7 @@
           <a:p>
             <a:fld id="{78C97017-6FC3-485B-9764-EAC9E56C1D49}" type="datetimeFigureOut">
               <a:rPr lang="en-US" smtClean="0"/>
-              <a:t>3/14/2017</a:t>
+              <a:t>3/19/2017</a:t>
             </a:fld>
             <a:endParaRPr lang="en-US"/>
           </a:p>
@@ -2329,7 +2329,7 @@
           <a:p>
             <a:fld id="{78C97017-6FC3-485B-9764-EAC9E56C1D49}" type="datetimeFigureOut">
               <a:rPr lang="en-US" smtClean="0"/>
-              <a:t>3/14/2017</a:t>
+              <a:t>3/19/2017</a:t>
             </a:fld>
             <a:endParaRPr lang="en-US"/>
           </a:p>
@@ -2604,7 +2604,7 @@
           <a:p>
             <a:fld id="{78C97017-6FC3-485B-9764-EAC9E56C1D49}" type="datetimeFigureOut">
               <a:rPr lang="en-US" smtClean="0"/>
-              <a:t>3/14/2017</a:t>
+              <a:t>3/19/2017</a:t>
             </a:fld>
             <a:endParaRPr lang="en-US"/>
           </a:p>
@@ -2856,7 +2856,7 @@
           <a:p>
             <a:fld id="{78C97017-6FC3-485B-9764-EAC9E56C1D49}" type="datetimeFigureOut">
               <a:rPr lang="en-US" smtClean="0"/>
-              <a:t>3/14/2017</a:t>
+              <a:t>3/19/2017</a:t>
             </a:fld>
             <a:endParaRPr lang="en-US"/>
           </a:p>
@@ -3067,7 +3067,7 @@
           <a:p>
             <a:fld id="{78C97017-6FC3-485B-9764-EAC9E56C1D49}" type="datetimeFigureOut">
               <a:rPr lang="en-US" smtClean="0"/>
-              <a:t>3/14/2017</a:t>
+              <a:t>3/19/2017</a:t>
             </a:fld>
             <a:endParaRPr lang="en-US"/>
           </a:p>
@@ -5030,7 +5030,7 @@
         </p:nvSpPr>
         <p:spPr>
           <a:xfrm>
-            <a:off x="3174214" y="1905000"/>
+            <a:off x="3174214" y="1862795"/>
             <a:ext cx="751107" cy="346760"/>
           </a:xfrm>
           <a:prstGeom prst="rect">
@@ -5072,7 +5072,7 @@
           <a:p>
             <a:pPr algn="ctr"/>
             <a:r>
-              <a:rPr lang="en-US" sz="1050" dirty="0">
+              <a:rPr lang="en-US" sz="1050">
                 <a:solidFill>
                   <a:schemeClr val="bg1"/>
                 </a:solidFill>
@@ -5080,14 +5080,14 @@
               <a:t>Argument</a:t>
             </a:r>
             <a:br>
-              <a:rPr lang="en-US" sz="1050" dirty="0">
+              <a:rPr lang="en-US" sz="1050">
                 <a:solidFill>
                   <a:schemeClr val="bg1"/>
                 </a:solidFill>
               </a:rPr>
             </a:br>
             <a:r>
-              <a:rPr lang="en-US" sz="1050" dirty="0">
+              <a:rPr lang="en-US" sz="1050">
                 <a:solidFill>
                   <a:schemeClr val="bg1"/>
                 </a:solidFill>
@@ -5652,7 +5652,7 @@
         </p:nvCxnSpPr>
         <p:spPr>
           <a:xfrm>
-            <a:off x="3925321" y="2078380"/>
+            <a:off x="3925321" y="2036175"/>
             <a:ext cx="327805" cy="107"/>
           </a:xfrm>
           <a:prstGeom prst="line">
@@ -5697,8 +5697,8 @@
         </p:nvCxnSpPr>
         <p:spPr>
           <a:xfrm rot="10800000" flipV="1">
-            <a:off x="2601618" y="2078379"/>
-            <a:ext cx="572596" cy="376101"/>
+            <a:off x="2601618" y="2036175"/>
+            <a:ext cx="572596" cy="418306"/>
           </a:xfrm>
           <a:prstGeom prst="bentConnector2">
             <a:avLst/>
@@ -6279,9 +6279,9 @@
           <p:nvPr/>
         </p:nvCxnSpPr>
         <p:spPr>
-          <a:xfrm flipH="1">
-            <a:off x="4248488" y="2078487"/>
-            <a:ext cx="4638" cy="1260312"/>
+          <a:xfrm>
+            <a:off x="4248488" y="2033984"/>
+            <a:ext cx="0" cy="1304815"/>
           </a:xfrm>
           <a:prstGeom prst="line">
             <a:avLst/>
@@ -6450,8 +6450,8 @@
         </p:nvSpPr>
         <p:spPr>
           <a:xfrm>
-            <a:off x="3139577" y="2450741"/>
-            <a:ext cx="825134" cy="174580"/>
+            <a:off x="3174214" y="2370131"/>
+            <a:ext cx="750156" cy="340758"/>
           </a:xfrm>
           <a:prstGeom prst="rect">
             <a:avLst/>
@@ -6497,7 +6497,22 @@
                   <a:schemeClr val="bg1"/>
                 </a:solidFill>
               </a:rPr>
-              <a:t>Arguments</a:t>
+              <a:t>Argument</a:t>
+            </a:r>
+            <a:br>
+              <a:rPr lang="en-SG" sz="1050" dirty="0">
+                <a:solidFill>
+                  <a:schemeClr val="bg1"/>
+                </a:solidFill>
+              </a:rPr>
+            </a:br>
+            <a:r>
+              <a:rPr lang="en-SG" sz="1050" dirty="0">
+                <a:solidFill>
+                  <a:schemeClr val="bg1"/>
+                </a:solidFill>
+              </a:rPr>
+              <a:t>Map</a:t>
             </a:r>
           </a:p>
         </p:txBody>
@@ -6514,8 +6529,8 @@
         </p:nvCxnSpPr>
         <p:spPr>
           <a:xfrm rot="10800000" flipV="1">
-            <a:off x="2964739" y="2538031"/>
-            <a:ext cx="174838" cy="3740"/>
+            <a:off x="2964740" y="2540509"/>
+            <a:ext cx="209475" cy="1261"/>
           </a:xfrm>
           <a:prstGeom prst="bentConnector3">
             <a:avLst>
@@ -6561,9 +6576,9 @@
           <p:nvPr/>
         </p:nvCxnSpPr>
         <p:spPr>
-          <a:xfrm rot="16200000" flipH="1">
-            <a:off x="3451466" y="2350062"/>
-            <a:ext cx="198981" cy="2376"/>
+          <a:xfrm rot="5400000">
+            <a:off x="3469242" y="2289605"/>
+            <a:ext cx="160576" cy="476"/>
           </a:xfrm>
           <a:prstGeom prst="bentConnector3">
             <a:avLst>
@@ -6609,8 +6624,8 @@
         </p:nvCxnSpPr>
         <p:spPr>
           <a:xfrm flipV="1">
-            <a:off x="3964711" y="2533616"/>
-            <a:ext cx="290331" cy="4415"/>
+            <a:off x="3924370" y="2535795"/>
+            <a:ext cx="322202" cy="4715"/>
           </a:xfrm>
           <a:prstGeom prst="line">
             <a:avLst/>

</xml_diff>

<commit_message>
Update Logic class diagram with ArgumentMap class
The Logic class diagram in the developer guide does not reflect the
updated dependencies between ArgumentTokenizer, ArgumentMap, Prefix, and
command parser classes.

Let's update the Logic class diagram.
</commit_message>
<xml_diff>
--- a/docs/diagrams/LogicComponentClassDiagram.pptx
+++ b/docs/diagrams/LogicComponentClassDiagram.pptx
@@ -208,7 +208,7 @@
           <a:p>
             <a:fld id="{F5CC4B3F-88C1-4FFA-B1B6-F41C21DC6924}" type="datetimeFigureOut">
               <a:rPr lang="en-US" smtClean="0"/>
-              <a:t>2/2/2017</a:t>
+              <a:t>3/19/2017</a:t>
             </a:fld>
             <a:endParaRPr lang="en-US"/>
           </a:p>
@@ -272,38 +272,37 @@
           <a:p>
             <a:pPr lvl="0"/>
             <a:r>
-              <a:rPr lang="en-US" smtClean="0"/>
+              <a:rPr lang="en-US"/>
               <a:t>Click to edit Master text styles</a:t>
             </a:r>
           </a:p>
           <a:p>
             <a:pPr lvl="1"/>
             <a:r>
-              <a:rPr lang="en-US" smtClean="0"/>
+              <a:rPr lang="en-US"/>
               <a:t>Second level</a:t>
             </a:r>
           </a:p>
           <a:p>
             <a:pPr lvl="2"/>
             <a:r>
-              <a:rPr lang="en-US" smtClean="0"/>
+              <a:rPr lang="en-US"/>
               <a:t>Third level</a:t>
             </a:r>
           </a:p>
           <a:p>
             <a:pPr lvl="3"/>
             <a:r>
-              <a:rPr lang="en-US" smtClean="0"/>
+              <a:rPr lang="en-US"/>
               <a:t>Fourth level</a:t>
             </a:r>
           </a:p>
           <a:p>
             <a:pPr lvl="4"/>
             <a:r>
-              <a:rPr lang="en-US" smtClean="0"/>
+              <a:rPr lang="en-US"/>
               <a:t>Fifth level</a:t>
             </a:r>
-            <a:endParaRPr lang="en-US"/>
           </a:p>
         </p:txBody>
       </p:sp>
@@ -514,10 +513,9 @@
           <a:lstStyle/>
           <a:p>
             <a:r>
-              <a:rPr lang="en-US" smtClean="0"/>
+              <a:rPr lang="en-US"/>
               <a:t>Click to edit Master title style</a:t>
             </a:r>
-            <a:endParaRPr lang="en-US"/>
           </a:p>
         </p:txBody>
       </p:sp>
@@ -633,10 +631,9 @@
           </a:lstStyle>
           <a:p>
             <a:r>
-              <a:rPr lang="en-US" smtClean="0"/>
+              <a:rPr lang="en-US"/>
               <a:t>Click to edit Master subtitle style</a:t>
             </a:r>
-            <a:endParaRPr lang="en-US"/>
           </a:p>
         </p:txBody>
       </p:sp>
@@ -657,7 +654,7 @@
           <a:p>
             <a:fld id="{78C97017-6FC3-485B-9764-EAC9E56C1D49}" type="datetimeFigureOut">
               <a:rPr lang="en-US" smtClean="0"/>
-              <a:t>2/2/2017</a:t>
+              <a:t>3/19/2017</a:t>
             </a:fld>
             <a:endParaRPr lang="en-US"/>
           </a:p>
@@ -751,10 +748,9 @@
           <a:lstStyle/>
           <a:p>
             <a:r>
-              <a:rPr lang="en-US" smtClean="0"/>
+              <a:rPr lang="en-US"/>
               <a:t>Click to edit Master title style</a:t>
             </a:r>
-            <a:endParaRPr lang="en-US"/>
           </a:p>
         </p:txBody>
       </p:sp>
@@ -775,38 +771,37 @@
           <a:p>
             <a:pPr lvl="0"/>
             <a:r>
-              <a:rPr lang="en-US" smtClean="0"/>
+              <a:rPr lang="en-US"/>
               <a:t>Click to edit Master text styles</a:t>
             </a:r>
           </a:p>
           <a:p>
             <a:pPr lvl="1"/>
             <a:r>
-              <a:rPr lang="en-US" smtClean="0"/>
+              <a:rPr lang="en-US"/>
               <a:t>Second level</a:t>
             </a:r>
           </a:p>
           <a:p>
             <a:pPr lvl="2"/>
             <a:r>
-              <a:rPr lang="en-US" smtClean="0"/>
+              <a:rPr lang="en-US"/>
               <a:t>Third level</a:t>
             </a:r>
           </a:p>
           <a:p>
             <a:pPr lvl="3"/>
             <a:r>
-              <a:rPr lang="en-US" smtClean="0"/>
+              <a:rPr lang="en-US"/>
               <a:t>Fourth level</a:t>
             </a:r>
           </a:p>
           <a:p>
             <a:pPr lvl="4"/>
             <a:r>
-              <a:rPr lang="en-US" smtClean="0"/>
+              <a:rPr lang="en-US"/>
               <a:t>Fifth level</a:t>
             </a:r>
-            <a:endParaRPr lang="en-US"/>
           </a:p>
         </p:txBody>
       </p:sp>
@@ -827,7 +822,7 @@
           <a:p>
             <a:fld id="{78C97017-6FC3-485B-9764-EAC9E56C1D49}" type="datetimeFigureOut">
               <a:rPr lang="en-US" smtClean="0"/>
-              <a:t>2/2/2017</a:t>
+              <a:t>3/19/2017</a:t>
             </a:fld>
             <a:endParaRPr lang="en-US"/>
           </a:p>
@@ -926,10 +921,9 @@
           <a:lstStyle/>
           <a:p>
             <a:r>
-              <a:rPr lang="en-US" smtClean="0"/>
+              <a:rPr lang="en-US"/>
               <a:t>Click to edit Master title style</a:t>
             </a:r>
-            <a:endParaRPr lang="en-US"/>
           </a:p>
         </p:txBody>
       </p:sp>
@@ -955,38 +949,37 @@
           <a:p>
             <a:pPr lvl="0"/>
             <a:r>
-              <a:rPr lang="en-US" smtClean="0"/>
+              <a:rPr lang="en-US"/>
               <a:t>Click to edit Master text styles</a:t>
             </a:r>
           </a:p>
           <a:p>
             <a:pPr lvl="1"/>
             <a:r>
-              <a:rPr lang="en-US" smtClean="0"/>
+              <a:rPr lang="en-US"/>
               <a:t>Second level</a:t>
             </a:r>
           </a:p>
           <a:p>
             <a:pPr lvl="2"/>
             <a:r>
-              <a:rPr lang="en-US" smtClean="0"/>
+              <a:rPr lang="en-US"/>
               <a:t>Third level</a:t>
             </a:r>
           </a:p>
           <a:p>
             <a:pPr lvl="3"/>
             <a:r>
-              <a:rPr lang="en-US" smtClean="0"/>
+              <a:rPr lang="en-US"/>
               <a:t>Fourth level</a:t>
             </a:r>
           </a:p>
           <a:p>
             <a:pPr lvl="4"/>
             <a:r>
-              <a:rPr lang="en-US" smtClean="0"/>
+              <a:rPr lang="en-US"/>
               <a:t>Fifth level</a:t>
             </a:r>
-            <a:endParaRPr lang="en-US"/>
           </a:p>
         </p:txBody>
       </p:sp>
@@ -1007,7 +1000,7 @@
           <a:p>
             <a:fld id="{78C97017-6FC3-485B-9764-EAC9E56C1D49}" type="datetimeFigureOut">
               <a:rPr lang="en-US" smtClean="0"/>
-              <a:t>2/2/2017</a:t>
+              <a:t>3/19/2017</a:t>
             </a:fld>
             <a:endParaRPr lang="en-US"/>
           </a:p>
@@ -1101,10 +1094,9 @@
           <a:lstStyle/>
           <a:p>
             <a:r>
-              <a:rPr lang="en-US" smtClean="0"/>
+              <a:rPr lang="en-US"/>
               <a:t>Click to edit Master title style</a:t>
             </a:r>
-            <a:endParaRPr lang="en-US"/>
           </a:p>
         </p:txBody>
       </p:sp>
@@ -1125,38 +1117,37 @@
           <a:p>
             <a:pPr lvl="0"/>
             <a:r>
-              <a:rPr lang="en-US" smtClean="0"/>
+              <a:rPr lang="en-US"/>
               <a:t>Click to edit Master text styles</a:t>
             </a:r>
           </a:p>
           <a:p>
             <a:pPr lvl="1"/>
             <a:r>
-              <a:rPr lang="en-US" smtClean="0"/>
+              <a:rPr lang="en-US"/>
               <a:t>Second level</a:t>
             </a:r>
           </a:p>
           <a:p>
             <a:pPr lvl="2"/>
             <a:r>
-              <a:rPr lang="en-US" smtClean="0"/>
+              <a:rPr lang="en-US"/>
               <a:t>Third level</a:t>
             </a:r>
           </a:p>
           <a:p>
             <a:pPr lvl="3"/>
             <a:r>
-              <a:rPr lang="en-US" smtClean="0"/>
+              <a:rPr lang="en-US"/>
               <a:t>Fourth level</a:t>
             </a:r>
           </a:p>
           <a:p>
             <a:pPr lvl="4"/>
             <a:r>
-              <a:rPr lang="en-US" smtClean="0"/>
+              <a:rPr lang="en-US"/>
               <a:t>Fifth level</a:t>
             </a:r>
-            <a:endParaRPr lang="en-US"/>
           </a:p>
         </p:txBody>
       </p:sp>
@@ -1177,7 +1168,7 @@
           <a:p>
             <a:fld id="{78C97017-6FC3-485B-9764-EAC9E56C1D49}" type="datetimeFigureOut">
               <a:rPr lang="en-US" smtClean="0"/>
-              <a:t>2/2/2017</a:t>
+              <a:t>3/19/2017</a:t>
             </a:fld>
             <a:endParaRPr lang="en-US"/>
           </a:p>
@@ -1280,10 +1271,9 @@
           </a:lstStyle>
           <a:p>
             <a:r>
-              <a:rPr lang="en-US" smtClean="0"/>
+              <a:rPr lang="en-US"/>
               <a:t>Click to edit Master title style</a:t>
             </a:r>
-            <a:endParaRPr lang="en-US"/>
           </a:p>
         </p:txBody>
       </p:sp>
@@ -1400,7 +1390,7 @@
           <a:p>
             <a:pPr lvl="0"/>
             <a:r>
-              <a:rPr lang="en-US" smtClean="0"/>
+              <a:rPr lang="en-US"/>
               <a:t>Click to edit Master text styles</a:t>
             </a:r>
           </a:p>
@@ -1423,7 +1413,7 @@
           <a:p>
             <a:fld id="{78C97017-6FC3-485B-9764-EAC9E56C1D49}" type="datetimeFigureOut">
               <a:rPr lang="en-US" smtClean="0"/>
-              <a:t>2/2/2017</a:t>
+              <a:t>3/19/2017</a:t>
             </a:fld>
             <a:endParaRPr lang="en-US"/>
           </a:p>
@@ -1517,10 +1507,9 @@
           <a:lstStyle/>
           <a:p>
             <a:r>
-              <a:rPr lang="en-US" smtClean="0"/>
+              <a:rPr lang="en-US"/>
               <a:t>Click to edit Master title style</a:t>
             </a:r>
-            <a:endParaRPr lang="en-US"/>
           </a:p>
         </p:txBody>
       </p:sp>
@@ -1574,38 +1563,37 @@
           <a:p>
             <a:pPr lvl="0"/>
             <a:r>
-              <a:rPr lang="en-US" smtClean="0"/>
+              <a:rPr lang="en-US"/>
               <a:t>Click to edit Master text styles</a:t>
             </a:r>
           </a:p>
           <a:p>
             <a:pPr lvl="1"/>
             <a:r>
-              <a:rPr lang="en-US" smtClean="0"/>
+              <a:rPr lang="en-US"/>
               <a:t>Second level</a:t>
             </a:r>
           </a:p>
           <a:p>
             <a:pPr lvl="2"/>
             <a:r>
-              <a:rPr lang="en-US" smtClean="0"/>
+              <a:rPr lang="en-US"/>
               <a:t>Third level</a:t>
             </a:r>
           </a:p>
           <a:p>
             <a:pPr lvl="3"/>
             <a:r>
-              <a:rPr lang="en-US" smtClean="0"/>
+              <a:rPr lang="en-US"/>
               <a:t>Fourth level</a:t>
             </a:r>
           </a:p>
           <a:p>
             <a:pPr lvl="4"/>
             <a:r>
-              <a:rPr lang="en-US" smtClean="0"/>
+              <a:rPr lang="en-US"/>
               <a:t>Fifth level</a:t>
             </a:r>
-            <a:endParaRPr lang="en-US"/>
           </a:p>
         </p:txBody>
       </p:sp>
@@ -1659,38 +1647,37 @@
           <a:p>
             <a:pPr lvl="0"/>
             <a:r>
-              <a:rPr lang="en-US" smtClean="0"/>
+              <a:rPr lang="en-US"/>
               <a:t>Click to edit Master text styles</a:t>
             </a:r>
           </a:p>
           <a:p>
             <a:pPr lvl="1"/>
             <a:r>
-              <a:rPr lang="en-US" smtClean="0"/>
+              <a:rPr lang="en-US"/>
               <a:t>Second level</a:t>
             </a:r>
           </a:p>
           <a:p>
             <a:pPr lvl="2"/>
             <a:r>
-              <a:rPr lang="en-US" smtClean="0"/>
+              <a:rPr lang="en-US"/>
               <a:t>Third level</a:t>
             </a:r>
           </a:p>
           <a:p>
             <a:pPr lvl="3"/>
             <a:r>
-              <a:rPr lang="en-US" smtClean="0"/>
+              <a:rPr lang="en-US"/>
               <a:t>Fourth level</a:t>
             </a:r>
           </a:p>
           <a:p>
             <a:pPr lvl="4"/>
             <a:r>
-              <a:rPr lang="en-US" smtClean="0"/>
+              <a:rPr lang="en-US"/>
               <a:t>Fifth level</a:t>
             </a:r>
-            <a:endParaRPr lang="en-US"/>
           </a:p>
         </p:txBody>
       </p:sp>
@@ -1711,7 +1698,7 @@
           <a:p>
             <a:fld id="{78C97017-6FC3-485B-9764-EAC9E56C1D49}" type="datetimeFigureOut">
               <a:rPr lang="en-US" smtClean="0"/>
-              <a:t>2/2/2017</a:t>
+              <a:t>3/19/2017</a:t>
             </a:fld>
             <a:endParaRPr lang="en-US"/>
           </a:p>
@@ -1809,10 +1796,9 @@
           </a:lstStyle>
           <a:p>
             <a:r>
-              <a:rPr lang="en-US" smtClean="0"/>
+              <a:rPr lang="en-US"/>
               <a:t>Click to edit Master title style</a:t>
             </a:r>
-            <a:endParaRPr lang="en-US"/>
           </a:p>
         </p:txBody>
       </p:sp>
@@ -1875,7 +1861,7 @@
           <a:p>
             <a:pPr lvl="0"/>
             <a:r>
-              <a:rPr lang="en-US" smtClean="0"/>
+              <a:rPr lang="en-US"/>
               <a:t>Click to edit Master text styles</a:t>
             </a:r>
           </a:p>
@@ -1931,38 +1917,37 @@
           <a:p>
             <a:pPr lvl="0"/>
             <a:r>
-              <a:rPr lang="en-US" smtClean="0"/>
+              <a:rPr lang="en-US"/>
               <a:t>Click to edit Master text styles</a:t>
             </a:r>
           </a:p>
           <a:p>
             <a:pPr lvl="1"/>
             <a:r>
-              <a:rPr lang="en-US" smtClean="0"/>
+              <a:rPr lang="en-US"/>
               <a:t>Second level</a:t>
             </a:r>
           </a:p>
           <a:p>
             <a:pPr lvl="2"/>
             <a:r>
-              <a:rPr lang="en-US" smtClean="0"/>
+              <a:rPr lang="en-US"/>
               <a:t>Third level</a:t>
             </a:r>
           </a:p>
           <a:p>
             <a:pPr lvl="3"/>
             <a:r>
-              <a:rPr lang="en-US" smtClean="0"/>
+              <a:rPr lang="en-US"/>
               <a:t>Fourth level</a:t>
             </a:r>
           </a:p>
           <a:p>
             <a:pPr lvl="4"/>
             <a:r>
-              <a:rPr lang="en-US" smtClean="0"/>
+              <a:rPr lang="en-US"/>
               <a:t>Fifth level</a:t>
             </a:r>
-            <a:endParaRPr lang="en-US"/>
           </a:p>
         </p:txBody>
       </p:sp>
@@ -2025,7 +2010,7 @@
           <a:p>
             <a:pPr lvl="0"/>
             <a:r>
-              <a:rPr lang="en-US" smtClean="0"/>
+              <a:rPr lang="en-US"/>
               <a:t>Click to edit Master text styles</a:t>
             </a:r>
           </a:p>
@@ -2081,38 +2066,37 @@
           <a:p>
             <a:pPr lvl="0"/>
             <a:r>
-              <a:rPr lang="en-US" smtClean="0"/>
+              <a:rPr lang="en-US"/>
               <a:t>Click to edit Master text styles</a:t>
             </a:r>
           </a:p>
           <a:p>
             <a:pPr lvl="1"/>
             <a:r>
-              <a:rPr lang="en-US" smtClean="0"/>
+              <a:rPr lang="en-US"/>
               <a:t>Second level</a:t>
             </a:r>
           </a:p>
           <a:p>
             <a:pPr lvl="2"/>
             <a:r>
-              <a:rPr lang="en-US" smtClean="0"/>
+              <a:rPr lang="en-US"/>
               <a:t>Third level</a:t>
             </a:r>
           </a:p>
           <a:p>
             <a:pPr lvl="3"/>
             <a:r>
-              <a:rPr lang="en-US" smtClean="0"/>
+              <a:rPr lang="en-US"/>
               <a:t>Fourth level</a:t>
             </a:r>
           </a:p>
           <a:p>
             <a:pPr lvl="4"/>
             <a:r>
-              <a:rPr lang="en-US" smtClean="0"/>
+              <a:rPr lang="en-US"/>
               <a:t>Fifth level</a:t>
             </a:r>
-            <a:endParaRPr lang="en-US"/>
           </a:p>
         </p:txBody>
       </p:sp>
@@ -2133,7 +2117,7 @@
           <a:p>
             <a:fld id="{78C97017-6FC3-485B-9764-EAC9E56C1D49}" type="datetimeFigureOut">
               <a:rPr lang="en-US" smtClean="0"/>
-              <a:t>2/2/2017</a:t>
+              <a:t>3/19/2017</a:t>
             </a:fld>
             <a:endParaRPr lang="en-US"/>
           </a:p>
@@ -2227,10 +2211,9 @@
           <a:lstStyle/>
           <a:p>
             <a:r>
-              <a:rPr lang="en-US" smtClean="0"/>
+              <a:rPr lang="en-US"/>
               <a:t>Click to edit Master title style</a:t>
             </a:r>
-            <a:endParaRPr lang="en-US"/>
           </a:p>
         </p:txBody>
       </p:sp>
@@ -2251,7 +2234,7 @@
           <a:p>
             <a:fld id="{78C97017-6FC3-485B-9764-EAC9E56C1D49}" type="datetimeFigureOut">
               <a:rPr lang="en-US" smtClean="0"/>
-              <a:t>2/2/2017</a:t>
+              <a:t>3/19/2017</a:t>
             </a:fld>
             <a:endParaRPr lang="en-US"/>
           </a:p>
@@ -2346,7 +2329,7 @@
           <a:p>
             <a:fld id="{78C97017-6FC3-485B-9764-EAC9E56C1D49}" type="datetimeFigureOut">
               <a:rPr lang="en-US" smtClean="0"/>
-              <a:t>2/2/2017</a:t>
+              <a:t>3/19/2017</a:t>
             </a:fld>
             <a:endParaRPr lang="en-US"/>
           </a:p>
@@ -2449,10 +2432,9 @@
           </a:lstStyle>
           <a:p>
             <a:r>
-              <a:rPr lang="en-US" smtClean="0"/>
+              <a:rPr lang="en-US"/>
               <a:t>Click to edit Master title style</a:t>
             </a:r>
-            <a:endParaRPr lang="en-US"/>
           </a:p>
         </p:txBody>
       </p:sp>
@@ -2506,38 +2488,37 @@
           <a:p>
             <a:pPr lvl="0"/>
             <a:r>
-              <a:rPr lang="en-US" smtClean="0"/>
+              <a:rPr lang="en-US"/>
               <a:t>Click to edit Master text styles</a:t>
             </a:r>
           </a:p>
           <a:p>
             <a:pPr lvl="1"/>
             <a:r>
-              <a:rPr lang="en-US" smtClean="0"/>
+              <a:rPr lang="en-US"/>
               <a:t>Second level</a:t>
             </a:r>
           </a:p>
           <a:p>
             <a:pPr lvl="2"/>
             <a:r>
-              <a:rPr lang="en-US" smtClean="0"/>
+              <a:rPr lang="en-US"/>
               <a:t>Third level</a:t>
             </a:r>
           </a:p>
           <a:p>
             <a:pPr lvl="3"/>
             <a:r>
-              <a:rPr lang="en-US" smtClean="0"/>
+              <a:rPr lang="en-US"/>
               <a:t>Fourth level</a:t>
             </a:r>
           </a:p>
           <a:p>
             <a:pPr lvl="4"/>
             <a:r>
-              <a:rPr lang="en-US" smtClean="0"/>
+              <a:rPr lang="en-US"/>
               <a:t>Fifth level</a:t>
             </a:r>
-            <a:endParaRPr lang="en-US"/>
           </a:p>
         </p:txBody>
       </p:sp>
@@ -2600,7 +2581,7 @@
           <a:p>
             <a:pPr lvl="0"/>
             <a:r>
-              <a:rPr lang="en-US" smtClean="0"/>
+              <a:rPr lang="en-US"/>
               <a:t>Click to edit Master text styles</a:t>
             </a:r>
           </a:p>
@@ -2623,7 +2604,7 @@
           <a:p>
             <a:fld id="{78C97017-6FC3-485B-9764-EAC9E56C1D49}" type="datetimeFigureOut">
               <a:rPr lang="en-US" smtClean="0"/>
-              <a:t>2/2/2017</a:t>
+              <a:t>3/19/2017</a:t>
             </a:fld>
             <a:endParaRPr lang="en-US"/>
           </a:p>
@@ -2726,10 +2707,9 @@
           </a:lstStyle>
           <a:p>
             <a:r>
-              <a:rPr lang="en-US" smtClean="0"/>
+              <a:rPr lang="en-US"/>
               <a:t>Click to edit Master title style</a:t>
             </a:r>
-            <a:endParaRPr lang="en-US"/>
           </a:p>
         </p:txBody>
       </p:sp>
@@ -2853,7 +2833,7 @@
           <a:p>
             <a:pPr lvl="0"/>
             <a:r>
-              <a:rPr lang="en-US" smtClean="0"/>
+              <a:rPr lang="en-US"/>
               <a:t>Click to edit Master text styles</a:t>
             </a:r>
           </a:p>
@@ -2876,7 +2856,7 @@
           <a:p>
             <a:fld id="{78C97017-6FC3-485B-9764-EAC9E56C1D49}" type="datetimeFigureOut">
               <a:rPr lang="en-US" smtClean="0"/>
-              <a:t>2/2/2017</a:t>
+              <a:t>3/19/2017</a:t>
             </a:fld>
             <a:endParaRPr lang="en-US"/>
           </a:p>
@@ -2985,10 +2965,9 @@
           <a:lstStyle/>
           <a:p>
             <a:r>
-              <a:rPr lang="en-US" smtClean="0"/>
+              <a:rPr lang="en-US"/>
               <a:t>Click to edit Master title style</a:t>
             </a:r>
-            <a:endParaRPr lang="en-US"/>
           </a:p>
         </p:txBody>
       </p:sp>
@@ -3019,38 +2998,37 @@
           <a:p>
             <a:pPr lvl="0"/>
             <a:r>
-              <a:rPr lang="en-US" smtClean="0"/>
+              <a:rPr lang="en-US"/>
               <a:t>Click to edit Master text styles</a:t>
             </a:r>
           </a:p>
           <a:p>
             <a:pPr lvl="1"/>
             <a:r>
-              <a:rPr lang="en-US" smtClean="0"/>
+              <a:rPr lang="en-US"/>
               <a:t>Second level</a:t>
             </a:r>
           </a:p>
           <a:p>
             <a:pPr lvl="2"/>
             <a:r>
-              <a:rPr lang="en-US" smtClean="0"/>
+              <a:rPr lang="en-US"/>
               <a:t>Third level</a:t>
             </a:r>
           </a:p>
           <a:p>
             <a:pPr lvl="3"/>
             <a:r>
-              <a:rPr lang="en-US" smtClean="0"/>
+              <a:rPr lang="en-US"/>
               <a:t>Fourth level</a:t>
             </a:r>
           </a:p>
           <a:p>
             <a:pPr lvl="4"/>
             <a:r>
-              <a:rPr lang="en-US" smtClean="0"/>
+              <a:rPr lang="en-US"/>
               <a:t>Fifth level</a:t>
             </a:r>
-            <a:endParaRPr lang="en-US"/>
           </a:p>
         </p:txBody>
       </p:sp>
@@ -3089,7 +3067,7 @@
           <a:p>
             <a:fld id="{78C97017-6FC3-485B-9764-EAC9E56C1D49}" type="datetimeFigureOut">
               <a:rPr lang="en-US" smtClean="0"/>
-              <a:t>2/2/2017</a:t>
+              <a:t>3/19/2017</a:t>
             </a:fld>
             <a:endParaRPr lang="en-US"/>
           </a:p>
@@ -3625,7 +3603,7 @@
           <a:p>
             <a:pPr algn="ctr"/>
             <a:r>
-              <a:rPr lang="en-US" sz="1050" b="1" dirty="0" err="1" smtClean="0">
+              <a:rPr lang="en-US" sz="1050" b="1" dirty="0" err="1">
                 <a:solidFill>
                   <a:srgbClr val="0070C0"/>
                 </a:solidFill>
@@ -3887,7 +3865,7 @@
           <a:p>
             <a:pPr algn="ctr"/>
             <a:r>
-              <a:rPr lang="en-US" sz="1050" b="1" dirty="0" err="1" smtClean="0">
+              <a:rPr lang="en-US" sz="1050" b="1" dirty="0" err="1">
                 <a:solidFill>
                   <a:srgbClr val="0070C0"/>
                 </a:solidFill>
@@ -3943,7 +3921,7 @@
           <a:p>
             <a:pPr algn="ctr"/>
             <a:r>
-              <a:rPr lang="en-US" sz="1050" b="1" dirty="0" smtClean="0">
+              <a:rPr lang="en-US" sz="1050" b="1" dirty="0">
                 <a:solidFill>
                   <a:srgbClr val="0070C0"/>
                 </a:solidFill>
@@ -3951,14 +3929,14 @@
               <a:t>Incorrect</a:t>
             </a:r>
             <a:br>
-              <a:rPr lang="en-US" sz="1050" b="1" dirty="0" smtClean="0">
+              <a:rPr lang="en-US" sz="1050" b="1" dirty="0">
                 <a:solidFill>
                   <a:srgbClr val="0070C0"/>
                 </a:solidFill>
               </a:rPr>
             </a:br>
             <a:r>
-              <a:rPr lang="en-US" sz="1050" b="1" dirty="0" smtClean="0">
+              <a:rPr lang="en-US" sz="1050" b="1" dirty="0">
                 <a:solidFill>
                   <a:srgbClr val="0070C0"/>
                 </a:solidFill>
@@ -4791,7 +4769,7 @@
           <a:p>
             <a:pPr algn="ctr"/>
             <a:r>
-              <a:rPr lang="en-US" sz="1050" b="1" dirty="0" smtClean="0">
+              <a:rPr lang="en-US" sz="1050" b="1" dirty="0">
                 <a:solidFill>
                   <a:srgbClr val="0070C0"/>
                 </a:solidFill>
@@ -4855,7 +4833,7 @@
         </p:nvSpPr>
         <p:spPr>
           <a:xfrm flipH="1">
-            <a:off x="4664592" y="2148937"/>
+            <a:off x="4831294" y="2148937"/>
             <a:ext cx="1093635" cy="346760"/>
           </a:xfrm>
           <a:prstGeom prst="rect">
@@ -4926,7 +4904,7 @@
         </p:nvSpPr>
         <p:spPr>
           <a:xfrm flipH="1">
-            <a:off x="4664592" y="2555337"/>
+            <a:off x="4831294" y="2555337"/>
             <a:ext cx="1093635" cy="346760"/>
           </a:xfrm>
           <a:prstGeom prst="rect">
@@ -4997,7 +4975,7 @@
         </p:nvSpPr>
         <p:spPr>
           <a:xfrm flipH="1">
-            <a:off x="4664590" y="2977582"/>
+            <a:off x="4831292" y="2977582"/>
             <a:ext cx="1093635" cy="346760"/>
           </a:xfrm>
           <a:prstGeom prst="rect">
@@ -5052,7 +5030,7 @@
         </p:nvSpPr>
         <p:spPr>
           <a:xfrm>
-            <a:off x="2807288" y="1905000"/>
+            <a:off x="3174214" y="1862795"/>
             <a:ext cx="751107" cy="346760"/>
           </a:xfrm>
           <a:prstGeom prst="rect">
@@ -5094,7 +5072,7 @@
           <a:p>
             <a:pPr algn="ctr"/>
             <a:r>
-              <a:rPr lang="en-US" sz="1050" dirty="0" smtClean="0">
+              <a:rPr lang="en-US" sz="1050">
                 <a:solidFill>
                   <a:schemeClr val="bg1"/>
                 </a:solidFill>
@@ -5102,14 +5080,14 @@
               <a:t>Argument</a:t>
             </a:r>
             <a:br>
-              <a:rPr lang="en-US" sz="1050" dirty="0" smtClean="0">
+              <a:rPr lang="en-US" sz="1050">
                 <a:solidFill>
                   <a:schemeClr val="bg1"/>
                 </a:solidFill>
               </a:rPr>
             </a:br>
             <a:r>
-              <a:rPr lang="en-US" sz="1050" dirty="0" smtClean="0">
+              <a:rPr lang="en-US" sz="1050">
                 <a:solidFill>
                   <a:schemeClr val="bg1"/>
                 </a:solidFill>
@@ -5132,7 +5110,7 @@
         </p:nvSpPr>
         <p:spPr>
           <a:xfrm>
-            <a:off x="2813291" y="2432664"/>
+            <a:off x="2238496" y="2454481"/>
             <a:ext cx="726243" cy="174580"/>
           </a:xfrm>
           <a:prstGeom prst="rect">
@@ -5174,7 +5152,7 @@
           <a:p>
             <a:pPr algn="ctr"/>
             <a:r>
-              <a:rPr lang="en-US" sz="1050" dirty="0" smtClean="0">
+              <a:rPr lang="en-US" sz="1050" dirty="0">
                 <a:solidFill>
                   <a:schemeClr val="bg1"/>
                 </a:solidFill>
@@ -5197,9 +5175,9 @@
         </p:nvGrpSpPr>
         <p:grpSpPr>
           <a:xfrm rot="5400000">
-            <a:off x="5941795" y="1962201"/>
+            <a:off x="6088711" y="1962201"/>
             <a:ext cx="254462" cy="555486"/>
-            <a:chOff x="3949242" y="712012"/>
+            <a:chOff x="3949242" y="578739"/>
             <a:chExt cx="254462" cy="503902"/>
           </a:xfrm>
         </p:grpSpPr>
@@ -5211,7 +5189,7 @@
           </p:nvSpPr>
           <p:spPr>
             <a:xfrm rot="16200000">
-              <a:off x="3824522" y="836732"/>
+              <a:off x="3824522" y="703459"/>
               <a:ext cx="503902" cy="254462"/>
             </a:xfrm>
             <a:prstGeom prst="rect">
@@ -5226,7 +5204,7 @@
             <a:lstStyle/>
             <a:p>
               <a:r>
-                <a:rPr lang="en-US" sz="1100" dirty="0" smtClean="0">
+                <a:rPr lang="en-US" sz="1100" dirty="0">
                   <a:solidFill>
                     <a:schemeClr val="accent5">
                       <a:lumMod val="75000"/>
@@ -5253,7 +5231,7 @@
           </p:nvSpPr>
           <p:spPr>
             <a:xfrm rot="10800000" flipV="1">
-              <a:off x="3979474" y="751200"/>
+              <a:off x="3979474" y="617927"/>
               <a:ext cx="132157" cy="79956"/>
             </a:xfrm>
             <a:prstGeom prst="triangle">
@@ -5302,9 +5280,9 @@
         </p:nvGrpSpPr>
         <p:grpSpPr>
           <a:xfrm rot="5400000">
-            <a:off x="5962853" y="2347569"/>
+            <a:off x="6098740" y="2390577"/>
             <a:ext cx="254462" cy="555486"/>
-            <a:chOff x="3949242" y="712012"/>
+            <a:chOff x="3965759" y="592436"/>
             <a:chExt cx="254462" cy="503902"/>
           </a:xfrm>
         </p:grpSpPr>
@@ -5316,7 +5294,7 @@
           </p:nvSpPr>
           <p:spPr>
             <a:xfrm rot="16200000">
-              <a:off x="3824522" y="836732"/>
+              <a:off x="3841039" y="717156"/>
               <a:ext cx="503902" cy="254462"/>
             </a:xfrm>
             <a:prstGeom prst="rect">
@@ -5331,7 +5309,7 @@
             <a:lstStyle/>
             <a:p>
               <a:r>
-                <a:rPr lang="en-US" sz="1100" dirty="0" smtClean="0">
+                <a:rPr lang="en-US" sz="1100" dirty="0">
                   <a:solidFill>
                     <a:schemeClr val="accent5">
                       <a:lumMod val="75000"/>
@@ -5358,7 +5336,7 @@
           </p:nvSpPr>
           <p:spPr>
             <a:xfrm rot="10800000" flipV="1">
-              <a:off x="3979474" y="751200"/>
+              <a:off x="3995991" y="631624"/>
               <a:ext cx="132157" cy="79956"/>
             </a:xfrm>
             <a:prstGeom prst="triangle">
@@ -5407,7 +5385,7 @@
         </p:nvSpPr>
         <p:spPr>
           <a:xfrm>
-            <a:off x="2819400" y="2841725"/>
+            <a:off x="3186326" y="2841725"/>
             <a:ext cx="731636" cy="283820"/>
           </a:xfrm>
           <a:prstGeom prst="rect">
@@ -5449,7 +5427,7 @@
           <a:p>
             <a:pPr algn="ctr"/>
             <a:r>
-              <a:rPr lang="en-SG" sz="1050" dirty="0" err="1" smtClean="0">
+              <a:rPr lang="en-SG" sz="1050" dirty="0" err="1">
                 <a:solidFill>
                   <a:schemeClr val="bg1"/>
                 </a:solidFill>
@@ -5472,7 +5450,7 @@
         </p:nvSpPr>
         <p:spPr>
           <a:xfrm>
-            <a:off x="2819400" y="3190882"/>
+            <a:off x="3186326" y="3190882"/>
             <a:ext cx="731636" cy="283820"/>
           </a:xfrm>
           <a:prstGeom prst="rect">
@@ -5514,7 +5492,7 @@
           <a:p>
             <a:pPr algn="ctr"/>
             <a:r>
-              <a:rPr lang="en-SG" sz="1050" dirty="0" err="1" smtClean="0">
+              <a:rPr lang="en-SG" sz="1050" dirty="0" err="1">
                 <a:solidFill>
                   <a:schemeClr val="bg1"/>
                 </a:solidFill>
@@ -5533,13 +5511,14 @@
         <p:nvCxnSpPr>
           <p:cNvPr id="100" name="Straight Arrow Connector 99"/>
           <p:cNvCxnSpPr>
+            <a:cxnSpLocks/>
             <a:endCxn id="60" idx="3"/>
           </p:cNvCxnSpPr>
           <p:nvPr/>
         </p:nvCxnSpPr>
         <p:spPr>
           <a:xfrm flipH="1">
-            <a:off x="3551036" y="2983635"/>
+            <a:off x="3917962" y="2983635"/>
             <a:ext cx="335164" cy="0"/>
           </a:xfrm>
           <a:prstGeom prst="straightConnector1">
@@ -5575,13 +5554,16 @@
       <p:cxnSp>
         <p:nvCxnSpPr>
           <p:cNvPr id="105" name="Straight Arrow Connector 104"/>
-          <p:cNvCxnSpPr/>
+          <p:cNvCxnSpPr>
+            <a:cxnSpLocks/>
+            <a:endCxn id="62" idx="3"/>
+          </p:cNvCxnSpPr>
           <p:nvPr/>
         </p:nvCxnSpPr>
         <p:spPr>
-          <a:xfrm flipH="1" flipV="1">
-            <a:off x="3558396" y="3297471"/>
-            <a:ext cx="327804" cy="5426"/>
+          <a:xfrm flipH="1">
+            <a:off x="3917962" y="3332439"/>
+            <a:ext cx="335164" cy="353"/>
           </a:xfrm>
           <a:prstGeom prst="straightConnector1">
             <a:avLst/>
@@ -5617,19 +5599,19 @@
         <p:nvCxnSpPr>
           <p:cNvPr id="13" name="Elbow Connector 12"/>
           <p:cNvCxnSpPr>
-            <a:stCxn id="60" idx="0"/>
+            <a:cxnSpLocks/>
+            <a:stCxn id="60" idx="1"/>
+            <a:endCxn id="58" idx="2"/>
           </p:cNvCxnSpPr>
           <p:nvPr/>
         </p:nvCxnSpPr>
         <p:spPr>
-          <a:xfrm rot="16200000" flipV="1">
-            <a:off x="3063575" y="2720082"/>
-            <a:ext cx="234481" cy="8806"/>
-          </a:xfrm>
-          <a:prstGeom prst="bentConnector3">
-            <a:avLst>
-              <a:gd name="adj1" fmla="val 50000"/>
-            </a:avLst>
+          <a:xfrm rot="10800000">
+            <a:off x="2601618" y="2629061"/>
+            <a:ext cx="584708" cy="354574"/>
+          </a:xfrm>
+          <a:prstGeom prst="bentConnector2">
+            <a:avLst/>
           </a:prstGeom>
           <a:ln w="19050">
             <a:solidFill>
@@ -5662,13 +5644,16 @@
       <p:cxnSp>
         <p:nvCxnSpPr>
           <p:cNvPr id="47" name="Straight Connector 46"/>
-          <p:cNvCxnSpPr/>
+          <p:cNvCxnSpPr>
+            <a:cxnSpLocks/>
+            <a:stCxn id="56" idx="3"/>
+          </p:cNvCxnSpPr>
           <p:nvPr/>
         </p:nvCxnSpPr>
         <p:spPr>
           <a:xfrm>
-            <a:off x="3539534" y="2078487"/>
-            <a:ext cx="346666" cy="0"/>
+            <a:off x="3925321" y="2036175"/>
+            <a:ext cx="327805" cy="107"/>
           </a:xfrm>
           <a:prstGeom prst="line">
             <a:avLst/>
@@ -5704,20 +5689,19 @@
         <p:nvCxnSpPr>
           <p:cNvPr id="50" name="Elbow Connector 49"/>
           <p:cNvCxnSpPr>
-            <a:stCxn id="56" idx="2"/>
+            <a:cxnSpLocks/>
+            <a:stCxn id="56" idx="1"/>
             <a:endCxn id="58" idx="0"/>
           </p:cNvCxnSpPr>
           <p:nvPr/>
         </p:nvCxnSpPr>
         <p:spPr>
-          <a:xfrm rot="5400000">
-            <a:off x="3089176" y="2338998"/>
-            <a:ext cx="180904" cy="6429"/>
-          </a:xfrm>
-          <a:prstGeom prst="bentConnector3">
-            <a:avLst>
-              <a:gd name="adj1" fmla="val 50000"/>
-            </a:avLst>
+          <a:xfrm rot="10800000" flipV="1">
+            <a:off x="2601618" y="2036175"/>
+            <a:ext cx="572596" cy="418306"/>
+          </a:xfrm>
+          <a:prstGeom prst="bentConnector2">
+            <a:avLst/>
           </a:prstGeom>
           <a:ln w="19050">
             <a:solidFill>
@@ -5755,9 +5739,9 @@
         </p:nvGrpSpPr>
         <p:grpSpPr>
           <a:xfrm rot="5400000">
-            <a:off x="4090826" y="3633626"/>
+            <a:off x="4346209" y="3538793"/>
             <a:ext cx="555486" cy="254462"/>
-            <a:chOff x="3798139" y="875689"/>
+            <a:chOff x="3703306" y="644022"/>
             <a:chExt cx="555486" cy="230832"/>
           </a:xfrm>
         </p:grpSpPr>
@@ -5769,7 +5753,7 @@
           </p:nvSpPr>
           <p:spPr>
             <a:xfrm rot="10800000">
-              <a:off x="3798139" y="875689"/>
+              <a:off x="3703306" y="644022"/>
               <a:ext cx="555486" cy="230832"/>
             </a:xfrm>
             <a:prstGeom prst="rect">
@@ -5784,7 +5768,7 @@
             <a:lstStyle/>
             <a:p>
               <a:r>
-                <a:rPr lang="en-US" sz="1100" dirty="0" smtClean="0">
+                <a:rPr lang="en-US" sz="1100" dirty="0">
                   <a:solidFill>
                     <a:schemeClr val="accent5">
                       <a:lumMod val="75000"/>
@@ -5811,7 +5795,7 @@
           </p:nvSpPr>
           <p:spPr>
             <a:xfrm rot="5400000" flipV="1">
-              <a:off x="3795127" y="973354"/>
+              <a:off x="3700294" y="741689"/>
               <a:ext cx="119885" cy="88141"/>
             </a:xfrm>
             <a:prstGeom prst="triangle">
@@ -6066,145 +6050,7 @@
         <p:spPr>
           <a:xfrm flipV="1">
             <a:off x="4114800" y="3150962"/>
-            <a:ext cx="549790" cy="797920"/>
-          </a:xfrm>
-          <a:prstGeom prst="bentConnector3">
-            <a:avLst>
-              <a:gd name="adj1" fmla="val 14720"/>
-            </a:avLst>
-          </a:prstGeom>
-          <a:ln w="19050">
-            <a:solidFill>
-              <a:schemeClr val="accent5">
-                <a:lumMod val="75000"/>
-              </a:schemeClr>
-            </a:solidFill>
-            <a:prstDash val="sysDot"/>
-            <a:headEnd type="none" w="med" len="med"/>
-            <a:tailEnd type="arrow" w="med" len="med"/>
-          </a:ln>
-          <a:effectLst/>
-        </p:spPr>
-        <p:style>
-          <a:lnRef idx="1">
-            <a:schemeClr val="accent2"/>
-          </a:lnRef>
-          <a:fillRef idx="2">
-            <a:schemeClr val="accent2"/>
-          </a:fillRef>
-          <a:effectRef idx="1">
-            <a:schemeClr val="accent2"/>
-          </a:effectRef>
-          <a:fontRef idx="minor">
-            <a:schemeClr val="dk1"/>
-          </a:fontRef>
-        </p:style>
-      </p:cxnSp>
-      <p:cxnSp>
-        <p:nvCxnSpPr>
-          <p:cNvPr id="113" name="Elbow Connector 63"/>
-          <p:cNvCxnSpPr>
-            <a:stCxn id="16" idx="3"/>
-            <a:endCxn id="44" idx="3"/>
-          </p:cNvCxnSpPr>
-          <p:nvPr/>
-        </p:nvCxnSpPr>
-        <p:spPr>
-          <a:xfrm flipV="1">
-            <a:off x="4114800" y="2728717"/>
-            <a:ext cx="549792" cy="1220165"/>
-          </a:xfrm>
-          <a:prstGeom prst="bentConnector3">
-            <a:avLst>
-              <a:gd name="adj1" fmla="val 14720"/>
-            </a:avLst>
-          </a:prstGeom>
-          <a:ln w="19050">
-            <a:solidFill>
-              <a:schemeClr val="accent5">
-                <a:lumMod val="75000"/>
-              </a:schemeClr>
-            </a:solidFill>
-            <a:prstDash val="sysDot"/>
-            <a:headEnd type="none" w="med" len="med"/>
-            <a:tailEnd type="arrow" w="med" len="med"/>
-          </a:ln>
-          <a:effectLst/>
-        </p:spPr>
-        <p:style>
-          <a:lnRef idx="1">
-            <a:schemeClr val="accent2"/>
-          </a:lnRef>
-          <a:fillRef idx="2">
-            <a:schemeClr val="accent2"/>
-          </a:fillRef>
-          <a:effectRef idx="1">
-            <a:schemeClr val="accent2"/>
-          </a:effectRef>
-          <a:fontRef idx="minor">
-            <a:schemeClr val="dk1"/>
-          </a:fontRef>
-        </p:style>
-      </p:cxnSp>
-      <p:cxnSp>
-        <p:nvCxnSpPr>
-          <p:cNvPr id="116" name="Elbow Connector 63"/>
-          <p:cNvCxnSpPr>
-            <a:stCxn id="16" idx="3"/>
-            <a:endCxn id="42" idx="3"/>
-          </p:cNvCxnSpPr>
-          <p:nvPr/>
-        </p:nvCxnSpPr>
-        <p:spPr>
-          <a:xfrm flipV="1">
-            <a:off x="4114800" y="2322317"/>
-            <a:ext cx="549792" cy="1626565"/>
-          </a:xfrm>
-          <a:prstGeom prst="bentConnector3">
-            <a:avLst>
-              <a:gd name="adj1" fmla="val 14721"/>
-            </a:avLst>
-          </a:prstGeom>
-          <a:ln w="19050">
-            <a:solidFill>
-              <a:schemeClr val="accent5">
-                <a:lumMod val="75000"/>
-              </a:schemeClr>
-            </a:solidFill>
-            <a:prstDash val="sysDot"/>
-            <a:headEnd type="none" w="med" len="med"/>
-            <a:tailEnd type="arrow" w="med" len="med"/>
-          </a:ln>
-          <a:effectLst/>
-        </p:spPr>
-        <p:style>
-          <a:lnRef idx="1">
-            <a:schemeClr val="accent2"/>
-          </a:lnRef>
-          <a:fillRef idx="2">
-            <a:schemeClr val="accent2"/>
-          </a:fillRef>
-          <a:effectRef idx="1">
-            <a:schemeClr val="accent2"/>
-          </a:effectRef>
-          <a:fontRef idx="minor">
-            <a:schemeClr val="dk1"/>
-          </a:fontRef>
-        </p:style>
-      </p:cxnSp>
-      <p:cxnSp>
-        <p:nvCxnSpPr>
-          <p:cNvPr id="120" name="Elbow Connector 63"/>
-          <p:cNvCxnSpPr>
-            <a:stCxn id="44" idx="1"/>
-            <a:endCxn id="10" idx="3"/>
-          </p:cNvCxnSpPr>
-          <p:nvPr/>
-        </p:nvCxnSpPr>
-        <p:spPr>
-          <a:xfrm flipV="1">
-            <a:off x="5758227" y="2728300"/>
-            <a:ext cx="768138" cy="417"/>
+            <a:ext cx="716492" cy="797920"/>
           </a:xfrm>
           <a:prstGeom prst="bentConnector3">
             <a:avLst>
@@ -6240,17 +6086,17 @@
       </p:cxnSp>
       <p:cxnSp>
         <p:nvCxnSpPr>
-          <p:cNvPr id="122" name="Elbow Connector 63"/>
+          <p:cNvPr id="113" name="Elbow Connector 63"/>
           <p:cNvCxnSpPr>
-            <a:stCxn id="42" idx="1"/>
-            <a:endCxn id="4" idx="3"/>
+            <a:stCxn id="16" idx="3"/>
+            <a:endCxn id="44" idx="3"/>
           </p:cNvCxnSpPr>
           <p:nvPr/>
         </p:nvCxnSpPr>
         <p:spPr>
-          <a:xfrm>
-            <a:off x="5758227" y="2322317"/>
-            <a:ext cx="762000" cy="230"/>
+          <a:xfrm flipV="1">
+            <a:off x="4114800" y="2728717"/>
+            <a:ext cx="716494" cy="1220165"/>
           </a:xfrm>
           <a:prstGeom prst="bentConnector3">
             <a:avLst>
@@ -6286,14 +6132,156 @@
       </p:cxnSp>
       <p:cxnSp>
         <p:nvCxnSpPr>
-          <p:cNvPr id="64" name="Straight Connector 63"/>
-          <p:cNvCxnSpPr/>
+          <p:cNvPr id="116" name="Elbow Connector 63"/>
+          <p:cNvCxnSpPr>
+            <a:stCxn id="16" idx="3"/>
+            <a:endCxn id="42" idx="3"/>
+          </p:cNvCxnSpPr>
           <p:nvPr/>
         </p:nvCxnSpPr>
         <p:spPr>
+          <a:xfrm flipV="1">
+            <a:off x="4114800" y="2322317"/>
+            <a:ext cx="716494" cy="1626565"/>
+          </a:xfrm>
+          <a:prstGeom prst="bentConnector3">
+            <a:avLst>
+              <a:gd name="adj1" fmla="val 50000"/>
+            </a:avLst>
+          </a:prstGeom>
+          <a:ln w="19050">
+            <a:solidFill>
+              <a:schemeClr val="accent5">
+                <a:lumMod val="75000"/>
+              </a:schemeClr>
+            </a:solidFill>
+            <a:prstDash val="sysDot"/>
+            <a:headEnd type="none" w="med" len="med"/>
+            <a:tailEnd type="arrow" w="med" len="med"/>
+          </a:ln>
+          <a:effectLst/>
+        </p:spPr>
+        <p:style>
+          <a:lnRef idx="1">
+            <a:schemeClr val="accent2"/>
+          </a:lnRef>
+          <a:fillRef idx="2">
+            <a:schemeClr val="accent2"/>
+          </a:fillRef>
+          <a:effectRef idx="1">
+            <a:schemeClr val="accent2"/>
+          </a:effectRef>
+          <a:fontRef idx="minor">
+            <a:schemeClr val="dk1"/>
+          </a:fontRef>
+        </p:style>
+      </p:cxnSp>
+      <p:cxnSp>
+        <p:nvCxnSpPr>
+          <p:cNvPr id="120" name="Elbow Connector 63"/>
+          <p:cNvCxnSpPr>
+            <a:cxnSpLocks/>
+            <a:stCxn id="44" idx="1"/>
+            <a:endCxn id="10" idx="3"/>
+          </p:cNvCxnSpPr>
+          <p:nvPr/>
+        </p:nvCxnSpPr>
+        <p:spPr>
+          <a:xfrm flipV="1">
+            <a:off x="5924929" y="2728300"/>
+            <a:ext cx="601436" cy="417"/>
+          </a:xfrm>
+          <a:prstGeom prst="bentConnector3">
+            <a:avLst>
+              <a:gd name="adj1" fmla="val 50000"/>
+            </a:avLst>
+          </a:prstGeom>
+          <a:ln w="19050">
+            <a:solidFill>
+              <a:schemeClr val="accent5">
+                <a:lumMod val="75000"/>
+              </a:schemeClr>
+            </a:solidFill>
+            <a:prstDash val="sysDot"/>
+            <a:headEnd type="none" w="med" len="med"/>
+            <a:tailEnd type="arrow" w="med" len="med"/>
+          </a:ln>
+          <a:effectLst/>
+        </p:spPr>
+        <p:style>
+          <a:lnRef idx="1">
+            <a:schemeClr val="accent2"/>
+          </a:lnRef>
+          <a:fillRef idx="2">
+            <a:schemeClr val="accent2"/>
+          </a:fillRef>
+          <a:effectRef idx="1">
+            <a:schemeClr val="accent2"/>
+          </a:effectRef>
+          <a:fontRef idx="minor">
+            <a:schemeClr val="dk1"/>
+          </a:fontRef>
+        </p:style>
+      </p:cxnSp>
+      <p:cxnSp>
+        <p:nvCxnSpPr>
+          <p:cNvPr id="122" name="Elbow Connector 63"/>
+          <p:cNvCxnSpPr>
+            <a:cxnSpLocks/>
+            <a:stCxn id="42" idx="1"/>
+            <a:endCxn id="4" idx="3"/>
+          </p:cNvCxnSpPr>
+          <p:nvPr/>
+        </p:nvCxnSpPr>
+        <p:spPr>
           <a:xfrm>
-            <a:off x="3886200" y="2078487"/>
-            <a:ext cx="0" cy="1218984"/>
+            <a:off x="5924929" y="2322317"/>
+            <a:ext cx="595298" cy="230"/>
+          </a:xfrm>
+          <a:prstGeom prst="bentConnector3">
+            <a:avLst>
+              <a:gd name="adj1" fmla="val 50000"/>
+            </a:avLst>
+          </a:prstGeom>
+          <a:ln w="19050">
+            <a:solidFill>
+              <a:schemeClr val="accent5">
+                <a:lumMod val="75000"/>
+              </a:schemeClr>
+            </a:solidFill>
+            <a:prstDash val="sysDot"/>
+            <a:headEnd type="none" w="med" len="med"/>
+            <a:tailEnd type="arrow" w="med" len="med"/>
+          </a:ln>
+          <a:effectLst/>
+        </p:spPr>
+        <p:style>
+          <a:lnRef idx="1">
+            <a:schemeClr val="accent2"/>
+          </a:lnRef>
+          <a:fillRef idx="2">
+            <a:schemeClr val="accent2"/>
+          </a:fillRef>
+          <a:effectRef idx="1">
+            <a:schemeClr val="accent2"/>
+          </a:effectRef>
+          <a:fontRef idx="minor">
+            <a:schemeClr val="dk1"/>
+          </a:fontRef>
+        </p:style>
+      </p:cxnSp>
+      <p:cxnSp>
+        <p:nvCxnSpPr>
+          <p:cNvPr id="64" name="Straight Connector 63"/>
+          <p:cNvCxnSpPr>
+            <a:cxnSpLocks/>
+          </p:cNvCxnSpPr>
+          <p:nvPr/>
+        </p:nvCxnSpPr>
+        <p:spPr>
+          <a:xfrm>
+            <a:off x="4248488" y="2033984"/>
+            <a:ext cx="0" cy="1304815"/>
           </a:xfrm>
           <a:prstGeom prst="line">
             <a:avLst/>
@@ -6328,13 +6316,15 @@
       <p:cxnSp>
         <p:nvCxnSpPr>
           <p:cNvPr id="66" name="Straight Connector 65"/>
-          <p:cNvCxnSpPr/>
+          <p:cNvCxnSpPr>
+            <a:cxnSpLocks/>
+          </p:cNvCxnSpPr>
           <p:nvPr/>
         </p:nvCxnSpPr>
         <p:spPr>
           <a:xfrm>
-            <a:off x="3894672" y="2209800"/>
-            <a:ext cx="769918" cy="0"/>
+            <a:off x="4248488" y="2209800"/>
+            <a:ext cx="582002" cy="0"/>
           </a:xfrm>
           <a:prstGeom prst="line">
             <a:avLst/>
@@ -6369,13 +6359,15 @@
       <p:cxnSp>
         <p:nvCxnSpPr>
           <p:cNvPr id="73" name="Straight Connector 72"/>
-          <p:cNvCxnSpPr/>
+          <p:cNvCxnSpPr>
+            <a:cxnSpLocks/>
+          </p:cNvCxnSpPr>
           <p:nvPr/>
         </p:nvCxnSpPr>
         <p:spPr>
-          <a:xfrm>
-            <a:off x="3886200" y="2607244"/>
-            <a:ext cx="769918" cy="0"/>
+          <a:xfrm flipV="1">
+            <a:off x="4255042" y="2607245"/>
+            <a:ext cx="566976" cy="5974"/>
           </a:xfrm>
           <a:prstGeom prst="line">
             <a:avLst/>
@@ -6410,13 +6402,15 @@
       <p:cxnSp>
         <p:nvCxnSpPr>
           <p:cNvPr id="74" name="Straight Connector 73"/>
-          <p:cNvCxnSpPr/>
+          <p:cNvCxnSpPr>
+            <a:cxnSpLocks/>
+          </p:cNvCxnSpPr>
           <p:nvPr/>
         </p:nvCxnSpPr>
         <p:spPr>
           <a:xfrm>
-            <a:off x="3886200" y="3048000"/>
-            <a:ext cx="769918" cy="0"/>
+            <a:off x="4248487" y="3048000"/>
+            <a:ext cx="573531" cy="0"/>
           </a:xfrm>
           <a:prstGeom prst="line">
             <a:avLst/>
@@ -6429,6 +6423,221 @@
             </a:solidFill>
             <a:prstDash val="sysDot"/>
             <a:headEnd type="none" w="med" len="med"/>
+            <a:tailEnd type="none" w="med" len="med"/>
+          </a:ln>
+          <a:effectLst/>
+        </p:spPr>
+        <p:style>
+          <a:lnRef idx="1">
+            <a:schemeClr val="accent2"/>
+          </a:lnRef>
+          <a:fillRef idx="2">
+            <a:schemeClr val="accent2"/>
+          </a:fillRef>
+          <a:effectRef idx="1">
+            <a:schemeClr val="accent2"/>
+          </a:effectRef>
+          <a:fontRef idx="minor">
+            <a:schemeClr val="dk1"/>
+          </a:fontRef>
+        </p:style>
+      </p:cxnSp>
+      <p:sp>
+        <p:nvSpPr>
+          <p:cNvPr id="109" name="Rectangle 62"/>
+          <p:cNvSpPr/>
+          <p:nvPr/>
+        </p:nvSpPr>
+        <p:spPr>
+          <a:xfrm>
+            <a:off x="3174214" y="2370131"/>
+            <a:ext cx="750156" cy="340758"/>
+          </a:xfrm>
+          <a:prstGeom prst="rect">
+            <a:avLst/>
+          </a:prstGeom>
+          <a:solidFill>
+            <a:schemeClr val="accent5">
+              <a:lumMod val="60000"/>
+              <a:lumOff val="40000"/>
+            </a:schemeClr>
+          </a:solidFill>
+          <a:ln w="19050">
+            <a:solidFill>
+              <a:schemeClr val="accent5">
+                <a:lumMod val="60000"/>
+                <a:lumOff val="40000"/>
+              </a:schemeClr>
+            </a:solidFill>
+          </a:ln>
+          <a:effectLst/>
+        </p:spPr>
+        <p:style>
+          <a:lnRef idx="1">
+            <a:schemeClr val="accent2"/>
+          </a:lnRef>
+          <a:fillRef idx="2">
+            <a:schemeClr val="accent2"/>
+          </a:fillRef>
+          <a:effectRef idx="1">
+            <a:schemeClr val="accent2"/>
+          </a:effectRef>
+          <a:fontRef idx="minor">
+            <a:schemeClr val="dk1"/>
+          </a:fontRef>
+        </p:style>
+        <p:txBody>
+          <a:bodyPr rtlCol="0" anchor="ctr"/>
+          <a:lstStyle/>
+          <a:p>
+            <a:pPr algn="ctr"/>
+            <a:r>
+              <a:rPr lang="en-SG" sz="1050" dirty="0">
+                <a:solidFill>
+                  <a:schemeClr val="bg1"/>
+                </a:solidFill>
+              </a:rPr>
+              <a:t>Argument</a:t>
+            </a:r>
+            <a:br>
+              <a:rPr lang="en-SG" sz="1050" dirty="0">
+                <a:solidFill>
+                  <a:schemeClr val="bg1"/>
+                </a:solidFill>
+              </a:rPr>
+            </a:br>
+            <a:r>
+              <a:rPr lang="en-SG" sz="1050" dirty="0">
+                <a:solidFill>
+                  <a:schemeClr val="bg1"/>
+                </a:solidFill>
+              </a:rPr>
+              <a:t>Map</a:t>
+            </a:r>
+          </a:p>
+        </p:txBody>
+      </p:sp>
+      <p:cxnSp>
+        <p:nvCxnSpPr>
+          <p:cNvPr id="112" name="Elbow Connector 12"/>
+          <p:cNvCxnSpPr>
+            <a:cxnSpLocks/>
+            <a:stCxn id="109" idx="1"/>
+            <a:endCxn id="58" idx="3"/>
+          </p:cNvCxnSpPr>
+          <p:nvPr/>
+        </p:nvCxnSpPr>
+        <p:spPr>
+          <a:xfrm rot="10800000" flipV="1">
+            <a:off x="2964740" y="2540509"/>
+            <a:ext cx="209475" cy="1261"/>
+          </a:xfrm>
+          <a:prstGeom prst="bentConnector3">
+            <a:avLst>
+              <a:gd name="adj1" fmla="val 50000"/>
+            </a:avLst>
+          </a:prstGeom>
+          <a:ln w="19050">
+            <a:solidFill>
+              <a:schemeClr val="accent5">
+                <a:lumMod val="60000"/>
+                <a:lumOff val="40000"/>
+              </a:schemeClr>
+            </a:solidFill>
+            <a:prstDash val="sysDot"/>
+            <a:headEnd type="none" w="med" len="med"/>
+            <a:tailEnd type="arrow" w="med" len="med"/>
+          </a:ln>
+          <a:effectLst/>
+        </p:spPr>
+        <p:style>
+          <a:lnRef idx="1">
+            <a:schemeClr val="accent2"/>
+          </a:lnRef>
+          <a:fillRef idx="2">
+            <a:schemeClr val="accent2"/>
+          </a:fillRef>
+          <a:effectRef idx="1">
+            <a:schemeClr val="accent2"/>
+          </a:effectRef>
+          <a:fontRef idx="minor">
+            <a:schemeClr val="dk1"/>
+          </a:fontRef>
+        </p:style>
+      </p:cxnSp>
+      <p:cxnSp>
+        <p:nvCxnSpPr>
+          <p:cNvPr id="118" name="Elbow Connector 49"/>
+          <p:cNvCxnSpPr>
+            <a:cxnSpLocks/>
+            <a:stCxn id="56" idx="2"/>
+            <a:endCxn id="109" idx="0"/>
+          </p:cNvCxnSpPr>
+          <p:nvPr/>
+        </p:nvCxnSpPr>
+        <p:spPr>
+          <a:xfrm rot="5400000">
+            <a:off x="3469242" y="2289605"/>
+            <a:ext cx="160576" cy="476"/>
+          </a:xfrm>
+          <a:prstGeom prst="bentConnector3">
+            <a:avLst>
+              <a:gd name="adj1" fmla="val 50000"/>
+            </a:avLst>
+          </a:prstGeom>
+          <a:ln w="19050">
+            <a:solidFill>
+              <a:schemeClr val="accent5">
+                <a:lumMod val="60000"/>
+                <a:lumOff val="40000"/>
+              </a:schemeClr>
+            </a:solidFill>
+            <a:prstDash val="sysDot"/>
+            <a:headEnd type="none" w="med" len="med"/>
+            <a:tailEnd type="arrow" w="med" len="med"/>
+          </a:ln>
+          <a:effectLst/>
+        </p:spPr>
+        <p:style>
+          <a:lnRef idx="1">
+            <a:schemeClr val="accent2"/>
+          </a:lnRef>
+          <a:fillRef idx="2">
+            <a:schemeClr val="accent2"/>
+          </a:fillRef>
+          <a:effectRef idx="1">
+            <a:schemeClr val="accent2"/>
+          </a:effectRef>
+          <a:fontRef idx="minor">
+            <a:schemeClr val="dk1"/>
+          </a:fontRef>
+        </p:style>
+      </p:cxnSp>
+      <p:cxnSp>
+        <p:nvCxnSpPr>
+          <p:cNvPr id="123" name="Straight Connector 122"/>
+          <p:cNvCxnSpPr>
+            <a:cxnSpLocks/>
+            <a:stCxn id="109" idx="3"/>
+          </p:cNvCxnSpPr>
+          <p:nvPr/>
+        </p:nvCxnSpPr>
+        <p:spPr>
+          <a:xfrm flipV="1">
+            <a:off x="3924370" y="2535795"/>
+            <a:ext cx="322202" cy="4715"/>
+          </a:xfrm>
+          <a:prstGeom prst="line">
+            <a:avLst/>
+          </a:prstGeom>
+          <a:ln w="19050">
+            <a:solidFill>
+              <a:schemeClr val="accent5">
+                <a:lumMod val="50000"/>
+              </a:schemeClr>
+            </a:solidFill>
+            <a:prstDash val="sysDot"/>
+            <a:headEnd type="arrow" w="med" len="med"/>
             <a:tailEnd type="none" w="med" len="med"/>
           </a:ln>
           <a:effectLst/>

</xml_diff>

<commit_message>
Update Logic class diagram with Arguments class
The Logic class diagram in the developer guide does not reflect the
updated dependencies between ArgumentTokenizer, Arguments, Prefix, and
command parser classes.

Let's update the Logic class diagram.
</commit_message>
<xml_diff>
--- a/docs/diagrams/LogicComponentClassDiagram.pptx
+++ b/docs/diagrams/LogicComponentClassDiagram.pptx
@@ -208,7 +208,7 @@
           <a:p>
             <a:fld id="{F5CC4B3F-88C1-4FFA-B1B6-F41C21DC6924}" type="datetimeFigureOut">
               <a:rPr lang="en-US" smtClean="0"/>
-              <a:t>2/2/2017</a:t>
+              <a:t>3/14/2017</a:t>
             </a:fld>
             <a:endParaRPr lang="en-US"/>
           </a:p>
@@ -272,38 +272,37 @@
           <a:p>
             <a:pPr lvl="0"/>
             <a:r>
-              <a:rPr lang="en-US" smtClean="0"/>
+              <a:rPr lang="en-US"/>
               <a:t>Click to edit Master text styles</a:t>
             </a:r>
           </a:p>
           <a:p>
             <a:pPr lvl="1"/>
             <a:r>
-              <a:rPr lang="en-US" smtClean="0"/>
+              <a:rPr lang="en-US"/>
               <a:t>Second level</a:t>
             </a:r>
           </a:p>
           <a:p>
             <a:pPr lvl="2"/>
             <a:r>
-              <a:rPr lang="en-US" smtClean="0"/>
+              <a:rPr lang="en-US"/>
               <a:t>Third level</a:t>
             </a:r>
           </a:p>
           <a:p>
             <a:pPr lvl="3"/>
             <a:r>
-              <a:rPr lang="en-US" smtClean="0"/>
+              <a:rPr lang="en-US"/>
               <a:t>Fourth level</a:t>
             </a:r>
           </a:p>
           <a:p>
             <a:pPr lvl="4"/>
             <a:r>
-              <a:rPr lang="en-US" smtClean="0"/>
+              <a:rPr lang="en-US"/>
               <a:t>Fifth level</a:t>
             </a:r>
-            <a:endParaRPr lang="en-US"/>
           </a:p>
         </p:txBody>
       </p:sp>
@@ -514,10 +513,9 @@
           <a:lstStyle/>
           <a:p>
             <a:r>
-              <a:rPr lang="en-US" smtClean="0"/>
+              <a:rPr lang="en-US"/>
               <a:t>Click to edit Master title style</a:t>
             </a:r>
-            <a:endParaRPr lang="en-US"/>
           </a:p>
         </p:txBody>
       </p:sp>
@@ -633,10 +631,9 @@
           </a:lstStyle>
           <a:p>
             <a:r>
-              <a:rPr lang="en-US" smtClean="0"/>
+              <a:rPr lang="en-US"/>
               <a:t>Click to edit Master subtitle style</a:t>
             </a:r>
-            <a:endParaRPr lang="en-US"/>
           </a:p>
         </p:txBody>
       </p:sp>
@@ -657,7 +654,7 @@
           <a:p>
             <a:fld id="{78C97017-6FC3-485B-9764-EAC9E56C1D49}" type="datetimeFigureOut">
               <a:rPr lang="en-US" smtClean="0"/>
-              <a:t>2/2/2017</a:t>
+              <a:t>3/14/2017</a:t>
             </a:fld>
             <a:endParaRPr lang="en-US"/>
           </a:p>
@@ -751,10 +748,9 @@
           <a:lstStyle/>
           <a:p>
             <a:r>
-              <a:rPr lang="en-US" smtClean="0"/>
+              <a:rPr lang="en-US"/>
               <a:t>Click to edit Master title style</a:t>
             </a:r>
-            <a:endParaRPr lang="en-US"/>
           </a:p>
         </p:txBody>
       </p:sp>
@@ -775,38 +771,37 @@
           <a:p>
             <a:pPr lvl="0"/>
             <a:r>
-              <a:rPr lang="en-US" smtClean="0"/>
+              <a:rPr lang="en-US"/>
               <a:t>Click to edit Master text styles</a:t>
             </a:r>
           </a:p>
           <a:p>
             <a:pPr lvl="1"/>
             <a:r>
-              <a:rPr lang="en-US" smtClean="0"/>
+              <a:rPr lang="en-US"/>
               <a:t>Second level</a:t>
             </a:r>
           </a:p>
           <a:p>
             <a:pPr lvl="2"/>
             <a:r>
-              <a:rPr lang="en-US" smtClean="0"/>
+              <a:rPr lang="en-US"/>
               <a:t>Third level</a:t>
             </a:r>
           </a:p>
           <a:p>
             <a:pPr lvl="3"/>
             <a:r>
-              <a:rPr lang="en-US" smtClean="0"/>
+              <a:rPr lang="en-US"/>
               <a:t>Fourth level</a:t>
             </a:r>
           </a:p>
           <a:p>
             <a:pPr lvl="4"/>
             <a:r>
-              <a:rPr lang="en-US" smtClean="0"/>
+              <a:rPr lang="en-US"/>
               <a:t>Fifth level</a:t>
             </a:r>
-            <a:endParaRPr lang="en-US"/>
           </a:p>
         </p:txBody>
       </p:sp>
@@ -827,7 +822,7 @@
           <a:p>
             <a:fld id="{78C97017-6FC3-485B-9764-EAC9E56C1D49}" type="datetimeFigureOut">
               <a:rPr lang="en-US" smtClean="0"/>
-              <a:t>2/2/2017</a:t>
+              <a:t>3/14/2017</a:t>
             </a:fld>
             <a:endParaRPr lang="en-US"/>
           </a:p>
@@ -926,10 +921,9 @@
           <a:lstStyle/>
           <a:p>
             <a:r>
-              <a:rPr lang="en-US" smtClean="0"/>
+              <a:rPr lang="en-US"/>
               <a:t>Click to edit Master title style</a:t>
             </a:r>
-            <a:endParaRPr lang="en-US"/>
           </a:p>
         </p:txBody>
       </p:sp>
@@ -955,38 +949,37 @@
           <a:p>
             <a:pPr lvl="0"/>
             <a:r>
-              <a:rPr lang="en-US" smtClean="0"/>
+              <a:rPr lang="en-US"/>
               <a:t>Click to edit Master text styles</a:t>
             </a:r>
           </a:p>
           <a:p>
             <a:pPr lvl="1"/>
             <a:r>
-              <a:rPr lang="en-US" smtClean="0"/>
+              <a:rPr lang="en-US"/>
               <a:t>Second level</a:t>
             </a:r>
           </a:p>
           <a:p>
             <a:pPr lvl="2"/>
             <a:r>
-              <a:rPr lang="en-US" smtClean="0"/>
+              <a:rPr lang="en-US"/>
               <a:t>Third level</a:t>
             </a:r>
           </a:p>
           <a:p>
             <a:pPr lvl="3"/>
             <a:r>
-              <a:rPr lang="en-US" smtClean="0"/>
+              <a:rPr lang="en-US"/>
               <a:t>Fourth level</a:t>
             </a:r>
           </a:p>
           <a:p>
             <a:pPr lvl="4"/>
             <a:r>
-              <a:rPr lang="en-US" smtClean="0"/>
+              <a:rPr lang="en-US"/>
               <a:t>Fifth level</a:t>
             </a:r>
-            <a:endParaRPr lang="en-US"/>
           </a:p>
         </p:txBody>
       </p:sp>
@@ -1007,7 +1000,7 @@
           <a:p>
             <a:fld id="{78C97017-6FC3-485B-9764-EAC9E56C1D49}" type="datetimeFigureOut">
               <a:rPr lang="en-US" smtClean="0"/>
-              <a:t>2/2/2017</a:t>
+              <a:t>3/14/2017</a:t>
             </a:fld>
             <a:endParaRPr lang="en-US"/>
           </a:p>
@@ -1101,10 +1094,9 @@
           <a:lstStyle/>
           <a:p>
             <a:r>
-              <a:rPr lang="en-US" smtClean="0"/>
+              <a:rPr lang="en-US"/>
               <a:t>Click to edit Master title style</a:t>
             </a:r>
-            <a:endParaRPr lang="en-US"/>
           </a:p>
         </p:txBody>
       </p:sp>
@@ -1125,38 +1117,37 @@
           <a:p>
             <a:pPr lvl="0"/>
             <a:r>
-              <a:rPr lang="en-US" smtClean="0"/>
+              <a:rPr lang="en-US"/>
               <a:t>Click to edit Master text styles</a:t>
             </a:r>
           </a:p>
           <a:p>
             <a:pPr lvl="1"/>
             <a:r>
-              <a:rPr lang="en-US" smtClean="0"/>
+              <a:rPr lang="en-US"/>
               <a:t>Second level</a:t>
             </a:r>
           </a:p>
           <a:p>
             <a:pPr lvl="2"/>
             <a:r>
-              <a:rPr lang="en-US" smtClean="0"/>
+              <a:rPr lang="en-US"/>
               <a:t>Third level</a:t>
             </a:r>
           </a:p>
           <a:p>
             <a:pPr lvl="3"/>
             <a:r>
-              <a:rPr lang="en-US" smtClean="0"/>
+              <a:rPr lang="en-US"/>
               <a:t>Fourth level</a:t>
             </a:r>
           </a:p>
           <a:p>
             <a:pPr lvl="4"/>
             <a:r>
-              <a:rPr lang="en-US" smtClean="0"/>
+              <a:rPr lang="en-US"/>
               <a:t>Fifth level</a:t>
             </a:r>
-            <a:endParaRPr lang="en-US"/>
           </a:p>
         </p:txBody>
       </p:sp>
@@ -1177,7 +1168,7 @@
           <a:p>
             <a:fld id="{78C97017-6FC3-485B-9764-EAC9E56C1D49}" type="datetimeFigureOut">
               <a:rPr lang="en-US" smtClean="0"/>
-              <a:t>2/2/2017</a:t>
+              <a:t>3/14/2017</a:t>
             </a:fld>
             <a:endParaRPr lang="en-US"/>
           </a:p>
@@ -1280,10 +1271,9 @@
           </a:lstStyle>
           <a:p>
             <a:r>
-              <a:rPr lang="en-US" smtClean="0"/>
+              <a:rPr lang="en-US"/>
               <a:t>Click to edit Master title style</a:t>
             </a:r>
-            <a:endParaRPr lang="en-US"/>
           </a:p>
         </p:txBody>
       </p:sp>
@@ -1400,7 +1390,7 @@
           <a:p>
             <a:pPr lvl="0"/>
             <a:r>
-              <a:rPr lang="en-US" smtClean="0"/>
+              <a:rPr lang="en-US"/>
               <a:t>Click to edit Master text styles</a:t>
             </a:r>
           </a:p>
@@ -1423,7 +1413,7 @@
           <a:p>
             <a:fld id="{78C97017-6FC3-485B-9764-EAC9E56C1D49}" type="datetimeFigureOut">
               <a:rPr lang="en-US" smtClean="0"/>
-              <a:t>2/2/2017</a:t>
+              <a:t>3/14/2017</a:t>
             </a:fld>
             <a:endParaRPr lang="en-US"/>
           </a:p>
@@ -1517,10 +1507,9 @@
           <a:lstStyle/>
           <a:p>
             <a:r>
-              <a:rPr lang="en-US" smtClean="0"/>
+              <a:rPr lang="en-US"/>
               <a:t>Click to edit Master title style</a:t>
             </a:r>
-            <a:endParaRPr lang="en-US"/>
           </a:p>
         </p:txBody>
       </p:sp>
@@ -1574,38 +1563,37 @@
           <a:p>
             <a:pPr lvl="0"/>
             <a:r>
-              <a:rPr lang="en-US" smtClean="0"/>
+              <a:rPr lang="en-US"/>
               <a:t>Click to edit Master text styles</a:t>
             </a:r>
           </a:p>
           <a:p>
             <a:pPr lvl="1"/>
             <a:r>
-              <a:rPr lang="en-US" smtClean="0"/>
+              <a:rPr lang="en-US"/>
               <a:t>Second level</a:t>
             </a:r>
           </a:p>
           <a:p>
             <a:pPr lvl="2"/>
             <a:r>
-              <a:rPr lang="en-US" smtClean="0"/>
+              <a:rPr lang="en-US"/>
               <a:t>Third level</a:t>
             </a:r>
           </a:p>
           <a:p>
             <a:pPr lvl="3"/>
             <a:r>
-              <a:rPr lang="en-US" smtClean="0"/>
+              <a:rPr lang="en-US"/>
               <a:t>Fourth level</a:t>
             </a:r>
           </a:p>
           <a:p>
             <a:pPr lvl="4"/>
             <a:r>
-              <a:rPr lang="en-US" smtClean="0"/>
+              <a:rPr lang="en-US"/>
               <a:t>Fifth level</a:t>
             </a:r>
-            <a:endParaRPr lang="en-US"/>
           </a:p>
         </p:txBody>
       </p:sp>
@@ -1659,38 +1647,37 @@
           <a:p>
             <a:pPr lvl="0"/>
             <a:r>
-              <a:rPr lang="en-US" smtClean="0"/>
+              <a:rPr lang="en-US"/>
               <a:t>Click to edit Master text styles</a:t>
             </a:r>
           </a:p>
           <a:p>
             <a:pPr lvl="1"/>
             <a:r>
-              <a:rPr lang="en-US" smtClean="0"/>
+              <a:rPr lang="en-US"/>
               <a:t>Second level</a:t>
             </a:r>
           </a:p>
           <a:p>
             <a:pPr lvl="2"/>
             <a:r>
-              <a:rPr lang="en-US" smtClean="0"/>
+              <a:rPr lang="en-US"/>
               <a:t>Third level</a:t>
             </a:r>
           </a:p>
           <a:p>
             <a:pPr lvl="3"/>
             <a:r>
-              <a:rPr lang="en-US" smtClean="0"/>
+              <a:rPr lang="en-US"/>
               <a:t>Fourth level</a:t>
             </a:r>
           </a:p>
           <a:p>
             <a:pPr lvl="4"/>
             <a:r>
-              <a:rPr lang="en-US" smtClean="0"/>
+              <a:rPr lang="en-US"/>
               <a:t>Fifth level</a:t>
             </a:r>
-            <a:endParaRPr lang="en-US"/>
           </a:p>
         </p:txBody>
       </p:sp>
@@ -1711,7 +1698,7 @@
           <a:p>
             <a:fld id="{78C97017-6FC3-485B-9764-EAC9E56C1D49}" type="datetimeFigureOut">
               <a:rPr lang="en-US" smtClean="0"/>
-              <a:t>2/2/2017</a:t>
+              <a:t>3/14/2017</a:t>
             </a:fld>
             <a:endParaRPr lang="en-US"/>
           </a:p>
@@ -1809,10 +1796,9 @@
           </a:lstStyle>
           <a:p>
             <a:r>
-              <a:rPr lang="en-US" smtClean="0"/>
+              <a:rPr lang="en-US"/>
               <a:t>Click to edit Master title style</a:t>
             </a:r>
-            <a:endParaRPr lang="en-US"/>
           </a:p>
         </p:txBody>
       </p:sp>
@@ -1875,7 +1861,7 @@
           <a:p>
             <a:pPr lvl="0"/>
             <a:r>
-              <a:rPr lang="en-US" smtClean="0"/>
+              <a:rPr lang="en-US"/>
               <a:t>Click to edit Master text styles</a:t>
             </a:r>
           </a:p>
@@ -1931,38 +1917,37 @@
           <a:p>
             <a:pPr lvl="0"/>
             <a:r>
-              <a:rPr lang="en-US" smtClean="0"/>
+              <a:rPr lang="en-US"/>
               <a:t>Click to edit Master text styles</a:t>
             </a:r>
           </a:p>
           <a:p>
             <a:pPr lvl="1"/>
             <a:r>
-              <a:rPr lang="en-US" smtClean="0"/>
+              <a:rPr lang="en-US"/>
               <a:t>Second level</a:t>
             </a:r>
           </a:p>
           <a:p>
             <a:pPr lvl="2"/>
             <a:r>
-              <a:rPr lang="en-US" smtClean="0"/>
+              <a:rPr lang="en-US"/>
               <a:t>Third level</a:t>
             </a:r>
           </a:p>
           <a:p>
             <a:pPr lvl="3"/>
             <a:r>
-              <a:rPr lang="en-US" smtClean="0"/>
+              <a:rPr lang="en-US"/>
               <a:t>Fourth level</a:t>
             </a:r>
           </a:p>
           <a:p>
             <a:pPr lvl="4"/>
             <a:r>
-              <a:rPr lang="en-US" smtClean="0"/>
+              <a:rPr lang="en-US"/>
               <a:t>Fifth level</a:t>
             </a:r>
-            <a:endParaRPr lang="en-US"/>
           </a:p>
         </p:txBody>
       </p:sp>
@@ -2025,7 +2010,7 @@
           <a:p>
             <a:pPr lvl="0"/>
             <a:r>
-              <a:rPr lang="en-US" smtClean="0"/>
+              <a:rPr lang="en-US"/>
               <a:t>Click to edit Master text styles</a:t>
             </a:r>
           </a:p>
@@ -2081,38 +2066,37 @@
           <a:p>
             <a:pPr lvl="0"/>
             <a:r>
-              <a:rPr lang="en-US" smtClean="0"/>
+              <a:rPr lang="en-US"/>
               <a:t>Click to edit Master text styles</a:t>
             </a:r>
           </a:p>
           <a:p>
             <a:pPr lvl="1"/>
             <a:r>
-              <a:rPr lang="en-US" smtClean="0"/>
+              <a:rPr lang="en-US"/>
               <a:t>Second level</a:t>
             </a:r>
           </a:p>
           <a:p>
             <a:pPr lvl="2"/>
             <a:r>
-              <a:rPr lang="en-US" smtClean="0"/>
+              <a:rPr lang="en-US"/>
               <a:t>Third level</a:t>
             </a:r>
           </a:p>
           <a:p>
             <a:pPr lvl="3"/>
             <a:r>
-              <a:rPr lang="en-US" smtClean="0"/>
+              <a:rPr lang="en-US"/>
               <a:t>Fourth level</a:t>
             </a:r>
           </a:p>
           <a:p>
             <a:pPr lvl="4"/>
             <a:r>
-              <a:rPr lang="en-US" smtClean="0"/>
+              <a:rPr lang="en-US"/>
               <a:t>Fifth level</a:t>
             </a:r>
-            <a:endParaRPr lang="en-US"/>
           </a:p>
         </p:txBody>
       </p:sp>
@@ -2133,7 +2117,7 @@
           <a:p>
             <a:fld id="{78C97017-6FC3-485B-9764-EAC9E56C1D49}" type="datetimeFigureOut">
               <a:rPr lang="en-US" smtClean="0"/>
-              <a:t>2/2/2017</a:t>
+              <a:t>3/14/2017</a:t>
             </a:fld>
             <a:endParaRPr lang="en-US"/>
           </a:p>
@@ -2227,10 +2211,9 @@
           <a:lstStyle/>
           <a:p>
             <a:r>
-              <a:rPr lang="en-US" smtClean="0"/>
+              <a:rPr lang="en-US"/>
               <a:t>Click to edit Master title style</a:t>
             </a:r>
-            <a:endParaRPr lang="en-US"/>
           </a:p>
         </p:txBody>
       </p:sp>
@@ -2251,7 +2234,7 @@
           <a:p>
             <a:fld id="{78C97017-6FC3-485B-9764-EAC9E56C1D49}" type="datetimeFigureOut">
               <a:rPr lang="en-US" smtClean="0"/>
-              <a:t>2/2/2017</a:t>
+              <a:t>3/14/2017</a:t>
             </a:fld>
             <a:endParaRPr lang="en-US"/>
           </a:p>
@@ -2346,7 +2329,7 @@
           <a:p>
             <a:fld id="{78C97017-6FC3-485B-9764-EAC9E56C1D49}" type="datetimeFigureOut">
               <a:rPr lang="en-US" smtClean="0"/>
-              <a:t>2/2/2017</a:t>
+              <a:t>3/14/2017</a:t>
             </a:fld>
             <a:endParaRPr lang="en-US"/>
           </a:p>
@@ -2449,10 +2432,9 @@
           </a:lstStyle>
           <a:p>
             <a:r>
-              <a:rPr lang="en-US" smtClean="0"/>
+              <a:rPr lang="en-US"/>
               <a:t>Click to edit Master title style</a:t>
             </a:r>
-            <a:endParaRPr lang="en-US"/>
           </a:p>
         </p:txBody>
       </p:sp>
@@ -2506,38 +2488,37 @@
           <a:p>
             <a:pPr lvl="0"/>
             <a:r>
-              <a:rPr lang="en-US" smtClean="0"/>
+              <a:rPr lang="en-US"/>
               <a:t>Click to edit Master text styles</a:t>
             </a:r>
           </a:p>
           <a:p>
             <a:pPr lvl="1"/>
             <a:r>
-              <a:rPr lang="en-US" smtClean="0"/>
+              <a:rPr lang="en-US"/>
               <a:t>Second level</a:t>
             </a:r>
           </a:p>
           <a:p>
             <a:pPr lvl="2"/>
             <a:r>
-              <a:rPr lang="en-US" smtClean="0"/>
+              <a:rPr lang="en-US"/>
               <a:t>Third level</a:t>
             </a:r>
           </a:p>
           <a:p>
             <a:pPr lvl="3"/>
             <a:r>
-              <a:rPr lang="en-US" smtClean="0"/>
+              <a:rPr lang="en-US"/>
               <a:t>Fourth level</a:t>
             </a:r>
           </a:p>
           <a:p>
             <a:pPr lvl="4"/>
             <a:r>
-              <a:rPr lang="en-US" smtClean="0"/>
+              <a:rPr lang="en-US"/>
               <a:t>Fifth level</a:t>
             </a:r>
-            <a:endParaRPr lang="en-US"/>
           </a:p>
         </p:txBody>
       </p:sp>
@@ -2600,7 +2581,7 @@
           <a:p>
             <a:pPr lvl="0"/>
             <a:r>
-              <a:rPr lang="en-US" smtClean="0"/>
+              <a:rPr lang="en-US"/>
               <a:t>Click to edit Master text styles</a:t>
             </a:r>
           </a:p>
@@ -2623,7 +2604,7 @@
           <a:p>
             <a:fld id="{78C97017-6FC3-485B-9764-EAC9E56C1D49}" type="datetimeFigureOut">
               <a:rPr lang="en-US" smtClean="0"/>
-              <a:t>2/2/2017</a:t>
+              <a:t>3/14/2017</a:t>
             </a:fld>
             <a:endParaRPr lang="en-US"/>
           </a:p>
@@ -2726,10 +2707,9 @@
           </a:lstStyle>
           <a:p>
             <a:r>
-              <a:rPr lang="en-US" smtClean="0"/>
+              <a:rPr lang="en-US"/>
               <a:t>Click to edit Master title style</a:t>
             </a:r>
-            <a:endParaRPr lang="en-US"/>
           </a:p>
         </p:txBody>
       </p:sp>
@@ -2853,7 +2833,7 @@
           <a:p>
             <a:pPr lvl="0"/>
             <a:r>
-              <a:rPr lang="en-US" smtClean="0"/>
+              <a:rPr lang="en-US"/>
               <a:t>Click to edit Master text styles</a:t>
             </a:r>
           </a:p>
@@ -2876,7 +2856,7 @@
           <a:p>
             <a:fld id="{78C97017-6FC3-485B-9764-EAC9E56C1D49}" type="datetimeFigureOut">
               <a:rPr lang="en-US" smtClean="0"/>
-              <a:t>2/2/2017</a:t>
+              <a:t>3/14/2017</a:t>
             </a:fld>
             <a:endParaRPr lang="en-US"/>
           </a:p>
@@ -2985,10 +2965,9 @@
           <a:lstStyle/>
           <a:p>
             <a:r>
-              <a:rPr lang="en-US" smtClean="0"/>
+              <a:rPr lang="en-US"/>
               <a:t>Click to edit Master title style</a:t>
             </a:r>
-            <a:endParaRPr lang="en-US"/>
           </a:p>
         </p:txBody>
       </p:sp>
@@ -3019,38 +2998,37 @@
           <a:p>
             <a:pPr lvl="0"/>
             <a:r>
-              <a:rPr lang="en-US" smtClean="0"/>
+              <a:rPr lang="en-US"/>
               <a:t>Click to edit Master text styles</a:t>
             </a:r>
           </a:p>
           <a:p>
             <a:pPr lvl="1"/>
             <a:r>
-              <a:rPr lang="en-US" smtClean="0"/>
+              <a:rPr lang="en-US"/>
               <a:t>Second level</a:t>
             </a:r>
           </a:p>
           <a:p>
             <a:pPr lvl="2"/>
             <a:r>
-              <a:rPr lang="en-US" smtClean="0"/>
+              <a:rPr lang="en-US"/>
               <a:t>Third level</a:t>
             </a:r>
           </a:p>
           <a:p>
             <a:pPr lvl="3"/>
             <a:r>
-              <a:rPr lang="en-US" smtClean="0"/>
+              <a:rPr lang="en-US"/>
               <a:t>Fourth level</a:t>
             </a:r>
           </a:p>
           <a:p>
             <a:pPr lvl="4"/>
             <a:r>
-              <a:rPr lang="en-US" smtClean="0"/>
+              <a:rPr lang="en-US"/>
               <a:t>Fifth level</a:t>
             </a:r>
-            <a:endParaRPr lang="en-US"/>
           </a:p>
         </p:txBody>
       </p:sp>
@@ -3089,7 +3067,7 @@
           <a:p>
             <a:fld id="{78C97017-6FC3-485B-9764-EAC9E56C1D49}" type="datetimeFigureOut">
               <a:rPr lang="en-US" smtClean="0"/>
-              <a:t>2/2/2017</a:t>
+              <a:t>3/14/2017</a:t>
             </a:fld>
             <a:endParaRPr lang="en-US"/>
           </a:p>
@@ -3625,7 +3603,7 @@
           <a:p>
             <a:pPr algn="ctr"/>
             <a:r>
-              <a:rPr lang="en-US" sz="1050" b="1" dirty="0" err="1" smtClean="0">
+              <a:rPr lang="en-US" sz="1050" b="1" dirty="0" err="1">
                 <a:solidFill>
                   <a:srgbClr val="0070C0"/>
                 </a:solidFill>
@@ -3887,7 +3865,7 @@
           <a:p>
             <a:pPr algn="ctr"/>
             <a:r>
-              <a:rPr lang="en-US" sz="1050" b="1" dirty="0" err="1" smtClean="0">
+              <a:rPr lang="en-US" sz="1050" b="1" dirty="0" err="1">
                 <a:solidFill>
                   <a:srgbClr val="0070C0"/>
                 </a:solidFill>
@@ -3943,7 +3921,7 @@
           <a:p>
             <a:pPr algn="ctr"/>
             <a:r>
-              <a:rPr lang="en-US" sz="1050" b="1" dirty="0" smtClean="0">
+              <a:rPr lang="en-US" sz="1050" b="1" dirty="0">
                 <a:solidFill>
                   <a:srgbClr val="0070C0"/>
                 </a:solidFill>
@@ -3951,14 +3929,14 @@
               <a:t>Incorrect</a:t>
             </a:r>
             <a:br>
-              <a:rPr lang="en-US" sz="1050" b="1" dirty="0" smtClean="0">
+              <a:rPr lang="en-US" sz="1050" b="1" dirty="0">
                 <a:solidFill>
                   <a:srgbClr val="0070C0"/>
                 </a:solidFill>
               </a:rPr>
             </a:br>
             <a:r>
-              <a:rPr lang="en-US" sz="1050" b="1" dirty="0" smtClean="0">
+              <a:rPr lang="en-US" sz="1050" b="1" dirty="0">
                 <a:solidFill>
                   <a:srgbClr val="0070C0"/>
                 </a:solidFill>
@@ -4791,7 +4769,7 @@
           <a:p>
             <a:pPr algn="ctr"/>
             <a:r>
-              <a:rPr lang="en-US" sz="1050" b="1" dirty="0" smtClean="0">
+              <a:rPr lang="en-US" sz="1050" b="1" dirty="0">
                 <a:solidFill>
                   <a:srgbClr val="0070C0"/>
                 </a:solidFill>
@@ -4855,7 +4833,7 @@
         </p:nvSpPr>
         <p:spPr>
           <a:xfrm flipH="1">
-            <a:off x="4664592" y="2148937"/>
+            <a:off x="4831294" y="2148937"/>
             <a:ext cx="1093635" cy="346760"/>
           </a:xfrm>
           <a:prstGeom prst="rect">
@@ -4926,7 +4904,7 @@
         </p:nvSpPr>
         <p:spPr>
           <a:xfrm flipH="1">
-            <a:off x="4664592" y="2555337"/>
+            <a:off x="4831294" y="2555337"/>
             <a:ext cx="1093635" cy="346760"/>
           </a:xfrm>
           <a:prstGeom prst="rect">
@@ -4997,7 +4975,7 @@
         </p:nvSpPr>
         <p:spPr>
           <a:xfrm flipH="1">
-            <a:off x="4664590" y="2977582"/>
+            <a:off x="4831292" y="2977582"/>
             <a:ext cx="1093635" cy="346760"/>
           </a:xfrm>
           <a:prstGeom prst="rect">
@@ -5052,7 +5030,7 @@
         </p:nvSpPr>
         <p:spPr>
           <a:xfrm>
-            <a:off x="2807288" y="1905000"/>
+            <a:off x="3174214" y="1905000"/>
             <a:ext cx="751107" cy="346760"/>
           </a:xfrm>
           <a:prstGeom prst="rect">
@@ -5094,7 +5072,7 @@
           <a:p>
             <a:pPr algn="ctr"/>
             <a:r>
-              <a:rPr lang="en-US" sz="1050" dirty="0" smtClean="0">
+              <a:rPr lang="en-US" sz="1050" dirty="0">
                 <a:solidFill>
                   <a:schemeClr val="bg1"/>
                 </a:solidFill>
@@ -5102,14 +5080,14 @@
               <a:t>Argument</a:t>
             </a:r>
             <a:br>
-              <a:rPr lang="en-US" sz="1050" dirty="0" smtClean="0">
+              <a:rPr lang="en-US" sz="1050" dirty="0">
                 <a:solidFill>
                   <a:schemeClr val="bg1"/>
                 </a:solidFill>
               </a:rPr>
             </a:br>
             <a:r>
-              <a:rPr lang="en-US" sz="1050" dirty="0" smtClean="0">
+              <a:rPr lang="en-US" sz="1050" dirty="0">
                 <a:solidFill>
                   <a:schemeClr val="bg1"/>
                 </a:solidFill>
@@ -5132,7 +5110,7 @@
         </p:nvSpPr>
         <p:spPr>
           <a:xfrm>
-            <a:off x="2813291" y="2432664"/>
+            <a:off x="2238496" y="2454481"/>
             <a:ext cx="726243" cy="174580"/>
           </a:xfrm>
           <a:prstGeom prst="rect">
@@ -5174,7 +5152,7 @@
           <a:p>
             <a:pPr algn="ctr"/>
             <a:r>
-              <a:rPr lang="en-US" sz="1050" dirty="0" smtClean="0">
+              <a:rPr lang="en-US" sz="1050" dirty="0">
                 <a:solidFill>
                   <a:schemeClr val="bg1"/>
                 </a:solidFill>
@@ -5197,9 +5175,9 @@
         </p:nvGrpSpPr>
         <p:grpSpPr>
           <a:xfrm rot="5400000">
-            <a:off x="5941795" y="1962201"/>
+            <a:off x="6088711" y="1962201"/>
             <a:ext cx="254462" cy="555486"/>
-            <a:chOff x="3949242" y="712012"/>
+            <a:chOff x="3949242" y="578739"/>
             <a:chExt cx="254462" cy="503902"/>
           </a:xfrm>
         </p:grpSpPr>
@@ -5211,7 +5189,7 @@
           </p:nvSpPr>
           <p:spPr>
             <a:xfrm rot="16200000">
-              <a:off x="3824522" y="836732"/>
+              <a:off x="3824522" y="703459"/>
               <a:ext cx="503902" cy="254462"/>
             </a:xfrm>
             <a:prstGeom prst="rect">
@@ -5226,7 +5204,7 @@
             <a:lstStyle/>
             <a:p>
               <a:r>
-                <a:rPr lang="en-US" sz="1100" dirty="0" smtClean="0">
+                <a:rPr lang="en-US" sz="1100" dirty="0">
                   <a:solidFill>
                     <a:schemeClr val="accent5">
                       <a:lumMod val="75000"/>
@@ -5253,7 +5231,7 @@
           </p:nvSpPr>
           <p:spPr>
             <a:xfrm rot="10800000" flipV="1">
-              <a:off x="3979474" y="751200"/>
+              <a:off x="3979474" y="617927"/>
               <a:ext cx="132157" cy="79956"/>
             </a:xfrm>
             <a:prstGeom prst="triangle">
@@ -5302,9 +5280,9 @@
         </p:nvGrpSpPr>
         <p:grpSpPr>
           <a:xfrm rot="5400000">
-            <a:off x="5962853" y="2347569"/>
+            <a:off x="6098740" y="2390577"/>
             <a:ext cx="254462" cy="555486"/>
-            <a:chOff x="3949242" y="712012"/>
+            <a:chOff x="3965759" y="592436"/>
             <a:chExt cx="254462" cy="503902"/>
           </a:xfrm>
         </p:grpSpPr>
@@ -5316,7 +5294,7 @@
           </p:nvSpPr>
           <p:spPr>
             <a:xfrm rot="16200000">
-              <a:off x="3824522" y="836732"/>
+              <a:off x="3841039" y="717156"/>
               <a:ext cx="503902" cy="254462"/>
             </a:xfrm>
             <a:prstGeom prst="rect">
@@ -5331,7 +5309,7 @@
             <a:lstStyle/>
             <a:p>
               <a:r>
-                <a:rPr lang="en-US" sz="1100" dirty="0" smtClean="0">
+                <a:rPr lang="en-US" sz="1100" dirty="0">
                   <a:solidFill>
                     <a:schemeClr val="accent5">
                       <a:lumMod val="75000"/>
@@ -5358,7 +5336,7 @@
           </p:nvSpPr>
           <p:spPr>
             <a:xfrm rot="10800000" flipV="1">
-              <a:off x="3979474" y="751200"/>
+              <a:off x="3995991" y="631624"/>
               <a:ext cx="132157" cy="79956"/>
             </a:xfrm>
             <a:prstGeom prst="triangle">
@@ -5407,7 +5385,7 @@
         </p:nvSpPr>
         <p:spPr>
           <a:xfrm>
-            <a:off x="2819400" y="2841725"/>
+            <a:off x="3186326" y="2841725"/>
             <a:ext cx="731636" cy="283820"/>
           </a:xfrm>
           <a:prstGeom prst="rect">
@@ -5449,7 +5427,7 @@
           <a:p>
             <a:pPr algn="ctr"/>
             <a:r>
-              <a:rPr lang="en-SG" sz="1050" dirty="0" err="1" smtClean="0">
+              <a:rPr lang="en-SG" sz="1050" dirty="0" err="1">
                 <a:solidFill>
                   <a:schemeClr val="bg1"/>
                 </a:solidFill>
@@ -5472,7 +5450,7 @@
         </p:nvSpPr>
         <p:spPr>
           <a:xfrm>
-            <a:off x="2819400" y="3190882"/>
+            <a:off x="3186326" y="3190882"/>
             <a:ext cx="731636" cy="283820"/>
           </a:xfrm>
           <a:prstGeom prst="rect">
@@ -5514,7 +5492,7 @@
           <a:p>
             <a:pPr algn="ctr"/>
             <a:r>
-              <a:rPr lang="en-SG" sz="1050" dirty="0" err="1" smtClean="0">
+              <a:rPr lang="en-SG" sz="1050" dirty="0" err="1">
                 <a:solidFill>
                   <a:schemeClr val="bg1"/>
                 </a:solidFill>
@@ -5533,13 +5511,14 @@
         <p:nvCxnSpPr>
           <p:cNvPr id="100" name="Straight Arrow Connector 99"/>
           <p:cNvCxnSpPr>
+            <a:cxnSpLocks/>
             <a:endCxn id="60" idx="3"/>
           </p:cNvCxnSpPr>
           <p:nvPr/>
         </p:nvCxnSpPr>
         <p:spPr>
           <a:xfrm flipH="1">
-            <a:off x="3551036" y="2983635"/>
+            <a:off x="3917962" y="2983635"/>
             <a:ext cx="335164" cy="0"/>
           </a:xfrm>
           <a:prstGeom prst="straightConnector1">
@@ -5575,13 +5554,16 @@
       <p:cxnSp>
         <p:nvCxnSpPr>
           <p:cNvPr id="105" name="Straight Arrow Connector 104"/>
-          <p:cNvCxnSpPr/>
+          <p:cNvCxnSpPr>
+            <a:cxnSpLocks/>
+            <a:endCxn id="62" idx="3"/>
+          </p:cNvCxnSpPr>
           <p:nvPr/>
         </p:nvCxnSpPr>
         <p:spPr>
-          <a:xfrm flipH="1" flipV="1">
-            <a:off x="3558396" y="3297471"/>
-            <a:ext cx="327804" cy="5426"/>
+          <a:xfrm flipH="1">
+            <a:off x="3917962" y="3332439"/>
+            <a:ext cx="335164" cy="353"/>
           </a:xfrm>
           <a:prstGeom prst="straightConnector1">
             <a:avLst/>
@@ -5617,19 +5599,19 @@
         <p:nvCxnSpPr>
           <p:cNvPr id="13" name="Elbow Connector 12"/>
           <p:cNvCxnSpPr>
-            <a:stCxn id="60" idx="0"/>
+            <a:cxnSpLocks/>
+            <a:stCxn id="60" idx="1"/>
+            <a:endCxn id="58" idx="2"/>
           </p:cNvCxnSpPr>
           <p:nvPr/>
         </p:nvCxnSpPr>
         <p:spPr>
-          <a:xfrm rot="16200000" flipV="1">
-            <a:off x="3063575" y="2720082"/>
-            <a:ext cx="234481" cy="8806"/>
-          </a:xfrm>
-          <a:prstGeom prst="bentConnector3">
-            <a:avLst>
-              <a:gd name="adj1" fmla="val 50000"/>
-            </a:avLst>
+          <a:xfrm rot="10800000">
+            <a:off x="2601618" y="2629061"/>
+            <a:ext cx="584708" cy="354574"/>
+          </a:xfrm>
+          <a:prstGeom prst="bentConnector2">
+            <a:avLst/>
           </a:prstGeom>
           <a:ln w="19050">
             <a:solidFill>
@@ -5662,13 +5644,16 @@
       <p:cxnSp>
         <p:nvCxnSpPr>
           <p:cNvPr id="47" name="Straight Connector 46"/>
-          <p:cNvCxnSpPr/>
+          <p:cNvCxnSpPr>
+            <a:cxnSpLocks/>
+            <a:stCxn id="56" idx="3"/>
+          </p:cNvCxnSpPr>
           <p:nvPr/>
         </p:nvCxnSpPr>
         <p:spPr>
           <a:xfrm>
-            <a:off x="3539534" y="2078487"/>
-            <a:ext cx="346666" cy="0"/>
+            <a:off x="3925321" y="2078380"/>
+            <a:ext cx="327805" cy="107"/>
           </a:xfrm>
           <a:prstGeom prst="line">
             <a:avLst/>
@@ -5704,20 +5689,19 @@
         <p:nvCxnSpPr>
           <p:cNvPr id="50" name="Elbow Connector 49"/>
           <p:cNvCxnSpPr>
-            <a:stCxn id="56" idx="2"/>
+            <a:cxnSpLocks/>
+            <a:stCxn id="56" idx="1"/>
             <a:endCxn id="58" idx="0"/>
           </p:cNvCxnSpPr>
           <p:nvPr/>
         </p:nvCxnSpPr>
         <p:spPr>
-          <a:xfrm rot="5400000">
-            <a:off x="3089176" y="2338998"/>
-            <a:ext cx="180904" cy="6429"/>
-          </a:xfrm>
-          <a:prstGeom prst="bentConnector3">
-            <a:avLst>
-              <a:gd name="adj1" fmla="val 50000"/>
-            </a:avLst>
+          <a:xfrm rot="10800000" flipV="1">
+            <a:off x="2601618" y="2078379"/>
+            <a:ext cx="572596" cy="376101"/>
+          </a:xfrm>
+          <a:prstGeom prst="bentConnector2">
+            <a:avLst/>
           </a:prstGeom>
           <a:ln w="19050">
             <a:solidFill>
@@ -5755,9 +5739,9 @@
         </p:nvGrpSpPr>
         <p:grpSpPr>
           <a:xfrm rot="5400000">
-            <a:off x="4090826" y="3633626"/>
+            <a:off x="4346209" y="3538793"/>
             <a:ext cx="555486" cy="254462"/>
-            <a:chOff x="3798139" y="875689"/>
+            <a:chOff x="3703306" y="644022"/>
             <a:chExt cx="555486" cy="230832"/>
           </a:xfrm>
         </p:grpSpPr>
@@ -5769,7 +5753,7 @@
           </p:nvSpPr>
           <p:spPr>
             <a:xfrm rot="10800000">
-              <a:off x="3798139" y="875689"/>
+              <a:off x="3703306" y="644022"/>
               <a:ext cx="555486" cy="230832"/>
             </a:xfrm>
             <a:prstGeom prst="rect">
@@ -5784,7 +5768,7 @@
             <a:lstStyle/>
             <a:p>
               <a:r>
-                <a:rPr lang="en-US" sz="1100" dirty="0" smtClean="0">
+                <a:rPr lang="en-US" sz="1100" dirty="0">
                   <a:solidFill>
                     <a:schemeClr val="accent5">
                       <a:lumMod val="75000"/>
@@ -5811,7 +5795,7 @@
           </p:nvSpPr>
           <p:spPr>
             <a:xfrm rot="5400000" flipV="1">
-              <a:off x="3795127" y="973354"/>
+              <a:off x="3700294" y="741689"/>
               <a:ext cx="119885" cy="88141"/>
             </a:xfrm>
             <a:prstGeom prst="triangle">
@@ -6066,145 +6050,7 @@
         <p:spPr>
           <a:xfrm flipV="1">
             <a:off x="4114800" y="3150962"/>
-            <a:ext cx="549790" cy="797920"/>
-          </a:xfrm>
-          <a:prstGeom prst="bentConnector3">
-            <a:avLst>
-              <a:gd name="adj1" fmla="val 14720"/>
-            </a:avLst>
-          </a:prstGeom>
-          <a:ln w="19050">
-            <a:solidFill>
-              <a:schemeClr val="accent5">
-                <a:lumMod val="75000"/>
-              </a:schemeClr>
-            </a:solidFill>
-            <a:prstDash val="sysDot"/>
-            <a:headEnd type="none" w="med" len="med"/>
-            <a:tailEnd type="arrow" w="med" len="med"/>
-          </a:ln>
-          <a:effectLst/>
-        </p:spPr>
-        <p:style>
-          <a:lnRef idx="1">
-            <a:schemeClr val="accent2"/>
-          </a:lnRef>
-          <a:fillRef idx="2">
-            <a:schemeClr val="accent2"/>
-          </a:fillRef>
-          <a:effectRef idx="1">
-            <a:schemeClr val="accent2"/>
-          </a:effectRef>
-          <a:fontRef idx="minor">
-            <a:schemeClr val="dk1"/>
-          </a:fontRef>
-        </p:style>
-      </p:cxnSp>
-      <p:cxnSp>
-        <p:nvCxnSpPr>
-          <p:cNvPr id="113" name="Elbow Connector 63"/>
-          <p:cNvCxnSpPr>
-            <a:stCxn id="16" idx="3"/>
-            <a:endCxn id="44" idx="3"/>
-          </p:cNvCxnSpPr>
-          <p:nvPr/>
-        </p:nvCxnSpPr>
-        <p:spPr>
-          <a:xfrm flipV="1">
-            <a:off x="4114800" y="2728717"/>
-            <a:ext cx="549792" cy="1220165"/>
-          </a:xfrm>
-          <a:prstGeom prst="bentConnector3">
-            <a:avLst>
-              <a:gd name="adj1" fmla="val 14720"/>
-            </a:avLst>
-          </a:prstGeom>
-          <a:ln w="19050">
-            <a:solidFill>
-              <a:schemeClr val="accent5">
-                <a:lumMod val="75000"/>
-              </a:schemeClr>
-            </a:solidFill>
-            <a:prstDash val="sysDot"/>
-            <a:headEnd type="none" w="med" len="med"/>
-            <a:tailEnd type="arrow" w="med" len="med"/>
-          </a:ln>
-          <a:effectLst/>
-        </p:spPr>
-        <p:style>
-          <a:lnRef idx="1">
-            <a:schemeClr val="accent2"/>
-          </a:lnRef>
-          <a:fillRef idx="2">
-            <a:schemeClr val="accent2"/>
-          </a:fillRef>
-          <a:effectRef idx="1">
-            <a:schemeClr val="accent2"/>
-          </a:effectRef>
-          <a:fontRef idx="minor">
-            <a:schemeClr val="dk1"/>
-          </a:fontRef>
-        </p:style>
-      </p:cxnSp>
-      <p:cxnSp>
-        <p:nvCxnSpPr>
-          <p:cNvPr id="116" name="Elbow Connector 63"/>
-          <p:cNvCxnSpPr>
-            <a:stCxn id="16" idx="3"/>
-            <a:endCxn id="42" idx="3"/>
-          </p:cNvCxnSpPr>
-          <p:nvPr/>
-        </p:nvCxnSpPr>
-        <p:spPr>
-          <a:xfrm flipV="1">
-            <a:off x="4114800" y="2322317"/>
-            <a:ext cx="549792" cy="1626565"/>
-          </a:xfrm>
-          <a:prstGeom prst="bentConnector3">
-            <a:avLst>
-              <a:gd name="adj1" fmla="val 14721"/>
-            </a:avLst>
-          </a:prstGeom>
-          <a:ln w="19050">
-            <a:solidFill>
-              <a:schemeClr val="accent5">
-                <a:lumMod val="75000"/>
-              </a:schemeClr>
-            </a:solidFill>
-            <a:prstDash val="sysDot"/>
-            <a:headEnd type="none" w="med" len="med"/>
-            <a:tailEnd type="arrow" w="med" len="med"/>
-          </a:ln>
-          <a:effectLst/>
-        </p:spPr>
-        <p:style>
-          <a:lnRef idx="1">
-            <a:schemeClr val="accent2"/>
-          </a:lnRef>
-          <a:fillRef idx="2">
-            <a:schemeClr val="accent2"/>
-          </a:fillRef>
-          <a:effectRef idx="1">
-            <a:schemeClr val="accent2"/>
-          </a:effectRef>
-          <a:fontRef idx="minor">
-            <a:schemeClr val="dk1"/>
-          </a:fontRef>
-        </p:style>
-      </p:cxnSp>
-      <p:cxnSp>
-        <p:nvCxnSpPr>
-          <p:cNvPr id="120" name="Elbow Connector 63"/>
-          <p:cNvCxnSpPr>
-            <a:stCxn id="44" idx="1"/>
-            <a:endCxn id="10" idx="3"/>
-          </p:cNvCxnSpPr>
-          <p:nvPr/>
-        </p:nvCxnSpPr>
-        <p:spPr>
-          <a:xfrm flipV="1">
-            <a:off x="5758227" y="2728300"/>
-            <a:ext cx="768138" cy="417"/>
+            <a:ext cx="716492" cy="797920"/>
           </a:xfrm>
           <a:prstGeom prst="bentConnector3">
             <a:avLst>
@@ -6240,17 +6086,17 @@
       </p:cxnSp>
       <p:cxnSp>
         <p:nvCxnSpPr>
-          <p:cNvPr id="122" name="Elbow Connector 63"/>
+          <p:cNvPr id="113" name="Elbow Connector 63"/>
           <p:cNvCxnSpPr>
-            <a:stCxn id="42" idx="1"/>
-            <a:endCxn id="4" idx="3"/>
+            <a:stCxn id="16" idx="3"/>
+            <a:endCxn id="44" idx="3"/>
           </p:cNvCxnSpPr>
           <p:nvPr/>
         </p:nvCxnSpPr>
         <p:spPr>
-          <a:xfrm>
-            <a:off x="5758227" y="2322317"/>
-            <a:ext cx="762000" cy="230"/>
+          <a:xfrm flipV="1">
+            <a:off x="4114800" y="2728717"/>
+            <a:ext cx="716494" cy="1220165"/>
           </a:xfrm>
           <a:prstGeom prst="bentConnector3">
             <a:avLst>
@@ -6286,14 +6132,156 @@
       </p:cxnSp>
       <p:cxnSp>
         <p:nvCxnSpPr>
-          <p:cNvPr id="64" name="Straight Connector 63"/>
-          <p:cNvCxnSpPr/>
+          <p:cNvPr id="116" name="Elbow Connector 63"/>
+          <p:cNvCxnSpPr>
+            <a:stCxn id="16" idx="3"/>
+            <a:endCxn id="42" idx="3"/>
+          </p:cNvCxnSpPr>
           <p:nvPr/>
         </p:nvCxnSpPr>
         <p:spPr>
+          <a:xfrm flipV="1">
+            <a:off x="4114800" y="2322317"/>
+            <a:ext cx="716494" cy="1626565"/>
+          </a:xfrm>
+          <a:prstGeom prst="bentConnector3">
+            <a:avLst>
+              <a:gd name="adj1" fmla="val 50000"/>
+            </a:avLst>
+          </a:prstGeom>
+          <a:ln w="19050">
+            <a:solidFill>
+              <a:schemeClr val="accent5">
+                <a:lumMod val="75000"/>
+              </a:schemeClr>
+            </a:solidFill>
+            <a:prstDash val="sysDot"/>
+            <a:headEnd type="none" w="med" len="med"/>
+            <a:tailEnd type="arrow" w="med" len="med"/>
+          </a:ln>
+          <a:effectLst/>
+        </p:spPr>
+        <p:style>
+          <a:lnRef idx="1">
+            <a:schemeClr val="accent2"/>
+          </a:lnRef>
+          <a:fillRef idx="2">
+            <a:schemeClr val="accent2"/>
+          </a:fillRef>
+          <a:effectRef idx="1">
+            <a:schemeClr val="accent2"/>
+          </a:effectRef>
+          <a:fontRef idx="minor">
+            <a:schemeClr val="dk1"/>
+          </a:fontRef>
+        </p:style>
+      </p:cxnSp>
+      <p:cxnSp>
+        <p:nvCxnSpPr>
+          <p:cNvPr id="120" name="Elbow Connector 63"/>
+          <p:cNvCxnSpPr>
+            <a:cxnSpLocks/>
+            <a:stCxn id="44" idx="1"/>
+            <a:endCxn id="10" idx="3"/>
+          </p:cNvCxnSpPr>
+          <p:nvPr/>
+        </p:nvCxnSpPr>
+        <p:spPr>
+          <a:xfrm flipV="1">
+            <a:off x="5924929" y="2728300"/>
+            <a:ext cx="601436" cy="417"/>
+          </a:xfrm>
+          <a:prstGeom prst="bentConnector3">
+            <a:avLst>
+              <a:gd name="adj1" fmla="val 50000"/>
+            </a:avLst>
+          </a:prstGeom>
+          <a:ln w="19050">
+            <a:solidFill>
+              <a:schemeClr val="accent5">
+                <a:lumMod val="75000"/>
+              </a:schemeClr>
+            </a:solidFill>
+            <a:prstDash val="sysDot"/>
+            <a:headEnd type="none" w="med" len="med"/>
+            <a:tailEnd type="arrow" w="med" len="med"/>
+          </a:ln>
+          <a:effectLst/>
+        </p:spPr>
+        <p:style>
+          <a:lnRef idx="1">
+            <a:schemeClr val="accent2"/>
+          </a:lnRef>
+          <a:fillRef idx="2">
+            <a:schemeClr val="accent2"/>
+          </a:fillRef>
+          <a:effectRef idx="1">
+            <a:schemeClr val="accent2"/>
+          </a:effectRef>
+          <a:fontRef idx="minor">
+            <a:schemeClr val="dk1"/>
+          </a:fontRef>
+        </p:style>
+      </p:cxnSp>
+      <p:cxnSp>
+        <p:nvCxnSpPr>
+          <p:cNvPr id="122" name="Elbow Connector 63"/>
+          <p:cNvCxnSpPr>
+            <a:cxnSpLocks/>
+            <a:stCxn id="42" idx="1"/>
+            <a:endCxn id="4" idx="3"/>
+          </p:cNvCxnSpPr>
+          <p:nvPr/>
+        </p:nvCxnSpPr>
+        <p:spPr>
           <a:xfrm>
-            <a:off x="3886200" y="2078487"/>
-            <a:ext cx="0" cy="1218984"/>
+            <a:off x="5924929" y="2322317"/>
+            <a:ext cx="595298" cy="230"/>
+          </a:xfrm>
+          <a:prstGeom prst="bentConnector3">
+            <a:avLst>
+              <a:gd name="adj1" fmla="val 50000"/>
+            </a:avLst>
+          </a:prstGeom>
+          <a:ln w="19050">
+            <a:solidFill>
+              <a:schemeClr val="accent5">
+                <a:lumMod val="75000"/>
+              </a:schemeClr>
+            </a:solidFill>
+            <a:prstDash val="sysDot"/>
+            <a:headEnd type="none" w="med" len="med"/>
+            <a:tailEnd type="arrow" w="med" len="med"/>
+          </a:ln>
+          <a:effectLst/>
+        </p:spPr>
+        <p:style>
+          <a:lnRef idx="1">
+            <a:schemeClr val="accent2"/>
+          </a:lnRef>
+          <a:fillRef idx="2">
+            <a:schemeClr val="accent2"/>
+          </a:fillRef>
+          <a:effectRef idx="1">
+            <a:schemeClr val="accent2"/>
+          </a:effectRef>
+          <a:fontRef idx="minor">
+            <a:schemeClr val="dk1"/>
+          </a:fontRef>
+        </p:style>
+      </p:cxnSp>
+      <p:cxnSp>
+        <p:nvCxnSpPr>
+          <p:cNvPr id="64" name="Straight Connector 63"/>
+          <p:cNvCxnSpPr>
+            <a:cxnSpLocks/>
+          </p:cNvCxnSpPr>
+          <p:nvPr/>
+        </p:nvCxnSpPr>
+        <p:spPr>
+          <a:xfrm flipH="1">
+            <a:off x="4248488" y="2078487"/>
+            <a:ext cx="4638" cy="1260312"/>
           </a:xfrm>
           <a:prstGeom prst="line">
             <a:avLst/>
@@ -6328,13 +6316,15 @@
       <p:cxnSp>
         <p:nvCxnSpPr>
           <p:cNvPr id="66" name="Straight Connector 65"/>
-          <p:cNvCxnSpPr/>
+          <p:cNvCxnSpPr>
+            <a:cxnSpLocks/>
+          </p:cNvCxnSpPr>
           <p:nvPr/>
         </p:nvCxnSpPr>
         <p:spPr>
           <a:xfrm>
-            <a:off x="3894672" y="2209800"/>
-            <a:ext cx="769918" cy="0"/>
+            <a:off x="4248488" y="2209800"/>
+            <a:ext cx="582002" cy="0"/>
           </a:xfrm>
           <a:prstGeom prst="line">
             <a:avLst/>
@@ -6369,13 +6359,15 @@
       <p:cxnSp>
         <p:nvCxnSpPr>
           <p:cNvPr id="73" name="Straight Connector 72"/>
-          <p:cNvCxnSpPr/>
+          <p:cNvCxnSpPr>
+            <a:cxnSpLocks/>
+          </p:cNvCxnSpPr>
           <p:nvPr/>
         </p:nvCxnSpPr>
         <p:spPr>
-          <a:xfrm>
-            <a:off x="3886200" y="2607244"/>
-            <a:ext cx="769918" cy="0"/>
+          <a:xfrm flipV="1">
+            <a:off x="4255042" y="2607245"/>
+            <a:ext cx="566976" cy="5974"/>
           </a:xfrm>
           <a:prstGeom prst="line">
             <a:avLst/>
@@ -6410,13 +6402,15 @@
       <p:cxnSp>
         <p:nvCxnSpPr>
           <p:cNvPr id="74" name="Straight Connector 73"/>
-          <p:cNvCxnSpPr/>
+          <p:cNvCxnSpPr>
+            <a:cxnSpLocks/>
+          </p:cNvCxnSpPr>
           <p:nvPr/>
         </p:nvCxnSpPr>
         <p:spPr>
           <a:xfrm>
-            <a:off x="3886200" y="3048000"/>
-            <a:ext cx="769918" cy="0"/>
+            <a:off x="4248487" y="3048000"/>
+            <a:ext cx="573531" cy="0"/>
           </a:xfrm>
           <a:prstGeom prst="line">
             <a:avLst/>
@@ -6429,6 +6423,206 @@
             </a:solidFill>
             <a:prstDash val="sysDot"/>
             <a:headEnd type="none" w="med" len="med"/>
+            <a:tailEnd type="none" w="med" len="med"/>
+          </a:ln>
+          <a:effectLst/>
+        </p:spPr>
+        <p:style>
+          <a:lnRef idx="1">
+            <a:schemeClr val="accent2"/>
+          </a:lnRef>
+          <a:fillRef idx="2">
+            <a:schemeClr val="accent2"/>
+          </a:fillRef>
+          <a:effectRef idx="1">
+            <a:schemeClr val="accent2"/>
+          </a:effectRef>
+          <a:fontRef idx="minor">
+            <a:schemeClr val="dk1"/>
+          </a:fontRef>
+        </p:style>
+      </p:cxnSp>
+      <p:sp>
+        <p:nvSpPr>
+          <p:cNvPr id="109" name="Rectangle 62"/>
+          <p:cNvSpPr/>
+          <p:nvPr/>
+        </p:nvSpPr>
+        <p:spPr>
+          <a:xfrm>
+            <a:off x="3139577" y="2450741"/>
+            <a:ext cx="825134" cy="174580"/>
+          </a:xfrm>
+          <a:prstGeom prst="rect">
+            <a:avLst/>
+          </a:prstGeom>
+          <a:solidFill>
+            <a:schemeClr val="accent5">
+              <a:lumMod val="60000"/>
+              <a:lumOff val="40000"/>
+            </a:schemeClr>
+          </a:solidFill>
+          <a:ln w="19050">
+            <a:solidFill>
+              <a:schemeClr val="accent5">
+                <a:lumMod val="60000"/>
+                <a:lumOff val="40000"/>
+              </a:schemeClr>
+            </a:solidFill>
+          </a:ln>
+          <a:effectLst/>
+        </p:spPr>
+        <p:style>
+          <a:lnRef idx="1">
+            <a:schemeClr val="accent2"/>
+          </a:lnRef>
+          <a:fillRef idx="2">
+            <a:schemeClr val="accent2"/>
+          </a:fillRef>
+          <a:effectRef idx="1">
+            <a:schemeClr val="accent2"/>
+          </a:effectRef>
+          <a:fontRef idx="minor">
+            <a:schemeClr val="dk1"/>
+          </a:fontRef>
+        </p:style>
+        <p:txBody>
+          <a:bodyPr rtlCol="0" anchor="ctr"/>
+          <a:lstStyle/>
+          <a:p>
+            <a:pPr algn="ctr"/>
+            <a:r>
+              <a:rPr lang="en-SG" sz="1050" dirty="0">
+                <a:solidFill>
+                  <a:schemeClr val="bg1"/>
+                </a:solidFill>
+              </a:rPr>
+              <a:t>Arguments</a:t>
+            </a:r>
+          </a:p>
+        </p:txBody>
+      </p:sp>
+      <p:cxnSp>
+        <p:nvCxnSpPr>
+          <p:cNvPr id="112" name="Elbow Connector 12"/>
+          <p:cNvCxnSpPr>
+            <a:cxnSpLocks/>
+            <a:stCxn id="109" idx="1"/>
+            <a:endCxn id="58" idx="3"/>
+          </p:cNvCxnSpPr>
+          <p:nvPr/>
+        </p:nvCxnSpPr>
+        <p:spPr>
+          <a:xfrm rot="10800000" flipV="1">
+            <a:off x="2964739" y="2538031"/>
+            <a:ext cx="174838" cy="3740"/>
+          </a:xfrm>
+          <a:prstGeom prst="bentConnector3">
+            <a:avLst>
+              <a:gd name="adj1" fmla="val 50000"/>
+            </a:avLst>
+          </a:prstGeom>
+          <a:ln w="19050">
+            <a:solidFill>
+              <a:schemeClr val="accent5">
+                <a:lumMod val="60000"/>
+                <a:lumOff val="40000"/>
+              </a:schemeClr>
+            </a:solidFill>
+            <a:prstDash val="sysDot"/>
+            <a:headEnd type="none" w="med" len="med"/>
+            <a:tailEnd type="arrow" w="med" len="med"/>
+          </a:ln>
+          <a:effectLst/>
+        </p:spPr>
+        <p:style>
+          <a:lnRef idx="1">
+            <a:schemeClr val="accent2"/>
+          </a:lnRef>
+          <a:fillRef idx="2">
+            <a:schemeClr val="accent2"/>
+          </a:fillRef>
+          <a:effectRef idx="1">
+            <a:schemeClr val="accent2"/>
+          </a:effectRef>
+          <a:fontRef idx="minor">
+            <a:schemeClr val="dk1"/>
+          </a:fontRef>
+        </p:style>
+      </p:cxnSp>
+      <p:cxnSp>
+        <p:nvCxnSpPr>
+          <p:cNvPr id="118" name="Elbow Connector 49"/>
+          <p:cNvCxnSpPr>
+            <a:cxnSpLocks/>
+            <a:stCxn id="56" idx="2"/>
+            <a:endCxn id="109" idx="0"/>
+          </p:cNvCxnSpPr>
+          <p:nvPr/>
+        </p:nvCxnSpPr>
+        <p:spPr>
+          <a:xfrm rot="16200000" flipH="1">
+            <a:off x="3451466" y="2350062"/>
+            <a:ext cx="198981" cy="2376"/>
+          </a:xfrm>
+          <a:prstGeom prst="bentConnector3">
+            <a:avLst>
+              <a:gd name="adj1" fmla="val 50000"/>
+            </a:avLst>
+          </a:prstGeom>
+          <a:ln w="19050">
+            <a:solidFill>
+              <a:schemeClr val="accent5">
+                <a:lumMod val="60000"/>
+                <a:lumOff val="40000"/>
+              </a:schemeClr>
+            </a:solidFill>
+            <a:prstDash val="sysDot"/>
+            <a:headEnd type="none" w="med" len="med"/>
+            <a:tailEnd type="arrow" w="med" len="med"/>
+          </a:ln>
+          <a:effectLst/>
+        </p:spPr>
+        <p:style>
+          <a:lnRef idx="1">
+            <a:schemeClr val="accent2"/>
+          </a:lnRef>
+          <a:fillRef idx="2">
+            <a:schemeClr val="accent2"/>
+          </a:fillRef>
+          <a:effectRef idx="1">
+            <a:schemeClr val="accent2"/>
+          </a:effectRef>
+          <a:fontRef idx="minor">
+            <a:schemeClr val="dk1"/>
+          </a:fontRef>
+        </p:style>
+      </p:cxnSp>
+      <p:cxnSp>
+        <p:nvCxnSpPr>
+          <p:cNvPr id="123" name="Straight Connector 122"/>
+          <p:cNvCxnSpPr>
+            <a:cxnSpLocks/>
+            <a:stCxn id="109" idx="3"/>
+          </p:cNvCxnSpPr>
+          <p:nvPr/>
+        </p:nvCxnSpPr>
+        <p:spPr>
+          <a:xfrm flipV="1">
+            <a:off x="3964711" y="2533616"/>
+            <a:ext cx="290331" cy="4415"/>
+          </a:xfrm>
+          <a:prstGeom prst="line">
+            <a:avLst/>
+          </a:prstGeom>
+          <a:ln w="19050">
+            <a:solidFill>
+              <a:schemeClr val="accent5">
+                <a:lumMod val="50000"/>
+              </a:schemeClr>
+            </a:solidFill>
+            <a:prstDash val="sysDot"/>
+            <a:headEnd type="arrow" w="med" len="med"/>
             <a:tailEnd type="none" w="med" len="med"/>
           </a:ln>
           <a:effectLst/>

</xml_diff>

<commit_message>
Update Logic class diagram with ArgumentMultimap class
The Logic class diagram in the developer guide does not reflect the
updated dependencies between ArgumentTokenizer, ArgumentMultimap,
Prefix, and command parser classes.

Let's update the Logic class diagram.
</commit_message>
<xml_diff>
--- a/docs/diagrams/LogicComponentClassDiagram.pptx
+++ b/docs/diagrams/LogicComponentClassDiagram.pptx
@@ -208,7 +208,7 @@
           <a:p>
             <a:fld id="{F5CC4B3F-88C1-4FFA-B1B6-F41C21DC6924}" type="datetimeFigureOut">
               <a:rPr lang="en-US" smtClean="0"/>
-              <a:t>2/2/2017</a:t>
+              <a:t>3/21/2017</a:t>
             </a:fld>
             <a:endParaRPr lang="en-US"/>
           </a:p>
@@ -272,38 +272,37 @@
           <a:p>
             <a:pPr lvl="0"/>
             <a:r>
-              <a:rPr lang="en-US" smtClean="0"/>
+              <a:rPr lang="en-US"/>
               <a:t>Click to edit Master text styles</a:t>
             </a:r>
           </a:p>
           <a:p>
             <a:pPr lvl="1"/>
             <a:r>
-              <a:rPr lang="en-US" smtClean="0"/>
+              <a:rPr lang="en-US"/>
               <a:t>Second level</a:t>
             </a:r>
           </a:p>
           <a:p>
             <a:pPr lvl="2"/>
             <a:r>
-              <a:rPr lang="en-US" smtClean="0"/>
+              <a:rPr lang="en-US"/>
               <a:t>Third level</a:t>
             </a:r>
           </a:p>
           <a:p>
             <a:pPr lvl="3"/>
             <a:r>
-              <a:rPr lang="en-US" smtClean="0"/>
+              <a:rPr lang="en-US"/>
               <a:t>Fourth level</a:t>
             </a:r>
           </a:p>
           <a:p>
             <a:pPr lvl="4"/>
             <a:r>
-              <a:rPr lang="en-US" smtClean="0"/>
+              <a:rPr lang="en-US"/>
               <a:t>Fifth level</a:t>
             </a:r>
-            <a:endParaRPr lang="en-US"/>
           </a:p>
         </p:txBody>
       </p:sp>
@@ -514,10 +513,9 @@
           <a:lstStyle/>
           <a:p>
             <a:r>
-              <a:rPr lang="en-US" smtClean="0"/>
+              <a:rPr lang="en-US"/>
               <a:t>Click to edit Master title style</a:t>
             </a:r>
-            <a:endParaRPr lang="en-US"/>
           </a:p>
         </p:txBody>
       </p:sp>
@@ -633,10 +631,9 @@
           </a:lstStyle>
           <a:p>
             <a:r>
-              <a:rPr lang="en-US" smtClean="0"/>
+              <a:rPr lang="en-US"/>
               <a:t>Click to edit Master subtitle style</a:t>
             </a:r>
-            <a:endParaRPr lang="en-US"/>
           </a:p>
         </p:txBody>
       </p:sp>
@@ -657,7 +654,7 @@
           <a:p>
             <a:fld id="{78C97017-6FC3-485B-9764-EAC9E56C1D49}" type="datetimeFigureOut">
               <a:rPr lang="en-US" smtClean="0"/>
-              <a:t>2/2/2017</a:t>
+              <a:t>3/21/2017</a:t>
             </a:fld>
             <a:endParaRPr lang="en-US"/>
           </a:p>
@@ -751,10 +748,9 @@
           <a:lstStyle/>
           <a:p>
             <a:r>
-              <a:rPr lang="en-US" smtClean="0"/>
+              <a:rPr lang="en-US"/>
               <a:t>Click to edit Master title style</a:t>
             </a:r>
-            <a:endParaRPr lang="en-US"/>
           </a:p>
         </p:txBody>
       </p:sp>
@@ -775,38 +771,37 @@
           <a:p>
             <a:pPr lvl="0"/>
             <a:r>
-              <a:rPr lang="en-US" smtClean="0"/>
+              <a:rPr lang="en-US"/>
               <a:t>Click to edit Master text styles</a:t>
             </a:r>
           </a:p>
           <a:p>
             <a:pPr lvl="1"/>
             <a:r>
-              <a:rPr lang="en-US" smtClean="0"/>
+              <a:rPr lang="en-US"/>
               <a:t>Second level</a:t>
             </a:r>
           </a:p>
           <a:p>
             <a:pPr lvl="2"/>
             <a:r>
-              <a:rPr lang="en-US" smtClean="0"/>
+              <a:rPr lang="en-US"/>
               <a:t>Third level</a:t>
             </a:r>
           </a:p>
           <a:p>
             <a:pPr lvl="3"/>
             <a:r>
-              <a:rPr lang="en-US" smtClean="0"/>
+              <a:rPr lang="en-US"/>
               <a:t>Fourth level</a:t>
             </a:r>
           </a:p>
           <a:p>
             <a:pPr lvl="4"/>
             <a:r>
-              <a:rPr lang="en-US" smtClean="0"/>
+              <a:rPr lang="en-US"/>
               <a:t>Fifth level</a:t>
             </a:r>
-            <a:endParaRPr lang="en-US"/>
           </a:p>
         </p:txBody>
       </p:sp>
@@ -827,7 +822,7 @@
           <a:p>
             <a:fld id="{78C97017-6FC3-485B-9764-EAC9E56C1D49}" type="datetimeFigureOut">
               <a:rPr lang="en-US" smtClean="0"/>
-              <a:t>2/2/2017</a:t>
+              <a:t>3/21/2017</a:t>
             </a:fld>
             <a:endParaRPr lang="en-US"/>
           </a:p>
@@ -926,10 +921,9 @@
           <a:lstStyle/>
           <a:p>
             <a:r>
-              <a:rPr lang="en-US" smtClean="0"/>
+              <a:rPr lang="en-US"/>
               <a:t>Click to edit Master title style</a:t>
             </a:r>
-            <a:endParaRPr lang="en-US"/>
           </a:p>
         </p:txBody>
       </p:sp>
@@ -955,38 +949,37 @@
           <a:p>
             <a:pPr lvl="0"/>
             <a:r>
-              <a:rPr lang="en-US" smtClean="0"/>
+              <a:rPr lang="en-US"/>
               <a:t>Click to edit Master text styles</a:t>
             </a:r>
           </a:p>
           <a:p>
             <a:pPr lvl="1"/>
             <a:r>
-              <a:rPr lang="en-US" smtClean="0"/>
+              <a:rPr lang="en-US"/>
               <a:t>Second level</a:t>
             </a:r>
           </a:p>
           <a:p>
             <a:pPr lvl="2"/>
             <a:r>
-              <a:rPr lang="en-US" smtClean="0"/>
+              <a:rPr lang="en-US"/>
               <a:t>Third level</a:t>
             </a:r>
           </a:p>
           <a:p>
             <a:pPr lvl="3"/>
             <a:r>
-              <a:rPr lang="en-US" smtClean="0"/>
+              <a:rPr lang="en-US"/>
               <a:t>Fourth level</a:t>
             </a:r>
           </a:p>
           <a:p>
             <a:pPr lvl="4"/>
             <a:r>
-              <a:rPr lang="en-US" smtClean="0"/>
+              <a:rPr lang="en-US"/>
               <a:t>Fifth level</a:t>
             </a:r>
-            <a:endParaRPr lang="en-US"/>
           </a:p>
         </p:txBody>
       </p:sp>
@@ -1007,7 +1000,7 @@
           <a:p>
             <a:fld id="{78C97017-6FC3-485B-9764-EAC9E56C1D49}" type="datetimeFigureOut">
               <a:rPr lang="en-US" smtClean="0"/>
-              <a:t>2/2/2017</a:t>
+              <a:t>3/21/2017</a:t>
             </a:fld>
             <a:endParaRPr lang="en-US"/>
           </a:p>
@@ -1101,10 +1094,9 @@
           <a:lstStyle/>
           <a:p>
             <a:r>
-              <a:rPr lang="en-US" smtClean="0"/>
+              <a:rPr lang="en-US"/>
               <a:t>Click to edit Master title style</a:t>
             </a:r>
-            <a:endParaRPr lang="en-US"/>
           </a:p>
         </p:txBody>
       </p:sp>
@@ -1125,38 +1117,37 @@
           <a:p>
             <a:pPr lvl="0"/>
             <a:r>
-              <a:rPr lang="en-US" smtClean="0"/>
+              <a:rPr lang="en-US"/>
               <a:t>Click to edit Master text styles</a:t>
             </a:r>
           </a:p>
           <a:p>
             <a:pPr lvl="1"/>
             <a:r>
-              <a:rPr lang="en-US" smtClean="0"/>
+              <a:rPr lang="en-US"/>
               <a:t>Second level</a:t>
             </a:r>
           </a:p>
           <a:p>
             <a:pPr lvl="2"/>
             <a:r>
-              <a:rPr lang="en-US" smtClean="0"/>
+              <a:rPr lang="en-US"/>
               <a:t>Third level</a:t>
             </a:r>
           </a:p>
           <a:p>
             <a:pPr lvl="3"/>
             <a:r>
-              <a:rPr lang="en-US" smtClean="0"/>
+              <a:rPr lang="en-US"/>
               <a:t>Fourth level</a:t>
             </a:r>
           </a:p>
           <a:p>
             <a:pPr lvl="4"/>
             <a:r>
-              <a:rPr lang="en-US" smtClean="0"/>
+              <a:rPr lang="en-US"/>
               <a:t>Fifth level</a:t>
             </a:r>
-            <a:endParaRPr lang="en-US"/>
           </a:p>
         </p:txBody>
       </p:sp>
@@ -1177,7 +1168,7 @@
           <a:p>
             <a:fld id="{78C97017-6FC3-485B-9764-EAC9E56C1D49}" type="datetimeFigureOut">
               <a:rPr lang="en-US" smtClean="0"/>
-              <a:t>2/2/2017</a:t>
+              <a:t>3/21/2017</a:t>
             </a:fld>
             <a:endParaRPr lang="en-US"/>
           </a:p>
@@ -1280,10 +1271,9 @@
           </a:lstStyle>
           <a:p>
             <a:r>
-              <a:rPr lang="en-US" smtClean="0"/>
+              <a:rPr lang="en-US"/>
               <a:t>Click to edit Master title style</a:t>
             </a:r>
-            <a:endParaRPr lang="en-US"/>
           </a:p>
         </p:txBody>
       </p:sp>
@@ -1400,7 +1390,7 @@
           <a:p>
             <a:pPr lvl="0"/>
             <a:r>
-              <a:rPr lang="en-US" smtClean="0"/>
+              <a:rPr lang="en-US"/>
               <a:t>Click to edit Master text styles</a:t>
             </a:r>
           </a:p>
@@ -1423,7 +1413,7 @@
           <a:p>
             <a:fld id="{78C97017-6FC3-485B-9764-EAC9E56C1D49}" type="datetimeFigureOut">
               <a:rPr lang="en-US" smtClean="0"/>
-              <a:t>2/2/2017</a:t>
+              <a:t>3/21/2017</a:t>
             </a:fld>
             <a:endParaRPr lang="en-US"/>
           </a:p>
@@ -1517,10 +1507,9 @@
           <a:lstStyle/>
           <a:p>
             <a:r>
-              <a:rPr lang="en-US" smtClean="0"/>
+              <a:rPr lang="en-US"/>
               <a:t>Click to edit Master title style</a:t>
             </a:r>
-            <a:endParaRPr lang="en-US"/>
           </a:p>
         </p:txBody>
       </p:sp>
@@ -1574,38 +1563,37 @@
           <a:p>
             <a:pPr lvl="0"/>
             <a:r>
-              <a:rPr lang="en-US" smtClean="0"/>
+              <a:rPr lang="en-US"/>
               <a:t>Click to edit Master text styles</a:t>
             </a:r>
           </a:p>
           <a:p>
             <a:pPr lvl="1"/>
             <a:r>
-              <a:rPr lang="en-US" smtClean="0"/>
+              <a:rPr lang="en-US"/>
               <a:t>Second level</a:t>
             </a:r>
           </a:p>
           <a:p>
             <a:pPr lvl="2"/>
             <a:r>
-              <a:rPr lang="en-US" smtClean="0"/>
+              <a:rPr lang="en-US"/>
               <a:t>Third level</a:t>
             </a:r>
           </a:p>
           <a:p>
             <a:pPr lvl="3"/>
             <a:r>
-              <a:rPr lang="en-US" smtClean="0"/>
+              <a:rPr lang="en-US"/>
               <a:t>Fourth level</a:t>
             </a:r>
           </a:p>
           <a:p>
             <a:pPr lvl="4"/>
             <a:r>
-              <a:rPr lang="en-US" smtClean="0"/>
+              <a:rPr lang="en-US"/>
               <a:t>Fifth level</a:t>
             </a:r>
-            <a:endParaRPr lang="en-US"/>
           </a:p>
         </p:txBody>
       </p:sp>
@@ -1659,38 +1647,37 @@
           <a:p>
             <a:pPr lvl="0"/>
             <a:r>
-              <a:rPr lang="en-US" smtClean="0"/>
+              <a:rPr lang="en-US"/>
               <a:t>Click to edit Master text styles</a:t>
             </a:r>
           </a:p>
           <a:p>
             <a:pPr lvl="1"/>
             <a:r>
-              <a:rPr lang="en-US" smtClean="0"/>
+              <a:rPr lang="en-US"/>
               <a:t>Second level</a:t>
             </a:r>
           </a:p>
           <a:p>
             <a:pPr lvl="2"/>
             <a:r>
-              <a:rPr lang="en-US" smtClean="0"/>
+              <a:rPr lang="en-US"/>
               <a:t>Third level</a:t>
             </a:r>
           </a:p>
           <a:p>
             <a:pPr lvl="3"/>
             <a:r>
-              <a:rPr lang="en-US" smtClean="0"/>
+              <a:rPr lang="en-US"/>
               <a:t>Fourth level</a:t>
             </a:r>
           </a:p>
           <a:p>
             <a:pPr lvl="4"/>
             <a:r>
-              <a:rPr lang="en-US" smtClean="0"/>
+              <a:rPr lang="en-US"/>
               <a:t>Fifth level</a:t>
             </a:r>
-            <a:endParaRPr lang="en-US"/>
           </a:p>
         </p:txBody>
       </p:sp>
@@ -1711,7 +1698,7 @@
           <a:p>
             <a:fld id="{78C97017-6FC3-485B-9764-EAC9E56C1D49}" type="datetimeFigureOut">
               <a:rPr lang="en-US" smtClean="0"/>
-              <a:t>2/2/2017</a:t>
+              <a:t>3/21/2017</a:t>
             </a:fld>
             <a:endParaRPr lang="en-US"/>
           </a:p>
@@ -1809,10 +1796,9 @@
           </a:lstStyle>
           <a:p>
             <a:r>
-              <a:rPr lang="en-US" smtClean="0"/>
+              <a:rPr lang="en-US"/>
               <a:t>Click to edit Master title style</a:t>
             </a:r>
-            <a:endParaRPr lang="en-US"/>
           </a:p>
         </p:txBody>
       </p:sp>
@@ -1875,7 +1861,7 @@
           <a:p>
             <a:pPr lvl="0"/>
             <a:r>
-              <a:rPr lang="en-US" smtClean="0"/>
+              <a:rPr lang="en-US"/>
               <a:t>Click to edit Master text styles</a:t>
             </a:r>
           </a:p>
@@ -1931,38 +1917,37 @@
           <a:p>
             <a:pPr lvl="0"/>
             <a:r>
-              <a:rPr lang="en-US" smtClean="0"/>
+              <a:rPr lang="en-US"/>
               <a:t>Click to edit Master text styles</a:t>
             </a:r>
           </a:p>
           <a:p>
             <a:pPr lvl="1"/>
             <a:r>
-              <a:rPr lang="en-US" smtClean="0"/>
+              <a:rPr lang="en-US"/>
               <a:t>Second level</a:t>
             </a:r>
           </a:p>
           <a:p>
             <a:pPr lvl="2"/>
             <a:r>
-              <a:rPr lang="en-US" smtClean="0"/>
+              <a:rPr lang="en-US"/>
               <a:t>Third level</a:t>
             </a:r>
           </a:p>
           <a:p>
             <a:pPr lvl="3"/>
             <a:r>
-              <a:rPr lang="en-US" smtClean="0"/>
+              <a:rPr lang="en-US"/>
               <a:t>Fourth level</a:t>
             </a:r>
           </a:p>
           <a:p>
             <a:pPr lvl="4"/>
             <a:r>
-              <a:rPr lang="en-US" smtClean="0"/>
+              <a:rPr lang="en-US"/>
               <a:t>Fifth level</a:t>
             </a:r>
-            <a:endParaRPr lang="en-US"/>
           </a:p>
         </p:txBody>
       </p:sp>
@@ -2025,7 +2010,7 @@
           <a:p>
             <a:pPr lvl="0"/>
             <a:r>
-              <a:rPr lang="en-US" smtClean="0"/>
+              <a:rPr lang="en-US"/>
               <a:t>Click to edit Master text styles</a:t>
             </a:r>
           </a:p>
@@ -2081,38 +2066,37 @@
           <a:p>
             <a:pPr lvl="0"/>
             <a:r>
-              <a:rPr lang="en-US" smtClean="0"/>
+              <a:rPr lang="en-US"/>
               <a:t>Click to edit Master text styles</a:t>
             </a:r>
           </a:p>
           <a:p>
             <a:pPr lvl="1"/>
             <a:r>
-              <a:rPr lang="en-US" smtClean="0"/>
+              <a:rPr lang="en-US"/>
               <a:t>Second level</a:t>
             </a:r>
           </a:p>
           <a:p>
             <a:pPr lvl="2"/>
             <a:r>
-              <a:rPr lang="en-US" smtClean="0"/>
+              <a:rPr lang="en-US"/>
               <a:t>Third level</a:t>
             </a:r>
           </a:p>
           <a:p>
             <a:pPr lvl="3"/>
             <a:r>
-              <a:rPr lang="en-US" smtClean="0"/>
+              <a:rPr lang="en-US"/>
               <a:t>Fourth level</a:t>
             </a:r>
           </a:p>
           <a:p>
             <a:pPr lvl="4"/>
             <a:r>
-              <a:rPr lang="en-US" smtClean="0"/>
+              <a:rPr lang="en-US"/>
               <a:t>Fifth level</a:t>
             </a:r>
-            <a:endParaRPr lang="en-US"/>
           </a:p>
         </p:txBody>
       </p:sp>
@@ -2133,7 +2117,7 @@
           <a:p>
             <a:fld id="{78C97017-6FC3-485B-9764-EAC9E56C1D49}" type="datetimeFigureOut">
               <a:rPr lang="en-US" smtClean="0"/>
-              <a:t>2/2/2017</a:t>
+              <a:t>3/21/2017</a:t>
             </a:fld>
             <a:endParaRPr lang="en-US"/>
           </a:p>
@@ -2227,10 +2211,9 @@
           <a:lstStyle/>
           <a:p>
             <a:r>
-              <a:rPr lang="en-US" smtClean="0"/>
+              <a:rPr lang="en-US"/>
               <a:t>Click to edit Master title style</a:t>
             </a:r>
-            <a:endParaRPr lang="en-US"/>
           </a:p>
         </p:txBody>
       </p:sp>
@@ -2251,7 +2234,7 @@
           <a:p>
             <a:fld id="{78C97017-6FC3-485B-9764-EAC9E56C1D49}" type="datetimeFigureOut">
               <a:rPr lang="en-US" smtClean="0"/>
-              <a:t>2/2/2017</a:t>
+              <a:t>3/21/2017</a:t>
             </a:fld>
             <a:endParaRPr lang="en-US"/>
           </a:p>
@@ -2346,7 +2329,7 @@
           <a:p>
             <a:fld id="{78C97017-6FC3-485B-9764-EAC9E56C1D49}" type="datetimeFigureOut">
               <a:rPr lang="en-US" smtClean="0"/>
-              <a:t>2/2/2017</a:t>
+              <a:t>3/21/2017</a:t>
             </a:fld>
             <a:endParaRPr lang="en-US"/>
           </a:p>
@@ -2449,10 +2432,9 @@
           </a:lstStyle>
           <a:p>
             <a:r>
-              <a:rPr lang="en-US" smtClean="0"/>
+              <a:rPr lang="en-US"/>
               <a:t>Click to edit Master title style</a:t>
             </a:r>
-            <a:endParaRPr lang="en-US"/>
           </a:p>
         </p:txBody>
       </p:sp>
@@ -2506,38 +2488,37 @@
           <a:p>
             <a:pPr lvl="0"/>
             <a:r>
-              <a:rPr lang="en-US" smtClean="0"/>
+              <a:rPr lang="en-US"/>
               <a:t>Click to edit Master text styles</a:t>
             </a:r>
           </a:p>
           <a:p>
             <a:pPr lvl="1"/>
             <a:r>
-              <a:rPr lang="en-US" smtClean="0"/>
+              <a:rPr lang="en-US"/>
               <a:t>Second level</a:t>
             </a:r>
           </a:p>
           <a:p>
             <a:pPr lvl="2"/>
             <a:r>
-              <a:rPr lang="en-US" smtClean="0"/>
+              <a:rPr lang="en-US"/>
               <a:t>Third level</a:t>
             </a:r>
           </a:p>
           <a:p>
             <a:pPr lvl="3"/>
             <a:r>
-              <a:rPr lang="en-US" smtClean="0"/>
+              <a:rPr lang="en-US"/>
               <a:t>Fourth level</a:t>
             </a:r>
           </a:p>
           <a:p>
             <a:pPr lvl="4"/>
             <a:r>
-              <a:rPr lang="en-US" smtClean="0"/>
+              <a:rPr lang="en-US"/>
               <a:t>Fifth level</a:t>
             </a:r>
-            <a:endParaRPr lang="en-US"/>
           </a:p>
         </p:txBody>
       </p:sp>
@@ -2600,7 +2581,7 @@
           <a:p>
             <a:pPr lvl="0"/>
             <a:r>
-              <a:rPr lang="en-US" smtClean="0"/>
+              <a:rPr lang="en-US"/>
               <a:t>Click to edit Master text styles</a:t>
             </a:r>
           </a:p>
@@ -2623,7 +2604,7 @@
           <a:p>
             <a:fld id="{78C97017-6FC3-485B-9764-EAC9E56C1D49}" type="datetimeFigureOut">
               <a:rPr lang="en-US" smtClean="0"/>
-              <a:t>2/2/2017</a:t>
+              <a:t>3/21/2017</a:t>
             </a:fld>
             <a:endParaRPr lang="en-US"/>
           </a:p>
@@ -2726,10 +2707,9 @@
           </a:lstStyle>
           <a:p>
             <a:r>
-              <a:rPr lang="en-US" smtClean="0"/>
+              <a:rPr lang="en-US"/>
               <a:t>Click to edit Master title style</a:t>
             </a:r>
-            <a:endParaRPr lang="en-US"/>
           </a:p>
         </p:txBody>
       </p:sp>
@@ -2853,7 +2833,7 @@
           <a:p>
             <a:pPr lvl="0"/>
             <a:r>
-              <a:rPr lang="en-US" smtClean="0"/>
+              <a:rPr lang="en-US"/>
               <a:t>Click to edit Master text styles</a:t>
             </a:r>
           </a:p>
@@ -2876,7 +2856,7 @@
           <a:p>
             <a:fld id="{78C97017-6FC3-485B-9764-EAC9E56C1D49}" type="datetimeFigureOut">
               <a:rPr lang="en-US" smtClean="0"/>
-              <a:t>2/2/2017</a:t>
+              <a:t>3/21/2017</a:t>
             </a:fld>
             <a:endParaRPr lang="en-US"/>
           </a:p>
@@ -2985,10 +2965,9 @@
           <a:lstStyle/>
           <a:p>
             <a:r>
-              <a:rPr lang="en-US" smtClean="0"/>
+              <a:rPr lang="en-US"/>
               <a:t>Click to edit Master title style</a:t>
             </a:r>
-            <a:endParaRPr lang="en-US"/>
           </a:p>
         </p:txBody>
       </p:sp>
@@ -3019,38 +2998,37 @@
           <a:p>
             <a:pPr lvl="0"/>
             <a:r>
-              <a:rPr lang="en-US" smtClean="0"/>
+              <a:rPr lang="en-US"/>
               <a:t>Click to edit Master text styles</a:t>
             </a:r>
           </a:p>
           <a:p>
             <a:pPr lvl="1"/>
             <a:r>
-              <a:rPr lang="en-US" smtClean="0"/>
+              <a:rPr lang="en-US"/>
               <a:t>Second level</a:t>
             </a:r>
           </a:p>
           <a:p>
             <a:pPr lvl="2"/>
             <a:r>
-              <a:rPr lang="en-US" smtClean="0"/>
+              <a:rPr lang="en-US"/>
               <a:t>Third level</a:t>
             </a:r>
           </a:p>
           <a:p>
             <a:pPr lvl="3"/>
             <a:r>
-              <a:rPr lang="en-US" smtClean="0"/>
+              <a:rPr lang="en-US"/>
               <a:t>Fourth level</a:t>
             </a:r>
           </a:p>
           <a:p>
             <a:pPr lvl="4"/>
             <a:r>
-              <a:rPr lang="en-US" smtClean="0"/>
+              <a:rPr lang="en-US"/>
               <a:t>Fifth level</a:t>
             </a:r>
-            <a:endParaRPr lang="en-US"/>
           </a:p>
         </p:txBody>
       </p:sp>
@@ -3089,7 +3067,7 @@
           <a:p>
             <a:fld id="{78C97017-6FC3-485B-9764-EAC9E56C1D49}" type="datetimeFigureOut">
               <a:rPr lang="en-US" smtClean="0"/>
-              <a:t>2/2/2017</a:t>
+              <a:t>3/21/2017</a:t>
             </a:fld>
             <a:endParaRPr lang="en-US"/>
           </a:p>
@@ -3625,7 +3603,7 @@
           <a:p>
             <a:pPr algn="ctr"/>
             <a:r>
-              <a:rPr lang="en-US" sz="1050" b="1" dirty="0" err="1" smtClean="0">
+              <a:rPr lang="en-US" sz="1050" b="1" dirty="0" err="1">
                 <a:solidFill>
                   <a:srgbClr val="0070C0"/>
                 </a:solidFill>
@@ -3887,7 +3865,7 @@
           <a:p>
             <a:pPr algn="ctr"/>
             <a:r>
-              <a:rPr lang="en-US" sz="1050" b="1" dirty="0" err="1" smtClean="0">
+              <a:rPr lang="en-US" sz="1050" b="1" dirty="0" err="1">
                 <a:solidFill>
                   <a:srgbClr val="0070C0"/>
                 </a:solidFill>
@@ -3943,7 +3921,7 @@
           <a:p>
             <a:pPr algn="ctr"/>
             <a:r>
-              <a:rPr lang="en-US" sz="1050" b="1" dirty="0" smtClean="0">
+              <a:rPr lang="en-US" sz="1050" b="1" dirty="0">
                 <a:solidFill>
                   <a:srgbClr val="0070C0"/>
                 </a:solidFill>
@@ -3951,14 +3929,14 @@
               <a:t>Incorrect</a:t>
             </a:r>
             <a:br>
-              <a:rPr lang="en-US" sz="1050" b="1" dirty="0" smtClean="0">
+              <a:rPr lang="en-US" sz="1050" b="1" dirty="0">
                 <a:solidFill>
                   <a:srgbClr val="0070C0"/>
                 </a:solidFill>
               </a:rPr>
             </a:br>
             <a:r>
-              <a:rPr lang="en-US" sz="1050" b="1" dirty="0" smtClean="0">
+              <a:rPr lang="en-US" sz="1050" b="1" dirty="0">
                 <a:solidFill>
                   <a:srgbClr val="0070C0"/>
                 </a:solidFill>
@@ -4791,7 +4769,7 @@
           <a:p>
             <a:pPr algn="ctr"/>
             <a:r>
-              <a:rPr lang="en-US" sz="1050" b="1" dirty="0" smtClean="0">
+              <a:rPr lang="en-US" sz="1050" b="1" dirty="0">
                 <a:solidFill>
                   <a:srgbClr val="0070C0"/>
                 </a:solidFill>
@@ -4855,7 +4833,7 @@
         </p:nvSpPr>
         <p:spPr>
           <a:xfrm flipH="1">
-            <a:off x="4664592" y="2148937"/>
+            <a:off x="4831294" y="2148937"/>
             <a:ext cx="1093635" cy="346760"/>
           </a:xfrm>
           <a:prstGeom prst="rect">
@@ -4926,7 +4904,7 @@
         </p:nvSpPr>
         <p:spPr>
           <a:xfrm flipH="1">
-            <a:off x="4664592" y="2555337"/>
+            <a:off x="4831294" y="2555337"/>
             <a:ext cx="1093635" cy="346760"/>
           </a:xfrm>
           <a:prstGeom prst="rect">
@@ -4997,7 +4975,7 @@
         </p:nvSpPr>
         <p:spPr>
           <a:xfrm flipH="1">
-            <a:off x="4664590" y="2977582"/>
+            <a:off x="4831292" y="2977582"/>
             <a:ext cx="1093635" cy="346760"/>
           </a:xfrm>
           <a:prstGeom prst="rect">
@@ -5052,7 +5030,7 @@
         </p:nvSpPr>
         <p:spPr>
           <a:xfrm>
-            <a:off x="2807288" y="1905000"/>
+            <a:off x="3174214" y="1862795"/>
             <a:ext cx="751107" cy="346760"/>
           </a:xfrm>
           <a:prstGeom prst="rect">
@@ -5094,7 +5072,7 @@
           <a:p>
             <a:pPr algn="ctr"/>
             <a:r>
-              <a:rPr lang="en-US" sz="1050" dirty="0" smtClean="0">
+              <a:rPr lang="en-US" sz="1050">
                 <a:solidFill>
                   <a:schemeClr val="bg1"/>
                 </a:solidFill>
@@ -5102,14 +5080,14 @@
               <a:t>Argument</a:t>
             </a:r>
             <a:br>
-              <a:rPr lang="en-US" sz="1050" dirty="0" smtClean="0">
+              <a:rPr lang="en-US" sz="1050">
                 <a:solidFill>
                   <a:schemeClr val="bg1"/>
                 </a:solidFill>
               </a:rPr>
             </a:br>
             <a:r>
-              <a:rPr lang="en-US" sz="1050" dirty="0" smtClean="0">
+              <a:rPr lang="en-US" sz="1050">
                 <a:solidFill>
                   <a:schemeClr val="bg1"/>
                 </a:solidFill>
@@ -5132,7 +5110,7 @@
         </p:nvSpPr>
         <p:spPr>
           <a:xfrm>
-            <a:off x="2813291" y="2432664"/>
+            <a:off x="2238496" y="2454481"/>
             <a:ext cx="726243" cy="174580"/>
           </a:xfrm>
           <a:prstGeom prst="rect">
@@ -5174,7 +5152,7 @@
           <a:p>
             <a:pPr algn="ctr"/>
             <a:r>
-              <a:rPr lang="en-US" sz="1050" dirty="0" smtClean="0">
+              <a:rPr lang="en-US" sz="1050" dirty="0">
                 <a:solidFill>
                   <a:schemeClr val="bg1"/>
                 </a:solidFill>
@@ -5197,9 +5175,9 @@
         </p:nvGrpSpPr>
         <p:grpSpPr>
           <a:xfrm rot="5400000">
-            <a:off x="5941795" y="1962201"/>
+            <a:off x="6088711" y="1962201"/>
             <a:ext cx="254462" cy="555486"/>
-            <a:chOff x="3949242" y="712012"/>
+            <a:chOff x="3949242" y="578739"/>
             <a:chExt cx="254462" cy="503902"/>
           </a:xfrm>
         </p:grpSpPr>
@@ -5211,7 +5189,7 @@
           </p:nvSpPr>
           <p:spPr>
             <a:xfrm rot="16200000">
-              <a:off x="3824522" y="836732"/>
+              <a:off x="3824522" y="703459"/>
               <a:ext cx="503902" cy="254462"/>
             </a:xfrm>
             <a:prstGeom prst="rect">
@@ -5226,7 +5204,7 @@
             <a:lstStyle/>
             <a:p>
               <a:r>
-                <a:rPr lang="en-US" sz="1100" dirty="0" smtClean="0">
+                <a:rPr lang="en-US" sz="1100" dirty="0">
                   <a:solidFill>
                     <a:schemeClr val="accent5">
                       <a:lumMod val="75000"/>
@@ -5253,7 +5231,7 @@
           </p:nvSpPr>
           <p:spPr>
             <a:xfrm rot="10800000" flipV="1">
-              <a:off x="3979474" y="751200"/>
+              <a:off x="3979474" y="617927"/>
               <a:ext cx="132157" cy="79956"/>
             </a:xfrm>
             <a:prstGeom prst="triangle">
@@ -5302,9 +5280,9 @@
         </p:nvGrpSpPr>
         <p:grpSpPr>
           <a:xfrm rot="5400000">
-            <a:off x="5962853" y="2347569"/>
+            <a:off x="6098740" y="2390577"/>
             <a:ext cx="254462" cy="555486"/>
-            <a:chOff x="3949242" y="712012"/>
+            <a:chOff x="3965759" y="592436"/>
             <a:chExt cx="254462" cy="503902"/>
           </a:xfrm>
         </p:grpSpPr>
@@ -5316,7 +5294,7 @@
           </p:nvSpPr>
           <p:spPr>
             <a:xfrm rot="16200000">
-              <a:off x="3824522" y="836732"/>
+              <a:off x="3841039" y="717156"/>
               <a:ext cx="503902" cy="254462"/>
             </a:xfrm>
             <a:prstGeom prst="rect">
@@ -5331,7 +5309,7 @@
             <a:lstStyle/>
             <a:p>
               <a:r>
-                <a:rPr lang="en-US" sz="1100" dirty="0" smtClean="0">
+                <a:rPr lang="en-US" sz="1100" dirty="0">
                   <a:solidFill>
                     <a:schemeClr val="accent5">
                       <a:lumMod val="75000"/>
@@ -5358,7 +5336,7 @@
           </p:nvSpPr>
           <p:spPr>
             <a:xfrm rot="10800000" flipV="1">
-              <a:off x="3979474" y="751200"/>
+              <a:off x="3995991" y="631624"/>
               <a:ext cx="132157" cy="79956"/>
             </a:xfrm>
             <a:prstGeom prst="triangle">
@@ -5407,7 +5385,7 @@
         </p:nvSpPr>
         <p:spPr>
           <a:xfrm>
-            <a:off x="2819400" y="2841725"/>
+            <a:off x="3186326" y="2841725"/>
             <a:ext cx="731636" cy="283820"/>
           </a:xfrm>
           <a:prstGeom prst="rect">
@@ -5449,7 +5427,7 @@
           <a:p>
             <a:pPr algn="ctr"/>
             <a:r>
-              <a:rPr lang="en-SG" sz="1050" dirty="0" err="1" smtClean="0">
+              <a:rPr lang="en-SG" sz="1050" dirty="0" err="1">
                 <a:solidFill>
                   <a:schemeClr val="bg1"/>
                 </a:solidFill>
@@ -5472,7 +5450,7 @@
         </p:nvSpPr>
         <p:spPr>
           <a:xfrm>
-            <a:off x="2819400" y="3190882"/>
+            <a:off x="3186326" y="3190882"/>
             <a:ext cx="731636" cy="283820"/>
           </a:xfrm>
           <a:prstGeom prst="rect">
@@ -5514,7 +5492,7 @@
           <a:p>
             <a:pPr algn="ctr"/>
             <a:r>
-              <a:rPr lang="en-SG" sz="1050" dirty="0" err="1" smtClean="0">
+              <a:rPr lang="en-SG" sz="1050" dirty="0" err="1">
                 <a:solidFill>
                   <a:schemeClr val="bg1"/>
                 </a:solidFill>
@@ -5533,13 +5511,14 @@
         <p:nvCxnSpPr>
           <p:cNvPr id="100" name="Straight Arrow Connector 99"/>
           <p:cNvCxnSpPr>
+            <a:cxnSpLocks/>
             <a:endCxn id="60" idx="3"/>
           </p:cNvCxnSpPr>
           <p:nvPr/>
         </p:nvCxnSpPr>
         <p:spPr>
           <a:xfrm flipH="1">
-            <a:off x="3551036" y="2983635"/>
+            <a:off x="3917962" y="2983635"/>
             <a:ext cx="335164" cy="0"/>
           </a:xfrm>
           <a:prstGeom prst="straightConnector1">
@@ -5575,13 +5554,16 @@
       <p:cxnSp>
         <p:nvCxnSpPr>
           <p:cNvPr id="105" name="Straight Arrow Connector 104"/>
-          <p:cNvCxnSpPr/>
+          <p:cNvCxnSpPr>
+            <a:cxnSpLocks/>
+            <a:endCxn id="62" idx="3"/>
+          </p:cNvCxnSpPr>
           <p:nvPr/>
         </p:nvCxnSpPr>
         <p:spPr>
-          <a:xfrm flipH="1" flipV="1">
-            <a:off x="3558396" y="3297471"/>
-            <a:ext cx="327804" cy="5426"/>
+          <a:xfrm flipH="1">
+            <a:off x="3917962" y="3332439"/>
+            <a:ext cx="335164" cy="353"/>
           </a:xfrm>
           <a:prstGeom prst="straightConnector1">
             <a:avLst/>
@@ -5617,19 +5599,19 @@
         <p:nvCxnSpPr>
           <p:cNvPr id="13" name="Elbow Connector 12"/>
           <p:cNvCxnSpPr>
-            <a:stCxn id="60" idx="0"/>
+            <a:cxnSpLocks/>
+            <a:stCxn id="60" idx="1"/>
+            <a:endCxn id="58" idx="2"/>
           </p:cNvCxnSpPr>
           <p:nvPr/>
         </p:nvCxnSpPr>
         <p:spPr>
-          <a:xfrm rot="16200000" flipV="1">
-            <a:off x="3063575" y="2720082"/>
-            <a:ext cx="234481" cy="8806"/>
-          </a:xfrm>
-          <a:prstGeom prst="bentConnector3">
-            <a:avLst>
-              <a:gd name="adj1" fmla="val 50000"/>
-            </a:avLst>
+          <a:xfrm rot="10800000">
+            <a:off x="2601618" y="2629061"/>
+            <a:ext cx="584708" cy="354574"/>
+          </a:xfrm>
+          <a:prstGeom prst="bentConnector2">
+            <a:avLst/>
           </a:prstGeom>
           <a:ln w="19050">
             <a:solidFill>
@@ -5662,13 +5644,16 @@
       <p:cxnSp>
         <p:nvCxnSpPr>
           <p:cNvPr id="47" name="Straight Connector 46"/>
-          <p:cNvCxnSpPr/>
+          <p:cNvCxnSpPr>
+            <a:cxnSpLocks/>
+            <a:stCxn id="56" idx="3"/>
+          </p:cNvCxnSpPr>
           <p:nvPr/>
         </p:nvCxnSpPr>
         <p:spPr>
           <a:xfrm>
-            <a:off x="3539534" y="2078487"/>
-            <a:ext cx="346666" cy="0"/>
+            <a:off x="3925321" y="2036175"/>
+            <a:ext cx="327805" cy="107"/>
           </a:xfrm>
           <a:prstGeom prst="line">
             <a:avLst/>
@@ -5704,20 +5689,19 @@
         <p:nvCxnSpPr>
           <p:cNvPr id="50" name="Elbow Connector 49"/>
           <p:cNvCxnSpPr>
-            <a:stCxn id="56" idx="2"/>
+            <a:cxnSpLocks/>
+            <a:stCxn id="56" idx="1"/>
             <a:endCxn id="58" idx="0"/>
           </p:cNvCxnSpPr>
           <p:nvPr/>
         </p:nvCxnSpPr>
         <p:spPr>
-          <a:xfrm rot="5400000">
-            <a:off x="3089176" y="2338998"/>
-            <a:ext cx="180904" cy="6429"/>
-          </a:xfrm>
-          <a:prstGeom prst="bentConnector3">
-            <a:avLst>
-              <a:gd name="adj1" fmla="val 50000"/>
-            </a:avLst>
+          <a:xfrm rot="10800000" flipV="1">
+            <a:off x="2601618" y="2036175"/>
+            <a:ext cx="572596" cy="418306"/>
+          </a:xfrm>
+          <a:prstGeom prst="bentConnector2">
+            <a:avLst/>
           </a:prstGeom>
           <a:ln w="19050">
             <a:solidFill>
@@ -5755,9 +5739,9 @@
         </p:nvGrpSpPr>
         <p:grpSpPr>
           <a:xfrm rot="5400000">
-            <a:off x="4090826" y="3633626"/>
+            <a:off x="4346209" y="3538793"/>
             <a:ext cx="555486" cy="254462"/>
-            <a:chOff x="3798139" y="875689"/>
+            <a:chOff x="3703306" y="644022"/>
             <a:chExt cx="555486" cy="230832"/>
           </a:xfrm>
         </p:grpSpPr>
@@ -5769,7 +5753,7 @@
           </p:nvSpPr>
           <p:spPr>
             <a:xfrm rot="10800000">
-              <a:off x="3798139" y="875689"/>
+              <a:off x="3703306" y="644022"/>
               <a:ext cx="555486" cy="230832"/>
             </a:xfrm>
             <a:prstGeom prst="rect">
@@ -5784,7 +5768,7 @@
             <a:lstStyle/>
             <a:p>
               <a:r>
-                <a:rPr lang="en-US" sz="1100" dirty="0" smtClean="0">
+                <a:rPr lang="en-US" sz="1100" dirty="0">
                   <a:solidFill>
                     <a:schemeClr val="accent5">
                       <a:lumMod val="75000"/>
@@ -5811,7 +5795,7 @@
           </p:nvSpPr>
           <p:spPr>
             <a:xfrm rot="5400000" flipV="1">
-              <a:off x="3795127" y="973354"/>
+              <a:off x="3700294" y="741689"/>
               <a:ext cx="119885" cy="88141"/>
             </a:xfrm>
             <a:prstGeom prst="triangle">
@@ -6066,145 +6050,7 @@
         <p:spPr>
           <a:xfrm flipV="1">
             <a:off x="4114800" y="3150962"/>
-            <a:ext cx="549790" cy="797920"/>
-          </a:xfrm>
-          <a:prstGeom prst="bentConnector3">
-            <a:avLst>
-              <a:gd name="adj1" fmla="val 14720"/>
-            </a:avLst>
-          </a:prstGeom>
-          <a:ln w="19050">
-            <a:solidFill>
-              <a:schemeClr val="accent5">
-                <a:lumMod val="75000"/>
-              </a:schemeClr>
-            </a:solidFill>
-            <a:prstDash val="sysDot"/>
-            <a:headEnd type="none" w="med" len="med"/>
-            <a:tailEnd type="arrow" w="med" len="med"/>
-          </a:ln>
-          <a:effectLst/>
-        </p:spPr>
-        <p:style>
-          <a:lnRef idx="1">
-            <a:schemeClr val="accent2"/>
-          </a:lnRef>
-          <a:fillRef idx="2">
-            <a:schemeClr val="accent2"/>
-          </a:fillRef>
-          <a:effectRef idx="1">
-            <a:schemeClr val="accent2"/>
-          </a:effectRef>
-          <a:fontRef idx="minor">
-            <a:schemeClr val="dk1"/>
-          </a:fontRef>
-        </p:style>
-      </p:cxnSp>
-      <p:cxnSp>
-        <p:nvCxnSpPr>
-          <p:cNvPr id="113" name="Elbow Connector 63"/>
-          <p:cNvCxnSpPr>
-            <a:stCxn id="16" idx="3"/>
-            <a:endCxn id="44" idx="3"/>
-          </p:cNvCxnSpPr>
-          <p:nvPr/>
-        </p:nvCxnSpPr>
-        <p:spPr>
-          <a:xfrm flipV="1">
-            <a:off x="4114800" y="2728717"/>
-            <a:ext cx="549792" cy="1220165"/>
-          </a:xfrm>
-          <a:prstGeom prst="bentConnector3">
-            <a:avLst>
-              <a:gd name="adj1" fmla="val 14720"/>
-            </a:avLst>
-          </a:prstGeom>
-          <a:ln w="19050">
-            <a:solidFill>
-              <a:schemeClr val="accent5">
-                <a:lumMod val="75000"/>
-              </a:schemeClr>
-            </a:solidFill>
-            <a:prstDash val="sysDot"/>
-            <a:headEnd type="none" w="med" len="med"/>
-            <a:tailEnd type="arrow" w="med" len="med"/>
-          </a:ln>
-          <a:effectLst/>
-        </p:spPr>
-        <p:style>
-          <a:lnRef idx="1">
-            <a:schemeClr val="accent2"/>
-          </a:lnRef>
-          <a:fillRef idx="2">
-            <a:schemeClr val="accent2"/>
-          </a:fillRef>
-          <a:effectRef idx="1">
-            <a:schemeClr val="accent2"/>
-          </a:effectRef>
-          <a:fontRef idx="minor">
-            <a:schemeClr val="dk1"/>
-          </a:fontRef>
-        </p:style>
-      </p:cxnSp>
-      <p:cxnSp>
-        <p:nvCxnSpPr>
-          <p:cNvPr id="116" name="Elbow Connector 63"/>
-          <p:cNvCxnSpPr>
-            <a:stCxn id="16" idx="3"/>
-            <a:endCxn id="42" idx="3"/>
-          </p:cNvCxnSpPr>
-          <p:nvPr/>
-        </p:nvCxnSpPr>
-        <p:spPr>
-          <a:xfrm flipV="1">
-            <a:off x="4114800" y="2322317"/>
-            <a:ext cx="549792" cy="1626565"/>
-          </a:xfrm>
-          <a:prstGeom prst="bentConnector3">
-            <a:avLst>
-              <a:gd name="adj1" fmla="val 14721"/>
-            </a:avLst>
-          </a:prstGeom>
-          <a:ln w="19050">
-            <a:solidFill>
-              <a:schemeClr val="accent5">
-                <a:lumMod val="75000"/>
-              </a:schemeClr>
-            </a:solidFill>
-            <a:prstDash val="sysDot"/>
-            <a:headEnd type="none" w="med" len="med"/>
-            <a:tailEnd type="arrow" w="med" len="med"/>
-          </a:ln>
-          <a:effectLst/>
-        </p:spPr>
-        <p:style>
-          <a:lnRef idx="1">
-            <a:schemeClr val="accent2"/>
-          </a:lnRef>
-          <a:fillRef idx="2">
-            <a:schemeClr val="accent2"/>
-          </a:fillRef>
-          <a:effectRef idx="1">
-            <a:schemeClr val="accent2"/>
-          </a:effectRef>
-          <a:fontRef idx="minor">
-            <a:schemeClr val="dk1"/>
-          </a:fontRef>
-        </p:style>
-      </p:cxnSp>
-      <p:cxnSp>
-        <p:nvCxnSpPr>
-          <p:cNvPr id="120" name="Elbow Connector 63"/>
-          <p:cNvCxnSpPr>
-            <a:stCxn id="44" idx="1"/>
-            <a:endCxn id="10" idx="3"/>
-          </p:cNvCxnSpPr>
-          <p:nvPr/>
-        </p:nvCxnSpPr>
-        <p:spPr>
-          <a:xfrm flipV="1">
-            <a:off x="5758227" y="2728300"/>
-            <a:ext cx="768138" cy="417"/>
+            <a:ext cx="716492" cy="797920"/>
           </a:xfrm>
           <a:prstGeom prst="bentConnector3">
             <a:avLst>
@@ -6240,17 +6086,17 @@
       </p:cxnSp>
       <p:cxnSp>
         <p:nvCxnSpPr>
-          <p:cNvPr id="122" name="Elbow Connector 63"/>
+          <p:cNvPr id="113" name="Elbow Connector 63"/>
           <p:cNvCxnSpPr>
-            <a:stCxn id="42" idx="1"/>
-            <a:endCxn id="4" idx="3"/>
+            <a:stCxn id="16" idx="3"/>
+            <a:endCxn id="44" idx="3"/>
           </p:cNvCxnSpPr>
           <p:nvPr/>
         </p:nvCxnSpPr>
         <p:spPr>
-          <a:xfrm>
-            <a:off x="5758227" y="2322317"/>
-            <a:ext cx="762000" cy="230"/>
+          <a:xfrm flipV="1">
+            <a:off x="4114800" y="2728717"/>
+            <a:ext cx="716494" cy="1220165"/>
           </a:xfrm>
           <a:prstGeom prst="bentConnector3">
             <a:avLst>
@@ -6286,14 +6132,156 @@
       </p:cxnSp>
       <p:cxnSp>
         <p:nvCxnSpPr>
-          <p:cNvPr id="64" name="Straight Connector 63"/>
-          <p:cNvCxnSpPr/>
+          <p:cNvPr id="116" name="Elbow Connector 63"/>
+          <p:cNvCxnSpPr>
+            <a:stCxn id="16" idx="3"/>
+            <a:endCxn id="42" idx="3"/>
+          </p:cNvCxnSpPr>
           <p:nvPr/>
         </p:nvCxnSpPr>
         <p:spPr>
+          <a:xfrm flipV="1">
+            <a:off x="4114800" y="2322317"/>
+            <a:ext cx="716494" cy="1626565"/>
+          </a:xfrm>
+          <a:prstGeom prst="bentConnector3">
+            <a:avLst>
+              <a:gd name="adj1" fmla="val 50000"/>
+            </a:avLst>
+          </a:prstGeom>
+          <a:ln w="19050">
+            <a:solidFill>
+              <a:schemeClr val="accent5">
+                <a:lumMod val="75000"/>
+              </a:schemeClr>
+            </a:solidFill>
+            <a:prstDash val="sysDot"/>
+            <a:headEnd type="none" w="med" len="med"/>
+            <a:tailEnd type="arrow" w="med" len="med"/>
+          </a:ln>
+          <a:effectLst/>
+        </p:spPr>
+        <p:style>
+          <a:lnRef idx="1">
+            <a:schemeClr val="accent2"/>
+          </a:lnRef>
+          <a:fillRef idx="2">
+            <a:schemeClr val="accent2"/>
+          </a:fillRef>
+          <a:effectRef idx="1">
+            <a:schemeClr val="accent2"/>
+          </a:effectRef>
+          <a:fontRef idx="minor">
+            <a:schemeClr val="dk1"/>
+          </a:fontRef>
+        </p:style>
+      </p:cxnSp>
+      <p:cxnSp>
+        <p:nvCxnSpPr>
+          <p:cNvPr id="120" name="Elbow Connector 63"/>
+          <p:cNvCxnSpPr>
+            <a:cxnSpLocks/>
+            <a:stCxn id="44" idx="1"/>
+            <a:endCxn id="10" idx="3"/>
+          </p:cNvCxnSpPr>
+          <p:nvPr/>
+        </p:nvCxnSpPr>
+        <p:spPr>
+          <a:xfrm flipV="1">
+            <a:off x="5924929" y="2728300"/>
+            <a:ext cx="601436" cy="417"/>
+          </a:xfrm>
+          <a:prstGeom prst="bentConnector3">
+            <a:avLst>
+              <a:gd name="adj1" fmla="val 50000"/>
+            </a:avLst>
+          </a:prstGeom>
+          <a:ln w="19050">
+            <a:solidFill>
+              <a:schemeClr val="accent5">
+                <a:lumMod val="75000"/>
+              </a:schemeClr>
+            </a:solidFill>
+            <a:prstDash val="sysDot"/>
+            <a:headEnd type="none" w="med" len="med"/>
+            <a:tailEnd type="arrow" w="med" len="med"/>
+          </a:ln>
+          <a:effectLst/>
+        </p:spPr>
+        <p:style>
+          <a:lnRef idx="1">
+            <a:schemeClr val="accent2"/>
+          </a:lnRef>
+          <a:fillRef idx="2">
+            <a:schemeClr val="accent2"/>
+          </a:fillRef>
+          <a:effectRef idx="1">
+            <a:schemeClr val="accent2"/>
+          </a:effectRef>
+          <a:fontRef idx="minor">
+            <a:schemeClr val="dk1"/>
+          </a:fontRef>
+        </p:style>
+      </p:cxnSp>
+      <p:cxnSp>
+        <p:nvCxnSpPr>
+          <p:cNvPr id="122" name="Elbow Connector 63"/>
+          <p:cNvCxnSpPr>
+            <a:cxnSpLocks/>
+            <a:stCxn id="42" idx="1"/>
+            <a:endCxn id="4" idx="3"/>
+          </p:cNvCxnSpPr>
+          <p:nvPr/>
+        </p:nvCxnSpPr>
+        <p:spPr>
           <a:xfrm>
-            <a:off x="3886200" y="2078487"/>
-            <a:ext cx="0" cy="1218984"/>
+            <a:off x="5924929" y="2322317"/>
+            <a:ext cx="595298" cy="230"/>
+          </a:xfrm>
+          <a:prstGeom prst="bentConnector3">
+            <a:avLst>
+              <a:gd name="adj1" fmla="val 50000"/>
+            </a:avLst>
+          </a:prstGeom>
+          <a:ln w="19050">
+            <a:solidFill>
+              <a:schemeClr val="accent5">
+                <a:lumMod val="75000"/>
+              </a:schemeClr>
+            </a:solidFill>
+            <a:prstDash val="sysDot"/>
+            <a:headEnd type="none" w="med" len="med"/>
+            <a:tailEnd type="arrow" w="med" len="med"/>
+          </a:ln>
+          <a:effectLst/>
+        </p:spPr>
+        <p:style>
+          <a:lnRef idx="1">
+            <a:schemeClr val="accent2"/>
+          </a:lnRef>
+          <a:fillRef idx="2">
+            <a:schemeClr val="accent2"/>
+          </a:fillRef>
+          <a:effectRef idx="1">
+            <a:schemeClr val="accent2"/>
+          </a:effectRef>
+          <a:fontRef idx="minor">
+            <a:schemeClr val="dk1"/>
+          </a:fontRef>
+        </p:style>
+      </p:cxnSp>
+      <p:cxnSp>
+        <p:nvCxnSpPr>
+          <p:cNvPr id="64" name="Straight Connector 63"/>
+          <p:cNvCxnSpPr>
+            <a:cxnSpLocks/>
+          </p:cNvCxnSpPr>
+          <p:nvPr/>
+        </p:nvCxnSpPr>
+        <p:spPr>
+          <a:xfrm>
+            <a:off x="4248488" y="2033984"/>
+            <a:ext cx="0" cy="1304815"/>
           </a:xfrm>
           <a:prstGeom prst="line">
             <a:avLst/>
@@ -6328,13 +6316,15 @@
       <p:cxnSp>
         <p:nvCxnSpPr>
           <p:cNvPr id="66" name="Straight Connector 65"/>
-          <p:cNvCxnSpPr/>
+          <p:cNvCxnSpPr>
+            <a:cxnSpLocks/>
+          </p:cNvCxnSpPr>
           <p:nvPr/>
         </p:nvCxnSpPr>
         <p:spPr>
           <a:xfrm>
-            <a:off x="3894672" y="2209800"/>
-            <a:ext cx="769918" cy="0"/>
+            <a:off x="4248488" y="2209800"/>
+            <a:ext cx="582002" cy="0"/>
           </a:xfrm>
           <a:prstGeom prst="line">
             <a:avLst/>
@@ -6369,13 +6359,15 @@
       <p:cxnSp>
         <p:nvCxnSpPr>
           <p:cNvPr id="73" name="Straight Connector 72"/>
-          <p:cNvCxnSpPr/>
+          <p:cNvCxnSpPr>
+            <a:cxnSpLocks/>
+          </p:cNvCxnSpPr>
           <p:nvPr/>
         </p:nvCxnSpPr>
         <p:spPr>
-          <a:xfrm>
-            <a:off x="3886200" y="2607244"/>
-            <a:ext cx="769918" cy="0"/>
+          <a:xfrm flipV="1">
+            <a:off x="4255042" y="2607245"/>
+            <a:ext cx="566976" cy="5974"/>
           </a:xfrm>
           <a:prstGeom prst="line">
             <a:avLst/>
@@ -6410,13 +6402,15 @@
       <p:cxnSp>
         <p:nvCxnSpPr>
           <p:cNvPr id="74" name="Straight Connector 73"/>
-          <p:cNvCxnSpPr/>
+          <p:cNvCxnSpPr>
+            <a:cxnSpLocks/>
+          </p:cNvCxnSpPr>
           <p:nvPr/>
         </p:nvCxnSpPr>
         <p:spPr>
           <a:xfrm>
-            <a:off x="3886200" y="3048000"/>
-            <a:ext cx="769918" cy="0"/>
+            <a:off x="4248487" y="3048000"/>
+            <a:ext cx="573531" cy="0"/>
           </a:xfrm>
           <a:prstGeom prst="line">
             <a:avLst/>
@@ -6429,6 +6423,221 @@
             </a:solidFill>
             <a:prstDash val="sysDot"/>
             <a:headEnd type="none" w="med" len="med"/>
+            <a:tailEnd type="none" w="med" len="med"/>
+          </a:ln>
+          <a:effectLst/>
+        </p:spPr>
+        <p:style>
+          <a:lnRef idx="1">
+            <a:schemeClr val="accent2"/>
+          </a:lnRef>
+          <a:fillRef idx="2">
+            <a:schemeClr val="accent2"/>
+          </a:fillRef>
+          <a:effectRef idx="1">
+            <a:schemeClr val="accent2"/>
+          </a:effectRef>
+          <a:fontRef idx="minor">
+            <a:schemeClr val="dk1"/>
+          </a:fontRef>
+        </p:style>
+      </p:cxnSp>
+      <p:sp>
+        <p:nvSpPr>
+          <p:cNvPr id="109" name="Rectangle 62"/>
+          <p:cNvSpPr/>
+          <p:nvPr/>
+        </p:nvSpPr>
+        <p:spPr>
+          <a:xfrm>
+            <a:off x="3174214" y="2370131"/>
+            <a:ext cx="750156" cy="340758"/>
+          </a:xfrm>
+          <a:prstGeom prst="rect">
+            <a:avLst/>
+          </a:prstGeom>
+          <a:solidFill>
+            <a:schemeClr val="accent5">
+              <a:lumMod val="60000"/>
+              <a:lumOff val="40000"/>
+            </a:schemeClr>
+          </a:solidFill>
+          <a:ln w="19050">
+            <a:solidFill>
+              <a:schemeClr val="accent5">
+                <a:lumMod val="60000"/>
+                <a:lumOff val="40000"/>
+              </a:schemeClr>
+            </a:solidFill>
+          </a:ln>
+          <a:effectLst/>
+        </p:spPr>
+        <p:style>
+          <a:lnRef idx="1">
+            <a:schemeClr val="accent2"/>
+          </a:lnRef>
+          <a:fillRef idx="2">
+            <a:schemeClr val="accent2"/>
+          </a:fillRef>
+          <a:effectRef idx="1">
+            <a:schemeClr val="accent2"/>
+          </a:effectRef>
+          <a:fontRef idx="minor">
+            <a:schemeClr val="dk1"/>
+          </a:fontRef>
+        </p:style>
+        <p:txBody>
+          <a:bodyPr rtlCol="0" anchor="ctr"/>
+          <a:lstStyle/>
+          <a:p>
+            <a:pPr algn="ctr"/>
+            <a:r>
+              <a:rPr lang="en-SG" sz="1050" dirty="0">
+                <a:solidFill>
+                  <a:schemeClr val="bg1"/>
+                </a:solidFill>
+              </a:rPr>
+              <a:t>Argument</a:t>
+            </a:r>
+            <a:br>
+              <a:rPr lang="en-SG" sz="1050" dirty="0">
+                <a:solidFill>
+                  <a:schemeClr val="bg1"/>
+                </a:solidFill>
+              </a:rPr>
+            </a:br>
+            <a:r>
+              <a:rPr lang="en-SG" sz="1050" dirty="0">
+                <a:solidFill>
+                  <a:schemeClr val="bg1"/>
+                </a:solidFill>
+              </a:rPr>
+              <a:t>Multimap</a:t>
+            </a:r>
+          </a:p>
+        </p:txBody>
+      </p:sp>
+      <p:cxnSp>
+        <p:nvCxnSpPr>
+          <p:cNvPr id="112" name="Elbow Connector 12"/>
+          <p:cNvCxnSpPr>
+            <a:cxnSpLocks/>
+            <a:stCxn id="109" idx="1"/>
+            <a:endCxn id="58" idx="3"/>
+          </p:cNvCxnSpPr>
+          <p:nvPr/>
+        </p:nvCxnSpPr>
+        <p:spPr>
+          <a:xfrm rot="10800000" flipV="1">
+            <a:off x="2964740" y="2540509"/>
+            <a:ext cx="209475" cy="1261"/>
+          </a:xfrm>
+          <a:prstGeom prst="bentConnector3">
+            <a:avLst>
+              <a:gd name="adj1" fmla="val 50000"/>
+            </a:avLst>
+          </a:prstGeom>
+          <a:ln w="19050">
+            <a:solidFill>
+              <a:schemeClr val="accent5">
+                <a:lumMod val="60000"/>
+                <a:lumOff val="40000"/>
+              </a:schemeClr>
+            </a:solidFill>
+            <a:prstDash val="sysDot"/>
+            <a:headEnd type="none" w="med" len="med"/>
+            <a:tailEnd type="arrow" w="med" len="med"/>
+          </a:ln>
+          <a:effectLst/>
+        </p:spPr>
+        <p:style>
+          <a:lnRef idx="1">
+            <a:schemeClr val="accent2"/>
+          </a:lnRef>
+          <a:fillRef idx="2">
+            <a:schemeClr val="accent2"/>
+          </a:fillRef>
+          <a:effectRef idx="1">
+            <a:schemeClr val="accent2"/>
+          </a:effectRef>
+          <a:fontRef idx="minor">
+            <a:schemeClr val="dk1"/>
+          </a:fontRef>
+        </p:style>
+      </p:cxnSp>
+      <p:cxnSp>
+        <p:nvCxnSpPr>
+          <p:cNvPr id="118" name="Elbow Connector 49"/>
+          <p:cNvCxnSpPr>
+            <a:cxnSpLocks/>
+            <a:stCxn id="56" idx="2"/>
+            <a:endCxn id="109" idx="0"/>
+          </p:cNvCxnSpPr>
+          <p:nvPr/>
+        </p:nvCxnSpPr>
+        <p:spPr>
+          <a:xfrm rot="5400000">
+            <a:off x="3469242" y="2289605"/>
+            <a:ext cx="160576" cy="476"/>
+          </a:xfrm>
+          <a:prstGeom prst="bentConnector3">
+            <a:avLst>
+              <a:gd name="adj1" fmla="val 50000"/>
+            </a:avLst>
+          </a:prstGeom>
+          <a:ln w="19050">
+            <a:solidFill>
+              <a:schemeClr val="accent5">
+                <a:lumMod val="60000"/>
+                <a:lumOff val="40000"/>
+              </a:schemeClr>
+            </a:solidFill>
+            <a:prstDash val="sysDot"/>
+            <a:headEnd type="none" w="med" len="med"/>
+            <a:tailEnd type="arrow" w="med" len="med"/>
+          </a:ln>
+          <a:effectLst/>
+        </p:spPr>
+        <p:style>
+          <a:lnRef idx="1">
+            <a:schemeClr val="accent2"/>
+          </a:lnRef>
+          <a:fillRef idx="2">
+            <a:schemeClr val="accent2"/>
+          </a:fillRef>
+          <a:effectRef idx="1">
+            <a:schemeClr val="accent2"/>
+          </a:effectRef>
+          <a:fontRef idx="minor">
+            <a:schemeClr val="dk1"/>
+          </a:fontRef>
+        </p:style>
+      </p:cxnSp>
+      <p:cxnSp>
+        <p:nvCxnSpPr>
+          <p:cNvPr id="123" name="Straight Connector 122"/>
+          <p:cNvCxnSpPr>
+            <a:cxnSpLocks/>
+            <a:stCxn id="109" idx="3"/>
+          </p:cNvCxnSpPr>
+          <p:nvPr/>
+        </p:nvCxnSpPr>
+        <p:spPr>
+          <a:xfrm flipV="1">
+            <a:off x="3924370" y="2535795"/>
+            <a:ext cx="322202" cy="4715"/>
+          </a:xfrm>
+          <a:prstGeom prst="line">
+            <a:avLst/>
+          </a:prstGeom>
+          <a:ln w="19050">
+            <a:solidFill>
+              <a:schemeClr val="accent5">
+                <a:lumMod val="50000"/>
+              </a:schemeClr>
+            </a:solidFill>
+            <a:prstDash val="sysDot"/>
+            <a:headEnd type="arrow" w="med" len="med"/>
             <a:tailEnd type="none" w="med" len="med"/>
           </a:ln>
           <a:effectLst/>

</xml_diff>

<commit_message>
Interdiff between v12 and v13
</commit_message>
<xml_diff>
--- a/docs/diagrams/LogicComponentClassDiagram.pptx
+++ b/docs/diagrams/LogicComponentClassDiagram.pptx
@@ -208,7 +208,7 @@
           <a:p>
             <a:fld id="{F5CC4B3F-88C1-4FFA-B1B6-F41C21DC6924}" type="datetimeFigureOut">
               <a:rPr lang="en-US" smtClean="0"/>
-              <a:t>2/2/2017</a:t>
+              <a:t>3/14/2017</a:t>
             </a:fld>
             <a:endParaRPr lang="en-US"/>
           </a:p>
@@ -272,38 +272,37 @@
           <a:p>
             <a:pPr lvl="0"/>
             <a:r>
-              <a:rPr lang="en-US" smtClean="0"/>
+              <a:rPr lang="en-US"/>
               <a:t>Click to edit Master text styles</a:t>
             </a:r>
           </a:p>
           <a:p>
             <a:pPr lvl="1"/>
             <a:r>
-              <a:rPr lang="en-US" smtClean="0"/>
+              <a:rPr lang="en-US"/>
               <a:t>Second level</a:t>
             </a:r>
           </a:p>
           <a:p>
             <a:pPr lvl="2"/>
             <a:r>
-              <a:rPr lang="en-US" smtClean="0"/>
+              <a:rPr lang="en-US"/>
               <a:t>Third level</a:t>
             </a:r>
           </a:p>
           <a:p>
             <a:pPr lvl="3"/>
             <a:r>
-              <a:rPr lang="en-US" smtClean="0"/>
+              <a:rPr lang="en-US"/>
               <a:t>Fourth level</a:t>
             </a:r>
           </a:p>
           <a:p>
             <a:pPr lvl="4"/>
             <a:r>
-              <a:rPr lang="en-US" smtClean="0"/>
+              <a:rPr lang="en-US"/>
               <a:t>Fifth level</a:t>
             </a:r>
-            <a:endParaRPr lang="en-US"/>
           </a:p>
         </p:txBody>
       </p:sp>
@@ -514,10 +513,9 @@
           <a:lstStyle/>
           <a:p>
             <a:r>
-              <a:rPr lang="en-US" smtClean="0"/>
+              <a:rPr lang="en-US"/>
               <a:t>Click to edit Master title style</a:t>
             </a:r>
-            <a:endParaRPr lang="en-US"/>
           </a:p>
         </p:txBody>
       </p:sp>
@@ -633,10 +631,9 @@
           </a:lstStyle>
           <a:p>
             <a:r>
-              <a:rPr lang="en-US" smtClean="0"/>
+              <a:rPr lang="en-US"/>
               <a:t>Click to edit Master subtitle style</a:t>
             </a:r>
-            <a:endParaRPr lang="en-US"/>
           </a:p>
         </p:txBody>
       </p:sp>
@@ -657,7 +654,7 @@
           <a:p>
             <a:fld id="{78C97017-6FC3-485B-9764-EAC9E56C1D49}" type="datetimeFigureOut">
               <a:rPr lang="en-US" smtClean="0"/>
-              <a:t>2/2/2017</a:t>
+              <a:t>3/14/2017</a:t>
             </a:fld>
             <a:endParaRPr lang="en-US"/>
           </a:p>
@@ -751,10 +748,9 @@
           <a:lstStyle/>
           <a:p>
             <a:r>
-              <a:rPr lang="en-US" smtClean="0"/>
+              <a:rPr lang="en-US"/>
               <a:t>Click to edit Master title style</a:t>
             </a:r>
-            <a:endParaRPr lang="en-US"/>
           </a:p>
         </p:txBody>
       </p:sp>
@@ -775,38 +771,37 @@
           <a:p>
             <a:pPr lvl="0"/>
             <a:r>
-              <a:rPr lang="en-US" smtClean="0"/>
+              <a:rPr lang="en-US"/>
               <a:t>Click to edit Master text styles</a:t>
             </a:r>
           </a:p>
           <a:p>
             <a:pPr lvl="1"/>
             <a:r>
-              <a:rPr lang="en-US" smtClean="0"/>
+              <a:rPr lang="en-US"/>
               <a:t>Second level</a:t>
             </a:r>
           </a:p>
           <a:p>
             <a:pPr lvl="2"/>
             <a:r>
-              <a:rPr lang="en-US" smtClean="0"/>
+              <a:rPr lang="en-US"/>
               <a:t>Third level</a:t>
             </a:r>
           </a:p>
           <a:p>
             <a:pPr lvl="3"/>
             <a:r>
-              <a:rPr lang="en-US" smtClean="0"/>
+              <a:rPr lang="en-US"/>
               <a:t>Fourth level</a:t>
             </a:r>
           </a:p>
           <a:p>
             <a:pPr lvl="4"/>
             <a:r>
-              <a:rPr lang="en-US" smtClean="0"/>
+              <a:rPr lang="en-US"/>
               <a:t>Fifth level</a:t>
             </a:r>
-            <a:endParaRPr lang="en-US"/>
           </a:p>
         </p:txBody>
       </p:sp>
@@ -827,7 +822,7 @@
           <a:p>
             <a:fld id="{78C97017-6FC3-485B-9764-EAC9E56C1D49}" type="datetimeFigureOut">
               <a:rPr lang="en-US" smtClean="0"/>
-              <a:t>2/2/2017</a:t>
+              <a:t>3/14/2017</a:t>
             </a:fld>
             <a:endParaRPr lang="en-US"/>
           </a:p>
@@ -926,10 +921,9 @@
           <a:lstStyle/>
           <a:p>
             <a:r>
-              <a:rPr lang="en-US" smtClean="0"/>
+              <a:rPr lang="en-US"/>
               <a:t>Click to edit Master title style</a:t>
             </a:r>
-            <a:endParaRPr lang="en-US"/>
           </a:p>
         </p:txBody>
       </p:sp>
@@ -955,38 +949,37 @@
           <a:p>
             <a:pPr lvl="0"/>
             <a:r>
-              <a:rPr lang="en-US" smtClean="0"/>
+              <a:rPr lang="en-US"/>
               <a:t>Click to edit Master text styles</a:t>
             </a:r>
           </a:p>
           <a:p>
             <a:pPr lvl="1"/>
             <a:r>
-              <a:rPr lang="en-US" smtClean="0"/>
+              <a:rPr lang="en-US"/>
               <a:t>Second level</a:t>
             </a:r>
           </a:p>
           <a:p>
             <a:pPr lvl="2"/>
             <a:r>
-              <a:rPr lang="en-US" smtClean="0"/>
+              <a:rPr lang="en-US"/>
               <a:t>Third level</a:t>
             </a:r>
           </a:p>
           <a:p>
             <a:pPr lvl="3"/>
             <a:r>
-              <a:rPr lang="en-US" smtClean="0"/>
+              <a:rPr lang="en-US"/>
               <a:t>Fourth level</a:t>
             </a:r>
           </a:p>
           <a:p>
             <a:pPr lvl="4"/>
             <a:r>
-              <a:rPr lang="en-US" smtClean="0"/>
+              <a:rPr lang="en-US"/>
               <a:t>Fifth level</a:t>
             </a:r>
-            <a:endParaRPr lang="en-US"/>
           </a:p>
         </p:txBody>
       </p:sp>
@@ -1007,7 +1000,7 @@
           <a:p>
             <a:fld id="{78C97017-6FC3-485B-9764-EAC9E56C1D49}" type="datetimeFigureOut">
               <a:rPr lang="en-US" smtClean="0"/>
-              <a:t>2/2/2017</a:t>
+              <a:t>3/14/2017</a:t>
             </a:fld>
             <a:endParaRPr lang="en-US"/>
           </a:p>
@@ -1101,10 +1094,9 @@
           <a:lstStyle/>
           <a:p>
             <a:r>
-              <a:rPr lang="en-US" smtClean="0"/>
+              <a:rPr lang="en-US"/>
               <a:t>Click to edit Master title style</a:t>
             </a:r>
-            <a:endParaRPr lang="en-US"/>
           </a:p>
         </p:txBody>
       </p:sp>
@@ -1125,38 +1117,37 @@
           <a:p>
             <a:pPr lvl="0"/>
             <a:r>
-              <a:rPr lang="en-US" smtClean="0"/>
+              <a:rPr lang="en-US"/>
               <a:t>Click to edit Master text styles</a:t>
             </a:r>
           </a:p>
           <a:p>
             <a:pPr lvl="1"/>
             <a:r>
-              <a:rPr lang="en-US" smtClean="0"/>
+              <a:rPr lang="en-US"/>
               <a:t>Second level</a:t>
             </a:r>
           </a:p>
           <a:p>
             <a:pPr lvl="2"/>
             <a:r>
-              <a:rPr lang="en-US" smtClean="0"/>
+              <a:rPr lang="en-US"/>
               <a:t>Third level</a:t>
             </a:r>
           </a:p>
           <a:p>
             <a:pPr lvl="3"/>
             <a:r>
-              <a:rPr lang="en-US" smtClean="0"/>
+              <a:rPr lang="en-US"/>
               <a:t>Fourth level</a:t>
             </a:r>
           </a:p>
           <a:p>
             <a:pPr lvl="4"/>
             <a:r>
-              <a:rPr lang="en-US" smtClean="0"/>
+              <a:rPr lang="en-US"/>
               <a:t>Fifth level</a:t>
             </a:r>
-            <a:endParaRPr lang="en-US"/>
           </a:p>
         </p:txBody>
       </p:sp>
@@ -1177,7 +1168,7 @@
           <a:p>
             <a:fld id="{78C97017-6FC3-485B-9764-EAC9E56C1D49}" type="datetimeFigureOut">
               <a:rPr lang="en-US" smtClean="0"/>
-              <a:t>2/2/2017</a:t>
+              <a:t>3/14/2017</a:t>
             </a:fld>
             <a:endParaRPr lang="en-US"/>
           </a:p>
@@ -1280,10 +1271,9 @@
           </a:lstStyle>
           <a:p>
             <a:r>
-              <a:rPr lang="en-US" smtClean="0"/>
+              <a:rPr lang="en-US"/>
               <a:t>Click to edit Master title style</a:t>
             </a:r>
-            <a:endParaRPr lang="en-US"/>
           </a:p>
         </p:txBody>
       </p:sp>
@@ -1400,7 +1390,7 @@
           <a:p>
             <a:pPr lvl="0"/>
             <a:r>
-              <a:rPr lang="en-US" smtClean="0"/>
+              <a:rPr lang="en-US"/>
               <a:t>Click to edit Master text styles</a:t>
             </a:r>
           </a:p>
@@ -1423,7 +1413,7 @@
           <a:p>
             <a:fld id="{78C97017-6FC3-485B-9764-EAC9E56C1D49}" type="datetimeFigureOut">
               <a:rPr lang="en-US" smtClean="0"/>
-              <a:t>2/2/2017</a:t>
+              <a:t>3/14/2017</a:t>
             </a:fld>
             <a:endParaRPr lang="en-US"/>
           </a:p>
@@ -1517,10 +1507,9 @@
           <a:lstStyle/>
           <a:p>
             <a:r>
-              <a:rPr lang="en-US" smtClean="0"/>
+              <a:rPr lang="en-US"/>
               <a:t>Click to edit Master title style</a:t>
             </a:r>
-            <a:endParaRPr lang="en-US"/>
           </a:p>
         </p:txBody>
       </p:sp>
@@ -1574,38 +1563,37 @@
           <a:p>
             <a:pPr lvl="0"/>
             <a:r>
-              <a:rPr lang="en-US" smtClean="0"/>
+              <a:rPr lang="en-US"/>
               <a:t>Click to edit Master text styles</a:t>
             </a:r>
           </a:p>
           <a:p>
             <a:pPr lvl="1"/>
             <a:r>
-              <a:rPr lang="en-US" smtClean="0"/>
+              <a:rPr lang="en-US"/>
               <a:t>Second level</a:t>
             </a:r>
           </a:p>
           <a:p>
             <a:pPr lvl="2"/>
             <a:r>
-              <a:rPr lang="en-US" smtClean="0"/>
+              <a:rPr lang="en-US"/>
               <a:t>Third level</a:t>
             </a:r>
           </a:p>
           <a:p>
             <a:pPr lvl="3"/>
             <a:r>
-              <a:rPr lang="en-US" smtClean="0"/>
+              <a:rPr lang="en-US"/>
               <a:t>Fourth level</a:t>
             </a:r>
           </a:p>
           <a:p>
             <a:pPr lvl="4"/>
             <a:r>
-              <a:rPr lang="en-US" smtClean="0"/>
+              <a:rPr lang="en-US"/>
               <a:t>Fifth level</a:t>
             </a:r>
-            <a:endParaRPr lang="en-US"/>
           </a:p>
         </p:txBody>
       </p:sp>
@@ -1659,38 +1647,37 @@
           <a:p>
             <a:pPr lvl="0"/>
             <a:r>
-              <a:rPr lang="en-US" smtClean="0"/>
+              <a:rPr lang="en-US"/>
               <a:t>Click to edit Master text styles</a:t>
             </a:r>
           </a:p>
           <a:p>
             <a:pPr lvl="1"/>
             <a:r>
-              <a:rPr lang="en-US" smtClean="0"/>
+              <a:rPr lang="en-US"/>
               <a:t>Second level</a:t>
             </a:r>
           </a:p>
           <a:p>
             <a:pPr lvl="2"/>
             <a:r>
-              <a:rPr lang="en-US" smtClean="0"/>
+              <a:rPr lang="en-US"/>
               <a:t>Third level</a:t>
             </a:r>
           </a:p>
           <a:p>
             <a:pPr lvl="3"/>
             <a:r>
-              <a:rPr lang="en-US" smtClean="0"/>
+              <a:rPr lang="en-US"/>
               <a:t>Fourth level</a:t>
             </a:r>
           </a:p>
           <a:p>
             <a:pPr lvl="4"/>
             <a:r>
-              <a:rPr lang="en-US" smtClean="0"/>
+              <a:rPr lang="en-US"/>
               <a:t>Fifth level</a:t>
             </a:r>
-            <a:endParaRPr lang="en-US"/>
           </a:p>
         </p:txBody>
       </p:sp>
@@ -1711,7 +1698,7 @@
           <a:p>
             <a:fld id="{78C97017-6FC3-485B-9764-EAC9E56C1D49}" type="datetimeFigureOut">
               <a:rPr lang="en-US" smtClean="0"/>
-              <a:t>2/2/2017</a:t>
+              <a:t>3/14/2017</a:t>
             </a:fld>
             <a:endParaRPr lang="en-US"/>
           </a:p>
@@ -1809,10 +1796,9 @@
           </a:lstStyle>
           <a:p>
             <a:r>
-              <a:rPr lang="en-US" smtClean="0"/>
+              <a:rPr lang="en-US"/>
               <a:t>Click to edit Master title style</a:t>
             </a:r>
-            <a:endParaRPr lang="en-US"/>
           </a:p>
         </p:txBody>
       </p:sp>
@@ -1875,7 +1861,7 @@
           <a:p>
             <a:pPr lvl="0"/>
             <a:r>
-              <a:rPr lang="en-US" smtClean="0"/>
+              <a:rPr lang="en-US"/>
               <a:t>Click to edit Master text styles</a:t>
             </a:r>
           </a:p>
@@ -1931,38 +1917,37 @@
           <a:p>
             <a:pPr lvl="0"/>
             <a:r>
-              <a:rPr lang="en-US" smtClean="0"/>
+              <a:rPr lang="en-US"/>
               <a:t>Click to edit Master text styles</a:t>
             </a:r>
           </a:p>
           <a:p>
             <a:pPr lvl="1"/>
             <a:r>
-              <a:rPr lang="en-US" smtClean="0"/>
+              <a:rPr lang="en-US"/>
               <a:t>Second level</a:t>
             </a:r>
           </a:p>
           <a:p>
             <a:pPr lvl="2"/>
             <a:r>
-              <a:rPr lang="en-US" smtClean="0"/>
+              <a:rPr lang="en-US"/>
               <a:t>Third level</a:t>
             </a:r>
           </a:p>
           <a:p>
             <a:pPr lvl="3"/>
             <a:r>
-              <a:rPr lang="en-US" smtClean="0"/>
+              <a:rPr lang="en-US"/>
               <a:t>Fourth level</a:t>
             </a:r>
           </a:p>
           <a:p>
             <a:pPr lvl="4"/>
             <a:r>
-              <a:rPr lang="en-US" smtClean="0"/>
+              <a:rPr lang="en-US"/>
               <a:t>Fifth level</a:t>
             </a:r>
-            <a:endParaRPr lang="en-US"/>
           </a:p>
         </p:txBody>
       </p:sp>
@@ -2025,7 +2010,7 @@
           <a:p>
             <a:pPr lvl="0"/>
             <a:r>
-              <a:rPr lang="en-US" smtClean="0"/>
+              <a:rPr lang="en-US"/>
               <a:t>Click to edit Master text styles</a:t>
             </a:r>
           </a:p>
@@ -2081,38 +2066,37 @@
           <a:p>
             <a:pPr lvl="0"/>
             <a:r>
-              <a:rPr lang="en-US" smtClean="0"/>
+              <a:rPr lang="en-US"/>
               <a:t>Click to edit Master text styles</a:t>
             </a:r>
           </a:p>
           <a:p>
             <a:pPr lvl="1"/>
             <a:r>
-              <a:rPr lang="en-US" smtClean="0"/>
+              <a:rPr lang="en-US"/>
               <a:t>Second level</a:t>
             </a:r>
           </a:p>
           <a:p>
             <a:pPr lvl="2"/>
             <a:r>
-              <a:rPr lang="en-US" smtClean="0"/>
+              <a:rPr lang="en-US"/>
               <a:t>Third level</a:t>
             </a:r>
           </a:p>
           <a:p>
             <a:pPr lvl="3"/>
             <a:r>
-              <a:rPr lang="en-US" smtClean="0"/>
+              <a:rPr lang="en-US"/>
               <a:t>Fourth level</a:t>
             </a:r>
           </a:p>
           <a:p>
             <a:pPr lvl="4"/>
             <a:r>
-              <a:rPr lang="en-US" smtClean="0"/>
+              <a:rPr lang="en-US"/>
               <a:t>Fifth level</a:t>
             </a:r>
-            <a:endParaRPr lang="en-US"/>
           </a:p>
         </p:txBody>
       </p:sp>
@@ -2133,7 +2117,7 @@
           <a:p>
             <a:fld id="{78C97017-6FC3-485B-9764-EAC9E56C1D49}" type="datetimeFigureOut">
               <a:rPr lang="en-US" smtClean="0"/>
-              <a:t>2/2/2017</a:t>
+              <a:t>3/14/2017</a:t>
             </a:fld>
             <a:endParaRPr lang="en-US"/>
           </a:p>
@@ -2227,10 +2211,9 @@
           <a:lstStyle/>
           <a:p>
             <a:r>
-              <a:rPr lang="en-US" smtClean="0"/>
+              <a:rPr lang="en-US"/>
               <a:t>Click to edit Master title style</a:t>
             </a:r>
-            <a:endParaRPr lang="en-US"/>
           </a:p>
         </p:txBody>
       </p:sp>
@@ -2251,7 +2234,7 @@
           <a:p>
             <a:fld id="{78C97017-6FC3-485B-9764-EAC9E56C1D49}" type="datetimeFigureOut">
               <a:rPr lang="en-US" smtClean="0"/>
-              <a:t>2/2/2017</a:t>
+              <a:t>3/14/2017</a:t>
             </a:fld>
             <a:endParaRPr lang="en-US"/>
           </a:p>
@@ -2346,7 +2329,7 @@
           <a:p>
             <a:fld id="{78C97017-6FC3-485B-9764-EAC9E56C1D49}" type="datetimeFigureOut">
               <a:rPr lang="en-US" smtClean="0"/>
-              <a:t>2/2/2017</a:t>
+              <a:t>3/14/2017</a:t>
             </a:fld>
             <a:endParaRPr lang="en-US"/>
           </a:p>
@@ -2449,10 +2432,9 @@
           </a:lstStyle>
           <a:p>
             <a:r>
-              <a:rPr lang="en-US" smtClean="0"/>
+              <a:rPr lang="en-US"/>
               <a:t>Click to edit Master title style</a:t>
             </a:r>
-            <a:endParaRPr lang="en-US"/>
           </a:p>
         </p:txBody>
       </p:sp>
@@ -2506,38 +2488,37 @@
           <a:p>
             <a:pPr lvl="0"/>
             <a:r>
-              <a:rPr lang="en-US" smtClean="0"/>
+              <a:rPr lang="en-US"/>
               <a:t>Click to edit Master text styles</a:t>
             </a:r>
           </a:p>
           <a:p>
             <a:pPr lvl="1"/>
             <a:r>
-              <a:rPr lang="en-US" smtClean="0"/>
+              <a:rPr lang="en-US"/>
               <a:t>Second level</a:t>
             </a:r>
           </a:p>
           <a:p>
             <a:pPr lvl="2"/>
             <a:r>
-              <a:rPr lang="en-US" smtClean="0"/>
+              <a:rPr lang="en-US"/>
               <a:t>Third level</a:t>
             </a:r>
           </a:p>
           <a:p>
             <a:pPr lvl="3"/>
             <a:r>
-              <a:rPr lang="en-US" smtClean="0"/>
+              <a:rPr lang="en-US"/>
               <a:t>Fourth level</a:t>
             </a:r>
           </a:p>
           <a:p>
             <a:pPr lvl="4"/>
             <a:r>
-              <a:rPr lang="en-US" smtClean="0"/>
+              <a:rPr lang="en-US"/>
               <a:t>Fifth level</a:t>
             </a:r>
-            <a:endParaRPr lang="en-US"/>
           </a:p>
         </p:txBody>
       </p:sp>
@@ -2600,7 +2581,7 @@
           <a:p>
             <a:pPr lvl="0"/>
             <a:r>
-              <a:rPr lang="en-US" smtClean="0"/>
+              <a:rPr lang="en-US"/>
               <a:t>Click to edit Master text styles</a:t>
             </a:r>
           </a:p>
@@ -2623,7 +2604,7 @@
           <a:p>
             <a:fld id="{78C97017-6FC3-485B-9764-EAC9E56C1D49}" type="datetimeFigureOut">
               <a:rPr lang="en-US" smtClean="0"/>
-              <a:t>2/2/2017</a:t>
+              <a:t>3/14/2017</a:t>
             </a:fld>
             <a:endParaRPr lang="en-US"/>
           </a:p>
@@ -2726,10 +2707,9 @@
           </a:lstStyle>
           <a:p>
             <a:r>
-              <a:rPr lang="en-US" smtClean="0"/>
+              <a:rPr lang="en-US"/>
               <a:t>Click to edit Master title style</a:t>
             </a:r>
-            <a:endParaRPr lang="en-US"/>
           </a:p>
         </p:txBody>
       </p:sp>
@@ -2853,7 +2833,7 @@
           <a:p>
             <a:pPr lvl="0"/>
             <a:r>
-              <a:rPr lang="en-US" smtClean="0"/>
+              <a:rPr lang="en-US"/>
               <a:t>Click to edit Master text styles</a:t>
             </a:r>
           </a:p>
@@ -2876,7 +2856,7 @@
           <a:p>
             <a:fld id="{78C97017-6FC3-485B-9764-EAC9E56C1D49}" type="datetimeFigureOut">
               <a:rPr lang="en-US" smtClean="0"/>
-              <a:t>2/2/2017</a:t>
+              <a:t>3/14/2017</a:t>
             </a:fld>
             <a:endParaRPr lang="en-US"/>
           </a:p>
@@ -2985,10 +2965,9 @@
           <a:lstStyle/>
           <a:p>
             <a:r>
-              <a:rPr lang="en-US" smtClean="0"/>
+              <a:rPr lang="en-US"/>
               <a:t>Click to edit Master title style</a:t>
             </a:r>
-            <a:endParaRPr lang="en-US"/>
           </a:p>
         </p:txBody>
       </p:sp>
@@ -3019,38 +2998,37 @@
           <a:p>
             <a:pPr lvl="0"/>
             <a:r>
-              <a:rPr lang="en-US" smtClean="0"/>
+              <a:rPr lang="en-US"/>
               <a:t>Click to edit Master text styles</a:t>
             </a:r>
           </a:p>
           <a:p>
             <a:pPr lvl="1"/>
             <a:r>
-              <a:rPr lang="en-US" smtClean="0"/>
+              <a:rPr lang="en-US"/>
               <a:t>Second level</a:t>
             </a:r>
           </a:p>
           <a:p>
             <a:pPr lvl="2"/>
             <a:r>
-              <a:rPr lang="en-US" smtClean="0"/>
+              <a:rPr lang="en-US"/>
               <a:t>Third level</a:t>
             </a:r>
           </a:p>
           <a:p>
             <a:pPr lvl="3"/>
             <a:r>
-              <a:rPr lang="en-US" smtClean="0"/>
+              <a:rPr lang="en-US"/>
               <a:t>Fourth level</a:t>
             </a:r>
           </a:p>
           <a:p>
             <a:pPr lvl="4"/>
             <a:r>
-              <a:rPr lang="en-US" smtClean="0"/>
+              <a:rPr lang="en-US"/>
               <a:t>Fifth level</a:t>
             </a:r>
-            <a:endParaRPr lang="en-US"/>
           </a:p>
         </p:txBody>
       </p:sp>
@@ -3089,7 +3067,7 @@
           <a:p>
             <a:fld id="{78C97017-6FC3-485B-9764-EAC9E56C1D49}" type="datetimeFigureOut">
               <a:rPr lang="en-US" smtClean="0"/>
-              <a:t>2/2/2017</a:t>
+              <a:t>3/14/2017</a:t>
             </a:fld>
             <a:endParaRPr lang="en-US"/>
           </a:p>
@@ -3625,7 +3603,7 @@
           <a:p>
             <a:pPr algn="ctr"/>
             <a:r>
-              <a:rPr lang="en-US" sz="1050" b="1" dirty="0" err="1" smtClean="0">
+              <a:rPr lang="en-US" sz="1050" b="1" dirty="0" err="1">
                 <a:solidFill>
                   <a:srgbClr val="0070C0"/>
                 </a:solidFill>
@@ -3887,7 +3865,7 @@
           <a:p>
             <a:pPr algn="ctr"/>
             <a:r>
-              <a:rPr lang="en-US" sz="1050" b="1" dirty="0" err="1" smtClean="0">
+              <a:rPr lang="en-US" sz="1050" b="1" dirty="0" err="1">
                 <a:solidFill>
                   <a:srgbClr val="0070C0"/>
                 </a:solidFill>
@@ -3943,7 +3921,7 @@
           <a:p>
             <a:pPr algn="ctr"/>
             <a:r>
-              <a:rPr lang="en-US" sz="1050" b="1" dirty="0" smtClean="0">
+              <a:rPr lang="en-US" sz="1050" b="1" dirty="0">
                 <a:solidFill>
                   <a:srgbClr val="0070C0"/>
                 </a:solidFill>
@@ -3951,14 +3929,14 @@
               <a:t>Incorrect</a:t>
             </a:r>
             <a:br>
-              <a:rPr lang="en-US" sz="1050" b="1" dirty="0" smtClean="0">
+              <a:rPr lang="en-US" sz="1050" b="1" dirty="0">
                 <a:solidFill>
                   <a:srgbClr val="0070C0"/>
                 </a:solidFill>
               </a:rPr>
             </a:br>
             <a:r>
-              <a:rPr lang="en-US" sz="1050" b="1" dirty="0" smtClean="0">
+              <a:rPr lang="en-US" sz="1050" b="1" dirty="0">
                 <a:solidFill>
                   <a:srgbClr val="0070C0"/>
                 </a:solidFill>
@@ -4791,7 +4769,7 @@
           <a:p>
             <a:pPr algn="ctr"/>
             <a:r>
-              <a:rPr lang="en-US" sz="1050" b="1" dirty="0" smtClean="0">
+              <a:rPr lang="en-US" sz="1050" b="1" dirty="0">
                 <a:solidFill>
                   <a:srgbClr val="0070C0"/>
                 </a:solidFill>
@@ -4855,7 +4833,7 @@
         </p:nvSpPr>
         <p:spPr>
           <a:xfrm flipH="1">
-            <a:off x="4664592" y="2148937"/>
+            <a:off x="4831294" y="2148937"/>
             <a:ext cx="1093635" cy="346760"/>
           </a:xfrm>
           <a:prstGeom prst="rect">
@@ -4926,7 +4904,7 @@
         </p:nvSpPr>
         <p:spPr>
           <a:xfrm flipH="1">
-            <a:off x="4664592" y="2555337"/>
+            <a:off x="4831294" y="2555337"/>
             <a:ext cx="1093635" cy="346760"/>
           </a:xfrm>
           <a:prstGeom prst="rect">
@@ -4997,7 +4975,7 @@
         </p:nvSpPr>
         <p:spPr>
           <a:xfrm flipH="1">
-            <a:off x="4664590" y="2977582"/>
+            <a:off x="4831292" y="2977582"/>
             <a:ext cx="1093635" cy="346760"/>
           </a:xfrm>
           <a:prstGeom prst="rect">
@@ -5052,7 +5030,7 @@
         </p:nvSpPr>
         <p:spPr>
           <a:xfrm>
-            <a:off x="2807288" y="1905000"/>
+            <a:off x="3174214" y="1905000"/>
             <a:ext cx="751107" cy="346760"/>
           </a:xfrm>
           <a:prstGeom prst="rect">
@@ -5094,7 +5072,7 @@
           <a:p>
             <a:pPr algn="ctr"/>
             <a:r>
-              <a:rPr lang="en-US" sz="1050" dirty="0" smtClean="0">
+              <a:rPr lang="en-US" sz="1050" dirty="0">
                 <a:solidFill>
                   <a:schemeClr val="bg1"/>
                 </a:solidFill>
@@ -5102,14 +5080,14 @@
               <a:t>Argument</a:t>
             </a:r>
             <a:br>
-              <a:rPr lang="en-US" sz="1050" dirty="0" smtClean="0">
+              <a:rPr lang="en-US" sz="1050" dirty="0">
                 <a:solidFill>
                   <a:schemeClr val="bg1"/>
                 </a:solidFill>
               </a:rPr>
             </a:br>
             <a:r>
-              <a:rPr lang="en-US" sz="1050" dirty="0" smtClean="0">
+              <a:rPr lang="en-US" sz="1050" dirty="0">
                 <a:solidFill>
                   <a:schemeClr val="bg1"/>
                 </a:solidFill>
@@ -5132,7 +5110,7 @@
         </p:nvSpPr>
         <p:spPr>
           <a:xfrm>
-            <a:off x="2813291" y="2432664"/>
+            <a:off x="2238496" y="2454481"/>
             <a:ext cx="726243" cy="174580"/>
           </a:xfrm>
           <a:prstGeom prst="rect">
@@ -5174,7 +5152,7 @@
           <a:p>
             <a:pPr algn="ctr"/>
             <a:r>
-              <a:rPr lang="en-US" sz="1050" dirty="0" smtClean="0">
+              <a:rPr lang="en-US" sz="1050" dirty="0">
                 <a:solidFill>
                   <a:schemeClr val="bg1"/>
                 </a:solidFill>
@@ -5197,9 +5175,9 @@
         </p:nvGrpSpPr>
         <p:grpSpPr>
           <a:xfrm rot="5400000">
-            <a:off x="5941795" y="1962201"/>
+            <a:off x="6088711" y="1962201"/>
             <a:ext cx="254462" cy="555486"/>
-            <a:chOff x="3949242" y="712012"/>
+            <a:chOff x="3949242" y="578739"/>
             <a:chExt cx="254462" cy="503902"/>
           </a:xfrm>
         </p:grpSpPr>
@@ -5211,7 +5189,7 @@
           </p:nvSpPr>
           <p:spPr>
             <a:xfrm rot="16200000">
-              <a:off x="3824522" y="836732"/>
+              <a:off x="3824522" y="703459"/>
               <a:ext cx="503902" cy="254462"/>
             </a:xfrm>
             <a:prstGeom prst="rect">
@@ -5226,7 +5204,7 @@
             <a:lstStyle/>
             <a:p>
               <a:r>
-                <a:rPr lang="en-US" sz="1100" dirty="0" smtClean="0">
+                <a:rPr lang="en-US" sz="1100" dirty="0">
                   <a:solidFill>
                     <a:schemeClr val="accent5">
                       <a:lumMod val="75000"/>
@@ -5253,7 +5231,7 @@
           </p:nvSpPr>
           <p:spPr>
             <a:xfrm rot="10800000" flipV="1">
-              <a:off x="3979474" y="751200"/>
+              <a:off x="3979474" y="617927"/>
               <a:ext cx="132157" cy="79956"/>
             </a:xfrm>
             <a:prstGeom prst="triangle">
@@ -5302,9 +5280,9 @@
         </p:nvGrpSpPr>
         <p:grpSpPr>
           <a:xfrm rot="5400000">
-            <a:off x="5962853" y="2347569"/>
+            <a:off x="6098740" y="2390577"/>
             <a:ext cx="254462" cy="555486"/>
-            <a:chOff x="3949242" y="712012"/>
+            <a:chOff x="3965759" y="592436"/>
             <a:chExt cx="254462" cy="503902"/>
           </a:xfrm>
         </p:grpSpPr>
@@ -5316,7 +5294,7 @@
           </p:nvSpPr>
           <p:spPr>
             <a:xfrm rot="16200000">
-              <a:off x="3824522" y="836732"/>
+              <a:off x="3841039" y="717156"/>
               <a:ext cx="503902" cy="254462"/>
             </a:xfrm>
             <a:prstGeom prst="rect">
@@ -5331,7 +5309,7 @@
             <a:lstStyle/>
             <a:p>
               <a:r>
-                <a:rPr lang="en-US" sz="1100" dirty="0" smtClean="0">
+                <a:rPr lang="en-US" sz="1100" dirty="0">
                   <a:solidFill>
                     <a:schemeClr val="accent5">
                       <a:lumMod val="75000"/>
@@ -5358,7 +5336,7 @@
           </p:nvSpPr>
           <p:spPr>
             <a:xfrm rot="10800000" flipV="1">
-              <a:off x="3979474" y="751200"/>
+              <a:off x="3995991" y="631624"/>
               <a:ext cx="132157" cy="79956"/>
             </a:xfrm>
             <a:prstGeom prst="triangle">
@@ -5407,7 +5385,7 @@
         </p:nvSpPr>
         <p:spPr>
           <a:xfrm>
-            <a:off x="2819400" y="2841725"/>
+            <a:off x="3186326" y="2841725"/>
             <a:ext cx="731636" cy="283820"/>
           </a:xfrm>
           <a:prstGeom prst="rect">
@@ -5449,7 +5427,7 @@
           <a:p>
             <a:pPr algn="ctr"/>
             <a:r>
-              <a:rPr lang="en-SG" sz="1050" dirty="0" err="1" smtClean="0">
+              <a:rPr lang="en-SG" sz="1050" dirty="0" err="1">
                 <a:solidFill>
                   <a:schemeClr val="bg1"/>
                 </a:solidFill>
@@ -5472,7 +5450,7 @@
         </p:nvSpPr>
         <p:spPr>
           <a:xfrm>
-            <a:off x="2819400" y="3190882"/>
+            <a:off x="3186326" y="3190882"/>
             <a:ext cx="731636" cy="283820"/>
           </a:xfrm>
           <a:prstGeom prst="rect">
@@ -5514,7 +5492,7 @@
           <a:p>
             <a:pPr algn="ctr"/>
             <a:r>
-              <a:rPr lang="en-SG" sz="1050" dirty="0" err="1" smtClean="0">
+              <a:rPr lang="en-SG" sz="1050" dirty="0" err="1">
                 <a:solidFill>
                   <a:schemeClr val="bg1"/>
                 </a:solidFill>
@@ -5533,13 +5511,14 @@
         <p:nvCxnSpPr>
           <p:cNvPr id="100" name="Straight Arrow Connector 99"/>
           <p:cNvCxnSpPr>
+            <a:cxnSpLocks/>
             <a:endCxn id="60" idx="3"/>
           </p:cNvCxnSpPr>
           <p:nvPr/>
         </p:nvCxnSpPr>
         <p:spPr>
           <a:xfrm flipH="1">
-            <a:off x="3551036" y="2983635"/>
+            <a:off x="3917962" y="2983635"/>
             <a:ext cx="335164" cy="0"/>
           </a:xfrm>
           <a:prstGeom prst="straightConnector1">
@@ -5575,13 +5554,16 @@
       <p:cxnSp>
         <p:nvCxnSpPr>
           <p:cNvPr id="105" name="Straight Arrow Connector 104"/>
-          <p:cNvCxnSpPr/>
+          <p:cNvCxnSpPr>
+            <a:cxnSpLocks/>
+            <a:endCxn id="62" idx="3"/>
+          </p:cNvCxnSpPr>
           <p:nvPr/>
         </p:nvCxnSpPr>
         <p:spPr>
-          <a:xfrm flipH="1" flipV="1">
-            <a:off x="3558396" y="3297471"/>
-            <a:ext cx="327804" cy="5426"/>
+          <a:xfrm flipH="1">
+            <a:off x="3917962" y="3332439"/>
+            <a:ext cx="335164" cy="353"/>
           </a:xfrm>
           <a:prstGeom prst="straightConnector1">
             <a:avLst/>
@@ -5617,19 +5599,19 @@
         <p:nvCxnSpPr>
           <p:cNvPr id="13" name="Elbow Connector 12"/>
           <p:cNvCxnSpPr>
-            <a:stCxn id="60" idx="0"/>
+            <a:cxnSpLocks/>
+            <a:stCxn id="60" idx="1"/>
+            <a:endCxn id="58" idx="2"/>
           </p:cNvCxnSpPr>
           <p:nvPr/>
         </p:nvCxnSpPr>
         <p:spPr>
-          <a:xfrm rot="16200000" flipV="1">
-            <a:off x="3063575" y="2720082"/>
-            <a:ext cx="234481" cy="8806"/>
-          </a:xfrm>
-          <a:prstGeom prst="bentConnector3">
-            <a:avLst>
-              <a:gd name="adj1" fmla="val 50000"/>
-            </a:avLst>
+          <a:xfrm rot="10800000">
+            <a:off x="2601618" y="2629061"/>
+            <a:ext cx="584708" cy="354574"/>
+          </a:xfrm>
+          <a:prstGeom prst="bentConnector2">
+            <a:avLst/>
           </a:prstGeom>
           <a:ln w="19050">
             <a:solidFill>
@@ -5662,13 +5644,16 @@
       <p:cxnSp>
         <p:nvCxnSpPr>
           <p:cNvPr id="47" name="Straight Connector 46"/>
-          <p:cNvCxnSpPr/>
+          <p:cNvCxnSpPr>
+            <a:cxnSpLocks/>
+            <a:stCxn id="56" idx="3"/>
+          </p:cNvCxnSpPr>
           <p:nvPr/>
         </p:nvCxnSpPr>
         <p:spPr>
           <a:xfrm>
-            <a:off x="3539534" y="2078487"/>
-            <a:ext cx="346666" cy="0"/>
+            <a:off x="3925321" y="2078380"/>
+            <a:ext cx="327805" cy="107"/>
           </a:xfrm>
           <a:prstGeom prst="line">
             <a:avLst/>
@@ -5704,20 +5689,19 @@
         <p:nvCxnSpPr>
           <p:cNvPr id="50" name="Elbow Connector 49"/>
           <p:cNvCxnSpPr>
-            <a:stCxn id="56" idx="2"/>
+            <a:cxnSpLocks/>
+            <a:stCxn id="56" idx="1"/>
             <a:endCxn id="58" idx="0"/>
           </p:cNvCxnSpPr>
           <p:nvPr/>
         </p:nvCxnSpPr>
         <p:spPr>
-          <a:xfrm rot="5400000">
-            <a:off x="3089176" y="2338998"/>
-            <a:ext cx="180904" cy="6429"/>
-          </a:xfrm>
-          <a:prstGeom prst="bentConnector3">
-            <a:avLst>
-              <a:gd name="adj1" fmla="val 50000"/>
-            </a:avLst>
+          <a:xfrm rot="10800000" flipV="1">
+            <a:off x="2601618" y="2078379"/>
+            <a:ext cx="572596" cy="376101"/>
+          </a:xfrm>
+          <a:prstGeom prst="bentConnector2">
+            <a:avLst/>
           </a:prstGeom>
           <a:ln w="19050">
             <a:solidFill>
@@ -5755,9 +5739,9 @@
         </p:nvGrpSpPr>
         <p:grpSpPr>
           <a:xfrm rot="5400000">
-            <a:off x="4090826" y="3633626"/>
+            <a:off x="4346209" y="3538793"/>
             <a:ext cx="555486" cy="254462"/>
-            <a:chOff x="3798139" y="875689"/>
+            <a:chOff x="3703306" y="644022"/>
             <a:chExt cx="555486" cy="230832"/>
           </a:xfrm>
         </p:grpSpPr>
@@ -5769,7 +5753,7 @@
           </p:nvSpPr>
           <p:spPr>
             <a:xfrm rot="10800000">
-              <a:off x="3798139" y="875689"/>
+              <a:off x="3703306" y="644022"/>
               <a:ext cx="555486" cy="230832"/>
             </a:xfrm>
             <a:prstGeom prst="rect">
@@ -5784,7 +5768,7 @@
             <a:lstStyle/>
             <a:p>
               <a:r>
-                <a:rPr lang="en-US" sz="1100" dirty="0" smtClean="0">
+                <a:rPr lang="en-US" sz="1100" dirty="0">
                   <a:solidFill>
                     <a:schemeClr val="accent5">
                       <a:lumMod val="75000"/>
@@ -5811,7 +5795,7 @@
           </p:nvSpPr>
           <p:spPr>
             <a:xfrm rot="5400000" flipV="1">
-              <a:off x="3795127" y="973354"/>
+              <a:off x="3700294" y="741689"/>
               <a:ext cx="119885" cy="88141"/>
             </a:xfrm>
             <a:prstGeom prst="triangle">
@@ -6066,145 +6050,7 @@
         <p:spPr>
           <a:xfrm flipV="1">
             <a:off x="4114800" y="3150962"/>
-            <a:ext cx="549790" cy="797920"/>
-          </a:xfrm>
-          <a:prstGeom prst="bentConnector3">
-            <a:avLst>
-              <a:gd name="adj1" fmla="val 14720"/>
-            </a:avLst>
-          </a:prstGeom>
-          <a:ln w="19050">
-            <a:solidFill>
-              <a:schemeClr val="accent5">
-                <a:lumMod val="75000"/>
-              </a:schemeClr>
-            </a:solidFill>
-            <a:prstDash val="sysDot"/>
-            <a:headEnd type="none" w="med" len="med"/>
-            <a:tailEnd type="arrow" w="med" len="med"/>
-          </a:ln>
-          <a:effectLst/>
-        </p:spPr>
-        <p:style>
-          <a:lnRef idx="1">
-            <a:schemeClr val="accent2"/>
-          </a:lnRef>
-          <a:fillRef idx="2">
-            <a:schemeClr val="accent2"/>
-          </a:fillRef>
-          <a:effectRef idx="1">
-            <a:schemeClr val="accent2"/>
-          </a:effectRef>
-          <a:fontRef idx="minor">
-            <a:schemeClr val="dk1"/>
-          </a:fontRef>
-        </p:style>
-      </p:cxnSp>
-      <p:cxnSp>
-        <p:nvCxnSpPr>
-          <p:cNvPr id="113" name="Elbow Connector 63"/>
-          <p:cNvCxnSpPr>
-            <a:stCxn id="16" idx="3"/>
-            <a:endCxn id="44" idx="3"/>
-          </p:cNvCxnSpPr>
-          <p:nvPr/>
-        </p:nvCxnSpPr>
-        <p:spPr>
-          <a:xfrm flipV="1">
-            <a:off x="4114800" y="2728717"/>
-            <a:ext cx="549792" cy="1220165"/>
-          </a:xfrm>
-          <a:prstGeom prst="bentConnector3">
-            <a:avLst>
-              <a:gd name="adj1" fmla="val 14720"/>
-            </a:avLst>
-          </a:prstGeom>
-          <a:ln w="19050">
-            <a:solidFill>
-              <a:schemeClr val="accent5">
-                <a:lumMod val="75000"/>
-              </a:schemeClr>
-            </a:solidFill>
-            <a:prstDash val="sysDot"/>
-            <a:headEnd type="none" w="med" len="med"/>
-            <a:tailEnd type="arrow" w="med" len="med"/>
-          </a:ln>
-          <a:effectLst/>
-        </p:spPr>
-        <p:style>
-          <a:lnRef idx="1">
-            <a:schemeClr val="accent2"/>
-          </a:lnRef>
-          <a:fillRef idx="2">
-            <a:schemeClr val="accent2"/>
-          </a:fillRef>
-          <a:effectRef idx="1">
-            <a:schemeClr val="accent2"/>
-          </a:effectRef>
-          <a:fontRef idx="minor">
-            <a:schemeClr val="dk1"/>
-          </a:fontRef>
-        </p:style>
-      </p:cxnSp>
-      <p:cxnSp>
-        <p:nvCxnSpPr>
-          <p:cNvPr id="116" name="Elbow Connector 63"/>
-          <p:cNvCxnSpPr>
-            <a:stCxn id="16" idx="3"/>
-            <a:endCxn id="42" idx="3"/>
-          </p:cNvCxnSpPr>
-          <p:nvPr/>
-        </p:nvCxnSpPr>
-        <p:spPr>
-          <a:xfrm flipV="1">
-            <a:off x="4114800" y="2322317"/>
-            <a:ext cx="549792" cy="1626565"/>
-          </a:xfrm>
-          <a:prstGeom prst="bentConnector3">
-            <a:avLst>
-              <a:gd name="adj1" fmla="val 14721"/>
-            </a:avLst>
-          </a:prstGeom>
-          <a:ln w="19050">
-            <a:solidFill>
-              <a:schemeClr val="accent5">
-                <a:lumMod val="75000"/>
-              </a:schemeClr>
-            </a:solidFill>
-            <a:prstDash val="sysDot"/>
-            <a:headEnd type="none" w="med" len="med"/>
-            <a:tailEnd type="arrow" w="med" len="med"/>
-          </a:ln>
-          <a:effectLst/>
-        </p:spPr>
-        <p:style>
-          <a:lnRef idx="1">
-            <a:schemeClr val="accent2"/>
-          </a:lnRef>
-          <a:fillRef idx="2">
-            <a:schemeClr val="accent2"/>
-          </a:fillRef>
-          <a:effectRef idx="1">
-            <a:schemeClr val="accent2"/>
-          </a:effectRef>
-          <a:fontRef idx="minor">
-            <a:schemeClr val="dk1"/>
-          </a:fontRef>
-        </p:style>
-      </p:cxnSp>
-      <p:cxnSp>
-        <p:nvCxnSpPr>
-          <p:cNvPr id="120" name="Elbow Connector 63"/>
-          <p:cNvCxnSpPr>
-            <a:stCxn id="44" idx="1"/>
-            <a:endCxn id="10" idx="3"/>
-          </p:cNvCxnSpPr>
-          <p:nvPr/>
-        </p:nvCxnSpPr>
-        <p:spPr>
-          <a:xfrm flipV="1">
-            <a:off x="5758227" y="2728300"/>
-            <a:ext cx="768138" cy="417"/>
+            <a:ext cx="716492" cy="797920"/>
           </a:xfrm>
           <a:prstGeom prst="bentConnector3">
             <a:avLst>
@@ -6240,17 +6086,17 @@
       </p:cxnSp>
       <p:cxnSp>
         <p:nvCxnSpPr>
-          <p:cNvPr id="122" name="Elbow Connector 63"/>
+          <p:cNvPr id="113" name="Elbow Connector 63"/>
           <p:cNvCxnSpPr>
-            <a:stCxn id="42" idx="1"/>
-            <a:endCxn id="4" idx="3"/>
+            <a:stCxn id="16" idx="3"/>
+            <a:endCxn id="44" idx="3"/>
           </p:cNvCxnSpPr>
           <p:nvPr/>
         </p:nvCxnSpPr>
         <p:spPr>
-          <a:xfrm>
-            <a:off x="5758227" y="2322317"/>
-            <a:ext cx="762000" cy="230"/>
+          <a:xfrm flipV="1">
+            <a:off x="4114800" y="2728717"/>
+            <a:ext cx="716494" cy="1220165"/>
           </a:xfrm>
           <a:prstGeom prst="bentConnector3">
             <a:avLst>
@@ -6286,14 +6132,156 @@
       </p:cxnSp>
       <p:cxnSp>
         <p:nvCxnSpPr>
-          <p:cNvPr id="64" name="Straight Connector 63"/>
-          <p:cNvCxnSpPr/>
+          <p:cNvPr id="116" name="Elbow Connector 63"/>
+          <p:cNvCxnSpPr>
+            <a:stCxn id="16" idx="3"/>
+            <a:endCxn id="42" idx="3"/>
+          </p:cNvCxnSpPr>
           <p:nvPr/>
         </p:nvCxnSpPr>
         <p:spPr>
+          <a:xfrm flipV="1">
+            <a:off x="4114800" y="2322317"/>
+            <a:ext cx="716494" cy="1626565"/>
+          </a:xfrm>
+          <a:prstGeom prst="bentConnector3">
+            <a:avLst>
+              <a:gd name="adj1" fmla="val 50000"/>
+            </a:avLst>
+          </a:prstGeom>
+          <a:ln w="19050">
+            <a:solidFill>
+              <a:schemeClr val="accent5">
+                <a:lumMod val="75000"/>
+              </a:schemeClr>
+            </a:solidFill>
+            <a:prstDash val="sysDot"/>
+            <a:headEnd type="none" w="med" len="med"/>
+            <a:tailEnd type="arrow" w="med" len="med"/>
+          </a:ln>
+          <a:effectLst/>
+        </p:spPr>
+        <p:style>
+          <a:lnRef idx="1">
+            <a:schemeClr val="accent2"/>
+          </a:lnRef>
+          <a:fillRef idx="2">
+            <a:schemeClr val="accent2"/>
+          </a:fillRef>
+          <a:effectRef idx="1">
+            <a:schemeClr val="accent2"/>
+          </a:effectRef>
+          <a:fontRef idx="minor">
+            <a:schemeClr val="dk1"/>
+          </a:fontRef>
+        </p:style>
+      </p:cxnSp>
+      <p:cxnSp>
+        <p:nvCxnSpPr>
+          <p:cNvPr id="120" name="Elbow Connector 63"/>
+          <p:cNvCxnSpPr>
+            <a:cxnSpLocks/>
+            <a:stCxn id="44" idx="1"/>
+            <a:endCxn id="10" idx="3"/>
+          </p:cNvCxnSpPr>
+          <p:nvPr/>
+        </p:nvCxnSpPr>
+        <p:spPr>
+          <a:xfrm flipV="1">
+            <a:off x="5924929" y="2728300"/>
+            <a:ext cx="601436" cy="417"/>
+          </a:xfrm>
+          <a:prstGeom prst="bentConnector3">
+            <a:avLst>
+              <a:gd name="adj1" fmla="val 50000"/>
+            </a:avLst>
+          </a:prstGeom>
+          <a:ln w="19050">
+            <a:solidFill>
+              <a:schemeClr val="accent5">
+                <a:lumMod val="75000"/>
+              </a:schemeClr>
+            </a:solidFill>
+            <a:prstDash val="sysDot"/>
+            <a:headEnd type="none" w="med" len="med"/>
+            <a:tailEnd type="arrow" w="med" len="med"/>
+          </a:ln>
+          <a:effectLst/>
+        </p:spPr>
+        <p:style>
+          <a:lnRef idx="1">
+            <a:schemeClr val="accent2"/>
+          </a:lnRef>
+          <a:fillRef idx="2">
+            <a:schemeClr val="accent2"/>
+          </a:fillRef>
+          <a:effectRef idx="1">
+            <a:schemeClr val="accent2"/>
+          </a:effectRef>
+          <a:fontRef idx="minor">
+            <a:schemeClr val="dk1"/>
+          </a:fontRef>
+        </p:style>
+      </p:cxnSp>
+      <p:cxnSp>
+        <p:nvCxnSpPr>
+          <p:cNvPr id="122" name="Elbow Connector 63"/>
+          <p:cNvCxnSpPr>
+            <a:cxnSpLocks/>
+            <a:stCxn id="42" idx="1"/>
+            <a:endCxn id="4" idx="3"/>
+          </p:cNvCxnSpPr>
+          <p:nvPr/>
+        </p:nvCxnSpPr>
+        <p:spPr>
           <a:xfrm>
-            <a:off x="3886200" y="2078487"/>
-            <a:ext cx="0" cy="1218984"/>
+            <a:off x="5924929" y="2322317"/>
+            <a:ext cx="595298" cy="230"/>
+          </a:xfrm>
+          <a:prstGeom prst="bentConnector3">
+            <a:avLst>
+              <a:gd name="adj1" fmla="val 50000"/>
+            </a:avLst>
+          </a:prstGeom>
+          <a:ln w="19050">
+            <a:solidFill>
+              <a:schemeClr val="accent5">
+                <a:lumMod val="75000"/>
+              </a:schemeClr>
+            </a:solidFill>
+            <a:prstDash val="sysDot"/>
+            <a:headEnd type="none" w="med" len="med"/>
+            <a:tailEnd type="arrow" w="med" len="med"/>
+          </a:ln>
+          <a:effectLst/>
+        </p:spPr>
+        <p:style>
+          <a:lnRef idx="1">
+            <a:schemeClr val="accent2"/>
+          </a:lnRef>
+          <a:fillRef idx="2">
+            <a:schemeClr val="accent2"/>
+          </a:fillRef>
+          <a:effectRef idx="1">
+            <a:schemeClr val="accent2"/>
+          </a:effectRef>
+          <a:fontRef idx="minor">
+            <a:schemeClr val="dk1"/>
+          </a:fontRef>
+        </p:style>
+      </p:cxnSp>
+      <p:cxnSp>
+        <p:nvCxnSpPr>
+          <p:cNvPr id="64" name="Straight Connector 63"/>
+          <p:cNvCxnSpPr>
+            <a:cxnSpLocks/>
+          </p:cNvCxnSpPr>
+          <p:nvPr/>
+        </p:nvCxnSpPr>
+        <p:spPr>
+          <a:xfrm flipH="1">
+            <a:off x="4248488" y="2078487"/>
+            <a:ext cx="4638" cy="1260312"/>
           </a:xfrm>
           <a:prstGeom prst="line">
             <a:avLst/>
@@ -6328,13 +6316,15 @@
       <p:cxnSp>
         <p:nvCxnSpPr>
           <p:cNvPr id="66" name="Straight Connector 65"/>
-          <p:cNvCxnSpPr/>
+          <p:cNvCxnSpPr>
+            <a:cxnSpLocks/>
+          </p:cNvCxnSpPr>
           <p:nvPr/>
         </p:nvCxnSpPr>
         <p:spPr>
           <a:xfrm>
-            <a:off x="3894672" y="2209800"/>
-            <a:ext cx="769918" cy="0"/>
+            <a:off x="4248488" y="2209800"/>
+            <a:ext cx="582002" cy="0"/>
           </a:xfrm>
           <a:prstGeom prst="line">
             <a:avLst/>
@@ -6369,13 +6359,15 @@
       <p:cxnSp>
         <p:nvCxnSpPr>
           <p:cNvPr id="73" name="Straight Connector 72"/>
-          <p:cNvCxnSpPr/>
+          <p:cNvCxnSpPr>
+            <a:cxnSpLocks/>
+          </p:cNvCxnSpPr>
           <p:nvPr/>
         </p:nvCxnSpPr>
         <p:spPr>
-          <a:xfrm>
-            <a:off x="3886200" y="2607244"/>
-            <a:ext cx="769918" cy="0"/>
+          <a:xfrm flipV="1">
+            <a:off x="4255042" y="2607245"/>
+            <a:ext cx="566976" cy="5974"/>
           </a:xfrm>
           <a:prstGeom prst="line">
             <a:avLst/>
@@ -6410,13 +6402,15 @@
       <p:cxnSp>
         <p:nvCxnSpPr>
           <p:cNvPr id="74" name="Straight Connector 73"/>
-          <p:cNvCxnSpPr/>
+          <p:cNvCxnSpPr>
+            <a:cxnSpLocks/>
+          </p:cNvCxnSpPr>
           <p:nvPr/>
         </p:nvCxnSpPr>
         <p:spPr>
           <a:xfrm>
-            <a:off x="3886200" y="3048000"/>
-            <a:ext cx="769918" cy="0"/>
+            <a:off x="4248487" y="3048000"/>
+            <a:ext cx="573531" cy="0"/>
           </a:xfrm>
           <a:prstGeom prst="line">
             <a:avLst/>
@@ -6429,6 +6423,206 @@
             </a:solidFill>
             <a:prstDash val="sysDot"/>
             <a:headEnd type="none" w="med" len="med"/>
+            <a:tailEnd type="none" w="med" len="med"/>
+          </a:ln>
+          <a:effectLst/>
+        </p:spPr>
+        <p:style>
+          <a:lnRef idx="1">
+            <a:schemeClr val="accent2"/>
+          </a:lnRef>
+          <a:fillRef idx="2">
+            <a:schemeClr val="accent2"/>
+          </a:fillRef>
+          <a:effectRef idx="1">
+            <a:schemeClr val="accent2"/>
+          </a:effectRef>
+          <a:fontRef idx="minor">
+            <a:schemeClr val="dk1"/>
+          </a:fontRef>
+        </p:style>
+      </p:cxnSp>
+      <p:sp>
+        <p:nvSpPr>
+          <p:cNvPr id="109" name="Rectangle 62"/>
+          <p:cNvSpPr/>
+          <p:nvPr/>
+        </p:nvSpPr>
+        <p:spPr>
+          <a:xfrm>
+            <a:off x="3139577" y="2450741"/>
+            <a:ext cx="825134" cy="174580"/>
+          </a:xfrm>
+          <a:prstGeom prst="rect">
+            <a:avLst/>
+          </a:prstGeom>
+          <a:solidFill>
+            <a:schemeClr val="accent5">
+              <a:lumMod val="60000"/>
+              <a:lumOff val="40000"/>
+            </a:schemeClr>
+          </a:solidFill>
+          <a:ln w="19050">
+            <a:solidFill>
+              <a:schemeClr val="accent5">
+                <a:lumMod val="60000"/>
+                <a:lumOff val="40000"/>
+              </a:schemeClr>
+            </a:solidFill>
+          </a:ln>
+          <a:effectLst/>
+        </p:spPr>
+        <p:style>
+          <a:lnRef idx="1">
+            <a:schemeClr val="accent2"/>
+          </a:lnRef>
+          <a:fillRef idx="2">
+            <a:schemeClr val="accent2"/>
+          </a:fillRef>
+          <a:effectRef idx="1">
+            <a:schemeClr val="accent2"/>
+          </a:effectRef>
+          <a:fontRef idx="minor">
+            <a:schemeClr val="dk1"/>
+          </a:fontRef>
+        </p:style>
+        <p:txBody>
+          <a:bodyPr rtlCol="0" anchor="ctr"/>
+          <a:lstStyle/>
+          <a:p>
+            <a:pPr algn="ctr"/>
+            <a:r>
+              <a:rPr lang="en-SG" sz="1050" dirty="0">
+                <a:solidFill>
+                  <a:schemeClr val="bg1"/>
+                </a:solidFill>
+              </a:rPr>
+              <a:t>Arguments</a:t>
+            </a:r>
+          </a:p>
+        </p:txBody>
+      </p:sp>
+      <p:cxnSp>
+        <p:nvCxnSpPr>
+          <p:cNvPr id="112" name="Elbow Connector 12"/>
+          <p:cNvCxnSpPr>
+            <a:cxnSpLocks/>
+            <a:stCxn id="109" idx="1"/>
+            <a:endCxn id="58" idx="3"/>
+          </p:cNvCxnSpPr>
+          <p:nvPr/>
+        </p:nvCxnSpPr>
+        <p:spPr>
+          <a:xfrm rot="10800000" flipV="1">
+            <a:off x="2964739" y="2538031"/>
+            <a:ext cx="174838" cy="3740"/>
+          </a:xfrm>
+          <a:prstGeom prst="bentConnector3">
+            <a:avLst>
+              <a:gd name="adj1" fmla="val 50000"/>
+            </a:avLst>
+          </a:prstGeom>
+          <a:ln w="19050">
+            <a:solidFill>
+              <a:schemeClr val="accent5">
+                <a:lumMod val="60000"/>
+                <a:lumOff val="40000"/>
+              </a:schemeClr>
+            </a:solidFill>
+            <a:prstDash val="sysDot"/>
+            <a:headEnd type="none" w="med" len="med"/>
+            <a:tailEnd type="arrow" w="med" len="med"/>
+          </a:ln>
+          <a:effectLst/>
+        </p:spPr>
+        <p:style>
+          <a:lnRef idx="1">
+            <a:schemeClr val="accent2"/>
+          </a:lnRef>
+          <a:fillRef idx="2">
+            <a:schemeClr val="accent2"/>
+          </a:fillRef>
+          <a:effectRef idx="1">
+            <a:schemeClr val="accent2"/>
+          </a:effectRef>
+          <a:fontRef idx="minor">
+            <a:schemeClr val="dk1"/>
+          </a:fontRef>
+        </p:style>
+      </p:cxnSp>
+      <p:cxnSp>
+        <p:nvCxnSpPr>
+          <p:cNvPr id="118" name="Elbow Connector 49"/>
+          <p:cNvCxnSpPr>
+            <a:cxnSpLocks/>
+            <a:stCxn id="56" idx="2"/>
+            <a:endCxn id="109" idx="0"/>
+          </p:cNvCxnSpPr>
+          <p:nvPr/>
+        </p:nvCxnSpPr>
+        <p:spPr>
+          <a:xfrm rot="16200000" flipH="1">
+            <a:off x="3451466" y="2350062"/>
+            <a:ext cx="198981" cy="2376"/>
+          </a:xfrm>
+          <a:prstGeom prst="bentConnector3">
+            <a:avLst>
+              <a:gd name="adj1" fmla="val 50000"/>
+            </a:avLst>
+          </a:prstGeom>
+          <a:ln w="19050">
+            <a:solidFill>
+              <a:schemeClr val="accent5">
+                <a:lumMod val="60000"/>
+                <a:lumOff val="40000"/>
+              </a:schemeClr>
+            </a:solidFill>
+            <a:prstDash val="sysDot"/>
+            <a:headEnd type="none" w="med" len="med"/>
+            <a:tailEnd type="arrow" w="med" len="med"/>
+          </a:ln>
+          <a:effectLst/>
+        </p:spPr>
+        <p:style>
+          <a:lnRef idx="1">
+            <a:schemeClr val="accent2"/>
+          </a:lnRef>
+          <a:fillRef idx="2">
+            <a:schemeClr val="accent2"/>
+          </a:fillRef>
+          <a:effectRef idx="1">
+            <a:schemeClr val="accent2"/>
+          </a:effectRef>
+          <a:fontRef idx="minor">
+            <a:schemeClr val="dk1"/>
+          </a:fontRef>
+        </p:style>
+      </p:cxnSp>
+      <p:cxnSp>
+        <p:nvCxnSpPr>
+          <p:cNvPr id="123" name="Straight Connector 122"/>
+          <p:cNvCxnSpPr>
+            <a:cxnSpLocks/>
+            <a:stCxn id="109" idx="3"/>
+          </p:cNvCxnSpPr>
+          <p:nvPr/>
+        </p:nvCxnSpPr>
+        <p:spPr>
+          <a:xfrm flipV="1">
+            <a:off x="3964711" y="2533616"/>
+            <a:ext cx="290331" cy="4415"/>
+          </a:xfrm>
+          <a:prstGeom prst="line">
+            <a:avLst/>
+          </a:prstGeom>
+          <a:ln w="19050">
+            <a:solidFill>
+              <a:schemeClr val="accent5">
+                <a:lumMod val="50000"/>
+              </a:schemeClr>
+            </a:solidFill>
+            <a:prstDash val="sysDot"/>
+            <a:headEnd type="arrow" w="med" len="med"/>
             <a:tailEnd type="none" w="med" len="med"/>
           </a:ln>
           <a:effectLst/>

</xml_diff>

<commit_message>
Interdiff between v16 and v17
</commit_message>
<xml_diff>
--- a/docs/diagrams/LogicComponentClassDiagram.pptx
+++ b/docs/diagrams/LogicComponentClassDiagram.pptx
@@ -208,7 +208,7 @@
           <a:p>
             <a:fld id="{F5CC4B3F-88C1-4FFA-B1B6-F41C21DC6924}" type="datetimeFigureOut">
               <a:rPr lang="en-US" smtClean="0"/>
-              <a:t>3/19/2017</a:t>
+              <a:t>3/21/2017</a:t>
             </a:fld>
             <a:endParaRPr lang="en-US"/>
           </a:p>
@@ -654,7 +654,7 @@
           <a:p>
             <a:fld id="{78C97017-6FC3-485B-9764-EAC9E56C1D49}" type="datetimeFigureOut">
               <a:rPr lang="en-US" smtClean="0"/>
-              <a:t>3/19/2017</a:t>
+              <a:t>3/21/2017</a:t>
             </a:fld>
             <a:endParaRPr lang="en-US"/>
           </a:p>
@@ -822,7 +822,7 @@
           <a:p>
             <a:fld id="{78C97017-6FC3-485B-9764-EAC9E56C1D49}" type="datetimeFigureOut">
               <a:rPr lang="en-US" smtClean="0"/>
-              <a:t>3/19/2017</a:t>
+              <a:t>3/21/2017</a:t>
             </a:fld>
             <a:endParaRPr lang="en-US"/>
           </a:p>
@@ -1000,7 +1000,7 @@
           <a:p>
             <a:fld id="{78C97017-6FC3-485B-9764-EAC9E56C1D49}" type="datetimeFigureOut">
               <a:rPr lang="en-US" smtClean="0"/>
-              <a:t>3/19/2017</a:t>
+              <a:t>3/21/2017</a:t>
             </a:fld>
             <a:endParaRPr lang="en-US"/>
           </a:p>
@@ -1168,7 +1168,7 @@
           <a:p>
             <a:fld id="{78C97017-6FC3-485B-9764-EAC9E56C1D49}" type="datetimeFigureOut">
               <a:rPr lang="en-US" smtClean="0"/>
-              <a:t>3/19/2017</a:t>
+              <a:t>3/21/2017</a:t>
             </a:fld>
             <a:endParaRPr lang="en-US"/>
           </a:p>
@@ -1413,7 +1413,7 @@
           <a:p>
             <a:fld id="{78C97017-6FC3-485B-9764-EAC9E56C1D49}" type="datetimeFigureOut">
               <a:rPr lang="en-US" smtClean="0"/>
-              <a:t>3/19/2017</a:t>
+              <a:t>3/21/2017</a:t>
             </a:fld>
             <a:endParaRPr lang="en-US"/>
           </a:p>
@@ -1698,7 +1698,7 @@
           <a:p>
             <a:fld id="{78C97017-6FC3-485B-9764-EAC9E56C1D49}" type="datetimeFigureOut">
               <a:rPr lang="en-US" smtClean="0"/>
-              <a:t>3/19/2017</a:t>
+              <a:t>3/21/2017</a:t>
             </a:fld>
             <a:endParaRPr lang="en-US"/>
           </a:p>
@@ -2117,7 +2117,7 @@
           <a:p>
             <a:fld id="{78C97017-6FC3-485B-9764-EAC9E56C1D49}" type="datetimeFigureOut">
               <a:rPr lang="en-US" smtClean="0"/>
-              <a:t>3/19/2017</a:t>
+              <a:t>3/21/2017</a:t>
             </a:fld>
             <a:endParaRPr lang="en-US"/>
           </a:p>
@@ -2234,7 +2234,7 @@
           <a:p>
             <a:fld id="{78C97017-6FC3-485B-9764-EAC9E56C1D49}" type="datetimeFigureOut">
               <a:rPr lang="en-US" smtClean="0"/>
-              <a:t>3/19/2017</a:t>
+              <a:t>3/21/2017</a:t>
             </a:fld>
             <a:endParaRPr lang="en-US"/>
           </a:p>
@@ -2329,7 +2329,7 @@
           <a:p>
             <a:fld id="{78C97017-6FC3-485B-9764-EAC9E56C1D49}" type="datetimeFigureOut">
               <a:rPr lang="en-US" smtClean="0"/>
-              <a:t>3/19/2017</a:t>
+              <a:t>3/21/2017</a:t>
             </a:fld>
             <a:endParaRPr lang="en-US"/>
           </a:p>
@@ -2604,7 +2604,7 @@
           <a:p>
             <a:fld id="{78C97017-6FC3-485B-9764-EAC9E56C1D49}" type="datetimeFigureOut">
               <a:rPr lang="en-US" smtClean="0"/>
-              <a:t>3/19/2017</a:t>
+              <a:t>3/21/2017</a:t>
             </a:fld>
             <a:endParaRPr lang="en-US"/>
           </a:p>
@@ -2856,7 +2856,7 @@
           <a:p>
             <a:fld id="{78C97017-6FC3-485B-9764-EAC9E56C1D49}" type="datetimeFigureOut">
               <a:rPr lang="en-US" smtClean="0"/>
-              <a:t>3/19/2017</a:t>
+              <a:t>3/21/2017</a:t>
             </a:fld>
             <a:endParaRPr lang="en-US"/>
           </a:p>
@@ -3067,7 +3067,7 @@
           <a:p>
             <a:fld id="{78C97017-6FC3-485B-9764-EAC9E56C1D49}" type="datetimeFigureOut">
               <a:rPr lang="en-US" smtClean="0"/>
-              <a:t>3/19/2017</a:t>
+              <a:t>3/21/2017</a:t>
             </a:fld>
             <a:endParaRPr lang="en-US"/>
           </a:p>
@@ -6512,7 +6512,7 @@
                   <a:schemeClr val="bg1"/>
                 </a:solidFill>
               </a:rPr>
-              <a:t>Map</a:t>
+              <a:t>Multimap</a:t>
             </a:r>
           </a:p>
         </p:txBody>

</xml_diff>

<commit_message>
docs: Update logic component class diagram
This is to reflect the code change that LogicManager and Command
have access to the Storage component.
</commit_message>
<xml_diff>
--- a/docs/diagrams/LogicComponentClassDiagram.pptx
+++ b/docs/diagrams/LogicComponentClassDiagram.pptx
@@ -8,7 +8,7 @@
     <p:notesMasterId r:id="rId3"/>
   </p:notesMasterIdLst>
   <p:sldIdLst>
-    <p:sldId id="262" r:id="rId2"/>
+    <p:sldId id="263" r:id="rId2"/>
   </p:sldIdLst>
   <p:sldSz cx="9144000" cy="6858000" type="screen4x3"/>
   <p:notesSz cx="6858000" cy="9144000"/>
@@ -208,7 +208,7 @@
           <a:p>
             <a:fld id="{F5CC4B3F-88C1-4FFA-B1B6-F41C21DC6924}" type="datetimeFigureOut">
               <a:rPr lang="en-US" smtClean="0"/>
-              <a:t>3/21/2017</a:t>
+              <a:t>3/30/17</a:t>
             </a:fld>
             <a:endParaRPr lang="en-US"/>
           </a:p>
@@ -654,7 +654,7 @@
           <a:p>
             <a:fld id="{78C97017-6FC3-485B-9764-EAC9E56C1D49}" type="datetimeFigureOut">
               <a:rPr lang="en-US" smtClean="0"/>
-              <a:t>3/21/2017</a:t>
+              <a:t>3/30/17</a:t>
             </a:fld>
             <a:endParaRPr lang="en-US"/>
           </a:p>
@@ -822,7 +822,7 @@
           <a:p>
             <a:fld id="{78C97017-6FC3-485B-9764-EAC9E56C1D49}" type="datetimeFigureOut">
               <a:rPr lang="en-US" smtClean="0"/>
-              <a:t>3/21/2017</a:t>
+              <a:t>3/30/17</a:t>
             </a:fld>
             <a:endParaRPr lang="en-US"/>
           </a:p>
@@ -1000,7 +1000,7 @@
           <a:p>
             <a:fld id="{78C97017-6FC3-485B-9764-EAC9E56C1D49}" type="datetimeFigureOut">
               <a:rPr lang="en-US" smtClean="0"/>
-              <a:t>3/21/2017</a:t>
+              <a:t>3/30/17</a:t>
             </a:fld>
             <a:endParaRPr lang="en-US"/>
           </a:p>
@@ -1168,7 +1168,7 @@
           <a:p>
             <a:fld id="{78C97017-6FC3-485B-9764-EAC9E56C1D49}" type="datetimeFigureOut">
               <a:rPr lang="en-US" smtClean="0"/>
-              <a:t>3/21/2017</a:t>
+              <a:t>3/30/17</a:t>
             </a:fld>
             <a:endParaRPr lang="en-US"/>
           </a:p>
@@ -1413,7 +1413,7 @@
           <a:p>
             <a:fld id="{78C97017-6FC3-485B-9764-EAC9E56C1D49}" type="datetimeFigureOut">
               <a:rPr lang="en-US" smtClean="0"/>
-              <a:t>3/21/2017</a:t>
+              <a:t>3/30/17</a:t>
             </a:fld>
             <a:endParaRPr lang="en-US"/>
           </a:p>
@@ -1698,7 +1698,7 @@
           <a:p>
             <a:fld id="{78C97017-6FC3-485B-9764-EAC9E56C1D49}" type="datetimeFigureOut">
               <a:rPr lang="en-US" smtClean="0"/>
-              <a:t>3/21/2017</a:t>
+              <a:t>3/30/17</a:t>
             </a:fld>
             <a:endParaRPr lang="en-US"/>
           </a:p>
@@ -2117,7 +2117,7 @@
           <a:p>
             <a:fld id="{78C97017-6FC3-485B-9764-EAC9E56C1D49}" type="datetimeFigureOut">
               <a:rPr lang="en-US" smtClean="0"/>
-              <a:t>3/21/2017</a:t>
+              <a:t>3/30/17</a:t>
             </a:fld>
             <a:endParaRPr lang="en-US"/>
           </a:p>
@@ -2234,7 +2234,7 @@
           <a:p>
             <a:fld id="{78C97017-6FC3-485B-9764-EAC9E56C1D49}" type="datetimeFigureOut">
               <a:rPr lang="en-US" smtClean="0"/>
-              <a:t>3/21/2017</a:t>
+              <a:t>3/30/17</a:t>
             </a:fld>
             <a:endParaRPr lang="en-US"/>
           </a:p>
@@ -2329,7 +2329,7 @@
           <a:p>
             <a:fld id="{78C97017-6FC3-485B-9764-EAC9E56C1D49}" type="datetimeFigureOut">
               <a:rPr lang="en-US" smtClean="0"/>
-              <a:t>3/21/2017</a:t>
+              <a:t>3/30/17</a:t>
             </a:fld>
             <a:endParaRPr lang="en-US"/>
           </a:p>
@@ -2604,7 +2604,7 @@
           <a:p>
             <a:fld id="{78C97017-6FC3-485B-9764-EAC9E56C1D49}" type="datetimeFigureOut">
               <a:rPr lang="en-US" smtClean="0"/>
-              <a:t>3/21/2017</a:t>
+              <a:t>3/30/17</a:t>
             </a:fld>
             <a:endParaRPr lang="en-US"/>
           </a:p>
@@ -2856,7 +2856,7 @@
           <a:p>
             <a:fld id="{78C97017-6FC3-485B-9764-EAC9E56C1D49}" type="datetimeFigureOut">
               <a:rPr lang="en-US" smtClean="0"/>
-              <a:t>3/21/2017</a:t>
+              <a:t>3/30/17</a:t>
             </a:fld>
             <a:endParaRPr lang="en-US"/>
           </a:p>
@@ -3067,7 +3067,7 @@
           <a:p>
             <a:fld id="{78C97017-6FC3-485B-9764-EAC9E56C1D49}" type="datetimeFigureOut">
               <a:rPr lang="en-US" smtClean="0"/>
-              <a:t>3/21/2017</a:t>
+              <a:t>3/30/17</a:t>
             </a:fld>
             <a:endParaRPr lang="en-US"/>
           </a:p>
@@ -3426,8 +3426,16 @@
 </file>
 
 <file path=ppt/slides/slide1.xml><?xml version="1.0" encoding="utf-8"?>
-<p:sld xmlns:a="http://schemas.openxmlformats.org/drawingml/2006/main" xmlns:r="http://schemas.openxmlformats.org/officeDocument/2006/relationships" xmlns:p="http://schemas.openxmlformats.org/presentationml/2006/main">
+<p:sld xmlns:a="http://schemas.openxmlformats.org/drawingml/2006/main" xmlns:r="http://schemas.openxmlformats.org/officeDocument/2006/relationships" xmlns:p="http://schemas.openxmlformats.org/presentationml/2006/main" showMasterSp="0">
   <p:cSld>
+    <p:bg>
+      <p:bgPr>
+        <a:solidFill>
+          <a:schemeClr val="bg1"/>
+        </a:solidFill>
+        <a:effectLst/>
+      </p:bgPr>
+    </p:bg>
     <p:spTree>
       <p:nvGrpSpPr>
         <p:cNvPr id="1" name=""/>
@@ -3723,7 +3731,7 @@
       </p:cxnSp>
       <p:cxnSp>
         <p:nvCxnSpPr>
-          <p:cNvPr id="8" name="Elbow Connector 122"/>
+          <p:cNvPr id="7" name="Elbow Connector 122"/>
           <p:cNvCxnSpPr>
             <a:endCxn id="3" idx="1"/>
           </p:cNvCxnSpPr>
@@ -3766,7 +3774,7 @@
       </p:cxnSp>
       <p:sp>
         <p:nvSpPr>
-          <p:cNvPr id="9" name="Rectangle 65"/>
+          <p:cNvPr id="8" name="Rectangle 65"/>
           <p:cNvSpPr/>
           <p:nvPr/>
         </p:nvSpPr>
@@ -3826,7 +3834,7 @@
       </p:sp>
       <p:sp>
         <p:nvSpPr>
-          <p:cNvPr id="10" name="Rectangle 11"/>
+          <p:cNvPr id="9" name="Rectangle 11"/>
           <p:cNvSpPr/>
           <p:nvPr/>
         </p:nvSpPr>
@@ -3882,7 +3890,7 @@
       </p:sp>
       <p:sp>
         <p:nvSpPr>
-          <p:cNvPr id="11" name="Rectangle 10"/>
+          <p:cNvPr id="10" name="Rectangle 9"/>
           <p:cNvSpPr/>
           <p:nvPr/>
         </p:nvSpPr>
@@ -3953,7 +3961,7 @@
       </p:sp>
       <p:sp>
         <p:nvSpPr>
-          <p:cNvPr id="12" name="Rectangle 62"/>
+          <p:cNvPr id="11" name="Rectangle 62"/>
           <p:cNvSpPr/>
           <p:nvPr/>
         </p:nvSpPr>
@@ -4024,7 +4032,7 @@
       </p:sp>
       <p:sp>
         <p:nvSpPr>
-          <p:cNvPr id="16" name="Rectangle 62"/>
+          <p:cNvPr id="12" name="Rectangle 62"/>
           <p:cNvSpPr/>
           <p:nvPr/>
         </p:nvSpPr>
@@ -4079,7 +4087,7 @@
       </p:sp>
       <p:cxnSp>
         <p:nvCxnSpPr>
-          <p:cNvPr id="17" name="Elbow Connector 106"/>
+          <p:cNvPr id="13" name="Elbow Connector 106"/>
           <p:cNvCxnSpPr>
             <a:stCxn id="5" idx="3"/>
             <a:endCxn id="16" idx="1"/>
@@ -4123,15 +4131,13 @@
       </p:cxnSp>
       <p:cxnSp>
         <p:nvCxnSpPr>
-          <p:cNvPr id="18" name="Straight Arrow Connector 110"/>
-          <p:cNvCxnSpPr>
-            <a:stCxn id="12" idx="2"/>
-          </p:cNvCxnSpPr>
+          <p:cNvPr id="14" name="Straight Arrow Connector 110"/>
+          <p:cNvCxnSpPr/>
           <p:nvPr/>
         </p:nvCxnSpPr>
         <p:spPr>
           <a:xfrm>
-            <a:off x="7824261" y="4495800"/>
+            <a:off x="7689007" y="4495800"/>
             <a:ext cx="0" cy="281555"/>
           </a:xfrm>
           <a:prstGeom prst="straightConnector1">
@@ -4164,7 +4170,7 @@
       </p:cxnSp>
       <p:sp>
         <p:nvSpPr>
-          <p:cNvPr id="19" name="Rectangle 62"/>
+          <p:cNvPr id="15" name="Rectangle 62"/>
           <p:cNvSpPr/>
           <p:nvPr/>
         </p:nvSpPr>
@@ -4234,7 +4240,7 @@
       </p:sp>
       <p:sp>
         <p:nvSpPr>
-          <p:cNvPr id="20" name="Isosceles Triangle 102"/>
+          <p:cNvPr id="16" name="Isosceles Triangle 102"/>
           <p:cNvSpPr/>
           <p:nvPr/>
         </p:nvSpPr>
@@ -4288,7 +4294,7 @@
       </p:sp>
       <p:cxnSp>
         <p:nvCxnSpPr>
-          <p:cNvPr id="21" name="Elbow Connector 63"/>
+          <p:cNvPr id="17" name="Elbow Connector 63"/>
           <p:cNvCxnSpPr>
             <a:stCxn id="5" idx="1"/>
             <a:endCxn id="20" idx="3"/>
@@ -4330,13 +4336,13 @@
       </p:cxnSp>
       <p:cxnSp>
         <p:nvCxnSpPr>
-          <p:cNvPr id="23" name="Straight Arrow Connector 57"/>
+          <p:cNvPr id="18" name="Straight Arrow Connector 57"/>
           <p:cNvCxnSpPr/>
           <p:nvPr/>
         </p:nvCxnSpPr>
         <p:spPr>
           <a:xfrm flipH="1">
-            <a:off x="1981201" y="4122262"/>
+            <a:off x="2044742" y="4122262"/>
             <a:ext cx="1" cy="655093"/>
           </a:xfrm>
           <a:prstGeom prst="straightConnector1">
@@ -4368,7 +4374,7 @@
       </p:cxnSp>
       <p:cxnSp>
         <p:nvCxnSpPr>
-          <p:cNvPr id="24" name="Elbow Connector 122"/>
+          <p:cNvPr id="19" name="Elbow Connector 122"/>
           <p:cNvCxnSpPr/>
           <p:nvPr/>
         </p:nvCxnSpPr>
@@ -4411,7 +4417,7 @@
       </p:cxnSp>
       <p:cxnSp>
         <p:nvCxnSpPr>
-          <p:cNvPr id="25" name="Elbow Connector 63"/>
+          <p:cNvPr id="20" name="Elbow Connector 63"/>
           <p:cNvCxnSpPr>
             <a:stCxn id="5" idx="2"/>
             <a:endCxn id="12" idx="1"/>
@@ -4453,7 +4459,7 @@
       </p:cxnSp>
       <p:grpSp>
         <p:nvGrpSpPr>
-          <p:cNvPr id="26" name="Group 25"/>
+          <p:cNvPr id="21" name="Group 20"/>
           <p:cNvGrpSpPr/>
           <p:nvPr/>
         </p:nvGrpSpPr>
@@ -4467,7 +4473,7 @@
         </p:grpSpPr>
         <p:sp>
           <p:nvSpPr>
-            <p:cNvPr id="27" name="TextBox 26"/>
+            <p:cNvPr id="22" name="TextBox 21"/>
             <p:cNvSpPr txBox="1"/>
             <p:nvPr/>
           </p:nvSpPr>
@@ -4506,7 +4512,7 @@
         </p:sp>
         <p:sp>
           <p:nvSpPr>
-            <p:cNvPr id="28" name="Isosceles Triangle 27"/>
+            <p:cNvPr id="23" name="Isosceles Triangle 27"/>
             <p:cNvSpPr/>
             <p:nvPr/>
           </p:nvSpPr>
@@ -4553,7 +4559,7 @@
       </p:grpSp>
       <p:grpSp>
         <p:nvGrpSpPr>
-          <p:cNvPr id="29" name="Group 28"/>
+          <p:cNvPr id="24" name="Group 23"/>
           <p:cNvGrpSpPr/>
           <p:nvPr/>
         </p:nvGrpSpPr>
@@ -4567,7 +4573,7 @@
         </p:grpSpPr>
         <p:sp>
           <p:nvSpPr>
-            <p:cNvPr id="30" name="TextBox 29"/>
+            <p:cNvPr id="25" name="TextBox 24"/>
             <p:cNvSpPr txBox="1"/>
             <p:nvPr/>
           </p:nvSpPr>
@@ -4605,7 +4611,7 @@
         </p:sp>
         <p:sp>
           <p:nvSpPr>
-            <p:cNvPr id="31" name="Isosceles Triangle 30"/>
+            <p:cNvPr id="26" name="Isosceles Triangle 30"/>
             <p:cNvSpPr/>
             <p:nvPr/>
           </p:nvSpPr>
@@ -4652,7 +4658,7 @@
       </p:grpSp>
       <p:sp>
         <p:nvSpPr>
-          <p:cNvPr id="32" name="TextBox 31"/>
+          <p:cNvPr id="27" name="TextBox 26"/>
           <p:cNvSpPr txBox="1"/>
           <p:nvPr/>
         </p:nvSpPr>
@@ -4691,7 +4697,7 @@
       </p:sp>
       <p:sp>
         <p:nvSpPr>
-          <p:cNvPr id="33" name="TextBox 32"/>
+          <p:cNvPr id="28" name="TextBox 27"/>
           <p:cNvSpPr txBox="1"/>
           <p:nvPr/>
         </p:nvSpPr>
@@ -4730,7 +4736,7 @@
       </p:sp>
       <p:sp>
         <p:nvSpPr>
-          <p:cNvPr id="37" name="Rectangle 11"/>
+          <p:cNvPr id="29" name="Rectangle 11"/>
           <p:cNvSpPr/>
           <p:nvPr/>
         </p:nvSpPr>
@@ -4786,7 +4792,7 @@
       </p:sp>
       <p:cxnSp>
         <p:nvCxnSpPr>
-          <p:cNvPr id="39" name="Elbow Connector 122"/>
+          <p:cNvPr id="30" name="Elbow Connector 122"/>
           <p:cNvCxnSpPr/>
           <p:nvPr/>
         </p:nvCxnSpPr>
@@ -4827,7 +4833,7 @@
       </p:cxnSp>
       <p:sp>
         <p:nvSpPr>
-          <p:cNvPr id="42" name="Rectangle 11"/>
+          <p:cNvPr id="31" name="Rectangle 11"/>
           <p:cNvSpPr/>
           <p:nvPr/>
         </p:nvSpPr>
@@ -4898,7 +4904,7 @@
       </p:sp>
       <p:sp>
         <p:nvSpPr>
-          <p:cNvPr id="44" name="Rectangle 11"/>
+          <p:cNvPr id="32" name="Rectangle 11"/>
           <p:cNvSpPr/>
           <p:nvPr/>
         </p:nvSpPr>
@@ -4969,7 +4975,7 @@
       </p:sp>
       <p:sp>
         <p:nvSpPr>
-          <p:cNvPr id="45" name="Rectangle 44"/>
+          <p:cNvPr id="33" name="Rectangle 32"/>
           <p:cNvSpPr/>
           <p:nvPr/>
         </p:nvSpPr>
@@ -5024,7 +5030,7 @@
       </p:sp>
       <p:sp>
         <p:nvSpPr>
-          <p:cNvPr id="56" name="Rectangle 62"/>
+          <p:cNvPr id="34" name="Rectangle 62"/>
           <p:cNvSpPr/>
           <p:nvPr/>
         </p:nvSpPr>
@@ -5104,7 +5110,7 @@
       </p:sp>
       <p:sp>
         <p:nvSpPr>
-          <p:cNvPr id="58" name="Rectangle 62"/>
+          <p:cNvPr id="35" name="Rectangle 62"/>
           <p:cNvSpPr/>
           <p:nvPr/>
         </p:nvSpPr>
@@ -5169,7 +5175,7 @@
       </p:sp>
       <p:grpSp>
         <p:nvGrpSpPr>
-          <p:cNvPr id="161" name="Group 160"/>
+          <p:cNvPr id="36" name="Group 35"/>
           <p:cNvGrpSpPr/>
           <p:nvPr/>
         </p:nvGrpSpPr>
@@ -5183,7 +5189,7 @@
         </p:grpSpPr>
         <p:sp>
           <p:nvSpPr>
-            <p:cNvPr id="162" name="TextBox 161"/>
+            <p:cNvPr id="37" name="TextBox 36"/>
             <p:cNvSpPr txBox="1"/>
             <p:nvPr/>
           </p:nvSpPr>
@@ -5225,7 +5231,7 @@
         </p:sp>
         <p:sp>
           <p:nvSpPr>
-            <p:cNvPr id="163" name="Isosceles Triangle 162"/>
+            <p:cNvPr id="38" name="Isosceles Triangle 162"/>
             <p:cNvSpPr/>
             <p:nvPr/>
           </p:nvSpPr>
@@ -5274,7 +5280,7 @@
       </p:grpSp>
       <p:grpSp>
         <p:nvGrpSpPr>
-          <p:cNvPr id="164" name="Group 163"/>
+          <p:cNvPr id="39" name="Group 38"/>
           <p:cNvGrpSpPr/>
           <p:nvPr/>
         </p:nvGrpSpPr>
@@ -5288,7 +5294,7 @@
         </p:grpSpPr>
         <p:sp>
           <p:nvSpPr>
-            <p:cNvPr id="165" name="TextBox 164"/>
+            <p:cNvPr id="40" name="TextBox 39"/>
             <p:cNvSpPr txBox="1"/>
             <p:nvPr/>
           </p:nvSpPr>
@@ -5330,7 +5336,7 @@
         </p:sp>
         <p:sp>
           <p:nvSpPr>
-            <p:cNvPr id="166" name="Isosceles Triangle 165"/>
+            <p:cNvPr id="41" name="Isosceles Triangle 165"/>
             <p:cNvSpPr/>
             <p:nvPr/>
           </p:nvSpPr>
@@ -5379,7 +5385,7 @@
       </p:grpSp>
       <p:sp>
         <p:nvSpPr>
-          <p:cNvPr id="60" name="Rectangle 62"/>
+          <p:cNvPr id="42" name="Rectangle 62"/>
           <p:cNvSpPr/>
           <p:nvPr/>
         </p:nvSpPr>
@@ -5444,7 +5450,7 @@
       </p:sp>
       <p:sp>
         <p:nvSpPr>
-          <p:cNvPr id="62" name="Rectangle 62"/>
+          <p:cNvPr id="43" name="Rectangle 62"/>
           <p:cNvSpPr/>
           <p:nvPr/>
         </p:nvSpPr>
@@ -5509,7 +5515,7 @@
       </p:sp>
       <p:cxnSp>
         <p:nvCxnSpPr>
-          <p:cNvPr id="100" name="Straight Arrow Connector 99"/>
+          <p:cNvPr id="44" name="Straight Arrow Connector 43"/>
           <p:cNvCxnSpPr>
             <a:cxnSpLocks/>
             <a:endCxn id="60" idx="3"/>
@@ -5553,7 +5559,7 @@
       </p:cxnSp>
       <p:cxnSp>
         <p:nvCxnSpPr>
-          <p:cNvPr id="105" name="Straight Arrow Connector 104"/>
+          <p:cNvPr id="45" name="Straight Arrow Connector 44"/>
           <p:cNvCxnSpPr>
             <a:cxnSpLocks/>
             <a:endCxn id="62" idx="3"/>
@@ -5597,7 +5603,7 @@
       </p:cxnSp>
       <p:cxnSp>
         <p:nvCxnSpPr>
-          <p:cNvPr id="13" name="Elbow Connector 12"/>
+          <p:cNvPr id="46" name="Elbow Connector 45"/>
           <p:cNvCxnSpPr>
             <a:cxnSpLocks/>
             <a:stCxn id="60" idx="1"/>
@@ -5687,7 +5693,7 @@
       </p:cxnSp>
       <p:cxnSp>
         <p:nvCxnSpPr>
-          <p:cNvPr id="50" name="Elbow Connector 49"/>
+          <p:cNvPr id="48" name="Elbow Connector 47"/>
           <p:cNvCxnSpPr>
             <a:cxnSpLocks/>
             <a:stCxn id="56" idx="1"/>
@@ -5733,7 +5739,7 @@
       </p:cxnSp>
       <p:grpSp>
         <p:nvGrpSpPr>
-          <p:cNvPr id="68" name="Group 67"/>
+          <p:cNvPr id="49" name="Group 48"/>
           <p:cNvGrpSpPr/>
           <p:nvPr/>
         </p:nvGrpSpPr>
@@ -5747,7 +5753,7 @@
         </p:grpSpPr>
         <p:sp>
           <p:nvSpPr>
-            <p:cNvPr id="69" name="TextBox 68"/>
+            <p:cNvPr id="50" name="TextBox 49"/>
             <p:cNvSpPr txBox="1"/>
             <p:nvPr/>
           </p:nvSpPr>
@@ -5789,7 +5795,7 @@
         </p:sp>
         <p:sp>
           <p:nvSpPr>
-            <p:cNvPr id="70" name="Isosceles Triangle 69"/>
+            <p:cNvPr id="51" name="Isosceles Triangle 69"/>
             <p:cNvSpPr/>
             <p:nvPr/>
           </p:nvSpPr>
@@ -5838,9 +5844,8 @@
       </p:grpSp>
       <p:cxnSp>
         <p:nvCxnSpPr>
-          <p:cNvPr id="84" name="Elbow Connector 83"/>
+          <p:cNvPr id="52" name="Elbow Connector 51"/>
           <p:cNvCxnSpPr>
-            <a:stCxn id="87" idx="3"/>
             <a:endCxn id="37" idx="1"/>
           </p:cNvCxnSpPr>
           <p:nvPr/>
@@ -5875,7 +5880,7 @@
       </p:cxnSp>
       <p:sp>
         <p:nvSpPr>
-          <p:cNvPr id="87" name="Isosceles Triangle 102"/>
+          <p:cNvPr id="53" name="Isosceles Triangle 102"/>
           <p:cNvSpPr/>
           <p:nvPr/>
         </p:nvSpPr>
@@ -5929,9 +5934,8 @@
       </p:sp>
       <p:cxnSp>
         <p:nvCxnSpPr>
-          <p:cNvPr id="90" name="Elbow Connector 89"/>
+          <p:cNvPr id="54" name="Elbow Connector 53"/>
           <p:cNvCxnSpPr>
-            <a:stCxn id="87" idx="3"/>
             <a:endCxn id="11" idx="1"/>
           </p:cNvCxnSpPr>
           <p:nvPr/>
@@ -5966,9 +5970,8 @@
       </p:cxnSp>
       <p:cxnSp>
         <p:nvCxnSpPr>
-          <p:cNvPr id="93" name="Elbow Connector 92"/>
+          <p:cNvPr id="55" name="Elbow Connector 54"/>
           <p:cNvCxnSpPr>
-            <a:stCxn id="87" idx="3"/>
             <a:endCxn id="10" idx="1"/>
           </p:cNvCxnSpPr>
           <p:nvPr/>
@@ -6003,9 +6006,8 @@
       </p:cxnSp>
       <p:cxnSp>
         <p:nvCxnSpPr>
-          <p:cNvPr id="96" name="Elbow Connector 95"/>
+          <p:cNvPr id="56" name="Elbow Connector 55"/>
           <p:cNvCxnSpPr>
-            <a:stCxn id="87" idx="3"/>
             <a:endCxn id="4" idx="1"/>
           </p:cNvCxnSpPr>
           <p:nvPr/>
@@ -6040,7 +6042,7 @@
       </p:cxnSp>
       <p:cxnSp>
         <p:nvCxnSpPr>
-          <p:cNvPr id="110" name="Elbow Connector 63"/>
+          <p:cNvPr id="57" name="Elbow Connector 63"/>
           <p:cNvCxnSpPr>
             <a:stCxn id="16" idx="3"/>
             <a:endCxn id="45" idx="3"/>
@@ -6086,7 +6088,7 @@
       </p:cxnSp>
       <p:cxnSp>
         <p:nvCxnSpPr>
-          <p:cNvPr id="113" name="Elbow Connector 63"/>
+          <p:cNvPr id="58" name="Elbow Connector 63"/>
           <p:cNvCxnSpPr>
             <a:stCxn id="16" idx="3"/>
             <a:endCxn id="44" idx="3"/>
@@ -6132,7 +6134,7 @@
       </p:cxnSp>
       <p:cxnSp>
         <p:nvCxnSpPr>
-          <p:cNvPr id="116" name="Elbow Connector 63"/>
+          <p:cNvPr id="59" name="Elbow Connector 63"/>
           <p:cNvCxnSpPr>
             <a:stCxn id="16" idx="3"/>
             <a:endCxn id="42" idx="3"/>
@@ -6178,7 +6180,7 @@
       </p:cxnSp>
       <p:cxnSp>
         <p:nvCxnSpPr>
-          <p:cNvPr id="120" name="Elbow Connector 63"/>
+          <p:cNvPr id="60" name="Elbow Connector 63"/>
           <p:cNvCxnSpPr>
             <a:cxnSpLocks/>
             <a:stCxn id="44" idx="1"/>
@@ -6225,7 +6227,7 @@
       </p:cxnSp>
       <p:cxnSp>
         <p:nvCxnSpPr>
-          <p:cNvPr id="122" name="Elbow Connector 63"/>
+          <p:cNvPr id="61" name="Elbow Connector 63"/>
           <p:cNvCxnSpPr>
             <a:cxnSpLocks/>
             <a:stCxn id="42" idx="1"/>
@@ -6272,7 +6274,7 @@
       </p:cxnSp>
       <p:cxnSp>
         <p:nvCxnSpPr>
-          <p:cNvPr id="64" name="Straight Connector 63"/>
+          <p:cNvPr id="62" name="Straight Connector 61"/>
           <p:cNvCxnSpPr>
             <a:cxnSpLocks/>
           </p:cNvCxnSpPr>
@@ -6315,7 +6317,7 @@
       </p:cxnSp>
       <p:cxnSp>
         <p:nvCxnSpPr>
-          <p:cNvPr id="66" name="Straight Connector 65"/>
+          <p:cNvPr id="63" name="Straight Connector 62"/>
           <p:cNvCxnSpPr>
             <a:cxnSpLocks/>
           </p:cNvCxnSpPr>
@@ -6358,7 +6360,7 @@
       </p:cxnSp>
       <p:cxnSp>
         <p:nvCxnSpPr>
-          <p:cNvPr id="73" name="Straight Connector 72"/>
+          <p:cNvPr id="64" name="Straight Connector 63"/>
           <p:cNvCxnSpPr>
             <a:cxnSpLocks/>
           </p:cNvCxnSpPr>
@@ -6401,7 +6403,7 @@
       </p:cxnSp>
       <p:cxnSp>
         <p:nvCxnSpPr>
-          <p:cNvPr id="74" name="Straight Connector 73"/>
+          <p:cNvPr id="65" name="Straight Connector 64"/>
           <p:cNvCxnSpPr>
             <a:cxnSpLocks/>
           </p:cNvCxnSpPr>
@@ -6444,7 +6446,7 @@
       </p:cxnSp>
       <p:sp>
         <p:nvSpPr>
-          <p:cNvPr id="109" name="Rectangle 62"/>
+          <p:cNvPr id="66" name="Rectangle 62"/>
           <p:cNvSpPr/>
           <p:nvPr/>
         </p:nvSpPr>
@@ -6519,10 +6521,9 @@
       </p:sp>
       <p:cxnSp>
         <p:nvCxnSpPr>
-          <p:cNvPr id="112" name="Elbow Connector 12"/>
+          <p:cNvPr id="67" name="Elbow Connector 12"/>
           <p:cNvCxnSpPr>
             <a:cxnSpLocks/>
-            <a:stCxn id="109" idx="1"/>
             <a:endCxn id="58" idx="3"/>
           </p:cNvCxnSpPr>
           <p:nvPr/>
@@ -6567,11 +6568,10 @@
       </p:cxnSp>
       <p:cxnSp>
         <p:nvCxnSpPr>
-          <p:cNvPr id="118" name="Elbow Connector 49"/>
+          <p:cNvPr id="68" name="Elbow Connector 49"/>
           <p:cNvCxnSpPr>
             <a:cxnSpLocks/>
             <a:stCxn id="56" idx="2"/>
-            <a:endCxn id="109" idx="0"/>
           </p:cNvCxnSpPr>
           <p:nvPr/>
         </p:nvCxnSpPr>
@@ -6615,10 +6615,9 @@
       </p:cxnSp>
       <p:cxnSp>
         <p:nvCxnSpPr>
-          <p:cNvPr id="123" name="Straight Connector 122"/>
+          <p:cNvPr id="69" name="Straight Connector 68"/>
           <p:cNvCxnSpPr>
             <a:cxnSpLocks/>
-            <a:stCxn id="109" idx="3"/>
           </p:cNvCxnSpPr>
           <p:nvPr/>
         </p:nvCxnSpPr>
@@ -6657,10 +6656,144 @@
           </a:fontRef>
         </p:style>
       </p:cxnSp>
+      <p:sp>
+        <p:nvSpPr>
+          <p:cNvPr id="70" name="Rectangle 65"/>
+          <p:cNvSpPr/>
+          <p:nvPr/>
+        </p:nvSpPr>
+        <p:spPr>
+          <a:xfrm>
+            <a:off x="1103084" y="5234555"/>
+            <a:ext cx="7431315" cy="328045"/>
+          </a:xfrm>
+          <a:prstGeom prst="roundRect">
+            <a:avLst/>
+          </a:prstGeom>
+          <a:solidFill>
+            <a:srgbClr val="FCEADB"/>
+          </a:solidFill>
+          <a:ln w="19050">
+            <a:noFill/>
+          </a:ln>
+          <a:effectLst/>
+        </p:spPr>
+        <p:style>
+          <a:lnRef idx="1">
+            <a:schemeClr val="accent2"/>
+          </a:lnRef>
+          <a:fillRef idx="2">
+            <a:schemeClr val="accent2"/>
+          </a:fillRef>
+          <a:effectRef idx="1">
+            <a:schemeClr val="accent2"/>
+          </a:effectRef>
+          <a:fontRef idx="minor">
+            <a:schemeClr val="dk1"/>
+          </a:fontRef>
+        </p:style>
+        <p:txBody>
+          <a:bodyPr rtlCol="0" anchor="ctr"/>
+          <a:lstStyle/>
+          <a:p>
+            <a:pPr algn="ctr"/>
+            <a:r>
+              <a:rPr lang="en-US" sz="1100" b="1" smtClean="0">
+                <a:solidFill>
+                  <a:schemeClr val="bg1"/>
+                </a:solidFill>
+              </a:rPr>
+              <a:t>Storage</a:t>
+            </a:r>
+            <a:endParaRPr lang="en-SG" sz="1100" b="1" dirty="0">
+              <a:solidFill>
+                <a:schemeClr val="bg1"/>
+              </a:solidFill>
+            </a:endParaRPr>
+          </a:p>
+        </p:txBody>
+      </p:sp>
+      <p:cxnSp>
+        <p:nvCxnSpPr>
+          <p:cNvPr id="71" name="Straight Arrow Connector 57"/>
+          <p:cNvCxnSpPr/>
+          <p:nvPr/>
+        </p:nvCxnSpPr>
+        <p:spPr>
+          <a:xfrm>
+            <a:off x="2179995" y="4105442"/>
+            <a:ext cx="0" cy="1158183"/>
+          </a:xfrm>
+          <a:prstGeom prst="straightConnector1">
+            <a:avLst/>
+          </a:prstGeom>
+          <a:ln w="19050">
+            <a:solidFill>
+              <a:srgbClr val="0070C0"/>
+            </a:solidFill>
+            <a:headEnd type="none" w="med" len="med"/>
+            <a:tailEnd type="arrow" w="med" len="med"/>
+          </a:ln>
+          <a:effectLst/>
+        </p:spPr>
+        <p:style>
+          <a:lnRef idx="1">
+            <a:schemeClr val="accent2"/>
+          </a:lnRef>
+          <a:fillRef idx="2">
+            <a:schemeClr val="accent2"/>
+          </a:fillRef>
+          <a:effectRef idx="1">
+            <a:schemeClr val="accent2"/>
+          </a:effectRef>
+          <a:fontRef idx="minor">
+            <a:schemeClr val="dk1"/>
+          </a:fontRef>
+        </p:style>
+      </p:cxnSp>
+      <p:cxnSp>
+        <p:nvCxnSpPr>
+          <p:cNvPr id="72" name="Straight Arrow Connector 110"/>
+          <p:cNvCxnSpPr/>
+          <p:nvPr/>
+        </p:nvCxnSpPr>
+        <p:spPr>
+          <a:xfrm>
+            <a:off x="7824260" y="4499151"/>
+            <a:ext cx="0" cy="738755"/>
+          </a:xfrm>
+          <a:prstGeom prst="straightConnector1">
+            <a:avLst/>
+          </a:prstGeom>
+          <a:ln w="19050">
+            <a:solidFill>
+              <a:srgbClr val="0070C0"/>
+            </a:solidFill>
+            <a:prstDash val="sysDot"/>
+            <a:headEnd type="none" w="med" len="med"/>
+            <a:tailEnd type="arrow" w="med" len="med"/>
+          </a:ln>
+          <a:effectLst/>
+        </p:spPr>
+        <p:style>
+          <a:lnRef idx="1">
+            <a:schemeClr val="accent2"/>
+          </a:lnRef>
+          <a:fillRef idx="2">
+            <a:schemeClr val="accent2"/>
+          </a:fillRef>
+          <a:effectRef idx="1">
+            <a:schemeClr val="accent2"/>
+          </a:effectRef>
+          <a:fontRef idx="minor">
+            <a:schemeClr val="dk1"/>
+          </a:fontRef>
+        </p:style>
+      </p:cxnSp>
     </p:spTree>
     <p:extLst>
       <p:ext uri="{BB962C8B-B14F-4D97-AF65-F5344CB8AC3E}">
-        <p14:creationId xmlns:p14="http://schemas.microsoft.com/office/powerpoint/2010/main" val="211586602"/>
+        <p14:creationId xmlns:p14="http://schemas.microsoft.com/office/powerpoint/2010/main" val="264721105"/>
       </p:ext>
     </p:extLst>
   </p:cSld>

</xml_diff>

<commit_message>
Interdiff between v11 and v12
</commit_message>
<xml_diff>
--- a/docs/diagrams/LogicComponentClassDiagram.pptx
+++ b/docs/diagrams/LogicComponentClassDiagram.pptx
@@ -208,7 +208,7 @@
           <a:p>
             <a:fld id="{F5CC4B3F-88C1-4FFA-B1B6-F41C21DC6924}" type="datetimeFigureOut">
               <a:rPr lang="en-US" smtClean="0"/>
-              <a:t>3/21/2017</a:t>
+              <a:t>5/30/17</a:t>
             </a:fld>
             <a:endParaRPr lang="en-US"/>
           </a:p>
@@ -475,6 +475,90 @@
 </p:notesMaster>
 </file>
 
+<file path=ppt/notesSlides/notesSlide1.xml><?xml version="1.0" encoding="utf-8"?>
+<p:notes xmlns:a="http://schemas.openxmlformats.org/drawingml/2006/main" xmlns:r="http://schemas.openxmlformats.org/officeDocument/2006/relationships" xmlns:p="http://schemas.openxmlformats.org/presentationml/2006/main">
+  <p:cSld>
+    <p:spTree>
+      <p:nvGrpSpPr>
+        <p:cNvPr id="1" name=""/>
+        <p:cNvGrpSpPr/>
+        <p:nvPr/>
+      </p:nvGrpSpPr>
+      <p:grpSpPr>
+        <a:xfrm>
+          <a:off x="0" y="0"/>
+          <a:ext cx="0" cy="0"/>
+          <a:chOff x="0" y="0"/>
+          <a:chExt cx="0" cy="0"/>
+        </a:xfrm>
+      </p:grpSpPr>
+      <p:sp>
+        <p:nvSpPr>
+          <p:cNvPr id="2" name="Slide Image Placeholder 1"/>
+          <p:cNvSpPr>
+            <a:spLocks noGrp="1" noRot="1" noChangeAspect="1"/>
+          </p:cNvSpPr>
+          <p:nvPr>
+            <p:ph type="sldImg"/>
+          </p:nvPr>
+        </p:nvSpPr>
+        <p:spPr/>
+      </p:sp>
+      <p:sp>
+        <p:nvSpPr>
+          <p:cNvPr id="3" name="Notes Placeholder 2"/>
+          <p:cNvSpPr>
+            <a:spLocks noGrp="1"/>
+          </p:cNvSpPr>
+          <p:nvPr>
+            <p:ph type="body" idx="1"/>
+          </p:nvPr>
+        </p:nvSpPr>
+        <p:spPr/>
+        <p:txBody>
+          <a:bodyPr/>
+          <a:lstStyle/>
+          <a:p>
+            <a:endParaRPr lang="en-US" dirty="0"/>
+          </a:p>
+        </p:txBody>
+      </p:sp>
+      <p:sp>
+        <p:nvSpPr>
+          <p:cNvPr id="4" name="Slide Number Placeholder 3"/>
+          <p:cNvSpPr>
+            <a:spLocks noGrp="1"/>
+          </p:cNvSpPr>
+          <p:nvPr>
+            <p:ph type="sldNum" sz="quarter" idx="10"/>
+          </p:nvPr>
+        </p:nvSpPr>
+        <p:spPr/>
+        <p:txBody>
+          <a:bodyPr/>
+          <a:lstStyle/>
+          <a:p>
+            <a:fld id="{5A7AB025-77E3-4BD1-A2FD-B3183DBA47A3}" type="slidenum">
+              <a:rPr lang="en-US" smtClean="0"/>
+              <a:t>1</a:t>
+            </a:fld>
+            <a:endParaRPr lang="en-US"/>
+          </a:p>
+        </p:txBody>
+      </p:sp>
+    </p:spTree>
+    <p:extLst>
+      <p:ext uri="{BB962C8B-B14F-4D97-AF65-F5344CB8AC3E}">
+        <p14:creationId xmlns:p14="http://schemas.microsoft.com/office/powerpoint/2010/main" val="717245331"/>
+      </p:ext>
+    </p:extLst>
+  </p:cSld>
+  <p:clrMapOvr>
+    <a:masterClrMapping/>
+  </p:clrMapOvr>
+</p:notes>
+</file>
+
 <file path=ppt/slideLayouts/slideLayout1.xml><?xml version="1.0" encoding="utf-8"?>
 <p:sldLayout xmlns:a="http://schemas.openxmlformats.org/drawingml/2006/main" xmlns:r="http://schemas.openxmlformats.org/officeDocument/2006/relationships" xmlns:p="http://schemas.openxmlformats.org/presentationml/2006/main" type="title" preserve="1">
   <p:cSld name="Title Slide">
@@ -654,7 +738,7 @@
           <a:p>
             <a:fld id="{78C97017-6FC3-485B-9764-EAC9E56C1D49}" type="datetimeFigureOut">
               <a:rPr lang="en-US" smtClean="0"/>
-              <a:t>3/21/2017</a:t>
+              <a:t>5/30/17</a:t>
             </a:fld>
             <a:endParaRPr lang="en-US"/>
           </a:p>
@@ -822,7 +906,7 @@
           <a:p>
             <a:fld id="{78C97017-6FC3-485B-9764-EAC9E56C1D49}" type="datetimeFigureOut">
               <a:rPr lang="en-US" smtClean="0"/>
-              <a:t>3/21/2017</a:t>
+              <a:t>5/30/17</a:t>
             </a:fld>
             <a:endParaRPr lang="en-US"/>
           </a:p>
@@ -1000,7 +1084,7 @@
           <a:p>
             <a:fld id="{78C97017-6FC3-485B-9764-EAC9E56C1D49}" type="datetimeFigureOut">
               <a:rPr lang="en-US" smtClean="0"/>
-              <a:t>3/21/2017</a:t>
+              <a:t>5/30/17</a:t>
             </a:fld>
             <a:endParaRPr lang="en-US"/>
           </a:p>
@@ -1168,7 +1252,7 @@
           <a:p>
             <a:fld id="{78C97017-6FC3-485B-9764-EAC9E56C1D49}" type="datetimeFigureOut">
               <a:rPr lang="en-US" smtClean="0"/>
-              <a:t>3/21/2017</a:t>
+              <a:t>5/30/17</a:t>
             </a:fld>
             <a:endParaRPr lang="en-US"/>
           </a:p>
@@ -1413,7 +1497,7 @@
           <a:p>
             <a:fld id="{78C97017-6FC3-485B-9764-EAC9E56C1D49}" type="datetimeFigureOut">
               <a:rPr lang="en-US" smtClean="0"/>
-              <a:t>3/21/2017</a:t>
+              <a:t>5/30/17</a:t>
             </a:fld>
             <a:endParaRPr lang="en-US"/>
           </a:p>
@@ -1698,7 +1782,7 @@
           <a:p>
             <a:fld id="{78C97017-6FC3-485B-9764-EAC9E56C1D49}" type="datetimeFigureOut">
               <a:rPr lang="en-US" smtClean="0"/>
-              <a:t>3/21/2017</a:t>
+              <a:t>5/30/17</a:t>
             </a:fld>
             <a:endParaRPr lang="en-US"/>
           </a:p>
@@ -2117,7 +2201,7 @@
           <a:p>
             <a:fld id="{78C97017-6FC3-485B-9764-EAC9E56C1D49}" type="datetimeFigureOut">
               <a:rPr lang="en-US" smtClean="0"/>
-              <a:t>3/21/2017</a:t>
+              <a:t>5/30/17</a:t>
             </a:fld>
             <a:endParaRPr lang="en-US"/>
           </a:p>
@@ -2234,7 +2318,7 @@
           <a:p>
             <a:fld id="{78C97017-6FC3-485B-9764-EAC9E56C1D49}" type="datetimeFigureOut">
               <a:rPr lang="en-US" smtClean="0"/>
-              <a:t>3/21/2017</a:t>
+              <a:t>5/30/17</a:t>
             </a:fld>
             <a:endParaRPr lang="en-US"/>
           </a:p>
@@ -2329,7 +2413,7 @@
           <a:p>
             <a:fld id="{78C97017-6FC3-485B-9764-EAC9E56C1D49}" type="datetimeFigureOut">
               <a:rPr lang="en-US" smtClean="0"/>
-              <a:t>3/21/2017</a:t>
+              <a:t>5/30/17</a:t>
             </a:fld>
             <a:endParaRPr lang="en-US"/>
           </a:p>
@@ -2604,7 +2688,7 @@
           <a:p>
             <a:fld id="{78C97017-6FC3-485B-9764-EAC9E56C1D49}" type="datetimeFigureOut">
               <a:rPr lang="en-US" smtClean="0"/>
-              <a:t>3/21/2017</a:t>
+              <a:t>5/30/17</a:t>
             </a:fld>
             <a:endParaRPr lang="en-US"/>
           </a:p>
@@ -2856,7 +2940,7 @@
           <a:p>
             <a:fld id="{78C97017-6FC3-485B-9764-EAC9E56C1D49}" type="datetimeFigureOut">
               <a:rPr lang="en-US" smtClean="0"/>
-              <a:t>3/21/2017</a:t>
+              <a:t>5/30/17</a:t>
             </a:fld>
             <a:endParaRPr lang="en-US"/>
           </a:p>
@@ -3067,7 +3151,7 @@
           <a:p>
             <a:fld id="{78C97017-6FC3-485B-9764-EAC9E56C1D49}" type="datetimeFigureOut">
               <a:rPr lang="en-US" smtClean="0"/>
-              <a:t>3/21/2017</a:t>
+              <a:t>5/30/17</a:t>
             </a:fld>
             <a:endParaRPr lang="en-US"/>
           </a:p>
@@ -3450,7 +3534,7 @@
         </p:nvSpPr>
         <p:spPr>
           <a:xfrm>
-            <a:off x="1066800" y="914400"/>
+            <a:off x="1066800" y="928395"/>
             <a:ext cx="7467600" cy="3733800"/>
           </a:xfrm>
           <a:prstGeom prst="roundRect">
@@ -3570,7 +3654,7 @@
         </p:nvSpPr>
         <p:spPr>
           <a:xfrm flipH="1">
-            <a:off x="6520227" y="2149167"/>
+            <a:off x="6874831" y="1818917"/>
             <a:ext cx="1093635" cy="346760"/>
           </a:xfrm>
           <a:prstGeom prst="rect">
@@ -3725,14 +3809,14 @@
         <p:nvCxnSpPr>
           <p:cNvPr id="8" name="Elbow Connector 122"/>
           <p:cNvCxnSpPr>
-            <a:endCxn id="3" idx="1"/>
+            <a:endCxn id="104" idx="1"/>
           </p:cNvCxnSpPr>
           <p:nvPr/>
         </p:nvCxnSpPr>
         <p:spPr>
           <a:xfrm>
-            <a:off x="1676400" y="1423587"/>
-            <a:ext cx="419548" cy="2860"/>
+            <a:off x="1685925" y="2032000"/>
+            <a:ext cx="231582" cy="165"/>
           </a:xfrm>
           <a:prstGeom prst="bentConnector3">
             <a:avLst>
@@ -3832,7 +3916,7 @@
         </p:nvSpPr>
         <p:spPr>
           <a:xfrm flipH="1">
-            <a:off x="6526365" y="2554920"/>
+            <a:off x="6880969" y="2224670"/>
             <a:ext cx="1093635" cy="346760"/>
           </a:xfrm>
           <a:prstGeom prst="rect">
@@ -3888,7 +3972,7 @@
         </p:nvSpPr>
         <p:spPr>
           <a:xfrm flipH="1">
-            <a:off x="6526365" y="3396383"/>
+            <a:off x="6880969" y="3066133"/>
             <a:ext cx="1093635" cy="346760"/>
           </a:xfrm>
           <a:prstGeom prst="rect">
@@ -4030,7 +4114,7 @@
         </p:nvSpPr>
         <p:spPr>
           <a:xfrm>
-            <a:off x="3529350" y="3775502"/>
+            <a:off x="3877262" y="3241814"/>
             <a:ext cx="585450" cy="346760"/>
           </a:xfrm>
           <a:prstGeom prst="rect">
@@ -4087,13 +4171,13 @@
           <p:nvPr/>
         </p:nvCxnSpPr>
         <p:spPr>
-          <a:xfrm>
-            <a:off x="2874420" y="3946343"/>
-            <a:ext cx="654930" cy="2539"/>
+          <a:xfrm flipV="1">
+            <a:off x="2874420" y="3415194"/>
+            <a:ext cx="1002842" cy="531149"/>
           </a:xfrm>
           <a:prstGeom prst="bentConnector3">
             <a:avLst>
-              <a:gd name="adj1" fmla="val 50000"/>
+              <a:gd name="adj1" fmla="val -10787"/>
             </a:avLst>
           </a:prstGeom>
           <a:ln w="19050">
@@ -4658,7 +4742,7 @@
         </p:nvSpPr>
         <p:spPr>
           <a:xfrm>
-            <a:off x="2301175" y="1618473"/>
+            <a:off x="2737492" y="1615794"/>
             <a:ext cx="131116" cy="230832"/>
           </a:xfrm>
           <a:prstGeom prst="rect">
@@ -4697,7 +4781,7 @@
         </p:nvSpPr>
         <p:spPr>
           <a:xfrm>
-            <a:off x="2912207" y="3709457"/>
+            <a:off x="3627061" y="3260713"/>
             <a:ext cx="131116" cy="230832"/>
           </a:xfrm>
           <a:prstGeom prst="rect">
@@ -4736,7 +4820,7 @@
         </p:nvSpPr>
         <p:spPr>
           <a:xfrm flipH="1">
-            <a:off x="6526365" y="2956137"/>
+            <a:off x="6880969" y="2625887"/>
             <a:ext cx="1093635" cy="346760"/>
           </a:xfrm>
           <a:prstGeom prst="rect">
@@ -4791,9 +4875,9 @@
           <p:nvPr/>
         </p:nvCxnSpPr>
         <p:spPr>
-          <a:xfrm rot="16200000" flipV="1">
-            <a:off x="1105538" y="2692369"/>
-            <a:ext cx="2147794" cy="2"/>
+          <a:xfrm rot="5400000" flipH="1" flipV="1">
+            <a:off x="1624562" y="2675091"/>
+            <a:ext cx="2173136" cy="3002"/>
           </a:xfrm>
           <a:prstGeom prst="bentConnector3">
             <a:avLst>
@@ -4833,7 +4917,7 @@
         </p:nvSpPr>
         <p:spPr>
           <a:xfrm flipH="1">
-            <a:off x="4831294" y="2148937"/>
+            <a:off x="5185898" y="1818687"/>
             <a:ext cx="1093635" cy="346760"/>
           </a:xfrm>
           <a:prstGeom prst="rect">
@@ -4904,7 +4988,7 @@
         </p:nvSpPr>
         <p:spPr>
           <a:xfrm flipH="1">
-            <a:off x="4831294" y="2555337"/>
+            <a:off x="5185898" y="2225087"/>
             <a:ext cx="1093635" cy="346760"/>
           </a:xfrm>
           <a:prstGeom prst="rect">
@@ -4975,7 +5059,7 @@
         </p:nvSpPr>
         <p:spPr>
           <a:xfrm flipH="1">
-            <a:off x="4831292" y="2977582"/>
+            <a:off x="5185896" y="2647332"/>
             <a:ext cx="1093635" cy="346760"/>
           </a:xfrm>
           <a:prstGeom prst="rect">
@@ -5030,7 +5114,7 @@
         </p:nvSpPr>
         <p:spPr>
           <a:xfrm>
-            <a:off x="3174214" y="1862795"/>
+            <a:off x="3528818" y="1532545"/>
             <a:ext cx="751107" cy="346760"/>
           </a:xfrm>
           <a:prstGeom prst="rect">
@@ -5110,8 +5194,8 @@
         </p:nvSpPr>
         <p:spPr>
           <a:xfrm>
-            <a:off x="2238496" y="2454481"/>
-            <a:ext cx="726243" cy="174580"/>
+            <a:off x="2793335" y="2120612"/>
+            <a:ext cx="506515" cy="174580"/>
           </a:xfrm>
           <a:prstGeom prst="rect">
             <a:avLst/>
@@ -5175,7 +5259,7 @@
         </p:nvGrpSpPr>
         <p:grpSpPr>
           <a:xfrm rot="5400000">
-            <a:off x="6088711" y="1962201"/>
+            <a:off x="6443315" y="1631951"/>
             <a:ext cx="254462" cy="555486"/>
             <a:chOff x="3949242" y="578739"/>
             <a:chExt cx="254462" cy="503902"/>
@@ -5280,7 +5364,7 @@
         </p:nvGrpSpPr>
         <p:grpSpPr>
           <a:xfrm rot="5400000">
-            <a:off x="6098740" y="2390577"/>
+            <a:off x="6453344" y="2060327"/>
             <a:ext cx="254462" cy="555486"/>
             <a:chOff x="3965759" y="592436"/>
             <a:chExt cx="254462" cy="503902"/>
@@ -5385,7 +5469,7 @@
         </p:nvSpPr>
         <p:spPr>
           <a:xfrm>
-            <a:off x="3186326" y="2841725"/>
+            <a:off x="3540930" y="2511475"/>
             <a:ext cx="731636" cy="283820"/>
           </a:xfrm>
           <a:prstGeom prst="rect">
@@ -5450,7 +5534,7 @@
         </p:nvSpPr>
         <p:spPr>
           <a:xfrm>
-            <a:off x="3186326" y="3190882"/>
+            <a:off x="3540930" y="2860632"/>
             <a:ext cx="731636" cy="283820"/>
           </a:xfrm>
           <a:prstGeom prst="rect">
@@ -5518,7 +5602,7 @@
         </p:nvCxnSpPr>
         <p:spPr>
           <a:xfrm flipH="1">
-            <a:off x="3917962" y="2983635"/>
+            <a:off x="4272566" y="2653385"/>
             <a:ext cx="335164" cy="0"/>
           </a:xfrm>
           <a:prstGeom prst="straightConnector1">
@@ -5562,7 +5646,7 @@
         </p:nvCxnSpPr>
         <p:spPr>
           <a:xfrm flipH="1">
-            <a:off x="3917962" y="3332439"/>
+            <a:off x="4272566" y="3002189"/>
             <a:ext cx="335164" cy="353"/>
           </a:xfrm>
           <a:prstGeom prst="straightConnector1">
@@ -5607,8 +5691,8 @@
         </p:nvCxnSpPr>
         <p:spPr>
           <a:xfrm rot="10800000">
-            <a:off x="2601618" y="2629061"/>
-            <a:ext cx="584708" cy="354574"/>
+            <a:off x="3046594" y="2295193"/>
+            <a:ext cx="494337" cy="358193"/>
           </a:xfrm>
           <a:prstGeom prst="bentConnector2">
             <a:avLst/>
@@ -5652,7 +5736,7 @@
         </p:nvCxnSpPr>
         <p:spPr>
           <a:xfrm>
-            <a:off x="3925321" y="2036175"/>
+            <a:off x="4279925" y="1705925"/>
             <a:ext cx="327805" cy="107"/>
           </a:xfrm>
           <a:prstGeom prst="line">
@@ -5697,8 +5781,8 @@
         </p:nvCxnSpPr>
         <p:spPr>
           <a:xfrm rot="10800000" flipV="1">
-            <a:off x="2601618" y="2036175"/>
-            <a:ext cx="572596" cy="418306"/>
+            <a:off x="3046594" y="1705924"/>
+            <a:ext cx="482225" cy="414687"/>
           </a:xfrm>
           <a:prstGeom prst="bentConnector2">
             <a:avLst/>
@@ -5739,7 +5823,7 @@
         </p:nvGrpSpPr>
         <p:grpSpPr>
           <a:xfrm rot="5400000">
-            <a:off x="4346209" y="3538793"/>
+            <a:off x="4700220" y="3066879"/>
             <a:ext cx="555486" cy="254462"/>
             <a:chOff x="3703306" y="644022"/>
             <a:chExt cx="555486" cy="230832"/>
@@ -5847,8 +5931,8 @@
         </p:nvCxnSpPr>
         <p:spPr>
           <a:xfrm rot="16200000" flipV="1">
-            <a:off x="7296652" y="3452865"/>
-            <a:ext cx="850958" cy="204262"/>
+            <a:off x="7468408" y="3305464"/>
+            <a:ext cx="1155025" cy="142632"/>
           </a:xfrm>
           <a:prstGeom prst="bentConnector2">
             <a:avLst/>
@@ -5881,7 +5965,7 @@
         </p:nvSpPr>
         <p:spPr>
           <a:xfrm flipV="1">
-            <a:off x="7689010" y="3980475"/>
+            <a:off x="7981984" y="3954292"/>
             <a:ext cx="270504" cy="175523"/>
           </a:xfrm>
           <a:prstGeom prst="triangle">
@@ -5938,8 +6022,8 @@
         </p:nvCxnSpPr>
         <p:spPr>
           <a:xfrm rot="16200000" flipV="1">
-            <a:off x="7516775" y="3672988"/>
-            <a:ext cx="410712" cy="204262"/>
+            <a:off x="7688531" y="3525587"/>
+            <a:ext cx="714779" cy="142632"/>
           </a:xfrm>
           <a:prstGeom prst="bentConnector2">
             <a:avLst/>
@@ -5975,8 +6059,8 @@
         </p:nvCxnSpPr>
         <p:spPr>
           <a:xfrm rot="16200000" flipV="1">
-            <a:off x="7096044" y="3252257"/>
-            <a:ext cx="1252175" cy="204262"/>
+            <a:off x="7267799" y="3104855"/>
+            <a:ext cx="1556242" cy="142632"/>
           </a:xfrm>
           <a:prstGeom prst="bentConnector2">
             <a:avLst/>
@@ -6012,8 +6096,8 @@
         </p:nvCxnSpPr>
         <p:spPr>
           <a:xfrm rot="16200000" flipV="1">
-            <a:off x="6890098" y="3046311"/>
-            <a:ext cx="1657928" cy="210400"/>
+            <a:off x="7061854" y="2898910"/>
+            <a:ext cx="1961995" cy="148770"/>
           </a:xfrm>
           <a:prstGeom prst="bentConnector2">
             <a:avLst/>
@@ -6049,8 +6133,8 @@
         </p:nvCxnSpPr>
         <p:spPr>
           <a:xfrm flipV="1">
-            <a:off x="4114800" y="3150962"/>
-            <a:ext cx="716492" cy="797920"/>
+            <a:off x="4462712" y="2820712"/>
+            <a:ext cx="723184" cy="594482"/>
           </a:xfrm>
           <a:prstGeom prst="bentConnector3">
             <a:avLst>
@@ -6095,8 +6179,8 @@
         </p:nvCxnSpPr>
         <p:spPr>
           <a:xfrm flipV="1">
-            <a:off x="4114800" y="2728717"/>
-            <a:ext cx="716494" cy="1220165"/>
+            <a:off x="4462712" y="2398467"/>
+            <a:ext cx="723186" cy="1016727"/>
           </a:xfrm>
           <a:prstGeom prst="bentConnector3">
             <a:avLst>
@@ -6141,8 +6225,8 @@
         </p:nvCxnSpPr>
         <p:spPr>
           <a:xfrm flipV="1">
-            <a:off x="4114800" y="2322317"/>
-            <a:ext cx="716494" cy="1626565"/>
+            <a:off x="4462712" y="1992067"/>
+            <a:ext cx="723186" cy="1423127"/>
           </a:xfrm>
           <a:prstGeom prst="bentConnector3">
             <a:avLst>
@@ -6188,7 +6272,7 @@
         </p:nvCxnSpPr>
         <p:spPr>
           <a:xfrm flipV="1">
-            <a:off x="5924929" y="2728300"/>
+            <a:off x="6279533" y="2398050"/>
             <a:ext cx="601436" cy="417"/>
           </a:xfrm>
           <a:prstGeom prst="bentConnector3">
@@ -6235,7 +6319,7 @@
         </p:nvCxnSpPr>
         <p:spPr>
           <a:xfrm>
-            <a:off x="5924929" y="2322317"/>
+            <a:off x="6279533" y="1992067"/>
             <a:ext cx="595298" cy="230"/>
           </a:xfrm>
           <a:prstGeom prst="bentConnector3">
@@ -6280,7 +6364,7 @@
         </p:nvCxnSpPr>
         <p:spPr>
           <a:xfrm>
-            <a:off x="4248488" y="2033984"/>
+            <a:off x="4603092" y="1703734"/>
             <a:ext cx="0" cy="1304815"/>
           </a:xfrm>
           <a:prstGeom prst="line">
@@ -6323,7 +6407,7 @@
         </p:nvCxnSpPr>
         <p:spPr>
           <a:xfrm>
-            <a:off x="4248488" y="2209800"/>
+            <a:off x="4603092" y="1879550"/>
             <a:ext cx="582002" cy="0"/>
           </a:xfrm>
           <a:prstGeom prst="line">
@@ -6366,7 +6450,7 @@
         </p:nvCxnSpPr>
         <p:spPr>
           <a:xfrm flipV="1">
-            <a:off x="4255042" y="2607245"/>
+            <a:off x="4609646" y="2276995"/>
             <a:ext cx="566976" cy="5974"/>
           </a:xfrm>
           <a:prstGeom prst="line">
@@ -6409,7 +6493,7 @@
         </p:nvCxnSpPr>
         <p:spPr>
           <a:xfrm>
-            <a:off x="4248487" y="3048000"/>
+            <a:off x="4603091" y="2717750"/>
             <a:ext cx="573531" cy="0"/>
           </a:xfrm>
           <a:prstGeom prst="line">
@@ -6450,7 +6534,7 @@
         </p:nvSpPr>
         <p:spPr>
           <a:xfrm>
-            <a:off x="3174214" y="2370131"/>
+            <a:off x="3528818" y="2039881"/>
             <a:ext cx="750156" cy="340758"/>
           </a:xfrm>
           <a:prstGeom prst="rect">
@@ -6523,13 +6607,12 @@
           <p:cNvCxnSpPr>
             <a:cxnSpLocks/>
             <a:stCxn id="109" idx="1"/>
-            <a:endCxn id="58" idx="3"/>
           </p:cNvCxnSpPr>
           <p:nvPr/>
         </p:nvCxnSpPr>
         <p:spPr>
           <a:xfrm rot="10800000" flipV="1">
-            <a:off x="2964740" y="2540509"/>
+            <a:off x="3319344" y="2210259"/>
             <a:ext cx="209475" cy="1261"/>
           </a:xfrm>
           <a:prstGeom prst="bentConnector3">
@@ -6577,7 +6660,7 @@
         </p:nvCxnSpPr>
         <p:spPr>
           <a:xfrm rot="5400000">
-            <a:off x="3469242" y="2289605"/>
+            <a:off x="3823846" y="1959355"/>
             <a:ext cx="160576" cy="476"/>
           </a:xfrm>
           <a:prstGeom prst="bentConnector3">
@@ -6624,7 +6707,7 @@
         </p:nvCxnSpPr>
         <p:spPr>
           <a:xfrm flipV="1">
-            <a:off x="3924370" y="2535795"/>
+            <a:off x="4278974" y="2205545"/>
             <a:ext cx="322202" cy="4715"/>
           </a:xfrm>
           <a:prstGeom prst="line">
@@ -6657,6 +6740,342 @@
           </a:fontRef>
         </p:style>
       </p:cxnSp>
+      <p:sp>
+        <p:nvSpPr>
+          <p:cNvPr id="86" name="Rectangle 85"/>
+          <p:cNvSpPr/>
+          <p:nvPr/>
+        </p:nvSpPr>
+        <p:spPr>
+          <a:xfrm flipH="1">
+            <a:off x="3721100" y="3775896"/>
+            <a:ext cx="900000" cy="346760"/>
+          </a:xfrm>
+          <a:prstGeom prst="rect">
+            <a:avLst/>
+          </a:prstGeom>
+          <a:solidFill>
+            <a:schemeClr val="accent5"/>
+          </a:solidFill>
+          <a:ln/>
+          <a:effectLst/>
+        </p:spPr>
+        <p:style>
+          <a:lnRef idx="1">
+            <a:schemeClr val="accent5"/>
+          </a:lnRef>
+          <a:fillRef idx="2">
+            <a:schemeClr val="accent5"/>
+          </a:fillRef>
+          <a:effectRef idx="1">
+            <a:schemeClr val="accent5"/>
+          </a:effectRef>
+          <a:fontRef idx="minor">
+            <a:schemeClr val="dk1"/>
+          </a:fontRef>
+        </p:style>
+        <p:txBody>
+          <a:bodyPr rtlCol="0" anchor="ctr"/>
+          <a:lstStyle/>
+          <a:p>
+            <a:pPr algn="ctr"/>
+            <a:r>
+              <a:rPr lang="en-US" sz="1050" b="1" dirty="0" err="1" smtClean="0">
+                <a:solidFill>
+                  <a:schemeClr val="bg1"/>
+                </a:solidFill>
+              </a:rPr>
+              <a:t>ParserResult</a:t>
+            </a:r>
+            <a:endParaRPr lang="en-SG" sz="1050" b="1" dirty="0">
+              <a:solidFill>
+                <a:schemeClr val="bg1"/>
+              </a:solidFill>
+            </a:endParaRPr>
+          </a:p>
+        </p:txBody>
+      </p:sp>
+      <p:cxnSp>
+        <p:nvCxnSpPr>
+          <p:cNvPr id="88" name="Elbow Connector 63"/>
+          <p:cNvCxnSpPr>
+            <a:stCxn id="16" idx="2"/>
+            <a:endCxn id="86" idx="0"/>
+          </p:cNvCxnSpPr>
+          <p:nvPr/>
+        </p:nvCxnSpPr>
+        <p:spPr>
+          <a:xfrm rot="16200000" flipH="1">
+            <a:off x="4076882" y="3681678"/>
+            <a:ext cx="187322" cy="1113"/>
+          </a:xfrm>
+          <a:prstGeom prst="bentConnector3">
+            <a:avLst>
+              <a:gd name="adj1" fmla="val 50000"/>
+            </a:avLst>
+          </a:prstGeom>
+          <a:ln w="19050">
+            <a:solidFill>
+              <a:schemeClr val="accent5">
+                <a:lumMod val="75000"/>
+              </a:schemeClr>
+            </a:solidFill>
+            <a:prstDash val="sysDot"/>
+            <a:headEnd type="none" w="med" len="med"/>
+            <a:tailEnd type="arrow" w="med" len="med"/>
+          </a:ln>
+          <a:effectLst/>
+        </p:spPr>
+        <p:style>
+          <a:lnRef idx="1">
+            <a:schemeClr val="accent2"/>
+          </a:lnRef>
+          <a:fillRef idx="2">
+            <a:schemeClr val="accent2"/>
+          </a:fillRef>
+          <a:effectRef idx="1">
+            <a:schemeClr val="accent2"/>
+          </a:effectRef>
+          <a:fontRef idx="minor">
+            <a:schemeClr val="dk1"/>
+          </a:fontRef>
+        </p:style>
+      </p:cxnSp>
+      <p:cxnSp>
+        <p:nvCxnSpPr>
+          <p:cNvPr id="98" name="Elbow Connector 122"/>
+          <p:cNvCxnSpPr>
+            <a:stCxn id="5" idx="3"/>
+            <a:endCxn id="86" idx="3"/>
+          </p:cNvCxnSpPr>
+          <p:nvPr/>
+        </p:nvCxnSpPr>
+        <p:spPr>
+          <a:xfrm>
+            <a:off x="2874420" y="3946343"/>
+            <a:ext cx="846680" cy="2933"/>
+          </a:xfrm>
+          <a:prstGeom prst="bentConnector3">
+            <a:avLst>
+              <a:gd name="adj1" fmla="val 50000"/>
+            </a:avLst>
+          </a:prstGeom>
+          <a:ln w="19050">
+            <a:solidFill>
+              <a:srgbClr val="0070C0"/>
+            </a:solidFill>
+            <a:prstDash val="sysDot"/>
+            <a:headEnd type="none" w="med" len="med"/>
+            <a:tailEnd type="arrow" w="med" len="med"/>
+          </a:ln>
+          <a:effectLst/>
+        </p:spPr>
+        <p:style>
+          <a:lnRef idx="1">
+            <a:schemeClr val="accent2"/>
+          </a:lnRef>
+          <a:fillRef idx="2">
+            <a:schemeClr val="accent2"/>
+          </a:fillRef>
+          <a:effectRef idx="1">
+            <a:schemeClr val="accent2"/>
+          </a:effectRef>
+          <a:fontRef idx="minor">
+            <a:schemeClr val="dk1"/>
+          </a:fontRef>
+        </p:style>
+      </p:cxnSp>
+      <p:cxnSp>
+        <p:nvCxnSpPr>
+          <p:cNvPr id="101" name="Elbow Connector 122"/>
+          <p:cNvCxnSpPr>
+            <a:stCxn id="5" idx="0"/>
+          </p:cNvCxnSpPr>
+          <p:nvPr/>
+        </p:nvCxnSpPr>
+        <p:spPr>
+          <a:xfrm rot="16200000" flipV="1">
+            <a:off x="1553455" y="2998814"/>
+            <a:ext cx="1548293" cy="5"/>
+          </a:xfrm>
+          <a:prstGeom prst="bentConnector3">
+            <a:avLst>
+              <a:gd name="adj1" fmla="val 50000"/>
+            </a:avLst>
+          </a:prstGeom>
+          <a:ln w="19050">
+            <a:solidFill>
+              <a:srgbClr val="0070C0"/>
+            </a:solidFill>
+            <a:prstDash val="sysDot"/>
+            <a:headEnd type="none" w="med" len="med"/>
+            <a:tailEnd type="arrow" w="med" len="med"/>
+          </a:ln>
+          <a:effectLst/>
+        </p:spPr>
+        <p:style>
+          <a:lnRef idx="1">
+            <a:schemeClr val="accent2"/>
+          </a:lnRef>
+          <a:fillRef idx="2">
+            <a:schemeClr val="accent2"/>
+          </a:fillRef>
+          <a:effectRef idx="1">
+            <a:schemeClr val="accent2"/>
+          </a:effectRef>
+          <a:fontRef idx="minor">
+            <a:schemeClr val="dk1"/>
+          </a:fontRef>
+        </p:style>
+      </p:cxnSp>
+      <p:sp>
+        <p:nvSpPr>
+          <p:cNvPr id="104" name="Rectangle 8"/>
+          <p:cNvSpPr/>
+          <p:nvPr/>
+        </p:nvSpPr>
+        <p:spPr>
+          <a:xfrm>
+            <a:off x="1917507" y="1858785"/>
+            <a:ext cx="752724" cy="346760"/>
+          </a:xfrm>
+          <a:prstGeom prst="rect">
+            <a:avLst/>
+          </a:prstGeom>
+          <a:solidFill>
+            <a:srgbClr val="0070C0"/>
+          </a:solidFill>
+          <a:ln w="19050">
+            <a:solidFill>
+              <a:srgbClr val="0070C0"/>
+            </a:solidFill>
+          </a:ln>
+          <a:effectLst/>
+        </p:spPr>
+        <p:style>
+          <a:lnRef idx="1">
+            <a:schemeClr val="accent2"/>
+          </a:lnRef>
+          <a:fillRef idx="2">
+            <a:schemeClr val="accent2"/>
+          </a:fillRef>
+          <a:effectRef idx="1">
+            <a:schemeClr val="accent2"/>
+          </a:effectRef>
+          <a:fontRef idx="minor">
+            <a:schemeClr val="dk1"/>
+          </a:fontRef>
+        </p:style>
+        <p:txBody>
+          <a:bodyPr rtlCol="0" anchor="ctr"/>
+          <a:lstStyle/>
+          <a:p>
+            <a:pPr algn="ctr"/>
+            <a:r>
+              <a:rPr lang="en-US" sz="1050" dirty="0" smtClean="0">
+                <a:solidFill>
+                  <a:schemeClr val="bg1"/>
+                </a:solidFill>
+              </a:rPr>
+              <a:t>Execution</a:t>
+            </a:r>
+          </a:p>
+          <a:p>
+            <a:pPr algn="ctr"/>
+            <a:r>
+              <a:rPr lang="en-US" sz="1050" dirty="0" smtClean="0">
+                <a:solidFill>
+                  <a:schemeClr val="bg1"/>
+                </a:solidFill>
+              </a:rPr>
+              <a:t>Result</a:t>
+            </a:r>
+            <a:endParaRPr lang="en-SG" sz="1050" dirty="0">
+              <a:solidFill>
+                <a:schemeClr val="bg1"/>
+              </a:solidFill>
+            </a:endParaRPr>
+          </a:p>
+        </p:txBody>
+      </p:sp>
+      <p:sp>
+        <p:nvSpPr>
+          <p:cNvPr id="134" name="TextBox 133"/>
+          <p:cNvSpPr txBox="1"/>
+          <p:nvPr/>
+        </p:nvSpPr>
+        <p:spPr>
+          <a:xfrm>
+            <a:off x="2095948" y="2246551"/>
+            <a:ext cx="131116" cy="230832"/>
+          </a:xfrm>
+          <a:prstGeom prst="rect">
+            <a:avLst/>
+          </a:prstGeom>
+          <a:noFill/>
+        </p:spPr>
+        <p:txBody>
+          <a:bodyPr wrap="square" lIns="0" tIns="0" rIns="0" bIns="0" rtlCol="0">
+            <a:noAutofit/>
+          </a:bodyPr>
+          <a:lstStyle/>
+          <a:p>
+            <a:pPr algn="r"/>
+            <a:r>
+              <a:rPr lang="en-US" sz="1100" dirty="0">
+                <a:solidFill>
+                  <a:srgbClr val="0070C0"/>
+                </a:solidFill>
+              </a:rPr>
+              <a:t>1</a:t>
+            </a:r>
+            <a:endParaRPr lang="en-SG" sz="1100" dirty="0">
+              <a:solidFill>
+                <a:srgbClr val="0070C0"/>
+              </a:solidFill>
+            </a:endParaRPr>
+          </a:p>
+        </p:txBody>
+      </p:sp>
+      <p:sp>
+        <p:nvSpPr>
+          <p:cNvPr id="135" name="TextBox 134"/>
+          <p:cNvSpPr txBox="1"/>
+          <p:nvPr/>
+        </p:nvSpPr>
+        <p:spPr>
+          <a:xfrm>
+            <a:off x="4182835" y="3631299"/>
+            <a:ext cx="131116" cy="230832"/>
+          </a:xfrm>
+          <a:prstGeom prst="rect">
+            <a:avLst/>
+          </a:prstGeom>
+          <a:noFill/>
+        </p:spPr>
+        <p:txBody>
+          <a:bodyPr wrap="square" lIns="0" tIns="0" rIns="0" bIns="0" rtlCol="0">
+            <a:noAutofit/>
+          </a:bodyPr>
+          <a:lstStyle/>
+          <a:p>
+            <a:pPr algn="r"/>
+            <a:r>
+              <a:rPr lang="en-US" sz="1100" dirty="0">
+                <a:solidFill>
+                  <a:srgbClr val="0070C0"/>
+                </a:solidFill>
+              </a:rPr>
+              <a:t>1</a:t>
+            </a:r>
+            <a:endParaRPr lang="en-SG" sz="1100" dirty="0">
+              <a:solidFill>
+                <a:srgbClr val="0070C0"/>
+              </a:solidFill>
+            </a:endParaRPr>
+          </a:p>
+        </p:txBody>
+      </p:sp>
     </p:spTree>
     <p:extLst>
       <p:ext uri="{BB962C8B-B14F-4D97-AF65-F5344CB8AC3E}">
@@ -6667,6 +7086,13 @@
   <p:clrMapOvr>
     <a:masterClrMapping/>
   </p:clrMapOvr>
+  <p:timing>
+    <p:tnLst>
+      <p:par>
+        <p:cTn id="1" dur="indefinite" restart="never" nodeType="tmRoot"/>
+      </p:par>
+    </p:tnLst>
+  </p:timing>
 </p:sld>
 </file>
 

</xml_diff>

<commit_message>
Update docs to include ParserResult and ExecutionResult
</commit_message>
<xml_diff>
--- a/docs/diagrams/LogicComponentClassDiagram.pptx
+++ b/docs/diagrams/LogicComponentClassDiagram.pptx
@@ -208,7 +208,7 @@
           <a:p>
             <a:fld id="{F5CC4B3F-88C1-4FFA-B1B6-F41C21DC6924}" type="datetimeFigureOut">
               <a:rPr lang="en-US" smtClean="0"/>
-              <a:t>3/21/2017</a:t>
+              <a:t>6/1/17</a:t>
             </a:fld>
             <a:endParaRPr lang="en-US"/>
           </a:p>
@@ -475,6 +475,90 @@
 </p:notesMaster>
 </file>
 
+<file path=ppt/notesSlides/notesSlide1.xml><?xml version="1.0" encoding="utf-8"?>
+<p:notes xmlns:a="http://schemas.openxmlformats.org/drawingml/2006/main" xmlns:r="http://schemas.openxmlformats.org/officeDocument/2006/relationships" xmlns:p="http://schemas.openxmlformats.org/presentationml/2006/main">
+  <p:cSld>
+    <p:spTree>
+      <p:nvGrpSpPr>
+        <p:cNvPr id="1" name=""/>
+        <p:cNvGrpSpPr/>
+        <p:nvPr/>
+      </p:nvGrpSpPr>
+      <p:grpSpPr>
+        <a:xfrm>
+          <a:off x="0" y="0"/>
+          <a:ext cx="0" cy="0"/>
+          <a:chOff x="0" y="0"/>
+          <a:chExt cx="0" cy="0"/>
+        </a:xfrm>
+      </p:grpSpPr>
+      <p:sp>
+        <p:nvSpPr>
+          <p:cNvPr id="2" name="Slide Image Placeholder 1"/>
+          <p:cNvSpPr>
+            <a:spLocks noGrp="1" noRot="1" noChangeAspect="1"/>
+          </p:cNvSpPr>
+          <p:nvPr>
+            <p:ph type="sldImg"/>
+          </p:nvPr>
+        </p:nvSpPr>
+        <p:spPr/>
+      </p:sp>
+      <p:sp>
+        <p:nvSpPr>
+          <p:cNvPr id="3" name="Notes Placeholder 2"/>
+          <p:cNvSpPr>
+            <a:spLocks noGrp="1"/>
+          </p:cNvSpPr>
+          <p:nvPr>
+            <p:ph type="body" idx="1"/>
+          </p:nvPr>
+        </p:nvSpPr>
+        <p:spPr/>
+        <p:txBody>
+          <a:bodyPr/>
+          <a:lstStyle/>
+          <a:p>
+            <a:endParaRPr lang="en-US" dirty="0"/>
+          </a:p>
+        </p:txBody>
+      </p:sp>
+      <p:sp>
+        <p:nvSpPr>
+          <p:cNvPr id="4" name="Slide Number Placeholder 3"/>
+          <p:cNvSpPr>
+            <a:spLocks noGrp="1"/>
+          </p:cNvSpPr>
+          <p:nvPr>
+            <p:ph type="sldNum" sz="quarter" idx="10"/>
+          </p:nvPr>
+        </p:nvSpPr>
+        <p:spPr/>
+        <p:txBody>
+          <a:bodyPr/>
+          <a:lstStyle/>
+          <a:p>
+            <a:fld id="{5A7AB025-77E3-4BD1-A2FD-B3183DBA47A3}" type="slidenum">
+              <a:rPr lang="en-US" smtClean="0"/>
+              <a:t>1</a:t>
+            </a:fld>
+            <a:endParaRPr lang="en-US"/>
+          </a:p>
+        </p:txBody>
+      </p:sp>
+    </p:spTree>
+    <p:extLst>
+      <p:ext uri="{BB962C8B-B14F-4D97-AF65-F5344CB8AC3E}">
+        <p14:creationId xmlns:p14="http://schemas.microsoft.com/office/powerpoint/2010/main" val="717245331"/>
+      </p:ext>
+    </p:extLst>
+  </p:cSld>
+  <p:clrMapOvr>
+    <a:masterClrMapping/>
+  </p:clrMapOvr>
+</p:notes>
+</file>
+
 <file path=ppt/slideLayouts/slideLayout1.xml><?xml version="1.0" encoding="utf-8"?>
 <p:sldLayout xmlns:a="http://schemas.openxmlformats.org/drawingml/2006/main" xmlns:r="http://schemas.openxmlformats.org/officeDocument/2006/relationships" xmlns:p="http://schemas.openxmlformats.org/presentationml/2006/main" type="title" preserve="1">
   <p:cSld name="Title Slide">
@@ -654,7 +738,7 @@
           <a:p>
             <a:fld id="{78C97017-6FC3-485B-9764-EAC9E56C1D49}" type="datetimeFigureOut">
               <a:rPr lang="en-US" smtClean="0"/>
-              <a:t>3/21/2017</a:t>
+              <a:t>6/1/17</a:t>
             </a:fld>
             <a:endParaRPr lang="en-US"/>
           </a:p>
@@ -822,7 +906,7 @@
           <a:p>
             <a:fld id="{78C97017-6FC3-485B-9764-EAC9E56C1D49}" type="datetimeFigureOut">
               <a:rPr lang="en-US" smtClean="0"/>
-              <a:t>3/21/2017</a:t>
+              <a:t>6/1/17</a:t>
             </a:fld>
             <a:endParaRPr lang="en-US"/>
           </a:p>
@@ -1000,7 +1084,7 @@
           <a:p>
             <a:fld id="{78C97017-6FC3-485B-9764-EAC9E56C1D49}" type="datetimeFigureOut">
               <a:rPr lang="en-US" smtClean="0"/>
-              <a:t>3/21/2017</a:t>
+              <a:t>6/1/17</a:t>
             </a:fld>
             <a:endParaRPr lang="en-US"/>
           </a:p>
@@ -1168,7 +1252,7 @@
           <a:p>
             <a:fld id="{78C97017-6FC3-485B-9764-EAC9E56C1D49}" type="datetimeFigureOut">
               <a:rPr lang="en-US" smtClean="0"/>
-              <a:t>3/21/2017</a:t>
+              <a:t>6/1/17</a:t>
             </a:fld>
             <a:endParaRPr lang="en-US"/>
           </a:p>
@@ -1413,7 +1497,7 @@
           <a:p>
             <a:fld id="{78C97017-6FC3-485B-9764-EAC9E56C1D49}" type="datetimeFigureOut">
               <a:rPr lang="en-US" smtClean="0"/>
-              <a:t>3/21/2017</a:t>
+              <a:t>6/1/17</a:t>
             </a:fld>
             <a:endParaRPr lang="en-US"/>
           </a:p>
@@ -1698,7 +1782,7 @@
           <a:p>
             <a:fld id="{78C97017-6FC3-485B-9764-EAC9E56C1D49}" type="datetimeFigureOut">
               <a:rPr lang="en-US" smtClean="0"/>
-              <a:t>3/21/2017</a:t>
+              <a:t>6/1/17</a:t>
             </a:fld>
             <a:endParaRPr lang="en-US"/>
           </a:p>
@@ -2117,7 +2201,7 @@
           <a:p>
             <a:fld id="{78C97017-6FC3-485B-9764-EAC9E56C1D49}" type="datetimeFigureOut">
               <a:rPr lang="en-US" smtClean="0"/>
-              <a:t>3/21/2017</a:t>
+              <a:t>6/1/17</a:t>
             </a:fld>
             <a:endParaRPr lang="en-US"/>
           </a:p>
@@ -2234,7 +2318,7 @@
           <a:p>
             <a:fld id="{78C97017-6FC3-485B-9764-EAC9E56C1D49}" type="datetimeFigureOut">
               <a:rPr lang="en-US" smtClean="0"/>
-              <a:t>3/21/2017</a:t>
+              <a:t>6/1/17</a:t>
             </a:fld>
             <a:endParaRPr lang="en-US"/>
           </a:p>
@@ -2329,7 +2413,7 @@
           <a:p>
             <a:fld id="{78C97017-6FC3-485B-9764-EAC9E56C1D49}" type="datetimeFigureOut">
               <a:rPr lang="en-US" smtClean="0"/>
-              <a:t>3/21/2017</a:t>
+              <a:t>6/1/17</a:t>
             </a:fld>
             <a:endParaRPr lang="en-US"/>
           </a:p>
@@ -2604,7 +2688,7 @@
           <a:p>
             <a:fld id="{78C97017-6FC3-485B-9764-EAC9E56C1D49}" type="datetimeFigureOut">
               <a:rPr lang="en-US" smtClean="0"/>
-              <a:t>3/21/2017</a:t>
+              <a:t>6/1/17</a:t>
             </a:fld>
             <a:endParaRPr lang="en-US"/>
           </a:p>
@@ -2856,7 +2940,7 @@
           <a:p>
             <a:fld id="{78C97017-6FC3-485B-9764-EAC9E56C1D49}" type="datetimeFigureOut">
               <a:rPr lang="en-US" smtClean="0"/>
-              <a:t>3/21/2017</a:t>
+              <a:t>6/1/17</a:t>
             </a:fld>
             <a:endParaRPr lang="en-US"/>
           </a:p>
@@ -3067,7 +3151,7 @@
           <a:p>
             <a:fld id="{78C97017-6FC3-485B-9764-EAC9E56C1D49}" type="datetimeFigureOut">
               <a:rPr lang="en-US" smtClean="0"/>
-              <a:t>3/21/2017</a:t>
+              <a:t>6/1/17</a:t>
             </a:fld>
             <a:endParaRPr lang="en-US"/>
           </a:p>
@@ -3450,7 +3534,7 @@
         </p:nvSpPr>
         <p:spPr>
           <a:xfrm>
-            <a:off x="1066800" y="914400"/>
+            <a:off x="1066800" y="928395"/>
             <a:ext cx="7467600" cy="3733800"/>
           </a:xfrm>
           <a:prstGeom prst="roundRect">
@@ -3570,7 +3654,7 @@
         </p:nvSpPr>
         <p:spPr>
           <a:xfrm flipH="1">
-            <a:off x="6520227" y="2149167"/>
+            <a:off x="6874831" y="1818917"/>
             <a:ext cx="1093635" cy="346760"/>
           </a:xfrm>
           <a:prstGeom prst="rect">
@@ -3725,14 +3809,14 @@
         <p:nvCxnSpPr>
           <p:cNvPr id="8" name="Elbow Connector 122"/>
           <p:cNvCxnSpPr>
-            <a:endCxn id="3" idx="1"/>
+            <a:endCxn id="104" idx="1"/>
           </p:cNvCxnSpPr>
           <p:nvPr/>
         </p:nvCxnSpPr>
         <p:spPr>
           <a:xfrm>
-            <a:off x="1676400" y="1423587"/>
-            <a:ext cx="419548" cy="2860"/>
+            <a:off x="1597218" y="2946318"/>
+            <a:ext cx="231582" cy="165"/>
           </a:xfrm>
           <a:prstGeom prst="bentConnector3">
             <a:avLst>
@@ -3832,7 +3916,7 @@
         </p:nvSpPr>
         <p:spPr>
           <a:xfrm flipH="1">
-            <a:off x="6526365" y="2554920"/>
+            <a:off x="6880969" y="2224670"/>
             <a:ext cx="1093635" cy="346760"/>
           </a:xfrm>
           <a:prstGeom prst="rect">
@@ -3888,7 +3972,7 @@
         </p:nvSpPr>
         <p:spPr>
           <a:xfrm flipH="1">
-            <a:off x="6526365" y="3396383"/>
+            <a:off x="6880969" y="3066133"/>
             <a:ext cx="1093635" cy="346760"/>
           </a:xfrm>
           <a:prstGeom prst="rect">
@@ -4030,7 +4114,7 @@
         </p:nvSpPr>
         <p:spPr>
           <a:xfrm>
-            <a:off x="3529350" y="3775502"/>
+            <a:off x="3854625" y="3772629"/>
             <a:ext cx="585450" cy="346760"/>
           </a:xfrm>
           <a:prstGeom prst="rect">
@@ -4087,9 +4171,9 @@
           <p:nvPr/>
         </p:nvCxnSpPr>
         <p:spPr>
-          <a:xfrm>
-            <a:off x="2874420" y="3946343"/>
-            <a:ext cx="654930" cy="2539"/>
+          <a:xfrm flipV="1">
+            <a:off x="2874420" y="3946009"/>
+            <a:ext cx="980205" cy="334"/>
           </a:xfrm>
           <a:prstGeom prst="bentConnector3">
             <a:avLst>
@@ -4652,91 +4736,13 @@
       </p:grpSp>
       <p:sp>
         <p:nvSpPr>
-          <p:cNvPr id="32" name="TextBox 31"/>
-          <p:cNvSpPr txBox="1"/>
-          <p:nvPr/>
-        </p:nvSpPr>
-        <p:spPr>
-          <a:xfrm>
-            <a:off x="2301175" y="1618473"/>
-            <a:ext cx="131116" cy="230832"/>
-          </a:xfrm>
-          <a:prstGeom prst="rect">
-            <a:avLst/>
-          </a:prstGeom>
-          <a:noFill/>
-        </p:spPr>
-        <p:txBody>
-          <a:bodyPr wrap="square" lIns="0" tIns="0" rIns="0" bIns="0" rtlCol="0">
-            <a:noAutofit/>
-          </a:bodyPr>
-          <a:lstStyle/>
-          <a:p>
-            <a:pPr algn="r"/>
-            <a:r>
-              <a:rPr lang="en-US" sz="1100" dirty="0">
-                <a:solidFill>
-                  <a:srgbClr val="0070C0"/>
-                </a:solidFill>
-              </a:rPr>
-              <a:t>1</a:t>
-            </a:r>
-            <a:endParaRPr lang="en-SG" sz="1100" dirty="0">
-              <a:solidFill>
-                <a:srgbClr val="0070C0"/>
-              </a:solidFill>
-            </a:endParaRPr>
-          </a:p>
-        </p:txBody>
-      </p:sp>
-      <p:sp>
-        <p:nvSpPr>
-          <p:cNvPr id="33" name="TextBox 32"/>
-          <p:cNvSpPr txBox="1"/>
-          <p:nvPr/>
-        </p:nvSpPr>
-        <p:spPr>
-          <a:xfrm>
-            <a:off x="2912207" y="3709457"/>
-            <a:ext cx="131116" cy="230832"/>
-          </a:xfrm>
-          <a:prstGeom prst="rect">
-            <a:avLst/>
-          </a:prstGeom>
-          <a:noFill/>
-        </p:spPr>
-        <p:txBody>
-          <a:bodyPr wrap="square" lIns="0" tIns="0" rIns="0" bIns="0" rtlCol="0">
-            <a:noAutofit/>
-          </a:bodyPr>
-          <a:lstStyle/>
-          <a:p>
-            <a:pPr algn="r"/>
-            <a:r>
-              <a:rPr lang="en-US" sz="1100" dirty="0">
-                <a:solidFill>
-                  <a:srgbClr val="0070C0"/>
-                </a:solidFill>
-              </a:rPr>
-              <a:t>1</a:t>
-            </a:r>
-            <a:endParaRPr lang="en-SG" sz="1100" dirty="0">
-              <a:solidFill>
-                <a:srgbClr val="0070C0"/>
-              </a:solidFill>
-            </a:endParaRPr>
-          </a:p>
-        </p:txBody>
-      </p:sp>
-      <p:sp>
-        <p:nvSpPr>
           <p:cNvPr id="37" name="Rectangle 11"/>
           <p:cNvSpPr/>
           <p:nvPr/>
         </p:nvSpPr>
         <p:spPr>
           <a:xfrm flipH="1">
-            <a:off x="6526365" y="2956137"/>
+            <a:off x="6880969" y="2625887"/>
             <a:ext cx="1093635" cy="346760"/>
           </a:xfrm>
           <a:prstGeom prst="rect">
@@ -4791,9 +4797,9 @@
           <p:nvPr/>
         </p:nvCxnSpPr>
         <p:spPr>
-          <a:xfrm rot="16200000" flipV="1">
-            <a:off x="1105538" y="2692369"/>
-            <a:ext cx="2147794" cy="2"/>
+          <a:xfrm rot="5400000" flipH="1" flipV="1">
+            <a:off x="1624562" y="2675091"/>
+            <a:ext cx="2173136" cy="3002"/>
           </a:xfrm>
           <a:prstGeom prst="bentConnector3">
             <a:avLst>
@@ -4833,7 +4839,7 @@
         </p:nvSpPr>
         <p:spPr>
           <a:xfrm flipH="1">
-            <a:off x="4831294" y="2148937"/>
+            <a:off x="5185898" y="1818687"/>
             <a:ext cx="1093635" cy="346760"/>
           </a:xfrm>
           <a:prstGeom prst="rect">
@@ -4904,7 +4910,7 @@
         </p:nvSpPr>
         <p:spPr>
           <a:xfrm flipH="1">
-            <a:off x="4831294" y="2555337"/>
+            <a:off x="5185898" y="2225087"/>
             <a:ext cx="1093635" cy="346760"/>
           </a:xfrm>
           <a:prstGeom prst="rect">
@@ -4975,7 +4981,7 @@
         </p:nvSpPr>
         <p:spPr>
           <a:xfrm flipH="1">
-            <a:off x="4831292" y="2977582"/>
+            <a:off x="5185896" y="2647332"/>
             <a:ext cx="1093635" cy="346760"/>
           </a:xfrm>
           <a:prstGeom prst="rect">
@@ -5030,7 +5036,7 @@
         </p:nvSpPr>
         <p:spPr>
           <a:xfrm>
-            <a:off x="3174214" y="1862795"/>
+            <a:off x="3528818" y="1532545"/>
             <a:ext cx="751107" cy="346760"/>
           </a:xfrm>
           <a:prstGeom prst="rect">
@@ -5110,8 +5116,8 @@
         </p:nvSpPr>
         <p:spPr>
           <a:xfrm>
-            <a:off x="2238496" y="2454481"/>
-            <a:ext cx="726243" cy="174580"/>
+            <a:off x="2793335" y="2120612"/>
+            <a:ext cx="506515" cy="174580"/>
           </a:xfrm>
           <a:prstGeom prst="rect">
             <a:avLst/>
@@ -5175,7 +5181,7 @@
         </p:nvGrpSpPr>
         <p:grpSpPr>
           <a:xfrm rot="5400000">
-            <a:off x="6088711" y="1962201"/>
+            <a:off x="6443315" y="1631951"/>
             <a:ext cx="254462" cy="555486"/>
             <a:chOff x="3949242" y="578739"/>
             <a:chExt cx="254462" cy="503902"/>
@@ -5280,7 +5286,7 @@
         </p:nvGrpSpPr>
         <p:grpSpPr>
           <a:xfrm rot="5400000">
-            <a:off x="6098740" y="2390577"/>
+            <a:off x="6453344" y="2060327"/>
             <a:ext cx="254462" cy="555486"/>
             <a:chOff x="3965759" y="592436"/>
             <a:chExt cx="254462" cy="503902"/>
@@ -5385,7 +5391,7 @@
         </p:nvSpPr>
         <p:spPr>
           <a:xfrm>
-            <a:off x="3186326" y="2841725"/>
+            <a:off x="3540930" y="2511475"/>
             <a:ext cx="731636" cy="283820"/>
           </a:xfrm>
           <a:prstGeom prst="rect">
@@ -5450,7 +5456,7 @@
         </p:nvSpPr>
         <p:spPr>
           <a:xfrm>
-            <a:off x="3186326" y="3190882"/>
+            <a:off x="3540930" y="2860632"/>
             <a:ext cx="731636" cy="283820"/>
           </a:xfrm>
           <a:prstGeom prst="rect">
@@ -5518,7 +5524,7 @@
         </p:nvCxnSpPr>
         <p:spPr>
           <a:xfrm flipH="1">
-            <a:off x="3917962" y="2983635"/>
+            <a:off x="4272566" y="2653385"/>
             <a:ext cx="335164" cy="0"/>
           </a:xfrm>
           <a:prstGeom prst="straightConnector1">
@@ -5562,7 +5568,7 @@
         </p:nvCxnSpPr>
         <p:spPr>
           <a:xfrm flipH="1">
-            <a:off x="3917962" y="3332439"/>
+            <a:off x="4272566" y="3002189"/>
             <a:ext cx="335164" cy="353"/>
           </a:xfrm>
           <a:prstGeom prst="straightConnector1">
@@ -5607,8 +5613,8 @@
         </p:nvCxnSpPr>
         <p:spPr>
           <a:xfrm rot="10800000">
-            <a:off x="2601618" y="2629061"/>
-            <a:ext cx="584708" cy="354574"/>
+            <a:off x="3046594" y="2295193"/>
+            <a:ext cx="494337" cy="358193"/>
           </a:xfrm>
           <a:prstGeom prst="bentConnector2">
             <a:avLst/>
@@ -5652,7 +5658,7 @@
         </p:nvCxnSpPr>
         <p:spPr>
           <a:xfrm>
-            <a:off x="3925321" y="2036175"/>
+            <a:off x="4279925" y="1705925"/>
             <a:ext cx="327805" cy="107"/>
           </a:xfrm>
           <a:prstGeom prst="line">
@@ -5697,8 +5703,8 @@
         </p:nvCxnSpPr>
         <p:spPr>
           <a:xfrm rot="10800000" flipV="1">
-            <a:off x="2601618" y="2036175"/>
-            <a:ext cx="572596" cy="418306"/>
+            <a:off x="3046594" y="1705924"/>
+            <a:ext cx="482225" cy="414687"/>
           </a:xfrm>
           <a:prstGeom prst="bentConnector2">
             <a:avLst/>
@@ -5739,7 +5745,7 @@
         </p:nvGrpSpPr>
         <p:grpSpPr>
           <a:xfrm rot="5400000">
-            <a:off x="4346209" y="3538793"/>
+            <a:off x="4700220" y="3066879"/>
             <a:ext cx="555486" cy="254462"/>
             <a:chOff x="3703306" y="644022"/>
             <a:chExt cx="555486" cy="230832"/>
@@ -5847,8 +5853,8 @@
         </p:nvCxnSpPr>
         <p:spPr>
           <a:xfrm rot="16200000" flipV="1">
-            <a:off x="7296652" y="3452865"/>
-            <a:ext cx="850958" cy="204262"/>
+            <a:off x="7468408" y="3305464"/>
+            <a:ext cx="1155025" cy="142632"/>
           </a:xfrm>
           <a:prstGeom prst="bentConnector2">
             <a:avLst/>
@@ -5881,7 +5887,7 @@
         </p:nvSpPr>
         <p:spPr>
           <a:xfrm flipV="1">
-            <a:off x="7689010" y="3980475"/>
+            <a:off x="7981984" y="3954292"/>
             <a:ext cx="270504" cy="175523"/>
           </a:xfrm>
           <a:prstGeom prst="triangle">
@@ -5938,8 +5944,8 @@
         </p:nvCxnSpPr>
         <p:spPr>
           <a:xfrm rot="16200000" flipV="1">
-            <a:off x="7516775" y="3672988"/>
-            <a:ext cx="410712" cy="204262"/>
+            <a:off x="7688531" y="3525587"/>
+            <a:ext cx="714779" cy="142632"/>
           </a:xfrm>
           <a:prstGeom prst="bentConnector2">
             <a:avLst/>
@@ -5975,8 +5981,8 @@
         </p:nvCxnSpPr>
         <p:spPr>
           <a:xfrm rot="16200000" flipV="1">
-            <a:off x="7096044" y="3252257"/>
-            <a:ext cx="1252175" cy="204262"/>
+            <a:off x="7267799" y="3104855"/>
+            <a:ext cx="1556242" cy="142632"/>
           </a:xfrm>
           <a:prstGeom prst="bentConnector2">
             <a:avLst/>
@@ -6012,8 +6018,8 @@
         </p:nvCxnSpPr>
         <p:spPr>
           <a:xfrm rot="16200000" flipV="1">
-            <a:off x="6890098" y="3046311"/>
-            <a:ext cx="1657928" cy="210400"/>
+            <a:off x="7061854" y="2898910"/>
+            <a:ext cx="1961995" cy="148770"/>
           </a:xfrm>
           <a:prstGeom prst="bentConnector2">
             <a:avLst/>
@@ -6049,8 +6055,8 @@
         </p:nvCxnSpPr>
         <p:spPr>
           <a:xfrm flipV="1">
-            <a:off x="4114800" y="3150962"/>
-            <a:ext cx="716492" cy="797920"/>
+            <a:off x="4440075" y="2820712"/>
+            <a:ext cx="745821" cy="1125297"/>
           </a:xfrm>
           <a:prstGeom prst="bentConnector3">
             <a:avLst>
@@ -6095,8 +6101,8 @@
         </p:nvCxnSpPr>
         <p:spPr>
           <a:xfrm flipV="1">
-            <a:off x="4114800" y="2728717"/>
-            <a:ext cx="716494" cy="1220165"/>
+            <a:off x="4440075" y="2398467"/>
+            <a:ext cx="745823" cy="1547542"/>
           </a:xfrm>
           <a:prstGeom prst="bentConnector3">
             <a:avLst>
@@ -6141,8 +6147,8 @@
         </p:nvCxnSpPr>
         <p:spPr>
           <a:xfrm flipV="1">
-            <a:off x="4114800" y="2322317"/>
-            <a:ext cx="716494" cy="1626565"/>
+            <a:off x="4440075" y="1992067"/>
+            <a:ext cx="745823" cy="1953942"/>
           </a:xfrm>
           <a:prstGeom prst="bentConnector3">
             <a:avLst>
@@ -6188,7 +6194,7 @@
         </p:nvCxnSpPr>
         <p:spPr>
           <a:xfrm flipV="1">
-            <a:off x="5924929" y="2728300"/>
+            <a:off x="6279533" y="2398050"/>
             <a:ext cx="601436" cy="417"/>
           </a:xfrm>
           <a:prstGeom prst="bentConnector3">
@@ -6235,7 +6241,7 @@
         </p:nvCxnSpPr>
         <p:spPr>
           <a:xfrm>
-            <a:off x="5924929" y="2322317"/>
+            <a:off x="6279533" y="1992067"/>
             <a:ext cx="595298" cy="230"/>
           </a:xfrm>
           <a:prstGeom prst="bentConnector3">
@@ -6280,7 +6286,7 @@
         </p:nvCxnSpPr>
         <p:spPr>
           <a:xfrm>
-            <a:off x="4248488" y="2033984"/>
+            <a:off x="4603092" y="1703734"/>
             <a:ext cx="0" cy="1304815"/>
           </a:xfrm>
           <a:prstGeom prst="line">
@@ -6323,7 +6329,7 @@
         </p:nvCxnSpPr>
         <p:spPr>
           <a:xfrm>
-            <a:off x="4248488" y="2209800"/>
+            <a:off x="4603092" y="1879550"/>
             <a:ext cx="582002" cy="0"/>
           </a:xfrm>
           <a:prstGeom prst="line">
@@ -6366,7 +6372,7 @@
         </p:nvCxnSpPr>
         <p:spPr>
           <a:xfrm flipV="1">
-            <a:off x="4255042" y="2607245"/>
+            <a:off x="4609646" y="2276995"/>
             <a:ext cx="566976" cy="5974"/>
           </a:xfrm>
           <a:prstGeom prst="line">
@@ -6409,7 +6415,7 @@
         </p:nvCxnSpPr>
         <p:spPr>
           <a:xfrm>
-            <a:off x="4248487" y="3048000"/>
+            <a:off x="4603091" y="2717750"/>
             <a:ext cx="573531" cy="0"/>
           </a:xfrm>
           <a:prstGeom prst="line">
@@ -6450,7 +6456,7 @@
         </p:nvSpPr>
         <p:spPr>
           <a:xfrm>
-            <a:off x="3174214" y="2370131"/>
+            <a:off x="3528818" y="2039881"/>
             <a:ext cx="750156" cy="340758"/>
           </a:xfrm>
           <a:prstGeom prst="rect">
@@ -6523,13 +6529,12 @@
           <p:cNvCxnSpPr>
             <a:cxnSpLocks/>
             <a:stCxn id="109" idx="1"/>
-            <a:endCxn id="58" idx="3"/>
           </p:cNvCxnSpPr>
           <p:nvPr/>
         </p:nvCxnSpPr>
         <p:spPr>
           <a:xfrm rot="10800000" flipV="1">
-            <a:off x="2964740" y="2540509"/>
+            <a:off x="3319344" y="2210259"/>
             <a:ext cx="209475" cy="1261"/>
           </a:xfrm>
           <a:prstGeom prst="bentConnector3">
@@ -6577,7 +6582,7 @@
         </p:nvCxnSpPr>
         <p:spPr>
           <a:xfrm rot="5400000">
-            <a:off x="3469242" y="2289605"/>
+            <a:off x="3823846" y="1959355"/>
             <a:ext cx="160576" cy="476"/>
           </a:xfrm>
           <a:prstGeom prst="bentConnector3">
@@ -6624,7 +6629,7 @@
         </p:nvCxnSpPr>
         <p:spPr>
           <a:xfrm flipV="1">
-            <a:off x="3924370" y="2535795"/>
+            <a:off x="4278974" y="2205545"/>
             <a:ext cx="322202" cy="4715"/>
           </a:xfrm>
           <a:prstGeom prst="line">
@@ -6639,6 +6644,385 @@
             <a:prstDash val="sysDot"/>
             <a:headEnd type="arrow" w="med" len="med"/>
             <a:tailEnd type="none" w="med" len="med"/>
+          </a:ln>
+          <a:effectLst/>
+        </p:spPr>
+        <p:style>
+          <a:lnRef idx="1">
+            <a:schemeClr val="accent2"/>
+          </a:lnRef>
+          <a:fillRef idx="2">
+            <a:schemeClr val="accent2"/>
+          </a:fillRef>
+          <a:effectRef idx="1">
+            <a:schemeClr val="accent2"/>
+          </a:effectRef>
+          <a:fontRef idx="minor">
+            <a:schemeClr val="dk1"/>
+          </a:fontRef>
+        </p:style>
+      </p:cxnSp>
+      <p:sp>
+        <p:nvSpPr>
+          <p:cNvPr id="86" name="Rectangle 85"/>
+          <p:cNvSpPr/>
+          <p:nvPr/>
+        </p:nvSpPr>
+        <p:spPr>
+          <a:xfrm flipH="1">
+            <a:off x="3000232" y="3328744"/>
+            <a:ext cx="900000" cy="346760"/>
+          </a:xfrm>
+          <a:prstGeom prst="rect">
+            <a:avLst/>
+          </a:prstGeom>
+          <a:solidFill>
+            <a:schemeClr val="accent5"/>
+          </a:solidFill>
+          <a:ln/>
+          <a:effectLst/>
+        </p:spPr>
+        <p:style>
+          <a:lnRef idx="1">
+            <a:schemeClr val="accent5"/>
+          </a:lnRef>
+          <a:fillRef idx="2">
+            <a:schemeClr val="accent5"/>
+          </a:fillRef>
+          <a:effectRef idx="1">
+            <a:schemeClr val="accent5"/>
+          </a:effectRef>
+          <a:fontRef idx="minor">
+            <a:schemeClr val="dk1"/>
+          </a:fontRef>
+        </p:style>
+        <p:txBody>
+          <a:bodyPr rtlCol="0" anchor="ctr"/>
+          <a:lstStyle/>
+          <a:p>
+            <a:pPr algn="ctr"/>
+            <a:r>
+              <a:rPr lang="en-US" sz="1050" b="1" dirty="0" err="1" smtClean="0">
+                <a:solidFill>
+                  <a:schemeClr val="bg1"/>
+                </a:solidFill>
+              </a:rPr>
+              <a:t>ParserResult</a:t>
+            </a:r>
+            <a:endParaRPr lang="en-SG" sz="1050" b="1" dirty="0">
+              <a:solidFill>
+                <a:schemeClr val="bg1"/>
+              </a:solidFill>
+            </a:endParaRPr>
+          </a:p>
+        </p:txBody>
+      </p:sp>
+      <p:cxnSp>
+        <p:nvCxnSpPr>
+          <p:cNvPr id="88" name="Elbow Connector 63"/>
+          <p:cNvCxnSpPr>
+            <a:stCxn id="16" idx="0"/>
+            <a:endCxn id="86" idx="1"/>
+          </p:cNvCxnSpPr>
+          <p:nvPr/>
+        </p:nvCxnSpPr>
+        <p:spPr>
+          <a:xfrm rot="16200000" flipV="1">
+            <a:off x="3888539" y="3513818"/>
+            <a:ext cx="270505" cy="247118"/>
+          </a:xfrm>
+          <a:prstGeom prst="bentConnector2">
+            <a:avLst/>
+          </a:prstGeom>
+          <a:ln w="19050">
+            <a:solidFill>
+              <a:schemeClr val="accent5">
+                <a:lumMod val="75000"/>
+              </a:schemeClr>
+            </a:solidFill>
+            <a:prstDash val="sysDot"/>
+            <a:headEnd type="none" w="med" len="med"/>
+            <a:tailEnd type="arrow" w="med" len="med"/>
+          </a:ln>
+          <a:effectLst/>
+        </p:spPr>
+        <p:style>
+          <a:lnRef idx="1">
+            <a:schemeClr val="accent2"/>
+          </a:lnRef>
+          <a:fillRef idx="2">
+            <a:schemeClr val="accent2"/>
+          </a:fillRef>
+          <a:effectRef idx="1">
+            <a:schemeClr val="accent2"/>
+          </a:effectRef>
+          <a:fontRef idx="minor">
+            <a:schemeClr val="dk1"/>
+          </a:fontRef>
+        </p:style>
+      </p:cxnSp>
+      <p:cxnSp>
+        <p:nvCxnSpPr>
+          <p:cNvPr id="98" name="Elbow Connector 122"/>
+          <p:cNvCxnSpPr>
+            <a:endCxn id="86" idx="3"/>
+          </p:cNvCxnSpPr>
+          <p:nvPr/>
+        </p:nvCxnSpPr>
+        <p:spPr>
+          <a:xfrm rot="5400000" flipH="1" flipV="1">
+            <a:off x="2778321" y="3535318"/>
+            <a:ext cx="255105" cy="188718"/>
+          </a:xfrm>
+          <a:prstGeom prst="bentConnector2">
+            <a:avLst/>
+          </a:prstGeom>
+          <a:ln w="19050">
+            <a:solidFill>
+              <a:srgbClr val="0070C0"/>
+            </a:solidFill>
+            <a:prstDash val="sysDot"/>
+            <a:headEnd type="none" w="med" len="med"/>
+            <a:tailEnd type="arrow" w="med" len="med"/>
+          </a:ln>
+          <a:effectLst/>
+        </p:spPr>
+        <p:style>
+          <a:lnRef idx="1">
+            <a:schemeClr val="accent2"/>
+          </a:lnRef>
+          <a:fillRef idx="2">
+            <a:schemeClr val="accent2"/>
+          </a:fillRef>
+          <a:effectRef idx="1">
+            <a:schemeClr val="accent2"/>
+          </a:effectRef>
+          <a:fontRef idx="minor">
+            <a:schemeClr val="dk1"/>
+          </a:fontRef>
+        </p:style>
+      </p:cxnSp>
+      <p:cxnSp>
+        <p:nvCxnSpPr>
+          <p:cNvPr id="101" name="Elbow Connector 122"/>
+          <p:cNvCxnSpPr>
+            <a:stCxn id="5" idx="0"/>
+          </p:cNvCxnSpPr>
+          <p:nvPr/>
+        </p:nvCxnSpPr>
+        <p:spPr>
+          <a:xfrm rot="16200000" flipV="1">
+            <a:off x="1999156" y="3444515"/>
+            <a:ext cx="653748" cy="3147"/>
+          </a:xfrm>
+          <a:prstGeom prst="bentConnector3">
+            <a:avLst>
+              <a:gd name="adj1" fmla="val 50000"/>
+            </a:avLst>
+          </a:prstGeom>
+          <a:ln w="19050">
+            <a:solidFill>
+              <a:srgbClr val="0070C0"/>
+            </a:solidFill>
+            <a:prstDash val="sysDot"/>
+            <a:headEnd type="none" w="med" len="med"/>
+            <a:tailEnd type="arrow" w="med" len="med"/>
+          </a:ln>
+          <a:effectLst/>
+        </p:spPr>
+        <p:style>
+          <a:lnRef idx="1">
+            <a:schemeClr val="accent2"/>
+          </a:lnRef>
+          <a:fillRef idx="2">
+            <a:schemeClr val="accent2"/>
+          </a:fillRef>
+          <a:effectRef idx="1">
+            <a:schemeClr val="accent2"/>
+          </a:effectRef>
+          <a:fontRef idx="minor">
+            <a:schemeClr val="dk1"/>
+          </a:fontRef>
+        </p:style>
+      </p:cxnSp>
+      <p:sp>
+        <p:nvSpPr>
+          <p:cNvPr id="104" name="Rectangle 8"/>
+          <p:cNvSpPr/>
+          <p:nvPr/>
+        </p:nvSpPr>
+        <p:spPr>
+          <a:xfrm>
+            <a:off x="1828800" y="2773103"/>
+            <a:ext cx="752724" cy="346760"/>
+          </a:xfrm>
+          <a:prstGeom prst="rect">
+            <a:avLst/>
+          </a:prstGeom>
+          <a:solidFill>
+            <a:srgbClr val="0070C0"/>
+          </a:solidFill>
+          <a:ln w="19050">
+            <a:solidFill>
+              <a:srgbClr val="0070C0"/>
+            </a:solidFill>
+          </a:ln>
+          <a:effectLst/>
+        </p:spPr>
+        <p:style>
+          <a:lnRef idx="1">
+            <a:schemeClr val="accent2"/>
+          </a:lnRef>
+          <a:fillRef idx="2">
+            <a:schemeClr val="accent2"/>
+          </a:fillRef>
+          <a:effectRef idx="1">
+            <a:schemeClr val="accent2"/>
+          </a:effectRef>
+          <a:fontRef idx="minor">
+            <a:schemeClr val="dk1"/>
+          </a:fontRef>
+        </p:style>
+        <p:txBody>
+          <a:bodyPr rtlCol="0" anchor="ctr"/>
+          <a:lstStyle/>
+          <a:p>
+            <a:pPr algn="ctr"/>
+            <a:r>
+              <a:rPr lang="en-US" sz="1050" dirty="0" smtClean="0">
+                <a:solidFill>
+                  <a:schemeClr val="bg1"/>
+                </a:solidFill>
+              </a:rPr>
+              <a:t>Execution</a:t>
+            </a:r>
+          </a:p>
+          <a:p>
+            <a:pPr algn="ctr"/>
+            <a:r>
+              <a:rPr lang="en-US" sz="1050" dirty="0" smtClean="0">
+                <a:solidFill>
+                  <a:schemeClr val="bg1"/>
+                </a:solidFill>
+              </a:rPr>
+              <a:t>Result</a:t>
+            </a:r>
+            <a:endParaRPr lang="en-SG" sz="1050" dirty="0">
+              <a:solidFill>
+                <a:schemeClr val="bg1"/>
+              </a:solidFill>
+            </a:endParaRPr>
+          </a:p>
+        </p:txBody>
+      </p:sp>
+      <p:sp>
+        <p:nvSpPr>
+          <p:cNvPr id="135" name="TextBox 134"/>
+          <p:cNvSpPr txBox="1"/>
+          <p:nvPr/>
+        </p:nvSpPr>
+        <p:spPr>
+          <a:xfrm>
+            <a:off x="3621040" y="3990239"/>
+            <a:ext cx="131116" cy="230832"/>
+          </a:xfrm>
+          <a:prstGeom prst="rect">
+            <a:avLst/>
+          </a:prstGeom>
+          <a:noFill/>
+        </p:spPr>
+        <p:txBody>
+          <a:bodyPr wrap="square" lIns="0" tIns="0" rIns="0" bIns="0" rtlCol="0">
+            <a:noAutofit/>
+          </a:bodyPr>
+          <a:lstStyle/>
+          <a:p>
+            <a:pPr algn="r"/>
+            <a:r>
+              <a:rPr lang="en-US" sz="1100" dirty="0">
+                <a:solidFill>
+                  <a:srgbClr val="0070C0"/>
+                </a:solidFill>
+              </a:rPr>
+              <a:t>1</a:t>
+            </a:r>
+            <a:endParaRPr lang="en-SG" sz="1100" dirty="0">
+              <a:solidFill>
+                <a:srgbClr val="0070C0"/>
+              </a:solidFill>
+            </a:endParaRPr>
+          </a:p>
+        </p:txBody>
+      </p:sp>
+      <p:cxnSp>
+        <p:nvCxnSpPr>
+          <p:cNvPr id="92" name="Elbow Connector 122"/>
+          <p:cNvCxnSpPr>
+            <a:stCxn id="104" idx="0"/>
+          </p:cNvCxnSpPr>
+          <p:nvPr/>
+        </p:nvCxnSpPr>
+        <p:spPr>
+          <a:xfrm rot="16200000" flipV="1">
+            <a:off x="1617395" y="2185336"/>
+            <a:ext cx="1173276" cy="2258"/>
+          </a:xfrm>
+          <a:prstGeom prst="bentConnector3">
+            <a:avLst>
+              <a:gd name="adj1" fmla="val 50000"/>
+            </a:avLst>
+          </a:prstGeom>
+          <a:ln w="19050">
+            <a:solidFill>
+              <a:schemeClr val="tx2">
+                <a:lumMod val="50000"/>
+              </a:schemeClr>
+            </a:solidFill>
+            <a:prstDash val="sysDot"/>
+            <a:headEnd type="none" w="med" len="med"/>
+            <a:tailEnd type="arrow" w="med" len="med"/>
+          </a:ln>
+          <a:effectLst/>
+        </p:spPr>
+        <p:style>
+          <a:lnRef idx="1">
+            <a:schemeClr val="accent2"/>
+          </a:lnRef>
+          <a:fillRef idx="2">
+            <a:schemeClr val="accent2"/>
+          </a:fillRef>
+          <a:effectRef idx="1">
+            <a:schemeClr val="accent2"/>
+          </a:effectRef>
+          <a:fontRef idx="minor">
+            <a:schemeClr val="dk1"/>
+          </a:fontRef>
+        </p:style>
+      </p:cxnSp>
+      <p:cxnSp>
+        <p:nvCxnSpPr>
+          <p:cNvPr id="95" name="Elbow Connector 122"/>
+          <p:cNvCxnSpPr>
+            <a:stCxn id="104" idx="3"/>
+            <a:endCxn id="86" idx="0"/>
+          </p:cNvCxnSpPr>
+          <p:nvPr/>
+        </p:nvCxnSpPr>
+        <p:spPr>
+          <a:xfrm>
+            <a:off x="2581524" y="2946483"/>
+            <a:ext cx="868708" cy="382261"/>
+          </a:xfrm>
+          <a:prstGeom prst="bentConnector2">
+            <a:avLst/>
+          </a:prstGeom>
+          <a:ln w="19050">
+            <a:solidFill>
+              <a:srgbClr val="002060"/>
+            </a:solidFill>
+            <a:prstDash val="sysDot"/>
+            <a:headEnd type="none" w="med" len="med"/>
+            <a:tailEnd type="arrow" w="med" len="med"/>
           </a:ln>
           <a:effectLst/>
         </p:spPr>
@@ -6667,6 +7051,13 @@
   <p:clrMapOvr>
     <a:masterClrMapping/>
   </p:clrMapOvr>
+  <p:timing>
+    <p:tnLst>
+      <p:par>
+        <p:cTn id="1" dur="indefinite" restart="never" nodeType="tmRoot"/>
+      </p:par>
+    </p:tnLst>
+  </p:timing>
 </p:sld>
 </file>
 

</xml_diff>

<commit_message>
DeveloperGuide: include ParserResult and ExecutionResult
</commit_message>
<xml_diff>
--- a/docs/diagrams/LogicComponentClassDiagram.pptx
+++ b/docs/diagrams/LogicComponentClassDiagram.pptx
@@ -208,7 +208,7 @@
           <a:p>
             <a:fld id="{F5CC4B3F-88C1-4FFA-B1B6-F41C21DC6924}" type="datetimeFigureOut">
               <a:rPr lang="en-US" smtClean="0"/>
-              <a:t>3/21/2017</a:t>
+              <a:t>6/1/17</a:t>
             </a:fld>
             <a:endParaRPr lang="en-US"/>
           </a:p>
@@ -475,6 +475,90 @@
 </p:notesMaster>
 </file>
 
+<file path=ppt/notesSlides/notesSlide1.xml><?xml version="1.0" encoding="utf-8"?>
+<p:notes xmlns:a="http://schemas.openxmlformats.org/drawingml/2006/main" xmlns:r="http://schemas.openxmlformats.org/officeDocument/2006/relationships" xmlns:p="http://schemas.openxmlformats.org/presentationml/2006/main">
+  <p:cSld>
+    <p:spTree>
+      <p:nvGrpSpPr>
+        <p:cNvPr id="1" name=""/>
+        <p:cNvGrpSpPr/>
+        <p:nvPr/>
+      </p:nvGrpSpPr>
+      <p:grpSpPr>
+        <a:xfrm>
+          <a:off x="0" y="0"/>
+          <a:ext cx="0" cy="0"/>
+          <a:chOff x="0" y="0"/>
+          <a:chExt cx="0" cy="0"/>
+        </a:xfrm>
+      </p:grpSpPr>
+      <p:sp>
+        <p:nvSpPr>
+          <p:cNvPr id="2" name="Slide Image Placeholder 1"/>
+          <p:cNvSpPr>
+            <a:spLocks noGrp="1" noRot="1" noChangeAspect="1"/>
+          </p:cNvSpPr>
+          <p:nvPr>
+            <p:ph type="sldImg"/>
+          </p:nvPr>
+        </p:nvSpPr>
+        <p:spPr/>
+      </p:sp>
+      <p:sp>
+        <p:nvSpPr>
+          <p:cNvPr id="3" name="Notes Placeholder 2"/>
+          <p:cNvSpPr>
+            <a:spLocks noGrp="1"/>
+          </p:cNvSpPr>
+          <p:nvPr>
+            <p:ph type="body" idx="1"/>
+          </p:nvPr>
+        </p:nvSpPr>
+        <p:spPr/>
+        <p:txBody>
+          <a:bodyPr/>
+          <a:lstStyle/>
+          <a:p>
+            <a:endParaRPr lang="en-US" dirty="0"/>
+          </a:p>
+        </p:txBody>
+      </p:sp>
+      <p:sp>
+        <p:nvSpPr>
+          <p:cNvPr id="4" name="Slide Number Placeholder 3"/>
+          <p:cNvSpPr>
+            <a:spLocks noGrp="1"/>
+          </p:cNvSpPr>
+          <p:nvPr>
+            <p:ph type="sldNum" sz="quarter" idx="10"/>
+          </p:nvPr>
+        </p:nvSpPr>
+        <p:spPr/>
+        <p:txBody>
+          <a:bodyPr/>
+          <a:lstStyle/>
+          <a:p>
+            <a:fld id="{5A7AB025-77E3-4BD1-A2FD-B3183DBA47A3}" type="slidenum">
+              <a:rPr lang="en-US" smtClean="0"/>
+              <a:t>1</a:t>
+            </a:fld>
+            <a:endParaRPr lang="en-US"/>
+          </a:p>
+        </p:txBody>
+      </p:sp>
+    </p:spTree>
+    <p:extLst>
+      <p:ext uri="{BB962C8B-B14F-4D97-AF65-F5344CB8AC3E}">
+        <p14:creationId xmlns:p14="http://schemas.microsoft.com/office/powerpoint/2010/main" val="717245331"/>
+      </p:ext>
+    </p:extLst>
+  </p:cSld>
+  <p:clrMapOvr>
+    <a:masterClrMapping/>
+  </p:clrMapOvr>
+</p:notes>
+</file>
+
 <file path=ppt/slideLayouts/slideLayout1.xml><?xml version="1.0" encoding="utf-8"?>
 <p:sldLayout xmlns:a="http://schemas.openxmlformats.org/drawingml/2006/main" xmlns:r="http://schemas.openxmlformats.org/officeDocument/2006/relationships" xmlns:p="http://schemas.openxmlformats.org/presentationml/2006/main" type="title" preserve="1">
   <p:cSld name="Title Slide">
@@ -654,7 +738,7 @@
           <a:p>
             <a:fld id="{78C97017-6FC3-485B-9764-EAC9E56C1D49}" type="datetimeFigureOut">
               <a:rPr lang="en-US" smtClean="0"/>
-              <a:t>3/21/2017</a:t>
+              <a:t>6/1/17</a:t>
             </a:fld>
             <a:endParaRPr lang="en-US"/>
           </a:p>
@@ -822,7 +906,7 @@
           <a:p>
             <a:fld id="{78C97017-6FC3-485B-9764-EAC9E56C1D49}" type="datetimeFigureOut">
               <a:rPr lang="en-US" smtClean="0"/>
-              <a:t>3/21/2017</a:t>
+              <a:t>6/1/17</a:t>
             </a:fld>
             <a:endParaRPr lang="en-US"/>
           </a:p>
@@ -1000,7 +1084,7 @@
           <a:p>
             <a:fld id="{78C97017-6FC3-485B-9764-EAC9E56C1D49}" type="datetimeFigureOut">
               <a:rPr lang="en-US" smtClean="0"/>
-              <a:t>3/21/2017</a:t>
+              <a:t>6/1/17</a:t>
             </a:fld>
             <a:endParaRPr lang="en-US"/>
           </a:p>
@@ -1168,7 +1252,7 @@
           <a:p>
             <a:fld id="{78C97017-6FC3-485B-9764-EAC9E56C1D49}" type="datetimeFigureOut">
               <a:rPr lang="en-US" smtClean="0"/>
-              <a:t>3/21/2017</a:t>
+              <a:t>6/1/17</a:t>
             </a:fld>
             <a:endParaRPr lang="en-US"/>
           </a:p>
@@ -1413,7 +1497,7 @@
           <a:p>
             <a:fld id="{78C97017-6FC3-485B-9764-EAC9E56C1D49}" type="datetimeFigureOut">
               <a:rPr lang="en-US" smtClean="0"/>
-              <a:t>3/21/2017</a:t>
+              <a:t>6/1/17</a:t>
             </a:fld>
             <a:endParaRPr lang="en-US"/>
           </a:p>
@@ -1698,7 +1782,7 @@
           <a:p>
             <a:fld id="{78C97017-6FC3-485B-9764-EAC9E56C1D49}" type="datetimeFigureOut">
               <a:rPr lang="en-US" smtClean="0"/>
-              <a:t>3/21/2017</a:t>
+              <a:t>6/1/17</a:t>
             </a:fld>
             <a:endParaRPr lang="en-US"/>
           </a:p>
@@ -2117,7 +2201,7 @@
           <a:p>
             <a:fld id="{78C97017-6FC3-485B-9764-EAC9E56C1D49}" type="datetimeFigureOut">
               <a:rPr lang="en-US" smtClean="0"/>
-              <a:t>3/21/2017</a:t>
+              <a:t>6/1/17</a:t>
             </a:fld>
             <a:endParaRPr lang="en-US"/>
           </a:p>
@@ -2234,7 +2318,7 @@
           <a:p>
             <a:fld id="{78C97017-6FC3-485B-9764-EAC9E56C1D49}" type="datetimeFigureOut">
               <a:rPr lang="en-US" smtClean="0"/>
-              <a:t>3/21/2017</a:t>
+              <a:t>6/1/17</a:t>
             </a:fld>
             <a:endParaRPr lang="en-US"/>
           </a:p>
@@ -2329,7 +2413,7 @@
           <a:p>
             <a:fld id="{78C97017-6FC3-485B-9764-EAC9E56C1D49}" type="datetimeFigureOut">
               <a:rPr lang="en-US" smtClean="0"/>
-              <a:t>3/21/2017</a:t>
+              <a:t>6/1/17</a:t>
             </a:fld>
             <a:endParaRPr lang="en-US"/>
           </a:p>
@@ -2604,7 +2688,7 @@
           <a:p>
             <a:fld id="{78C97017-6FC3-485B-9764-EAC9E56C1D49}" type="datetimeFigureOut">
               <a:rPr lang="en-US" smtClean="0"/>
-              <a:t>3/21/2017</a:t>
+              <a:t>6/1/17</a:t>
             </a:fld>
             <a:endParaRPr lang="en-US"/>
           </a:p>
@@ -2856,7 +2940,7 @@
           <a:p>
             <a:fld id="{78C97017-6FC3-485B-9764-EAC9E56C1D49}" type="datetimeFigureOut">
               <a:rPr lang="en-US" smtClean="0"/>
-              <a:t>3/21/2017</a:t>
+              <a:t>6/1/17</a:t>
             </a:fld>
             <a:endParaRPr lang="en-US"/>
           </a:p>
@@ -3067,7 +3151,7 @@
           <a:p>
             <a:fld id="{78C97017-6FC3-485B-9764-EAC9E56C1D49}" type="datetimeFigureOut">
               <a:rPr lang="en-US" smtClean="0"/>
-              <a:t>3/21/2017</a:t>
+              <a:t>6/1/17</a:t>
             </a:fld>
             <a:endParaRPr lang="en-US"/>
           </a:p>
@@ -3450,7 +3534,7 @@
         </p:nvSpPr>
         <p:spPr>
           <a:xfrm>
-            <a:off x="1066800" y="914400"/>
+            <a:off x="1066800" y="928395"/>
             <a:ext cx="7467600" cy="3733800"/>
           </a:xfrm>
           <a:prstGeom prst="roundRect">
@@ -3570,7 +3654,7 @@
         </p:nvSpPr>
         <p:spPr>
           <a:xfrm flipH="1">
-            <a:off x="6520227" y="2149167"/>
+            <a:off x="6874831" y="1818917"/>
             <a:ext cx="1093635" cy="346760"/>
           </a:xfrm>
           <a:prstGeom prst="rect">
@@ -3725,14 +3809,14 @@
         <p:nvCxnSpPr>
           <p:cNvPr id="8" name="Elbow Connector 122"/>
           <p:cNvCxnSpPr>
-            <a:endCxn id="3" idx="1"/>
+            <a:endCxn id="104" idx="1"/>
           </p:cNvCxnSpPr>
           <p:nvPr/>
         </p:nvCxnSpPr>
         <p:spPr>
           <a:xfrm>
-            <a:off x="1676400" y="1423587"/>
-            <a:ext cx="419548" cy="2860"/>
+            <a:off x="1597218" y="2946318"/>
+            <a:ext cx="231582" cy="165"/>
           </a:xfrm>
           <a:prstGeom prst="bentConnector3">
             <a:avLst>
@@ -3832,7 +3916,7 @@
         </p:nvSpPr>
         <p:spPr>
           <a:xfrm flipH="1">
-            <a:off x="6526365" y="2554920"/>
+            <a:off x="6880969" y="2224670"/>
             <a:ext cx="1093635" cy="346760"/>
           </a:xfrm>
           <a:prstGeom prst="rect">
@@ -3888,7 +3972,7 @@
         </p:nvSpPr>
         <p:spPr>
           <a:xfrm flipH="1">
-            <a:off x="6526365" y="3396383"/>
+            <a:off x="6880969" y="3066133"/>
             <a:ext cx="1093635" cy="346760"/>
           </a:xfrm>
           <a:prstGeom prst="rect">
@@ -4030,7 +4114,7 @@
         </p:nvSpPr>
         <p:spPr>
           <a:xfrm>
-            <a:off x="3529350" y="3775502"/>
+            <a:off x="3854625" y="3772629"/>
             <a:ext cx="585450" cy="346760"/>
           </a:xfrm>
           <a:prstGeom prst="rect">
@@ -4087,9 +4171,9 @@
           <p:nvPr/>
         </p:nvCxnSpPr>
         <p:spPr>
-          <a:xfrm>
-            <a:off x="2874420" y="3946343"/>
-            <a:ext cx="654930" cy="2539"/>
+          <a:xfrm flipV="1">
+            <a:off x="2874420" y="3946009"/>
+            <a:ext cx="980205" cy="334"/>
           </a:xfrm>
           <a:prstGeom prst="bentConnector3">
             <a:avLst>
@@ -4652,91 +4736,13 @@
       </p:grpSp>
       <p:sp>
         <p:nvSpPr>
-          <p:cNvPr id="32" name="TextBox 31"/>
-          <p:cNvSpPr txBox="1"/>
-          <p:nvPr/>
-        </p:nvSpPr>
-        <p:spPr>
-          <a:xfrm>
-            <a:off x="2301175" y="1618473"/>
-            <a:ext cx="131116" cy="230832"/>
-          </a:xfrm>
-          <a:prstGeom prst="rect">
-            <a:avLst/>
-          </a:prstGeom>
-          <a:noFill/>
-        </p:spPr>
-        <p:txBody>
-          <a:bodyPr wrap="square" lIns="0" tIns="0" rIns="0" bIns="0" rtlCol="0">
-            <a:noAutofit/>
-          </a:bodyPr>
-          <a:lstStyle/>
-          <a:p>
-            <a:pPr algn="r"/>
-            <a:r>
-              <a:rPr lang="en-US" sz="1100" dirty="0">
-                <a:solidFill>
-                  <a:srgbClr val="0070C0"/>
-                </a:solidFill>
-              </a:rPr>
-              <a:t>1</a:t>
-            </a:r>
-            <a:endParaRPr lang="en-SG" sz="1100" dirty="0">
-              <a:solidFill>
-                <a:srgbClr val="0070C0"/>
-              </a:solidFill>
-            </a:endParaRPr>
-          </a:p>
-        </p:txBody>
-      </p:sp>
-      <p:sp>
-        <p:nvSpPr>
-          <p:cNvPr id="33" name="TextBox 32"/>
-          <p:cNvSpPr txBox="1"/>
-          <p:nvPr/>
-        </p:nvSpPr>
-        <p:spPr>
-          <a:xfrm>
-            <a:off x="2912207" y="3709457"/>
-            <a:ext cx="131116" cy="230832"/>
-          </a:xfrm>
-          <a:prstGeom prst="rect">
-            <a:avLst/>
-          </a:prstGeom>
-          <a:noFill/>
-        </p:spPr>
-        <p:txBody>
-          <a:bodyPr wrap="square" lIns="0" tIns="0" rIns="0" bIns="0" rtlCol="0">
-            <a:noAutofit/>
-          </a:bodyPr>
-          <a:lstStyle/>
-          <a:p>
-            <a:pPr algn="r"/>
-            <a:r>
-              <a:rPr lang="en-US" sz="1100" dirty="0">
-                <a:solidFill>
-                  <a:srgbClr val="0070C0"/>
-                </a:solidFill>
-              </a:rPr>
-              <a:t>1</a:t>
-            </a:r>
-            <a:endParaRPr lang="en-SG" sz="1100" dirty="0">
-              <a:solidFill>
-                <a:srgbClr val="0070C0"/>
-              </a:solidFill>
-            </a:endParaRPr>
-          </a:p>
-        </p:txBody>
-      </p:sp>
-      <p:sp>
-        <p:nvSpPr>
           <p:cNvPr id="37" name="Rectangle 11"/>
           <p:cNvSpPr/>
           <p:nvPr/>
         </p:nvSpPr>
         <p:spPr>
           <a:xfrm flipH="1">
-            <a:off x="6526365" y="2956137"/>
+            <a:off x="6880969" y="2625887"/>
             <a:ext cx="1093635" cy="346760"/>
           </a:xfrm>
           <a:prstGeom prst="rect">
@@ -4791,9 +4797,9 @@
           <p:nvPr/>
         </p:nvCxnSpPr>
         <p:spPr>
-          <a:xfrm rot="16200000" flipV="1">
-            <a:off x="1105538" y="2692369"/>
-            <a:ext cx="2147794" cy="2"/>
+          <a:xfrm rot="5400000" flipH="1" flipV="1">
+            <a:off x="1624562" y="2675091"/>
+            <a:ext cx="2173136" cy="3002"/>
           </a:xfrm>
           <a:prstGeom prst="bentConnector3">
             <a:avLst>
@@ -4833,7 +4839,7 @@
         </p:nvSpPr>
         <p:spPr>
           <a:xfrm flipH="1">
-            <a:off x="4831294" y="2148937"/>
+            <a:off x="5185898" y="1818687"/>
             <a:ext cx="1093635" cy="346760"/>
           </a:xfrm>
           <a:prstGeom prst="rect">
@@ -4904,7 +4910,7 @@
         </p:nvSpPr>
         <p:spPr>
           <a:xfrm flipH="1">
-            <a:off x="4831294" y="2555337"/>
+            <a:off x="5185898" y="2225087"/>
             <a:ext cx="1093635" cy="346760"/>
           </a:xfrm>
           <a:prstGeom prst="rect">
@@ -4975,7 +4981,7 @@
         </p:nvSpPr>
         <p:spPr>
           <a:xfrm flipH="1">
-            <a:off x="4831292" y="2977582"/>
+            <a:off x="5185896" y="2647332"/>
             <a:ext cx="1093635" cy="346760"/>
           </a:xfrm>
           <a:prstGeom prst="rect">
@@ -5030,7 +5036,7 @@
         </p:nvSpPr>
         <p:spPr>
           <a:xfrm>
-            <a:off x="3174214" y="1862795"/>
+            <a:off x="3528818" y="1532545"/>
             <a:ext cx="751107" cy="346760"/>
           </a:xfrm>
           <a:prstGeom prst="rect">
@@ -5110,8 +5116,8 @@
         </p:nvSpPr>
         <p:spPr>
           <a:xfrm>
-            <a:off x="2238496" y="2454481"/>
-            <a:ext cx="726243" cy="174580"/>
+            <a:off x="2793335" y="2120612"/>
+            <a:ext cx="506515" cy="174580"/>
           </a:xfrm>
           <a:prstGeom prst="rect">
             <a:avLst/>
@@ -5175,7 +5181,7 @@
         </p:nvGrpSpPr>
         <p:grpSpPr>
           <a:xfrm rot="5400000">
-            <a:off x="6088711" y="1962201"/>
+            <a:off x="6443315" y="1631951"/>
             <a:ext cx="254462" cy="555486"/>
             <a:chOff x="3949242" y="578739"/>
             <a:chExt cx="254462" cy="503902"/>
@@ -5280,7 +5286,7 @@
         </p:nvGrpSpPr>
         <p:grpSpPr>
           <a:xfrm rot="5400000">
-            <a:off x="6098740" y="2390577"/>
+            <a:off x="6453344" y="2060327"/>
             <a:ext cx="254462" cy="555486"/>
             <a:chOff x="3965759" y="592436"/>
             <a:chExt cx="254462" cy="503902"/>
@@ -5385,7 +5391,7 @@
         </p:nvSpPr>
         <p:spPr>
           <a:xfrm>
-            <a:off x="3186326" y="2841725"/>
+            <a:off x="3540930" y="2511475"/>
             <a:ext cx="731636" cy="283820"/>
           </a:xfrm>
           <a:prstGeom prst="rect">
@@ -5450,7 +5456,7 @@
         </p:nvSpPr>
         <p:spPr>
           <a:xfrm>
-            <a:off x="3186326" y="3190882"/>
+            <a:off x="3540930" y="2860632"/>
             <a:ext cx="731636" cy="283820"/>
           </a:xfrm>
           <a:prstGeom prst="rect">
@@ -5518,7 +5524,7 @@
         </p:nvCxnSpPr>
         <p:spPr>
           <a:xfrm flipH="1">
-            <a:off x="3917962" y="2983635"/>
+            <a:off x="4272566" y="2653385"/>
             <a:ext cx="335164" cy="0"/>
           </a:xfrm>
           <a:prstGeom prst="straightConnector1">
@@ -5562,7 +5568,7 @@
         </p:nvCxnSpPr>
         <p:spPr>
           <a:xfrm flipH="1">
-            <a:off x="3917962" y="3332439"/>
+            <a:off x="4272566" y="3002189"/>
             <a:ext cx="335164" cy="353"/>
           </a:xfrm>
           <a:prstGeom prst="straightConnector1">
@@ -5607,8 +5613,8 @@
         </p:nvCxnSpPr>
         <p:spPr>
           <a:xfrm rot="10800000">
-            <a:off x="2601618" y="2629061"/>
-            <a:ext cx="584708" cy="354574"/>
+            <a:off x="3046594" y="2295193"/>
+            <a:ext cx="494337" cy="358193"/>
           </a:xfrm>
           <a:prstGeom prst="bentConnector2">
             <a:avLst/>
@@ -5652,7 +5658,7 @@
         </p:nvCxnSpPr>
         <p:spPr>
           <a:xfrm>
-            <a:off x="3925321" y="2036175"/>
+            <a:off x="4279925" y="1705925"/>
             <a:ext cx="327805" cy="107"/>
           </a:xfrm>
           <a:prstGeom prst="line">
@@ -5697,8 +5703,8 @@
         </p:nvCxnSpPr>
         <p:spPr>
           <a:xfrm rot="10800000" flipV="1">
-            <a:off x="2601618" y="2036175"/>
-            <a:ext cx="572596" cy="418306"/>
+            <a:off x="3046594" y="1705924"/>
+            <a:ext cx="482225" cy="414687"/>
           </a:xfrm>
           <a:prstGeom prst="bentConnector2">
             <a:avLst/>
@@ -5739,7 +5745,7 @@
         </p:nvGrpSpPr>
         <p:grpSpPr>
           <a:xfrm rot="5400000">
-            <a:off x="4346209" y="3538793"/>
+            <a:off x="4700220" y="3066879"/>
             <a:ext cx="555486" cy="254462"/>
             <a:chOff x="3703306" y="644022"/>
             <a:chExt cx="555486" cy="230832"/>
@@ -5847,8 +5853,8 @@
         </p:nvCxnSpPr>
         <p:spPr>
           <a:xfrm rot="16200000" flipV="1">
-            <a:off x="7296652" y="3452865"/>
-            <a:ext cx="850958" cy="204262"/>
+            <a:off x="7468408" y="3305464"/>
+            <a:ext cx="1155025" cy="142632"/>
           </a:xfrm>
           <a:prstGeom prst="bentConnector2">
             <a:avLst/>
@@ -5881,7 +5887,7 @@
         </p:nvSpPr>
         <p:spPr>
           <a:xfrm flipV="1">
-            <a:off x="7689010" y="3980475"/>
+            <a:off x="7981984" y="3954292"/>
             <a:ext cx="270504" cy="175523"/>
           </a:xfrm>
           <a:prstGeom prst="triangle">
@@ -5938,8 +5944,8 @@
         </p:nvCxnSpPr>
         <p:spPr>
           <a:xfrm rot="16200000" flipV="1">
-            <a:off x="7516775" y="3672988"/>
-            <a:ext cx="410712" cy="204262"/>
+            <a:off x="7688531" y="3525587"/>
+            <a:ext cx="714779" cy="142632"/>
           </a:xfrm>
           <a:prstGeom prst="bentConnector2">
             <a:avLst/>
@@ -5975,8 +5981,8 @@
         </p:nvCxnSpPr>
         <p:spPr>
           <a:xfrm rot="16200000" flipV="1">
-            <a:off x="7096044" y="3252257"/>
-            <a:ext cx="1252175" cy="204262"/>
+            <a:off x="7267799" y="3104855"/>
+            <a:ext cx="1556242" cy="142632"/>
           </a:xfrm>
           <a:prstGeom prst="bentConnector2">
             <a:avLst/>
@@ -6012,8 +6018,8 @@
         </p:nvCxnSpPr>
         <p:spPr>
           <a:xfrm rot="16200000" flipV="1">
-            <a:off x="6890098" y="3046311"/>
-            <a:ext cx="1657928" cy="210400"/>
+            <a:off x="7061854" y="2898910"/>
+            <a:ext cx="1961995" cy="148770"/>
           </a:xfrm>
           <a:prstGeom prst="bentConnector2">
             <a:avLst/>
@@ -6049,8 +6055,8 @@
         </p:nvCxnSpPr>
         <p:spPr>
           <a:xfrm flipV="1">
-            <a:off x="4114800" y="3150962"/>
-            <a:ext cx="716492" cy="797920"/>
+            <a:off x="4440075" y="2820712"/>
+            <a:ext cx="745821" cy="1125297"/>
           </a:xfrm>
           <a:prstGeom prst="bentConnector3">
             <a:avLst>
@@ -6095,8 +6101,8 @@
         </p:nvCxnSpPr>
         <p:spPr>
           <a:xfrm flipV="1">
-            <a:off x="4114800" y="2728717"/>
-            <a:ext cx="716494" cy="1220165"/>
+            <a:off x="4440075" y="2398467"/>
+            <a:ext cx="745823" cy="1547542"/>
           </a:xfrm>
           <a:prstGeom prst="bentConnector3">
             <a:avLst>
@@ -6141,8 +6147,8 @@
         </p:nvCxnSpPr>
         <p:spPr>
           <a:xfrm flipV="1">
-            <a:off x="4114800" y="2322317"/>
-            <a:ext cx="716494" cy="1626565"/>
+            <a:off x="4440075" y="1992067"/>
+            <a:ext cx="745823" cy="1953942"/>
           </a:xfrm>
           <a:prstGeom prst="bentConnector3">
             <a:avLst>
@@ -6188,7 +6194,7 @@
         </p:nvCxnSpPr>
         <p:spPr>
           <a:xfrm flipV="1">
-            <a:off x="5924929" y="2728300"/>
+            <a:off x="6279533" y="2398050"/>
             <a:ext cx="601436" cy="417"/>
           </a:xfrm>
           <a:prstGeom prst="bentConnector3">
@@ -6235,7 +6241,7 @@
         </p:nvCxnSpPr>
         <p:spPr>
           <a:xfrm>
-            <a:off x="5924929" y="2322317"/>
+            <a:off x="6279533" y="1992067"/>
             <a:ext cx="595298" cy="230"/>
           </a:xfrm>
           <a:prstGeom prst="bentConnector3">
@@ -6280,7 +6286,7 @@
         </p:nvCxnSpPr>
         <p:spPr>
           <a:xfrm>
-            <a:off x="4248488" y="2033984"/>
+            <a:off x="4603092" y="1703734"/>
             <a:ext cx="0" cy="1304815"/>
           </a:xfrm>
           <a:prstGeom prst="line">
@@ -6323,7 +6329,7 @@
         </p:nvCxnSpPr>
         <p:spPr>
           <a:xfrm>
-            <a:off x="4248488" y="2209800"/>
+            <a:off x="4603092" y="1879550"/>
             <a:ext cx="582002" cy="0"/>
           </a:xfrm>
           <a:prstGeom prst="line">
@@ -6366,7 +6372,7 @@
         </p:nvCxnSpPr>
         <p:spPr>
           <a:xfrm flipV="1">
-            <a:off x="4255042" y="2607245"/>
+            <a:off x="4609646" y="2276995"/>
             <a:ext cx="566976" cy="5974"/>
           </a:xfrm>
           <a:prstGeom prst="line">
@@ -6409,7 +6415,7 @@
         </p:nvCxnSpPr>
         <p:spPr>
           <a:xfrm>
-            <a:off x="4248487" y="3048000"/>
+            <a:off x="4603091" y="2717750"/>
             <a:ext cx="573531" cy="0"/>
           </a:xfrm>
           <a:prstGeom prst="line">
@@ -6450,7 +6456,7 @@
         </p:nvSpPr>
         <p:spPr>
           <a:xfrm>
-            <a:off x="3174214" y="2370131"/>
+            <a:off x="3528818" y="2039881"/>
             <a:ext cx="750156" cy="340758"/>
           </a:xfrm>
           <a:prstGeom prst="rect">
@@ -6523,13 +6529,12 @@
           <p:cNvCxnSpPr>
             <a:cxnSpLocks/>
             <a:stCxn id="109" idx="1"/>
-            <a:endCxn id="58" idx="3"/>
           </p:cNvCxnSpPr>
           <p:nvPr/>
         </p:nvCxnSpPr>
         <p:spPr>
           <a:xfrm rot="10800000" flipV="1">
-            <a:off x="2964740" y="2540509"/>
+            <a:off x="3319344" y="2210259"/>
             <a:ext cx="209475" cy="1261"/>
           </a:xfrm>
           <a:prstGeom prst="bentConnector3">
@@ -6577,7 +6582,7 @@
         </p:nvCxnSpPr>
         <p:spPr>
           <a:xfrm rot="5400000">
-            <a:off x="3469242" y="2289605"/>
+            <a:off x="3823846" y="1959355"/>
             <a:ext cx="160576" cy="476"/>
           </a:xfrm>
           <a:prstGeom prst="bentConnector3">
@@ -6624,7 +6629,7 @@
         </p:nvCxnSpPr>
         <p:spPr>
           <a:xfrm flipV="1">
-            <a:off x="3924370" y="2535795"/>
+            <a:off x="4278974" y="2205545"/>
             <a:ext cx="322202" cy="4715"/>
           </a:xfrm>
           <a:prstGeom prst="line">
@@ -6639,6 +6644,385 @@
             <a:prstDash val="sysDot"/>
             <a:headEnd type="arrow" w="med" len="med"/>
             <a:tailEnd type="none" w="med" len="med"/>
+          </a:ln>
+          <a:effectLst/>
+        </p:spPr>
+        <p:style>
+          <a:lnRef idx="1">
+            <a:schemeClr val="accent2"/>
+          </a:lnRef>
+          <a:fillRef idx="2">
+            <a:schemeClr val="accent2"/>
+          </a:fillRef>
+          <a:effectRef idx="1">
+            <a:schemeClr val="accent2"/>
+          </a:effectRef>
+          <a:fontRef idx="minor">
+            <a:schemeClr val="dk1"/>
+          </a:fontRef>
+        </p:style>
+      </p:cxnSp>
+      <p:sp>
+        <p:nvSpPr>
+          <p:cNvPr id="86" name="Rectangle 85"/>
+          <p:cNvSpPr/>
+          <p:nvPr/>
+        </p:nvSpPr>
+        <p:spPr>
+          <a:xfrm flipH="1">
+            <a:off x="3000232" y="3328744"/>
+            <a:ext cx="900000" cy="346760"/>
+          </a:xfrm>
+          <a:prstGeom prst="rect">
+            <a:avLst/>
+          </a:prstGeom>
+          <a:solidFill>
+            <a:schemeClr val="accent5"/>
+          </a:solidFill>
+          <a:ln/>
+          <a:effectLst/>
+        </p:spPr>
+        <p:style>
+          <a:lnRef idx="1">
+            <a:schemeClr val="accent5"/>
+          </a:lnRef>
+          <a:fillRef idx="2">
+            <a:schemeClr val="accent5"/>
+          </a:fillRef>
+          <a:effectRef idx="1">
+            <a:schemeClr val="accent5"/>
+          </a:effectRef>
+          <a:fontRef idx="minor">
+            <a:schemeClr val="dk1"/>
+          </a:fontRef>
+        </p:style>
+        <p:txBody>
+          <a:bodyPr rtlCol="0" anchor="ctr"/>
+          <a:lstStyle/>
+          <a:p>
+            <a:pPr algn="ctr"/>
+            <a:r>
+              <a:rPr lang="en-US" sz="1050" b="1" dirty="0" err="1" smtClean="0">
+                <a:solidFill>
+                  <a:schemeClr val="bg1"/>
+                </a:solidFill>
+              </a:rPr>
+              <a:t>ParserResult</a:t>
+            </a:r>
+            <a:endParaRPr lang="en-SG" sz="1050" b="1" dirty="0">
+              <a:solidFill>
+                <a:schemeClr val="bg1"/>
+              </a:solidFill>
+            </a:endParaRPr>
+          </a:p>
+        </p:txBody>
+      </p:sp>
+      <p:cxnSp>
+        <p:nvCxnSpPr>
+          <p:cNvPr id="88" name="Elbow Connector 63"/>
+          <p:cNvCxnSpPr>
+            <a:stCxn id="16" idx="0"/>
+            <a:endCxn id="86" idx="1"/>
+          </p:cNvCxnSpPr>
+          <p:nvPr/>
+        </p:nvCxnSpPr>
+        <p:spPr>
+          <a:xfrm rot="16200000" flipV="1">
+            <a:off x="3888539" y="3513818"/>
+            <a:ext cx="270505" cy="247118"/>
+          </a:xfrm>
+          <a:prstGeom prst="bentConnector2">
+            <a:avLst/>
+          </a:prstGeom>
+          <a:ln w="19050">
+            <a:solidFill>
+              <a:schemeClr val="accent5">
+                <a:lumMod val="75000"/>
+              </a:schemeClr>
+            </a:solidFill>
+            <a:prstDash val="sysDot"/>
+            <a:headEnd type="none" w="med" len="med"/>
+            <a:tailEnd type="arrow" w="med" len="med"/>
+          </a:ln>
+          <a:effectLst/>
+        </p:spPr>
+        <p:style>
+          <a:lnRef idx="1">
+            <a:schemeClr val="accent2"/>
+          </a:lnRef>
+          <a:fillRef idx="2">
+            <a:schemeClr val="accent2"/>
+          </a:fillRef>
+          <a:effectRef idx="1">
+            <a:schemeClr val="accent2"/>
+          </a:effectRef>
+          <a:fontRef idx="minor">
+            <a:schemeClr val="dk1"/>
+          </a:fontRef>
+        </p:style>
+      </p:cxnSp>
+      <p:cxnSp>
+        <p:nvCxnSpPr>
+          <p:cNvPr id="98" name="Elbow Connector 122"/>
+          <p:cNvCxnSpPr>
+            <a:endCxn id="86" idx="3"/>
+          </p:cNvCxnSpPr>
+          <p:nvPr/>
+        </p:nvCxnSpPr>
+        <p:spPr>
+          <a:xfrm rot="5400000" flipH="1" flipV="1">
+            <a:off x="2778321" y="3535318"/>
+            <a:ext cx="255105" cy="188718"/>
+          </a:xfrm>
+          <a:prstGeom prst="bentConnector2">
+            <a:avLst/>
+          </a:prstGeom>
+          <a:ln w="19050">
+            <a:solidFill>
+              <a:srgbClr val="0070C0"/>
+            </a:solidFill>
+            <a:prstDash val="sysDot"/>
+            <a:headEnd type="none" w="med" len="med"/>
+            <a:tailEnd type="arrow" w="med" len="med"/>
+          </a:ln>
+          <a:effectLst/>
+        </p:spPr>
+        <p:style>
+          <a:lnRef idx="1">
+            <a:schemeClr val="accent2"/>
+          </a:lnRef>
+          <a:fillRef idx="2">
+            <a:schemeClr val="accent2"/>
+          </a:fillRef>
+          <a:effectRef idx="1">
+            <a:schemeClr val="accent2"/>
+          </a:effectRef>
+          <a:fontRef idx="minor">
+            <a:schemeClr val="dk1"/>
+          </a:fontRef>
+        </p:style>
+      </p:cxnSp>
+      <p:cxnSp>
+        <p:nvCxnSpPr>
+          <p:cNvPr id="101" name="Elbow Connector 122"/>
+          <p:cNvCxnSpPr>
+            <a:stCxn id="5" idx="0"/>
+          </p:cNvCxnSpPr>
+          <p:nvPr/>
+        </p:nvCxnSpPr>
+        <p:spPr>
+          <a:xfrm rot="16200000" flipV="1">
+            <a:off x="1999156" y="3444515"/>
+            <a:ext cx="653748" cy="3147"/>
+          </a:xfrm>
+          <a:prstGeom prst="bentConnector3">
+            <a:avLst>
+              <a:gd name="adj1" fmla="val 50000"/>
+            </a:avLst>
+          </a:prstGeom>
+          <a:ln w="19050">
+            <a:solidFill>
+              <a:srgbClr val="0070C0"/>
+            </a:solidFill>
+            <a:prstDash val="sysDot"/>
+            <a:headEnd type="none" w="med" len="med"/>
+            <a:tailEnd type="arrow" w="med" len="med"/>
+          </a:ln>
+          <a:effectLst/>
+        </p:spPr>
+        <p:style>
+          <a:lnRef idx="1">
+            <a:schemeClr val="accent2"/>
+          </a:lnRef>
+          <a:fillRef idx="2">
+            <a:schemeClr val="accent2"/>
+          </a:fillRef>
+          <a:effectRef idx="1">
+            <a:schemeClr val="accent2"/>
+          </a:effectRef>
+          <a:fontRef idx="minor">
+            <a:schemeClr val="dk1"/>
+          </a:fontRef>
+        </p:style>
+      </p:cxnSp>
+      <p:sp>
+        <p:nvSpPr>
+          <p:cNvPr id="104" name="Rectangle 8"/>
+          <p:cNvSpPr/>
+          <p:nvPr/>
+        </p:nvSpPr>
+        <p:spPr>
+          <a:xfrm>
+            <a:off x="1828800" y="2773103"/>
+            <a:ext cx="752724" cy="346760"/>
+          </a:xfrm>
+          <a:prstGeom prst="rect">
+            <a:avLst/>
+          </a:prstGeom>
+          <a:solidFill>
+            <a:srgbClr val="0070C0"/>
+          </a:solidFill>
+          <a:ln w="19050">
+            <a:solidFill>
+              <a:srgbClr val="0070C0"/>
+            </a:solidFill>
+          </a:ln>
+          <a:effectLst/>
+        </p:spPr>
+        <p:style>
+          <a:lnRef idx="1">
+            <a:schemeClr val="accent2"/>
+          </a:lnRef>
+          <a:fillRef idx="2">
+            <a:schemeClr val="accent2"/>
+          </a:fillRef>
+          <a:effectRef idx="1">
+            <a:schemeClr val="accent2"/>
+          </a:effectRef>
+          <a:fontRef idx="minor">
+            <a:schemeClr val="dk1"/>
+          </a:fontRef>
+        </p:style>
+        <p:txBody>
+          <a:bodyPr rtlCol="0" anchor="ctr"/>
+          <a:lstStyle/>
+          <a:p>
+            <a:pPr algn="ctr"/>
+            <a:r>
+              <a:rPr lang="en-US" sz="1050" dirty="0" smtClean="0">
+                <a:solidFill>
+                  <a:schemeClr val="bg1"/>
+                </a:solidFill>
+              </a:rPr>
+              <a:t>Execution</a:t>
+            </a:r>
+          </a:p>
+          <a:p>
+            <a:pPr algn="ctr"/>
+            <a:r>
+              <a:rPr lang="en-US" sz="1050" dirty="0" smtClean="0">
+                <a:solidFill>
+                  <a:schemeClr val="bg1"/>
+                </a:solidFill>
+              </a:rPr>
+              <a:t>Result</a:t>
+            </a:r>
+            <a:endParaRPr lang="en-SG" sz="1050" dirty="0">
+              <a:solidFill>
+                <a:schemeClr val="bg1"/>
+              </a:solidFill>
+            </a:endParaRPr>
+          </a:p>
+        </p:txBody>
+      </p:sp>
+      <p:sp>
+        <p:nvSpPr>
+          <p:cNvPr id="135" name="TextBox 134"/>
+          <p:cNvSpPr txBox="1"/>
+          <p:nvPr/>
+        </p:nvSpPr>
+        <p:spPr>
+          <a:xfrm>
+            <a:off x="3621040" y="3990239"/>
+            <a:ext cx="131116" cy="230832"/>
+          </a:xfrm>
+          <a:prstGeom prst="rect">
+            <a:avLst/>
+          </a:prstGeom>
+          <a:noFill/>
+        </p:spPr>
+        <p:txBody>
+          <a:bodyPr wrap="square" lIns="0" tIns="0" rIns="0" bIns="0" rtlCol="0">
+            <a:noAutofit/>
+          </a:bodyPr>
+          <a:lstStyle/>
+          <a:p>
+            <a:pPr algn="r"/>
+            <a:r>
+              <a:rPr lang="en-US" sz="1100" dirty="0">
+                <a:solidFill>
+                  <a:srgbClr val="0070C0"/>
+                </a:solidFill>
+              </a:rPr>
+              <a:t>1</a:t>
+            </a:r>
+            <a:endParaRPr lang="en-SG" sz="1100" dirty="0">
+              <a:solidFill>
+                <a:srgbClr val="0070C0"/>
+              </a:solidFill>
+            </a:endParaRPr>
+          </a:p>
+        </p:txBody>
+      </p:sp>
+      <p:cxnSp>
+        <p:nvCxnSpPr>
+          <p:cNvPr id="92" name="Elbow Connector 122"/>
+          <p:cNvCxnSpPr>
+            <a:stCxn id="104" idx="0"/>
+          </p:cNvCxnSpPr>
+          <p:nvPr/>
+        </p:nvCxnSpPr>
+        <p:spPr>
+          <a:xfrm rot="16200000" flipV="1">
+            <a:off x="1617395" y="2185336"/>
+            <a:ext cx="1173276" cy="2258"/>
+          </a:xfrm>
+          <a:prstGeom prst="bentConnector3">
+            <a:avLst>
+              <a:gd name="adj1" fmla="val 50000"/>
+            </a:avLst>
+          </a:prstGeom>
+          <a:ln w="19050">
+            <a:solidFill>
+              <a:schemeClr val="tx2">
+                <a:lumMod val="50000"/>
+              </a:schemeClr>
+            </a:solidFill>
+            <a:prstDash val="sysDot"/>
+            <a:headEnd type="none" w="med" len="med"/>
+            <a:tailEnd type="arrow" w="med" len="med"/>
+          </a:ln>
+          <a:effectLst/>
+        </p:spPr>
+        <p:style>
+          <a:lnRef idx="1">
+            <a:schemeClr val="accent2"/>
+          </a:lnRef>
+          <a:fillRef idx="2">
+            <a:schemeClr val="accent2"/>
+          </a:fillRef>
+          <a:effectRef idx="1">
+            <a:schemeClr val="accent2"/>
+          </a:effectRef>
+          <a:fontRef idx="minor">
+            <a:schemeClr val="dk1"/>
+          </a:fontRef>
+        </p:style>
+      </p:cxnSp>
+      <p:cxnSp>
+        <p:nvCxnSpPr>
+          <p:cNvPr id="95" name="Elbow Connector 122"/>
+          <p:cNvCxnSpPr>
+            <a:stCxn id="104" idx="3"/>
+            <a:endCxn id="86" idx="0"/>
+          </p:cNvCxnSpPr>
+          <p:nvPr/>
+        </p:nvCxnSpPr>
+        <p:spPr>
+          <a:xfrm>
+            <a:off x="2581524" y="2946483"/>
+            <a:ext cx="868708" cy="382261"/>
+          </a:xfrm>
+          <a:prstGeom prst="bentConnector2">
+            <a:avLst/>
+          </a:prstGeom>
+          <a:ln w="19050">
+            <a:solidFill>
+              <a:srgbClr val="002060"/>
+            </a:solidFill>
+            <a:prstDash val="sysDot"/>
+            <a:headEnd type="none" w="med" len="med"/>
+            <a:tailEnd type="arrow" w="med" len="med"/>
           </a:ln>
           <a:effectLst/>
         </p:spPr>
@@ -6667,6 +7051,13 @@
   <p:clrMapOvr>
     <a:masterClrMapping/>
   </p:clrMapOvr>
+  <p:timing>
+    <p:tnLst>
+      <p:par>
+        <p:cTn id="1" dur="indefinite" restart="never" nodeType="tmRoot"/>
+      </p:par>
+    </p:tnLst>
+  </p:timing>
 </p:sld>
 </file>
 

</xml_diff>

<commit_message>
Interdiff between v9 and v10
</commit_message>
<xml_diff>
--- a/docs/diagrams/LogicComponentClassDiagram.pptx
+++ b/docs/diagrams/LogicComponentClassDiagram.pptx
@@ -208,7 +208,7 @@
           <a:p>
             <a:fld id="{F5CC4B3F-88C1-4FFA-B1B6-F41C21DC6924}" type="datetimeFigureOut">
               <a:rPr lang="en-US" smtClean="0"/>
-              <a:t>3/21/2017</a:t>
+              <a:t>6/2/17</a:t>
             </a:fld>
             <a:endParaRPr lang="en-US"/>
           </a:p>
@@ -654,7 +654,7 @@
           <a:p>
             <a:fld id="{78C97017-6FC3-485B-9764-EAC9E56C1D49}" type="datetimeFigureOut">
               <a:rPr lang="en-US" smtClean="0"/>
-              <a:t>3/21/2017</a:t>
+              <a:t>6/2/17</a:t>
             </a:fld>
             <a:endParaRPr lang="en-US"/>
           </a:p>
@@ -822,7 +822,7 @@
           <a:p>
             <a:fld id="{78C97017-6FC3-485B-9764-EAC9E56C1D49}" type="datetimeFigureOut">
               <a:rPr lang="en-US" smtClean="0"/>
-              <a:t>3/21/2017</a:t>
+              <a:t>6/2/17</a:t>
             </a:fld>
             <a:endParaRPr lang="en-US"/>
           </a:p>
@@ -1000,7 +1000,7 @@
           <a:p>
             <a:fld id="{78C97017-6FC3-485B-9764-EAC9E56C1D49}" type="datetimeFigureOut">
               <a:rPr lang="en-US" smtClean="0"/>
-              <a:t>3/21/2017</a:t>
+              <a:t>6/2/17</a:t>
             </a:fld>
             <a:endParaRPr lang="en-US"/>
           </a:p>
@@ -1168,7 +1168,7 @@
           <a:p>
             <a:fld id="{78C97017-6FC3-485B-9764-EAC9E56C1D49}" type="datetimeFigureOut">
               <a:rPr lang="en-US" smtClean="0"/>
-              <a:t>3/21/2017</a:t>
+              <a:t>6/2/17</a:t>
             </a:fld>
             <a:endParaRPr lang="en-US"/>
           </a:p>
@@ -1413,7 +1413,7 @@
           <a:p>
             <a:fld id="{78C97017-6FC3-485B-9764-EAC9E56C1D49}" type="datetimeFigureOut">
               <a:rPr lang="en-US" smtClean="0"/>
-              <a:t>3/21/2017</a:t>
+              <a:t>6/2/17</a:t>
             </a:fld>
             <a:endParaRPr lang="en-US"/>
           </a:p>
@@ -1698,7 +1698,7 @@
           <a:p>
             <a:fld id="{78C97017-6FC3-485B-9764-EAC9E56C1D49}" type="datetimeFigureOut">
               <a:rPr lang="en-US" smtClean="0"/>
-              <a:t>3/21/2017</a:t>
+              <a:t>6/2/17</a:t>
             </a:fld>
             <a:endParaRPr lang="en-US"/>
           </a:p>
@@ -2117,7 +2117,7 @@
           <a:p>
             <a:fld id="{78C97017-6FC3-485B-9764-EAC9E56C1D49}" type="datetimeFigureOut">
               <a:rPr lang="en-US" smtClean="0"/>
-              <a:t>3/21/2017</a:t>
+              <a:t>6/2/17</a:t>
             </a:fld>
             <a:endParaRPr lang="en-US"/>
           </a:p>
@@ -2234,7 +2234,7 @@
           <a:p>
             <a:fld id="{78C97017-6FC3-485B-9764-EAC9E56C1D49}" type="datetimeFigureOut">
               <a:rPr lang="en-US" smtClean="0"/>
-              <a:t>3/21/2017</a:t>
+              <a:t>6/2/17</a:t>
             </a:fld>
             <a:endParaRPr lang="en-US"/>
           </a:p>
@@ -2329,7 +2329,7 @@
           <a:p>
             <a:fld id="{78C97017-6FC3-485B-9764-EAC9E56C1D49}" type="datetimeFigureOut">
               <a:rPr lang="en-US" smtClean="0"/>
-              <a:t>3/21/2017</a:t>
+              <a:t>6/2/17</a:t>
             </a:fld>
             <a:endParaRPr lang="en-US"/>
           </a:p>
@@ -2604,7 +2604,7 @@
           <a:p>
             <a:fld id="{78C97017-6FC3-485B-9764-EAC9E56C1D49}" type="datetimeFigureOut">
               <a:rPr lang="en-US" smtClean="0"/>
-              <a:t>3/21/2017</a:t>
+              <a:t>6/2/17</a:t>
             </a:fld>
             <a:endParaRPr lang="en-US"/>
           </a:p>
@@ -2856,7 +2856,7 @@
           <a:p>
             <a:fld id="{78C97017-6FC3-485B-9764-EAC9E56C1D49}" type="datetimeFigureOut">
               <a:rPr lang="en-US" smtClean="0"/>
-              <a:t>3/21/2017</a:t>
+              <a:t>6/2/17</a:t>
             </a:fld>
             <a:endParaRPr lang="en-US"/>
           </a:p>
@@ -3067,7 +3067,7 @@
           <a:p>
             <a:fld id="{78C97017-6FC3-485B-9764-EAC9E56C1D49}" type="datetimeFigureOut">
               <a:rPr lang="en-US" smtClean="0"/>
-              <a:t>3/21/2017</a:t>
+              <a:t>6/2/17</a:t>
             </a:fld>
             <a:endParaRPr lang="en-US"/>
           </a:p>
@@ -3626,7 +3626,7 @@
         </p:nvSpPr>
         <p:spPr>
           <a:xfrm>
-            <a:off x="1780785" y="3772963"/>
+            <a:off x="1782495" y="3583530"/>
             <a:ext cx="1093635" cy="346760"/>
           </a:xfrm>
           <a:prstGeom prst="rect">
@@ -4030,7 +4030,7 @@
         </p:nvSpPr>
         <p:spPr>
           <a:xfrm>
-            <a:off x="3529350" y="3775502"/>
+            <a:off x="3529350" y="3581895"/>
             <a:ext cx="585450" cy="346760"/>
           </a:xfrm>
           <a:prstGeom prst="rect">
@@ -4087,9 +4087,9 @@
           <p:nvPr/>
         </p:nvCxnSpPr>
         <p:spPr>
-          <a:xfrm>
-            <a:off x="2874420" y="3946343"/>
-            <a:ext cx="654930" cy="2539"/>
+          <a:xfrm flipV="1">
+            <a:off x="2876130" y="3755275"/>
+            <a:ext cx="653220" cy="1635"/>
           </a:xfrm>
           <a:prstGeom prst="bentConnector3">
             <a:avLst>
@@ -4297,8 +4297,8 @@
         </p:nvCxnSpPr>
         <p:spPr>
           <a:xfrm rot="10800000">
-            <a:off x="1494291" y="3604523"/>
-            <a:ext cx="286494" cy="341820"/>
+            <a:off x="1494291" y="3604524"/>
+            <a:ext cx="288204" cy="152387"/>
           </a:xfrm>
           <a:prstGeom prst="bentConnector2">
             <a:avLst/>
@@ -4331,13 +4331,15 @@
       <p:cxnSp>
         <p:nvCxnSpPr>
           <p:cNvPr id="23" name="Straight Arrow Connector 57"/>
-          <p:cNvCxnSpPr/>
+          <p:cNvCxnSpPr>
+            <a:stCxn id="5" idx="2"/>
+          </p:cNvCxnSpPr>
           <p:nvPr/>
         </p:nvCxnSpPr>
         <p:spPr>
-          <a:xfrm flipH="1">
-            <a:off x="1981201" y="4122262"/>
-            <a:ext cx="1" cy="655093"/>
+          <a:xfrm>
+            <a:off x="2329313" y="3930290"/>
+            <a:ext cx="1376" cy="854841"/>
           </a:xfrm>
           <a:prstGeom prst="straightConnector1">
             <a:avLst/>
@@ -4413,18 +4415,19 @@
         <p:nvCxnSpPr>
           <p:cNvPr id="25" name="Elbow Connector 63"/>
           <p:cNvCxnSpPr>
-            <a:stCxn id="5" idx="2"/>
             <a:endCxn id="12" idx="1"/>
           </p:cNvCxnSpPr>
           <p:nvPr/>
         </p:nvCxnSpPr>
         <p:spPr>
-          <a:xfrm rot="16200000" flipH="1">
-            <a:off x="4781573" y="1665753"/>
-            <a:ext cx="202697" cy="5110636"/>
-          </a:xfrm>
-          <a:prstGeom prst="bentConnector2">
-            <a:avLst/>
+          <a:xfrm>
+            <a:off x="2743200" y="3939492"/>
+            <a:ext cx="4695039" cy="382928"/>
+          </a:xfrm>
+          <a:prstGeom prst="bentConnector3">
+            <a:avLst>
+              <a:gd name="adj1" fmla="val -81"/>
+            </a:avLst>
           </a:prstGeom>
           <a:ln w="19050">
             <a:solidFill>
@@ -4652,52 +4655,13 @@
       </p:grpSp>
       <p:sp>
         <p:nvSpPr>
-          <p:cNvPr id="32" name="TextBox 31"/>
-          <p:cNvSpPr txBox="1"/>
-          <p:nvPr/>
-        </p:nvSpPr>
-        <p:spPr>
-          <a:xfrm>
-            <a:off x="2301175" y="1618473"/>
-            <a:ext cx="131116" cy="230832"/>
-          </a:xfrm>
-          <a:prstGeom prst="rect">
-            <a:avLst/>
-          </a:prstGeom>
-          <a:noFill/>
-        </p:spPr>
-        <p:txBody>
-          <a:bodyPr wrap="square" lIns="0" tIns="0" rIns="0" bIns="0" rtlCol="0">
-            <a:noAutofit/>
-          </a:bodyPr>
-          <a:lstStyle/>
-          <a:p>
-            <a:pPr algn="r"/>
-            <a:r>
-              <a:rPr lang="en-US" sz="1100" dirty="0">
-                <a:solidFill>
-                  <a:srgbClr val="0070C0"/>
-                </a:solidFill>
-              </a:rPr>
-              <a:t>1</a:t>
-            </a:r>
-            <a:endParaRPr lang="en-SG" sz="1100" dirty="0">
-              <a:solidFill>
-                <a:srgbClr val="0070C0"/>
-              </a:solidFill>
-            </a:endParaRPr>
-          </a:p>
-        </p:txBody>
-      </p:sp>
-      <p:sp>
-        <p:nvSpPr>
           <p:cNvPr id="33" name="TextBox 32"/>
           <p:cNvSpPr txBox="1"/>
           <p:nvPr/>
         </p:nvSpPr>
         <p:spPr>
           <a:xfrm>
-            <a:off x="2912207" y="3709457"/>
+            <a:off x="3272832" y="3766112"/>
             <a:ext cx="131116" cy="230832"/>
           </a:xfrm>
           <a:prstGeom prst="rect">
@@ -4791,9 +4755,9 @@
           <p:nvPr/>
         </p:nvCxnSpPr>
         <p:spPr>
-          <a:xfrm rot="16200000" flipV="1">
-            <a:off x="1105538" y="2692369"/>
-            <a:ext cx="2147794" cy="2"/>
+          <a:xfrm rot="5400000" flipH="1" flipV="1">
+            <a:off x="1193276" y="2601868"/>
+            <a:ext cx="1969553" cy="2764"/>
           </a:xfrm>
           <a:prstGeom prst="bentConnector3">
             <a:avLst>
@@ -6050,7 +6014,7 @@
         <p:spPr>
           <a:xfrm flipV="1">
             <a:off x="4114800" y="3150962"/>
-            <a:ext cx="716492" cy="797920"/>
+            <a:ext cx="716492" cy="604313"/>
           </a:xfrm>
           <a:prstGeom prst="bentConnector3">
             <a:avLst>
@@ -6096,7 +6060,7 @@
         <p:spPr>
           <a:xfrm flipV="1">
             <a:off x="4114800" y="2728717"/>
-            <a:ext cx="716494" cy="1220165"/>
+            <a:ext cx="716494" cy="1026558"/>
           </a:xfrm>
           <a:prstGeom prst="bentConnector3">
             <a:avLst>
@@ -6142,7 +6106,7 @@
         <p:spPr>
           <a:xfrm flipV="1">
             <a:off x="4114800" y="2322317"/>
-            <a:ext cx="716494" cy="1626565"/>
+            <a:ext cx="716494" cy="1432958"/>
           </a:xfrm>
           <a:prstGeom prst="bentConnector3">
             <a:avLst>
@@ -6657,6 +6621,153 @@
           </a:fontRef>
         </p:style>
       </p:cxnSp>
+      <p:sp>
+        <p:nvSpPr>
+          <p:cNvPr id="86" name="Rectangle 62"/>
+          <p:cNvSpPr/>
+          <p:nvPr/>
+        </p:nvSpPr>
+        <p:spPr>
+          <a:xfrm>
+            <a:off x="1295065" y="4183424"/>
+            <a:ext cx="805984" cy="346760"/>
+          </a:xfrm>
+          <a:prstGeom prst="rect">
+            <a:avLst/>
+          </a:prstGeom>
+          <a:solidFill>
+            <a:srgbClr val="0070C0"/>
+          </a:solidFill>
+          <a:ln w="19050">
+            <a:solidFill>
+              <a:srgbClr val="0070C0"/>
+            </a:solidFill>
+          </a:ln>
+          <a:effectLst/>
+        </p:spPr>
+        <p:style>
+          <a:lnRef idx="1">
+            <a:schemeClr val="accent2"/>
+          </a:lnRef>
+          <a:fillRef idx="2">
+            <a:schemeClr val="accent2"/>
+          </a:fillRef>
+          <a:effectRef idx="1">
+            <a:schemeClr val="accent2"/>
+          </a:effectRef>
+          <a:fontRef idx="minor">
+            <a:schemeClr val="dk1"/>
+          </a:fontRef>
+        </p:style>
+        <p:txBody>
+          <a:bodyPr rtlCol="0" anchor="ctr"/>
+          <a:lstStyle/>
+          <a:p>
+            <a:pPr algn="ctr"/>
+            <a:r>
+              <a:rPr lang="en-US" sz="1050" smtClean="0">
+                <a:solidFill>
+                  <a:schemeClr val="bg1"/>
+                </a:solidFill>
+              </a:rPr>
+              <a:t>Command</a:t>
+            </a:r>
+          </a:p>
+          <a:p>
+            <a:pPr algn="ctr"/>
+            <a:r>
+              <a:rPr lang="en-US" sz="1050" dirty="0" smtClean="0">
+                <a:solidFill>
+                  <a:schemeClr val="bg1"/>
+                </a:solidFill>
+              </a:rPr>
+              <a:t>History</a:t>
+            </a:r>
+            <a:endParaRPr lang="en-SG" sz="1050" dirty="0">
+              <a:solidFill>
+                <a:schemeClr val="bg1"/>
+              </a:solidFill>
+            </a:endParaRPr>
+          </a:p>
+        </p:txBody>
+      </p:sp>
+      <p:cxnSp>
+        <p:nvCxnSpPr>
+          <p:cNvPr id="88" name="Straight Arrow Connector 57"/>
+          <p:cNvCxnSpPr/>
+          <p:nvPr/>
+        </p:nvCxnSpPr>
+        <p:spPr>
+          <a:xfrm>
+            <a:off x="1971157" y="3939492"/>
+            <a:ext cx="2022" cy="240622"/>
+          </a:xfrm>
+          <a:prstGeom prst="straightConnector1">
+            <a:avLst/>
+          </a:prstGeom>
+          <a:ln w="19050">
+            <a:solidFill>
+              <a:srgbClr val="0070C0"/>
+            </a:solidFill>
+            <a:headEnd type="none" w="med" len="med"/>
+            <a:tailEnd type="arrow" w="med" len="med"/>
+          </a:ln>
+          <a:effectLst/>
+        </p:spPr>
+        <p:style>
+          <a:lnRef idx="1">
+            <a:schemeClr val="accent2"/>
+          </a:lnRef>
+          <a:fillRef idx="2">
+            <a:schemeClr val="accent2"/>
+          </a:fillRef>
+          <a:effectRef idx="1">
+            <a:schemeClr val="accent2"/>
+          </a:effectRef>
+          <a:fontRef idx="minor">
+            <a:schemeClr val="dk1"/>
+          </a:fontRef>
+        </p:style>
+      </p:cxnSp>
+      <p:sp>
+        <p:nvSpPr>
+          <p:cNvPr id="91" name="TextBox 90"/>
+          <p:cNvSpPr txBox="1"/>
+          <p:nvPr/>
+        </p:nvSpPr>
+        <p:spPr>
+          <a:xfrm>
+            <a:off x="1773980" y="4000395"/>
+            <a:ext cx="131116" cy="230832"/>
+          </a:xfrm>
+          <a:prstGeom prst="rect">
+            <a:avLst/>
+          </a:prstGeom>
+          <a:noFill/>
+        </p:spPr>
+        <p:txBody>
+          <a:bodyPr wrap="square" lIns="0" tIns="0" rIns="0" bIns="0" rtlCol="0">
+            <a:noAutofit/>
+          </a:bodyPr>
+          <a:lstStyle/>
+          <a:p>
+            <a:pPr algn="r"/>
+            <a:r>
+              <a:rPr lang="en-US" sz="1100" dirty="0">
+                <a:solidFill>
+                  <a:srgbClr val="0070C0"/>
+                </a:solidFill>
+              </a:rPr>
+              <a:t>1</a:t>
+            </a:r>
+            <a:endParaRPr lang="en-SG" sz="1100" dirty="0">
+              <a:solidFill>
+                <a:srgbClr val="0070C0"/>
+              </a:solidFill>
+            </a:endParaRPr>
+          </a:p>
+        </p:txBody>
+      </p:sp>
     </p:spTree>
     <p:extLst>
       <p:ext uri="{BB962C8B-B14F-4D97-AF65-F5344CB8AC3E}">

</xml_diff>

<commit_message>
Update User Guide and Developer Guide
</commit_message>
<xml_diff>
--- a/docs/diagrams/LogicComponentClassDiagram.pptx
+++ b/docs/diagrams/LogicComponentClassDiagram.pptx
@@ -109,7 +109,7 @@
   </p:defaultTextStyle>
   <p:extLst>
     <p:ext uri="{EFAFB233-063F-42B5-8137-9DF3F51BA10A}">
-      <p15:sldGuideLst xmlns:p15="http://schemas.microsoft.com/office/powerpoint/2012/main" xmlns="">
+      <p15:sldGuideLst xmlns:p15="http://schemas.microsoft.com/office/powerpoint/2012/main">
         <p15:guide id="1" orient="horz" pos="1488">
           <p15:clr>
             <a:srgbClr val="A4A3A4"/>
@@ -212,7 +212,7 @@
           <a:p>
             <a:fld id="{F5CC4B3F-88C1-4FFA-B1B6-F41C21DC6924}" type="datetimeFigureOut">
               <a:rPr lang="en-US" smtClean="0"/>
-              <a:t>7/12/2017</a:t>
+              <a:t>7/20/17</a:t>
             </a:fld>
             <a:endParaRPr lang="en-US"/>
           </a:p>
@@ -658,7 +658,7 @@
           <a:p>
             <a:fld id="{78C97017-6FC3-485B-9764-EAC9E56C1D49}" type="datetimeFigureOut">
               <a:rPr lang="en-US" smtClean="0"/>
-              <a:t>7/12/2017</a:t>
+              <a:t>7/20/17</a:t>
             </a:fld>
             <a:endParaRPr lang="en-US"/>
           </a:p>
@@ -826,7 +826,7 @@
           <a:p>
             <a:fld id="{78C97017-6FC3-485B-9764-EAC9E56C1D49}" type="datetimeFigureOut">
               <a:rPr lang="en-US" smtClean="0"/>
-              <a:t>7/12/2017</a:t>
+              <a:t>7/20/17</a:t>
             </a:fld>
             <a:endParaRPr lang="en-US"/>
           </a:p>
@@ -1004,7 +1004,7 @@
           <a:p>
             <a:fld id="{78C97017-6FC3-485B-9764-EAC9E56C1D49}" type="datetimeFigureOut">
               <a:rPr lang="en-US" smtClean="0"/>
-              <a:t>7/12/2017</a:t>
+              <a:t>7/20/17</a:t>
             </a:fld>
             <a:endParaRPr lang="en-US"/>
           </a:p>
@@ -1172,7 +1172,7 @@
           <a:p>
             <a:fld id="{78C97017-6FC3-485B-9764-EAC9E56C1D49}" type="datetimeFigureOut">
               <a:rPr lang="en-US" smtClean="0"/>
-              <a:t>7/12/2017</a:t>
+              <a:t>7/20/17</a:t>
             </a:fld>
             <a:endParaRPr lang="en-US"/>
           </a:p>
@@ -1417,7 +1417,7 @@
           <a:p>
             <a:fld id="{78C97017-6FC3-485B-9764-EAC9E56C1D49}" type="datetimeFigureOut">
               <a:rPr lang="en-US" smtClean="0"/>
-              <a:t>7/12/2017</a:t>
+              <a:t>7/20/17</a:t>
             </a:fld>
             <a:endParaRPr lang="en-US"/>
           </a:p>
@@ -1702,7 +1702,7 @@
           <a:p>
             <a:fld id="{78C97017-6FC3-485B-9764-EAC9E56C1D49}" type="datetimeFigureOut">
               <a:rPr lang="en-US" smtClean="0"/>
-              <a:t>7/12/2017</a:t>
+              <a:t>7/20/17</a:t>
             </a:fld>
             <a:endParaRPr lang="en-US"/>
           </a:p>
@@ -2121,7 +2121,7 @@
           <a:p>
             <a:fld id="{78C97017-6FC3-485B-9764-EAC9E56C1D49}" type="datetimeFigureOut">
               <a:rPr lang="en-US" smtClean="0"/>
-              <a:t>7/12/2017</a:t>
+              <a:t>7/20/17</a:t>
             </a:fld>
             <a:endParaRPr lang="en-US"/>
           </a:p>
@@ -2238,7 +2238,7 @@
           <a:p>
             <a:fld id="{78C97017-6FC3-485B-9764-EAC9E56C1D49}" type="datetimeFigureOut">
               <a:rPr lang="en-US" smtClean="0"/>
-              <a:t>7/12/2017</a:t>
+              <a:t>7/20/17</a:t>
             </a:fld>
             <a:endParaRPr lang="en-US"/>
           </a:p>
@@ -2333,7 +2333,7 @@
           <a:p>
             <a:fld id="{78C97017-6FC3-485B-9764-EAC9E56C1D49}" type="datetimeFigureOut">
               <a:rPr lang="en-US" smtClean="0"/>
-              <a:t>7/12/2017</a:t>
+              <a:t>7/20/17</a:t>
             </a:fld>
             <a:endParaRPr lang="en-US"/>
           </a:p>
@@ -2608,7 +2608,7 @@
           <a:p>
             <a:fld id="{78C97017-6FC3-485B-9764-EAC9E56C1D49}" type="datetimeFigureOut">
               <a:rPr lang="en-US" smtClean="0"/>
-              <a:t>7/12/2017</a:t>
+              <a:t>7/20/17</a:t>
             </a:fld>
             <a:endParaRPr lang="en-US"/>
           </a:p>
@@ -2860,7 +2860,7 @@
           <a:p>
             <a:fld id="{78C97017-6FC3-485B-9764-EAC9E56C1D49}" type="datetimeFigureOut">
               <a:rPr lang="en-US" smtClean="0"/>
-              <a:t>7/12/2017</a:t>
+              <a:t>7/20/17</a:t>
             </a:fld>
             <a:endParaRPr lang="en-US"/>
           </a:p>
@@ -3071,7 +3071,7 @@
           <a:p>
             <a:fld id="{78C97017-6FC3-485B-9764-EAC9E56C1D49}" type="datetimeFigureOut">
               <a:rPr lang="en-US" smtClean="0"/>
-              <a:t>7/12/2017</a:t>
+              <a:t>7/20/17</a:t>
             </a:fld>
             <a:endParaRPr lang="en-US"/>
           </a:p>
@@ -3612,15 +3612,7 @@
                   <a:srgbClr val="0070C0"/>
                 </a:solidFill>
               </a:rPr>
-              <a:t>XYZ</a:t>
-            </a:r>
-            <a:r>
-              <a:rPr lang="en-US" sz="1050" b="1" dirty="0" err="1" smtClean="0">
-                <a:solidFill>
-                  <a:srgbClr val="0070C0"/>
-                </a:solidFill>
-              </a:rPr>
-              <a:t>Command</a:t>
+              <a:t>XYZCommand</a:t>
             </a:r>
             <a:endParaRPr lang="en-SG" sz="1050" b="1" dirty="0">
               <a:solidFill>
@@ -5525,7 +5517,7 @@
           <p:cNvPr id="97" name="Rectangle 96">
             <a:extLst>
               <a:ext uri="{FF2B5EF4-FFF2-40B4-BE49-F238E27FC236}">
-                <a16:creationId xmlns:a16="http://schemas.microsoft.com/office/drawing/2014/main" xmlns="" id="{AADE6A0C-89AB-467B-8CEA-5FCF36CE0D21}"/>
+                <a16:creationId xmlns="" xmlns:a16="http://schemas.microsoft.com/office/drawing/2014/main" id="{AADE6A0C-89AB-467B-8CEA-5FCF36CE0D21}"/>
               </a:ext>
             </a:extLst>
           </p:cNvPr>
@@ -5828,15 +5820,7 @@
                   <a:schemeClr val="bg1"/>
                 </a:solidFill>
               </a:rPr>
-              <a:t>XYZ</a:t>
-            </a:r>
-            <a:r>
-              <a:rPr lang="en-US" sz="1050" b="1" dirty="0" err="1" smtClean="0">
-                <a:solidFill>
-                  <a:schemeClr val="bg1"/>
-                </a:solidFill>
-              </a:rPr>
-              <a:t>Command</a:t>
+              <a:t>XYZCommand</a:t>
             </a:r>
             <a:endParaRPr lang="en-US" sz="1050" b="1" dirty="0">
               <a:solidFill>
@@ -6231,6 +6215,160 @@
             <a:endParaRPr lang="en-US" sz="1050" dirty="0">
               <a:solidFill>
                 <a:schemeClr val="bg1"/>
+              </a:solidFill>
+            </a:endParaRPr>
+          </a:p>
+        </p:txBody>
+      </p:sp>
+      <p:sp>
+        <p:nvSpPr>
+          <p:cNvPr id="59" name="Rectangle 62"/>
+          <p:cNvSpPr/>
+          <p:nvPr/>
+        </p:nvSpPr>
+        <p:spPr>
+          <a:xfrm>
+            <a:off x="2334221" y="3058789"/>
+            <a:ext cx="758695" cy="346760"/>
+          </a:xfrm>
+          <a:prstGeom prst="rect">
+            <a:avLst/>
+          </a:prstGeom>
+          <a:solidFill>
+            <a:srgbClr val="0070C0"/>
+          </a:solidFill>
+          <a:ln w="19050">
+            <a:solidFill>
+              <a:srgbClr val="0070C0"/>
+            </a:solidFill>
+          </a:ln>
+          <a:effectLst/>
+        </p:spPr>
+        <p:style>
+          <a:lnRef idx="1">
+            <a:schemeClr val="accent2"/>
+          </a:lnRef>
+          <a:fillRef idx="2">
+            <a:schemeClr val="accent2"/>
+          </a:fillRef>
+          <a:effectRef idx="1">
+            <a:schemeClr val="accent2"/>
+          </a:effectRef>
+          <a:fontRef idx="minor">
+            <a:schemeClr val="dk1"/>
+          </a:fontRef>
+        </p:style>
+        <p:txBody>
+          <a:bodyPr rtlCol="0" anchor="ctr"/>
+          <a:lstStyle/>
+          <a:p>
+            <a:pPr algn="ctr"/>
+            <a:r>
+              <a:rPr lang="en-US" sz="1050" dirty="0" err="1" smtClean="0">
+                <a:solidFill>
+                  <a:schemeClr val="bg1"/>
+                </a:solidFill>
+              </a:rPr>
+              <a:t>UndoRedo</a:t>
+            </a:r>
+            <a:endParaRPr lang="en-US" sz="1050" dirty="0" smtClean="0">
+              <a:solidFill>
+                <a:schemeClr val="bg1"/>
+              </a:solidFill>
+            </a:endParaRPr>
+          </a:p>
+          <a:p>
+            <a:pPr algn="ctr"/>
+            <a:r>
+              <a:rPr lang="en-US" sz="1050" dirty="0" smtClean="0">
+                <a:solidFill>
+                  <a:schemeClr val="bg1"/>
+                </a:solidFill>
+              </a:rPr>
+              <a:t>Stack</a:t>
+            </a:r>
+            <a:endParaRPr lang="en-SG" sz="1050" dirty="0">
+              <a:solidFill>
+                <a:schemeClr val="bg1"/>
+              </a:solidFill>
+            </a:endParaRPr>
+          </a:p>
+        </p:txBody>
+      </p:sp>
+      <p:cxnSp>
+        <p:nvCxnSpPr>
+          <p:cNvPr id="61" name="Straight Arrow Connector 57"/>
+          <p:cNvCxnSpPr>
+            <a:endCxn id="59" idx="2"/>
+          </p:cNvCxnSpPr>
+          <p:nvPr/>
+        </p:nvCxnSpPr>
+        <p:spPr>
+          <a:xfrm flipV="1">
+            <a:off x="2713568" y="3405549"/>
+            <a:ext cx="1" cy="177981"/>
+          </a:xfrm>
+          <a:prstGeom prst="straightConnector1">
+            <a:avLst/>
+          </a:prstGeom>
+          <a:ln w="19050">
+            <a:solidFill>
+              <a:srgbClr val="0070C0"/>
+            </a:solidFill>
+            <a:headEnd type="none" w="med" len="med"/>
+            <a:tailEnd type="arrow" w="med" len="med"/>
+          </a:ln>
+          <a:effectLst/>
+        </p:spPr>
+        <p:style>
+          <a:lnRef idx="1">
+            <a:schemeClr val="accent2"/>
+          </a:lnRef>
+          <a:fillRef idx="2">
+            <a:schemeClr val="accent2"/>
+          </a:fillRef>
+          <a:effectRef idx="1">
+            <a:schemeClr val="accent2"/>
+          </a:effectRef>
+          <a:fontRef idx="minor">
+            <a:schemeClr val="dk1"/>
+          </a:fontRef>
+        </p:style>
+      </p:cxnSp>
+      <p:sp>
+        <p:nvSpPr>
+          <p:cNvPr id="63" name="TextBox 62"/>
+          <p:cNvSpPr txBox="1"/>
+          <p:nvPr/>
+        </p:nvSpPr>
+        <p:spPr>
+          <a:xfrm>
+            <a:off x="2724741" y="3418256"/>
+            <a:ext cx="131116" cy="230832"/>
+          </a:xfrm>
+          <a:prstGeom prst="rect">
+            <a:avLst/>
+          </a:prstGeom>
+          <a:noFill/>
+        </p:spPr>
+        <p:txBody>
+          <a:bodyPr wrap="square" lIns="0" tIns="0" rIns="0" bIns="0" rtlCol="0">
+            <a:noAutofit/>
+          </a:bodyPr>
+          <a:lstStyle/>
+          <a:p>
+            <a:pPr algn="r"/>
+            <a:r>
+              <a:rPr lang="en-US" sz="1100" dirty="0">
+                <a:solidFill>
+                  <a:srgbClr val="0070C0"/>
+                </a:solidFill>
+              </a:rPr>
+              <a:t>1</a:t>
+            </a:r>
+            <a:endParaRPr lang="en-SG" sz="1100" dirty="0">
+              <a:solidFill>
+                <a:srgbClr val="0070C0"/>
               </a:solidFill>
             </a:endParaRPr>
           </a:p>

</xml_diff>

<commit_message>
Interdiff between v13 and v14
</commit_message>
<xml_diff>
--- a/docs/diagrams/LogicComponentClassDiagram.pptx
+++ b/docs/diagrams/LogicComponentClassDiagram.pptx
@@ -109,7 +109,7 @@
   </p:defaultTextStyle>
   <p:extLst>
     <p:ext uri="{EFAFB233-063F-42B5-8137-9DF3F51BA10A}">
-      <p15:sldGuideLst xmlns:p15="http://schemas.microsoft.com/office/powerpoint/2012/main" xmlns="">
+      <p15:sldGuideLst xmlns:p15="http://schemas.microsoft.com/office/powerpoint/2012/main">
         <p15:guide id="1" orient="horz" pos="1488">
           <p15:clr>
             <a:srgbClr val="A4A3A4"/>
@@ -212,7 +212,7 @@
           <a:p>
             <a:fld id="{F5CC4B3F-88C1-4FFA-B1B6-F41C21DC6924}" type="datetimeFigureOut">
               <a:rPr lang="en-US" smtClean="0"/>
-              <a:t>7/12/2017</a:t>
+              <a:t>7/19/2017</a:t>
             </a:fld>
             <a:endParaRPr lang="en-US"/>
           </a:p>
@@ -658,7 +658,7 @@
           <a:p>
             <a:fld id="{78C97017-6FC3-485B-9764-EAC9E56C1D49}" type="datetimeFigureOut">
               <a:rPr lang="en-US" smtClean="0"/>
-              <a:t>7/12/2017</a:t>
+              <a:t>7/19/2017</a:t>
             </a:fld>
             <a:endParaRPr lang="en-US"/>
           </a:p>
@@ -826,7 +826,7 @@
           <a:p>
             <a:fld id="{78C97017-6FC3-485B-9764-EAC9E56C1D49}" type="datetimeFigureOut">
               <a:rPr lang="en-US" smtClean="0"/>
-              <a:t>7/12/2017</a:t>
+              <a:t>7/19/2017</a:t>
             </a:fld>
             <a:endParaRPr lang="en-US"/>
           </a:p>
@@ -1004,7 +1004,7 @@
           <a:p>
             <a:fld id="{78C97017-6FC3-485B-9764-EAC9E56C1D49}" type="datetimeFigureOut">
               <a:rPr lang="en-US" smtClean="0"/>
-              <a:t>7/12/2017</a:t>
+              <a:t>7/19/2017</a:t>
             </a:fld>
             <a:endParaRPr lang="en-US"/>
           </a:p>
@@ -1172,7 +1172,7 @@
           <a:p>
             <a:fld id="{78C97017-6FC3-485B-9764-EAC9E56C1D49}" type="datetimeFigureOut">
               <a:rPr lang="en-US" smtClean="0"/>
-              <a:t>7/12/2017</a:t>
+              <a:t>7/19/2017</a:t>
             </a:fld>
             <a:endParaRPr lang="en-US"/>
           </a:p>
@@ -1417,7 +1417,7 @@
           <a:p>
             <a:fld id="{78C97017-6FC3-485B-9764-EAC9E56C1D49}" type="datetimeFigureOut">
               <a:rPr lang="en-US" smtClean="0"/>
-              <a:t>7/12/2017</a:t>
+              <a:t>7/19/2017</a:t>
             </a:fld>
             <a:endParaRPr lang="en-US"/>
           </a:p>
@@ -1702,7 +1702,7 @@
           <a:p>
             <a:fld id="{78C97017-6FC3-485B-9764-EAC9E56C1D49}" type="datetimeFigureOut">
               <a:rPr lang="en-US" smtClean="0"/>
-              <a:t>7/12/2017</a:t>
+              <a:t>7/19/2017</a:t>
             </a:fld>
             <a:endParaRPr lang="en-US"/>
           </a:p>
@@ -2121,7 +2121,7 @@
           <a:p>
             <a:fld id="{78C97017-6FC3-485B-9764-EAC9E56C1D49}" type="datetimeFigureOut">
               <a:rPr lang="en-US" smtClean="0"/>
-              <a:t>7/12/2017</a:t>
+              <a:t>7/19/2017</a:t>
             </a:fld>
             <a:endParaRPr lang="en-US"/>
           </a:p>
@@ -2238,7 +2238,7 @@
           <a:p>
             <a:fld id="{78C97017-6FC3-485B-9764-EAC9E56C1D49}" type="datetimeFigureOut">
               <a:rPr lang="en-US" smtClean="0"/>
-              <a:t>7/12/2017</a:t>
+              <a:t>7/19/2017</a:t>
             </a:fld>
             <a:endParaRPr lang="en-US"/>
           </a:p>
@@ -2333,7 +2333,7 @@
           <a:p>
             <a:fld id="{78C97017-6FC3-485B-9764-EAC9E56C1D49}" type="datetimeFigureOut">
               <a:rPr lang="en-US" smtClean="0"/>
-              <a:t>7/12/2017</a:t>
+              <a:t>7/19/2017</a:t>
             </a:fld>
             <a:endParaRPr lang="en-US"/>
           </a:p>
@@ -2608,7 +2608,7 @@
           <a:p>
             <a:fld id="{78C97017-6FC3-485B-9764-EAC9E56C1D49}" type="datetimeFigureOut">
               <a:rPr lang="en-US" smtClean="0"/>
-              <a:t>7/12/2017</a:t>
+              <a:t>7/19/2017</a:t>
             </a:fld>
             <a:endParaRPr lang="en-US"/>
           </a:p>
@@ -2860,7 +2860,7 @@
           <a:p>
             <a:fld id="{78C97017-6FC3-485B-9764-EAC9E56C1D49}" type="datetimeFigureOut">
               <a:rPr lang="en-US" smtClean="0"/>
-              <a:t>7/12/2017</a:t>
+              <a:t>7/19/2017</a:t>
             </a:fld>
             <a:endParaRPr lang="en-US"/>
           </a:p>
@@ -3071,7 +3071,7 @@
           <a:p>
             <a:fld id="{78C97017-6FC3-485B-9764-EAC9E56C1D49}" type="datetimeFigureOut">
               <a:rPr lang="en-US" smtClean="0"/>
-              <a:t>7/12/2017</a:t>
+              <a:t>7/19/2017</a:t>
             </a:fld>
             <a:endParaRPr lang="en-US"/>
           </a:p>
@@ -3607,20 +3607,12 @@
           <a:p>
             <a:pPr algn="ctr"/>
             <a:r>
-              <a:rPr lang="en-US" sz="1050" b="1" dirty="0" err="1" smtClean="0">
+              <a:rPr lang="en-US" sz="1050" b="1" dirty="0" err="1">
                 <a:solidFill>
                   <a:srgbClr val="0070C0"/>
                 </a:solidFill>
               </a:rPr>
-              <a:t>XYZ</a:t>
-            </a:r>
-            <a:r>
-              <a:rPr lang="en-US" sz="1050" b="1" dirty="0" err="1" smtClean="0">
-                <a:solidFill>
-                  <a:srgbClr val="0070C0"/>
-                </a:solidFill>
-              </a:rPr>
-              <a:t>Command</a:t>
+              <a:t>XYZCommand</a:t>
             </a:r>
             <a:endParaRPr lang="en-SG" sz="1050" b="1" dirty="0">
               <a:solidFill>
@@ -3638,7 +3630,7 @@
         </p:nvSpPr>
         <p:spPr>
           <a:xfrm>
-            <a:off x="1782495" y="3583530"/>
+            <a:off x="1782495" y="3619500"/>
             <a:ext cx="1093635" cy="346760"/>
           </a:xfrm>
           <a:prstGeom prst="rect">
@@ -3947,7 +3939,7 @@
           <a:p>
             <a:pPr algn="ctr"/>
             <a:r>
-              <a:rPr lang="en-US" sz="1050" dirty="0" err="1" smtClean="0">
+              <a:rPr lang="en-US" sz="1050" dirty="0" err="1">
                 <a:solidFill>
                   <a:schemeClr val="bg1"/>
                 </a:solidFill>
@@ -4155,7 +4147,7 @@
         <p:spPr>
           <a:xfrm rot="10800000">
             <a:off x="1494291" y="3604524"/>
-            <a:ext cx="288204" cy="152387"/>
+            <a:ext cx="288204" cy="188357"/>
           </a:xfrm>
           <a:prstGeom prst="bentConnector2">
             <a:avLst/>
@@ -4189,14 +4181,15 @@
         <p:nvCxnSpPr>
           <p:cNvPr id="23" name="Straight Arrow Connector 57"/>
           <p:cNvCxnSpPr>
+            <a:cxnSpLocks/>
             <a:stCxn id="5" idx="2"/>
           </p:cNvCxnSpPr>
           <p:nvPr/>
         </p:nvCxnSpPr>
         <p:spPr>
-          <a:xfrm>
-            <a:off x="2329313" y="3930290"/>
-            <a:ext cx="1376" cy="854841"/>
+          <a:xfrm flipH="1">
+            <a:off x="2324740" y="3966260"/>
+            <a:ext cx="4573" cy="811095"/>
           </a:xfrm>
           <a:prstGeom prst="straightConnector1">
             <a:avLst/>
@@ -4272,6 +4265,7 @@
         <p:nvCxnSpPr>
           <p:cNvPr id="25" name="Elbow Connector 63"/>
           <p:cNvCxnSpPr>
+            <a:cxnSpLocks/>
             <a:endCxn id="12" idx="1"/>
           </p:cNvCxnSpPr>
           <p:nvPr/>
@@ -4552,13 +4546,15 @@
       <p:cxnSp>
         <p:nvCxnSpPr>
           <p:cNvPr id="39" name="Elbow Connector 122"/>
-          <p:cNvCxnSpPr/>
+          <p:cNvCxnSpPr>
+            <a:cxnSpLocks/>
+          </p:cNvCxnSpPr>
           <p:nvPr/>
         </p:nvCxnSpPr>
         <p:spPr>
-          <a:xfrm rot="5400000" flipH="1" flipV="1">
-            <a:off x="1193276" y="2601868"/>
-            <a:ext cx="1969553" cy="2764"/>
+          <a:xfrm rot="16200000" flipV="1">
+            <a:off x="1181817" y="2616092"/>
+            <a:ext cx="1995238" cy="2"/>
           </a:xfrm>
           <a:prstGeom prst="bentConnector3">
             <a:avLst>
@@ -5525,7 +5521,7 @@
           <p:cNvPr id="97" name="Rectangle 96">
             <a:extLst>
               <a:ext uri="{FF2B5EF4-FFF2-40B4-BE49-F238E27FC236}">
-                <a16:creationId xmlns:a16="http://schemas.microsoft.com/office/drawing/2014/main" xmlns="" id="{AADE6A0C-89AB-467B-8CEA-5FCF36CE0D21}"/>
+                <a16:creationId xmlns:a16="http://schemas.microsoft.com/office/drawing/2014/main" id="{AADE6A0C-89AB-467B-8CEA-5FCF36CE0D21}"/>
               </a:ext>
             </a:extLst>
           </p:cNvPr>
@@ -5823,20 +5819,12 @@
           <a:p>
             <a:pPr algn="ctr"/>
             <a:r>
-              <a:rPr lang="en-US" sz="1050" b="1" dirty="0" err="1" smtClean="0">
+              <a:rPr lang="en-US" sz="1050" b="1" dirty="0" err="1">
                 <a:solidFill>
                   <a:schemeClr val="bg1"/>
                 </a:solidFill>
               </a:rPr>
-              <a:t>XYZ</a:t>
-            </a:r>
-            <a:r>
-              <a:rPr lang="en-US" sz="1050" b="1" dirty="0" err="1" smtClean="0">
-                <a:solidFill>
-                  <a:schemeClr val="bg1"/>
-                </a:solidFill>
-              </a:rPr>
-              <a:t>Command</a:t>
+              <a:t>XYZCommand</a:t>
             </a:r>
             <a:endParaRPr lang="en-US" sz="1050" b="1" dirty="0">
               <a:solidFill>
@@ -6054,6 +6042,7 @@
         <p:nvCxnSpPr>
           <p:cNvPr id="51" name="Elbow Connector 50"/>
           <p:cNvCxnSpPr>
+            <a:cxnSpLocks/>
             <a:stCxn id="16" idx="3"/>
             <a:endCxn id="42" idx="2"/>
           </p:cNvCxnSpPr>
@@ -6142,8 +6131,8 @@
         </p:nvSpPr>
         <p:spPr>
           <a:xfrm>
-            <a:off x="6263130" y="1981200"/>
-            <a:ext cx="1276614" cy="630473"/>
+            <a:off x="6134238" y="1542461"/>
+            <a:ext cx="1788166" cy="1144973"/>
           </a:xfrm>
           <a:prstGeom prst="foldedCorner">
             <a:avLst/>
@@ -6181,7 +6170,7 @@
           <a:p>
             <a:pPr algn="ctr"/>
             <a:r>
-              <a:rPr lang="en-US" sz="1050" dirty="0" err="1" smtClean="0">
+              <a:rPr lang="en-US" sz="1050" dirty="0" err="1">
                 <a:solidFill>
                   <a:schemeClr val="bg1"/>
                 </a:solidFill>
@@ -6189,7 +6178,7 @@
               <a:t>XYZCommand</a:t>
             </a:r>
             <a:r>
-              <a:rPr lang="en-US" sz="1050" dirty="0" smtClean="0">
+              <a:rPr lang="en-US" sz="1050" dirty="0">
                 <a:solidFill>
                   <a:schemeClr val="bg1"/>
                 </a:solidFill>
@@ -6197,7 +6186,7 @@
               <a:t> = </a:t>
             </a:r>
             <a:r>
-              <a:rPr lang="en-US" sz="1050" dirty="0" err="1" smtClean="0">
+              <a:rPr lang="en-US" sz="1050" dirty="0" err="1">
                 <a:solidFill>
                   <a:schemeClr val="bg1"/>
                 </a:solidFill>
@@ -6205,7 +6194,7 @@
               <a:t>AddCommand</a:t>
             </a:r>
             <a:r>
-              <a:rPr lang="en-US" sz="1050" dirty="0" smtClean="0">
+              <a:rPr lang="en-US" sz="1050" dirty="0">
                 <a:solidFill>
                   <a:schemeClr val="bg1"/>
                 </a:solidFill>
@@ -6213,7 +6202,7 @@
               <a:t>, </a:t>
             </a:r>
             <a:r>
-              <a:rPr lang="en-US" sz="1050" dirty="0" err="1" smtClean="0">
+              <a:rPr lang="en-US" sz="1050" dirty="0" err="1">
                 <a:solidFill>
                   <a:schemeClr val="bg1"/>
                 </a:solidFill>
@@ -6221,16 +6210,506 @@
               <a:t>FindCommand</a:t>
             </a:r>
             <a:r>
-              <a:rPr lang="en-US" sz="1050" dirty="0" smtClean="0">
+              <a:rPr lang="en-US" sz="1050" dirty="0">
                 <a:solidFill>
                   <a:schemeClr val="bg1"/>
                 </a:solidFill>
               </a:rPr>
               <a:t>, etc.</a:t>
             </a:r>
+          </a:p>
+          <a:p>
+            <a:pPr algn="ctr"/>
+            <a:r>
+              <a:rPr lang="en-US" sz="1050" dirty="0">
+                <a:solidFill>
+                  <a:schemeClr val="bg1"/>
+                </a:solidFill>
+              </a:rPr>
+              <a:t>Some commands implement </a:t>
+            </a:r>
+            <a:r>
+              <a:rPr lang="en-US" sz="1050" dirty="0" err="1">
+                <a:solidFill>
+                  <a:schemeClr val="bg1"/>
+                </a:solidFill>
+              </a:rPr>
+              <a:t>UndoableCommand</a:t>
+            </a:r>
+            <a:r>
+              <a:rPr lang="en-US" sz="1050" dirty="0">
+                <a:solidFill>
+                  <a:schemeClr val="bg1"/>
+                </a:solidFill>
+              </a:rPr>
+              <a:t>, some implement Command.</a:t>
+            </a:r>
+          </a:p>
+        </p:txBody>
+      </p:sp>
+      <p:sp>
+        <p:nvSpPr>
+          <p:cNvPr id="61" name="Rectangle 62">
+            <a:extLst>
+              <a:ext uri="{FF2B5EF4-FFF2-40B4-BE49-F238E27FC236}">
+                <a16:creationId xmlns:a16="http://schemas.microsoft.com/office/drawing/2014/main" id="{D3E9FA9F-F967-45C5-8A80-BFE6478356CA}"/>
+              </a:ext>
+            </a:extLst>
+          </p:cNvPr>
+          <p:cNvSpPr/>
+          <p:nvPr/>
+        </p:nvSpPr>
+        <p:spPr>
+          <a:xfrm>
+            <a:off x="5809226" y="3438900"/>
+            <a:ext cx="772043" cy="455242"/>
+          </a:xfrm>
+          <a:prstGeom prst="rect">
+            <a:avLst/>
+          </a:prstGeom>
+          <a:ln w="19050">
+            <a:solidFill>
+              <a:srgbClr val="0070C0"/>
+            </a:solidFill>
+          </a:ln>
+          <a:effectLst/>
+        </p:spPr>
+        <p:style>
+          <a:lnRef idx="1">
+            <a:schemeClr val="accent1"/>
+          </a:lnRef>
+          <a:fillRef idx="2">
+            <a:schemeClr val="accent1"/>
+          </a:fillRef>
+          <a:effectRef idx="1">
+            <a:schemeClr val="accent1"/>
+          </a:effectRef>
+          <a:fontRef idx="minor">
+            <a:schemeClr val="dk1"/>
+          </a:fontRef>
+        </p:style>
+        <p:txBody>
+          <a:bodyPr rtlCol="0" anchor="ctr"/>
+          <a:lstStyle/>
+          <a:p>
+            <a:pPr algn="ctr"/>
+            <a:r>
+              <a:rPr lang="en-US" sz="1050" b="1" dirty="0">
+                <a:solidFill>
+                  <a:srgbClr val="0070C0"/>
+                </a:solidFill>
+              </a:rPr>
+              <a:t>{abstract}</a:t>
+            </a:r>
+            <a:br>
+              <a:rPr lang="en-US" sz="1050" b="1" dirty="0">
+                <a:solidFill>
+                  <a:srgbClr val="0070C0"/>
+                </a:solidFill>
+              </a:rPr>
+            </a:br>
+            <a:r>
+              <a:rPr lang="en-US" sz="1050" b="1" dirty="0">
+                <a:solidFill>
+                  <a:srgbClr val="0070C0"/>
+                </a:solidFill>
+              </a:rPr>
+              <a:t>Undoable</a:t>
+            </a:r>
+          </a:p>
+          <a:p>
+            <a:pPr algn="ctr"/>
+            <a:r>
+              <a:rPr lang="en-US" sz="1050" b="1" dirty="0">
+                <a:solidFill>
+                  <a:srgbClr val="0070C0"/>
+                </a:solidFill>
+              </a:rPr>
+              <a:t>Command</a:t>
+            </a:r>
+            <a:endParaRPr lang="en-SG" sz="1050" b="1" dirty="0">
+              <a:solidFill>
+                <a:srgbClr val="0070C0"/>
+              </a:solidFill>
+            </a:endParaRPr>
+          </a:p>
+        </p:txBody>
+      </p:sp>
+      <p:cxnSp>
+        <p:nvCxnSpPr>
+          <p:cNvPr id="64" name="Elbow Connector 95">
+            <a:extLst>
+              <a:ext uri="{FF2B5EF4-FFF2-40B4-BE49-F238E27FC236}">
+                <a16:creationId xmlns:a16="http://schemas.microsoft.com/office/drawing/2014/main" id="{7EC77819-AF6B-4605-890B-41C289D3635B}"/>
+              </a:ext>
+            </a:extLst>
+          </p:cNvPr>
+          <p:cNvCxnSpPr>
+            <a:cxnSpLocks/>
+            <a:stCxn id="63" idx="0"/>
+          </p:cNvCxnSpPr>
+          <p:nvPr/>
+        </p:nvCxnSpPr>
+        <p:spPr>
+          <a:xfrm flipV="1">
+            <a:off x="6584326" y="3091222"/>
+            <a:ext cx="292555" cy="364153"/>
+          </a:xfrm>
+          <a:prstGeom prst="straightConnector1">
+            <a:avLst/>
+          </a:prstGeom>
+          <a:ln w="19050">
+            <a:headEnd type="none" w="med" len="med"/>
+            <a:tailEnd type="none" w="med" len="med"/>
+          </a:ln>
+        </p:spPr>
+        <p:style>
+          <a:lnRef idx="1">
+            <a:schemeClr val="accent1"/>
+          </a:lnRef>
+          <a:fillRef idx="0">
+            <a:schemeClr val="accent1"/>
+          </a:fillRef>
+          <a:effectRef idx="0">
+            <a:schemeClr val="accent1"/>
+          </a:effectRef>
+          <a:fontRef idx="minor">
+            <a:schemeClr val="tx1"/>
+          </a:fontRef>
+        </p:style>
+      </p:cxnSp>
+      <p:sp>
+        <p:nvSpPr>
+          <p:cNvPr id="63" name="Isosceles Triangle 102">
+            <a:extLst>
+              <a:ext uri="{FF2B5EF4-FFF2-40B4-BE49-F238E27FC236}">
+                <a16:creationId xmlns:a16="http://schemas.microsoft.com/office/drawing/2014/main" id="{D26AB0D2-BCC3-4A0B-ADED-E5DFB9E9EF56}"/>
+              </a:ext>
+            </a:extLst>
+          </p:cNvPr>
+          <p:cNvSpPr/>
+          <p:nvPr/>
+        </p:nvSpPr>
+        <p:spPr>
+          <a:xfrm rot="2379662" flipV="1">
+            <a:off x="6505087" y="3300052"/>
+            <a:ext cx="270504" cy="175523"/>
+          </a:xfrm>
+          <a:prstGeom prst="triangle">
+            <a:avLst/>
+          </a:prstGeom>
+          <a:solidFill>
+            <a:schemeClr val="tx2">
+              <a:lumMod val="60000"/>
+              <a:lumOff val="40000"/>
+            </a:schemeClr>
+          </a:solidFill>
+          <a:ln w="19050">
+            <a:solidFill>
+              <a:srgbClr val="0070C0"/>
+            </a:solidFill>
+          </a:ln>
+          <a:effectLst/>
+        </p:spPr>
+        <p:style>
+          <a:lnRef idx="1">
+            <a:schemeClr val="accent1"/>
+          </a:lnRef>
+          <a:fillRef idx="2">
+            <a:schemeClr val="accent1"/>
+          </a:fillRef>
+          <a:effectRef idx="1">
+            <a:schemeClr val="accent1"/>
+          </a:effectRef>
+          <a:fontRef idx="minor">
+            <a:schemeClr val="dk1"/>
+          </a:fontRef>
+        </p:style>
+        <p:txBody>
+          <a:bodyPr rtlCol="0" anchor="ctr"/>
+          <a:lstStyle/>
+          <a:p>
+            <a:pPr algn="ctr"/>
+            <a:endParaRPr lang="en-SG" sz="1050" b="1">
+              <a:solidFill>
+                <a:srgbClr val="92D050"/>
+              </a:solidFill>
+            </a:endParaRPr>
+          </a:p>
+        </p:txBody>
+      </p:sp>
+      <p:sp>
+        <p:nvSpPr>
+          <p:cNvPr id="71" name="Rectangle 62">
+            <a:extLst>
+              <a:ext uri="{FF2B5EF4-FFF2-40B4-BE49-F238E27FC236}">
+                <a16:creationId xmlns:a16="http://schemas.microsoft.com/office/drawing/2014/main" id="{531F8CFF-AA02-438B-9405-8FB027005542}"/>
+              </a:ext>
+            </a:extLst>
+          </p:cNvPr>
+          <p:cNvSpPr/>
+          <p:nvPr/>
+        </p:nvSpPr>
+        <p:spPr>
+          <a:xfrm>
+            <a:off x="2297016" y="3103365"/>
+            <a:ext cx="805984" cy="346760"/>
+          </a:xfrm>
+          <a:prstGeom prst="rect">
+            <a:avLst/>
+          </a:prstGeom>
+          <a:solidFill>
+            <a:srgbClr val="0070C0"/>
+          </a:solidFill>
+          <a:ln w="19050">
+            <a:solidFill>
+              <a:srgbClr val="0070C0"/>
+            </a:solidFill>
+          </a:ln>
+          <a:effectLst/>
+        </p:spPr>
+        <p:style>
+          <a:lnRef idx="1">
+            <a:schemeClr val="accent2"/>
+          </a:lnRef>
+          <a:fillRef idx="2">
+            <a:schemeClr val="accent2"/>
+          </a:fillRef>
+          <a:effectRef idx="1">
+            <a:schemeClr val="accent2"/>
+          </a:effectRef>
+          <a:fontRef idx="minor">
+            <a:schemeClr val="dk1"/>
+          </a:fontRef>
+        </p:style>
+        <p:txBody>
+          <a:bodyPr rtlCol="0" anchor="ctr"/>
+          <a:lstStyle/>
+          <a:p>
+            <a:pPr algn="ctr"/>
+            <a:r>
+              <a:rPr lang="en-US" sz="1050" dirty="0" err="1">
+                <a:solidFill>
+                  <a:schemeClr val="bg1"/>
+                </a:solidFill>
+              </a:rPr>
+              <a:t>UndoRedo</a:t>
+            </a:r>
             <a:endParaRPr lang="en-US" sz="1050" dirty="0">
               <a:solidFill>
                 <a:schemeClr val="bg1"/>
+              </a:solidFill>
+            </a:endParaRPr>
+          </a:p>
+          <a:p>
+            <a:pPr algn="ctr"/>
+            <a:r>
+              <a:rPr lang="en-US" sz="1050" dirty="0">
+                <a:solidFill>
+                  <a:schemeClr val="bg1"/>
+                </a:solidFill>
+              </a:rPr>
+              <a:t>Stack</a:t>
+            </a:r>
+            <a:endParaRPr lang="en-SG" sz="1050" dirty="0">
+              <a:solidFill>
+                <a:schemeClr val="bg1"/>
+              </a:solidFill>
+            </a:endParaRPr>
+          </a:p>
+        </p:txBody>
+      </p:sp>
+      <p:cxnSp>
+        <p:nvCxnSpPr>
+          <p:cNvPr id="72" name="Straight Connector 71">
+            <a:extLst>
+              <a:ext uri="{FF2B5EF4-FFF2-40B4-BE49-F238E27FC236}">
+                <a16:creationId xmlns:a16="http://schemas.microsoft.com/office/drawing/2014/main" id="{841EC2FC-9AA9-4EC0-B909-0BAAFF2393FE}"/>
+              </a:ext>
+            </a:extLst>
+          </p:cNvPr>
+          <p:cNvCxnSpPr>
+            <a:cxnSpLocks/>
+            <a:endCxn id="71" idx="2"/>
+          </p:cNvCxnSpPr>
+          <p:nvPr/>
+        </p:nvCxnSpPr>
+        <p:spPr>
+          <a:xfrm flipV="1">
+            <a:off x="2700008" y="3450125"/>
+            <a:ext cx="0" cy="163587"/>
+          </a:xfrm>
+          <a:prstGeom prst="line">
+            <a:avLst/>
+          </a:prstGeom>
+          <a:ln w="19050">
+            <a:solidFill>
+              <a:srgbClr val="0070C0"/>
+            </a:solidFill>
+            <a:prstDash val="solid"/>
+            <a:headEnd type="none" w="med" len="med"/>
+            <a:tailEnd type="arrow" w="med" len="med"/>
+          </a:ln>
+          <a:effectLst/>
+        </p:spPr>
+        <p:style>
+          <a:lnRef idx="1">
+            <a:schemeClr val="accent2"/>
+          </a:lnRef>
+          <a:fillRef idx="2">
+            <a:schemeClr val="accent2"/>
+          </a:fillRef>
+          <a:effectRef idx="1">
+            <a:schemeClr val="accent2"/>
+          </a:effectRef>
+          <a:fontRef idx="minor">
+            <a:schemeClr val="dk1"/>
+          </a:fontRef>
+        </p:style>
+      </p:cxnSp>
+      <p:sp>
+        <p:nvSpPr>
+          <p:cNvPr id="76" name="TextBox 75">
+            <a:extLst>
+              <a:ext uri="{FF2B5EF4-FFF2-40B4-BE49-F238E27FC236}">
+                <a16:creationId xmlns:a16="http://schemas.microsoft.com/office/drawing/2014/main" id="{9327BF43-349A-4A74-9D21-E562941F55D5}"/>
+              </a:ext>
+            </a:extLst>
+          </p:cNvPr>
+          <p:cNvSpPr txBox="1"/>
+          <p:nvPr/>
+        </p:nvSpPr>
+        <p:spPr>
+          <a:xfrm>
+            <a:off x="2692980" y="3454547"/>
+            <a:ext cx="131116" cy="230832"/>
+          </a:xfrm>
+          <a:prstGeom prst="rect">
+            <a:avLst/>
+          </a:prstGeom>
+          <a:noFill/>
+        </p:spPr>
+        <p:txBody>
+          <a:bodyPr wrap="square" lIns="0" tIns="0" rIns="0" bIns="0" rtlCol="0">
+            <a:noAutofit/>
+          </a:bodyPr>
+          <a:lstStyle/>
+          <a:p>
+            <a:pPr algn="r"/>
+            <a:r>
+              <a:rPr lang="en-US" sz="1100" dirty="0">
+                <a:solidFill>
+                  <a:srgbClr val="0070C0"/>
+                </a:solidFill>
+              </a:rPr>
+              <a:t>1</a:t>
+            </a:r>
+            <a:endParaRPr lang="en-SG" sz="1100" dirty="0">
+              <a:solidFill>
+                <a:srgbClr val="0070C0"/>
+              </a:solidFill>
+            </a:endParaRPr>
+          </a:p>
+        </p:txBody>
+      </p:sp>
+      <p:cxnSp>
+        <p:nvCxnSpPr>
+          <p:cNvPr id="81" name="Elbow Connector 95">
+            <a:extLst>
+              <a:ext uri="{FF2B5EF4-FFF2-40B4-BE49-F238E27FC236}">
+                <a16:creationId xmlns:a16="http://schemas.microsoft.com/office/drawing/2014/main" id="{9D1A9F4E-6DEA-413D-ADE8-71D250D1E9DD}"/>
+              </a:ext>
+            </a:extLst>
+          </p:cNvPr>
+          <p:cNvCxnSpPr>
+            <a:cxnSpLocks/>
+            <a:stCxn id="84" idx="0"/>
+          </p:cNvCxnSpPr>
+          <p:nvPr/>
+        </p:nvCxnSpPr>
+        <p:spPr>
+          <a:xfrm flipH="1" flipV="1">
+            <a:off x="6588605" y="3894142"/>
+            <a:ext cx="384297" cy="261344"/>
+          </a:xfrm>
+          <a:prstGeom prst="straightConnector1">
+            <a:avLst/>
+          </a:prstGeom>
+          <a:ln w="19050">
+            <a:headEnd type="none" w="med" len="med"/>
+            <a:tailEnd type="none" w="med" len="med"/>
+          </a:ln>
+        </p:spPr>
+        <p:style>
+          <a:lnRef idx="1">
+            <a:schemeClr val="accent1"/>
+          </a:lnRef>
+          <a:fillRef idx="0">
+            <a:schemeClr val="accent1"/>
+          </a:fillRef>
+          <a:effectRef idx="0">
+            <a:schemeClr val="accent1"/>
+          </a:effectRef>
+          <a:fontRef idx="minor">
+            <a:schemeClr val="tx1"/>
+          </a:fontRef>
+        </p:style>
+      </p:cxnSp>
+      <p:sp>
+        <p:nvSpPr>
+          <p:cNvPr id="84" name="Isosceles Triangle 102">
+            <a:extLst>
+              <a:ext uri="{FF2B5EF4-FFF2-40B4-BE49-F238E27FC236}">
+                <a16:creationId xmlns:a16="http://schemas.microsoft.com/office/drawing/2014/main" id="{D62D0A62-EAE8-417C-BCA3-A924A001FFB4}"/>
+              </a:ext>
+            </a:extLst>
+          </p:cNvPr>
+          <p:cNvSpPr/>
+          <p:nvPr/>
+        </p:nvSpPr>
+        <p:spPr>
+          <a:xfrm rot="18064308" flipV="1">
+            <a:off x="6762480" y="4022430"/>
+            <a:ext cx="270504" cy="175523"/>
+          </a:xfrm>
+          <a:prstGeom prst="triangle">
+            <a:avLst/>
+          </a:prstGeom>
+          <a:solidFill>
+            <a:schemeClr val="tx2">
+              <a:lumMod val="60000"/>
+              <a:lumOff val="40000"/>
+            </a:schemeClr>
+          </a:solidFill>
+          <a:ln w="19050">
+            <a:solidFill>
+              <a:srgbClr val="0070C0"/>
+            </a:solidFill>
+          </a:ln>
+          <a:effectLst/>
+        </p:spPr>
+        <p:style>
+          <a:lnRef idx="1">
+            <a:schemeClr val="accent1"/>
+          </a:lnRef>
+          <a:fillRef idx="2">
+            <a:schemeClr val="accent1"/>
+          </a:fillRef>
+          <a:effectRef idx="1">
+            <a:schemeClr val="accent1"/>
+          </a:effectRef>
+          <a:fontRef idx="minor">
+            <a:schemeClr val="dk1"/>
+          </a:fontRef>
+        </p:style>
+        <p:txBody>
+          <a:bodyPr rtlCol="0" anchor="ctr"/>
+          <a:lstStyle/>
+          <a:p>
+            <a:pPr algn="ctr"/>
+            <a:endParaRPr lang="en-SG" sz="1050" b="1">
+              <a:solidFill>
+                <a:srgbClr val="92D050"/>
               </a:solidFill>
             </a:endParaRPr>
           </a:p>

</xml_diff>

<commit_message>
DeveloperGuide: update section of UndoRedoStack to AddressBookCareTaker
We previous have UndoRedoStack which stores the UndoableCommands in
LogicManager.

Since UndoRedoStack has been updated to AddressBookCareTaker which
stores ReadOnlyAddressBook in a List, and has been moved to Model
instead, the sections on undo/redo feature, Logic and Model component
in DeveloperGuide is out of date.

Let's update the out of date sections in DeveloperGuide to the updated
AddressBookCareTaker.

UndoableCommand has also been removed from the codebase.

Let's also remove the `Structure of Commands in the Logic Component`
section under Logic component, and any references to UndoableCommand
in DeveloperGuide.
</commit_message>
<xml_diff>
--- a/docs/diagrams/LogicComponentClassDiagram.pptx
+++ b/docs/diagrams/LogicComponentClassDiagram.pptx
@@ -212,7 +212,7 @@
           <a:p>
             <a:fld id="{F5CC4B3F-88C1-4FFA-B1B6-F41C21DC6924}" type="datetimeFigureOut">
               <a:rPr lang="en-US" smtClean="0"/>
-              <a:t>7/20/17</a:t>
+              <a:t>4/4/2018</a:t>
             </a:fld>
             <a:endParaRPr lang="en-US"/>
           </a:p>
@@ -658,7 +658,7 @@
           <a:p>
             <a:fld id="{78C97017-6FC3-485B-9764-EAC9E56C1D49}" type="datetimeFigureOut">
               <a:rPr lang="en-US" smtClean="0"/>
-              <a:t>7/20/17</a:t>
+              <a:t>4/4/2018</a:t>
             </a:fld>
             <a:endParaRPr lang="en-US"/>
           </a:p>
@@ -826,7 +826,7 @@
           <a:p>
             <a:fld id="{78C97017-6FC3-485B-9764-EAC9E56C1D49}" type="datetimeFigureOut">
               <a:rPr lang="en-US" smtClean="0"/>
-              <a:t>7/20/17</a:t>
+              <a:t>4/4/2018</a:t>
             </a:fld>
             <a:endParaRPr lang="en-US"/>
           </a:p>
@@ -1004,7 +1004,7 @@
           <a:p>
             <a:fld id="{78C97017-6FC3-485B-9764-EAC9E56C1D49}" type="datetimeFigureOut">
               <a:rPr lang="en-US" smtClean="0"/>
-              <a:t>7/20/17</a:t>
+              <a:t>4/4/2018</a:t>
             </a:fld>
             <a:endParaRPr lang="en-US"/>
           </a:p>
@@ -1172,7 +1172,7 @@
           <a:p>
             <a:fld id="{78C97017-6FC3-485B-9764-EAC9E56C1D49}" type="datetimeFigureOut">
               <a:rPr lang="en-US" smtClean="0"/>
-              <a:t>7/20/17</a:t>
+              <a:t>4/4/2018</a:t>
             </a:fld>
             <a:endParaRPr lang="en-US"/>
           </a:p>
@@ -1417,7 +1417,7 @@
           <a:p>
             <a:fld id="{78C97017-6FC3-485B-9764-EAC9E56C1D49}" type="datetimeFigureOut">
               <a:rPr lang="en-US" smtClean="0"/>
-              <a:t>7/20/17</a:t>
+              <a:t>4/4/2018</a:t>
             </a:fld>
             <a:endParaRPr lang="en-US"/>
           </a:p>
@@ -1702,7 +1702,7 @@
           <a:p>
             <a:fld id="{78C97017-6FC3-485B-9764-EAC9E56C1D49}" type="datetimeFigureOut">
               <a:rPr lang="en-US" smtClean="0"/>
-              <a:t>7/20/17</a:t>
+              <a:t>4/4/2018</a:t>
             </a:fld>
             <a:endParaRPr lang="en-US"/>
           </a:p>
@@ -2121,7 +2121,7 @@
           <a:p>
             <a:fld id="{78C97017-6FC3-485B-9764-EAC9E56C1D49}" type="datetimeFigureOut">
               <a:rPr lang="en-US" smtClean="0"/>
-              <a:t>7/20/17</a:t>
+              <a:t>4/4/2018</a:t>
             </a:fld>
             <a:endParaRPr lang="en-US"/>
           </a:p>
@@ -2238,7 +2238,7 @@
           <a:p>
             <a:fld id="{78C97017-6FC3-485B-9764-EAC9E56C1D49}" type="datetimeFigureOut">
               <a:rPr lang="en-US" smtClean="0"/>
-              <a:t>7/20/17</a:t>
+              <a:t>4/4/2018</a:t>
             </a:fld>
             <a:endParaRPr lang="en-US"/>
           </a:p>
@@ -2333,7 +2333,7 @@
           <a:p>
             <a:fld id="{78C97017-6FC3-485B-9764-EAC9E56C1D49}" type="datetimeFigureOut">
               <a:rPr lang="en-US" smtClean="0"/>
-              <a:t>7/20/17</a:t>
+              <a:t>4/4/2018</a:t>
             </a:fld>
             <a:endParaRPr lang="en-US"/>
           </a:p>
@@ -2608,7 +2608,7 @@
           <a:p>
             <a:fld id="{78C97017-6FC3-485B-9764-EAC9E56C1D49}" type="datetimeFigureOut">
               <a:rPr lang="en-US" smtClean="0"/>
-              <a:t>7/20/17</a:t>
+              <a:t>4/4/2018</a:t>
             </a:fld>
             <a:endParaRPr lang="en-US"/>
           </a:p>
@@ -2860,7 +2860,7 @@
           <a:p>
             <a:fld id="{78C97017-6FC3-485B-9764-EAC9E56C1D49}" type="datetimeFigureOut">
               <a:rPr lang="en-US" smtClean="0"/>
-              <a:t>7/20/17</a:t>
+              <a:t>4/4/2018</a:t>
             </a:fld>
             <a:endParaRPr lang="en-US"/>
           </a:p>
@@ -3071,7 +3071,7 @@
           <a:p>
             <a:fld id="{78C97017-6FC3-485B-9764-EAC9E56C1D49}" type="datetimeFigureOut">
               <a:rPr lang="en-US" smtClean="0"/>
-              <a:t>7/20/17</a:t>
+              <a:t>4/4/2018</a:t>
             </a:fld>
             <a:endParaRPr lang="en-US"/>
           </a:p>
@@ -5517,7 +5517,7 @@
           <p:cNvPr id="97" name="Rectangle 96">
             <a:extLst>
               <a:ext uri="{FF2B5EF4-FFF2-40B4-BE49-F238E27FC236}">
-                <a16:creationId xmlns="" xmlns:a16="http://schemas.microsoft.com/office/drawing/2014/main" id="{AADE6A0C-89AB-467B-8CEA-5FCF36CE0D21}"/>
+                <a16:creationId xmlns:a16="http://schemas.microsoft.com/office/drawing/2014/main" id="{AADE6A0C-89AB-467B-8CEA-5FCF36CE0D21}"/>
               </a:ext>
             </a:extLst>
           </p:cNvPr>
@@ -6215,160 +6215,6 @@
             <a:endParaRPr lang="en-US" sz="1050" dirty="0">
               <a:solidFill>
                 <a:schemeClr val="bg1"/>
-              </a:solidFill>
-            </a:endParaRPr>
-          </a:p>
-        </p:txBody>
-      </p:sp>
-      <p:sp>
-        <p:nvSpPr>
-          <p:cNvPr id="59" name="Rectangle 62"/>
-          <p:cNvSpPr/>
-          <p:nvPr/>
-        </p:nvSpPr>
-        <p:spPr>
-          <a:xfrm>
-            <a:off x="2334221" y="3058789"/>
-            <a:ext cx="758695" cy="346760"/>
-          </a:xfrm>
-          <a:prstGeom prst="rect">
-            <a:avLst/>
-          </a:prstGeom>
-          <a:solidFill>
-            <a:srgbClr val="0070C0"/>
-          </a:solidFill>
-          <a:ln w="19050">
-            <a:solidFill>
-              <a:srgbClr val="0070C0"/>
-            </a:solidFill>
-          </a:ln>
-          <a:effectLst/>
-        </p:spPr>
-        <p:style>
-          <a:lnRef idx="1">
-            <a:schemeClr val="accent2"/>
-          </a:lnRef>
-          <a:fillRef idx="2">
-            <a:schemeClr val="accent2"/>
-          </a:fillRef>
-          <a:effectRef idx="1">
-            <a:schemeClr val="accent2"/>
-          </a:effectRef>
-          <a:fontRef idx="minor">
-            <a:schemeClr val="dk1"/>
-          </a:fontRef>
-        </p:style>
-        <p:txBody>
-          <a:bodyPr rtlCol="0" anchor="ctr"/>
-          <a:lstStyle/>
-          <a:p>
-            <a:pPr algn="ctr"/>
-            <a:r>
-              <a:rPr lang="en-US" sz="1050" dirty="0" err="1" smtClean="0">
-                <a:solidFill>
-                  <a:schemeClr val="bg1"/>
-                </a:solidFill>
-              </a:rPr>
-              <a:t>UndoRedo</a:t>
-            </a:r>
-            <a:endParaRPr lang="en-US" sz="1050" dirty="0" smtClean="0">
-              <a:solidFill>
-                <a:schemeClr val="bg1"/>
-              </a:solidFill>
-            </a:endParaRPr>
-          </a:p>
-          <a:p>
-            <a:pPr algn="ctr"/>
-            <a:r>
-              <a:rPr lang="en-US" sz="1050" dirty="0" smtClean="0">
-                <a:solidFill>
-                  <a:schemeClr val="bg1"/>
-                </a:solidFill>
-              </a:rPr>
-              <a:t>Stack</a:t>
-            </a:r>
-            <a:endParaRPr lang="en-SG" sz="1050" dirty="0">
-              <a:solidFill>
-                <a:schemeClr val="bg1"/>
-              </a:solidFill>
-            </a:endParaRPr>
-          </a:p>
-        </p:txBody>
-      </p:sp>
-      <p:cxnSp>
-        <p:nvCxnSpPr>
-          <p:cNvPr id="61" name="Straight Arrow Connector 57"/>
-          <p:cNvCxnSpPr>
-            <a:endCxn id="59" idx="2"/>
-          </p:cNvCxnSpPr>
-          <p:nvPr/>
-        </p:nvCxnSpPr>
-        <p:spPr>
-          <a:xfrm flipV="1">
-            <a:off x="2713568" y="3405549"/>
-            <a:ext cx="1" cy="177981"/>
-          </a:xfrm>
-          <a:prstGeom prst="straightConnector1">
-            <a:avLst/>
-          </a:prstGeom>
-          <a:ln w="19050">
-            <a:solidFill>
-              <a:srgbClr val="0070C0"/>
-            </a:solidFill>
-            <a:headEnd type="none" w="med" len="med"/>
-            <a:tailEnd type="arrow" w="med" len="med"/>
-          </a:ln>
-          <a:effectLst/>
-        </p:spPr>
-        <p:style>
-          <a:lnRef idx="1">
-            <a:schemeClr val="accent2"/>
-          </a:lnRef>
-          <a:fillRef idx="2">
-            <a:schemeClr val="accent2"/>
-          </a:fillRef>
-          <a:effectRef idx="1">
-            <a:schemeClr val="accent2"/>
-          </a:effectRef>
-          <a:fontRef idx="minor">
-            <a:schemeClr val="dk1"/>
-          </a:fontRef>
-        </p:style>
-      </p:cxnSp>
-      <p:sp>
-        <p:nvSpPr>
-          <p:cNvPr id="63" name="TextBox 62"/>
-          <p:cNvSpPr txBox="1"/>
-          <p:nvPr/>
-        </p:nvSpPr>
-        <p:spPr>
-          <a:xfrm>
-            <a:off x="2724741" y="3418256"/>
-            <a:ext cx="131116" cy="230832"/>
-          </a:xfrm>
-          <a:prstGeom prst="rect">
-            <a:avLst/>
-          </a:prstGeom>
-          <a:noFill/>
-        </p:spPr>
-        <p:txBody>
-          <a:bodyPr wrap="square" lIns="0" tIns="0" rIns="0" bIns="0" rtlCol="0">
-            <a:noAutofit/>
-          </a:bodyPr>
-          <a:lstStyle/>
-          <a:p>
-            <a:pPr algn="r"/>
-            <a:r>
-              <a:rPr lang="en-US" sz="1100" dirty="0">
-                <a:solidFill>
-                  <a:srgbClr val="0070C0"/>
-                </a:solidFill>
-              </a:rPr>
-              <a:t>1</a:t>
-            </a:r>
-            <a:endParaRPr lang="en-SG" sz="1100" dirty="0">
-              <a:solidFill>
-                <a:srgbClr val="0070C0"/>
               </a:solidFill>
             </a:endParaRPr>
           </a:p>

</xml_diff>

<commit_message>
DeveloperGuide: update section of UndoRedoStack to UndoRedoCareTaker
We previous have UndoRedoStack which stores the UndoableCommands in
LogicManager.

Since UndoRedoStack has been updated to UndoRedoCareTaker which
stores ReadOnlyAddressBook in a List, and has been moved to Model
instead, the sections on undo/redo feature, Logic and Model component
in DeveloperGuide is out of date.

Let's update the out of date sections in DeveloperGuide to the updated
UndoRedoCareTaker.

UndoableCommand has also been removed from the codebase.

Let's also remove the `Structure of Commands in the Logic Component`
section under Logic component, and any references to UndoableCommand
in DeveloperGuide.
</commit_message>
<xml_diff>
--- a/docs/diagrams/LogicComponentClassDiagram.pptx
+++ b/docs/diagrams/LogicComponentClassDiagram.pptx
@@ -212,7 +212,7 @@
           <a:p>
             <a:fld id="{F5CC4B3F-88C1-4FFA-B1B6-F41C21DC6924}" type="datetimeFigureOut">
               <a:rPr lang="en-US" smtClean="0"/>
-              <a:t>7/20/17</a:t>
+              <a:t>4/4/2018</a:t>
             </a:fld>
             <a:endParaRPr lang="en-US"/>
           </a:p>
@@ -658,7 +658,7 @@
           <a:p>
             <a:fld id="{78C97017-6FC3-485B-9764-EAC9E56C1D49}" type="datetimeFigureOut">
               <a:rPr lang="en-US" smtClean="0"/>
-              <a:t>7/20/17</a:t>
+              <a:t>4/4/2018</a:t>
             </a:fld>
             <a:endParaRPr lang="en-US"/>
           </a:p>
@@ -826,7 +826,7 @@
           <a:p>
             <a:fld id="{78C97017-6FC3-485B-9764-EAC9E56C1D49}" type="datetimeFigureOut">
               <a:rPr lang="en-US" smtClean="0"/>
-              <a:t>7/20/17</a:t>
+              <a:t>4/4/2018</a:t>
             </a:fld>
             <a:endParaRPr lang="en-US"/>
           </a:p>
@@ -1004,7 +1004,7 @@
           <a:p>
             <a:fld id="{78C97017-6FC3-485B-9764-EAC9E56C1D49}" type="datetimeFigureOut">
               <a:rPr lang="en-US" smtClean="0"/>
-              <a:t>7/20/17</a:t>
+              <a:t>4/4/2018</a:t>
             </a:fld>
             <a:endParaRPr lang="en-US"/>
           </a:p>
@@ -1172,7 +1172,7 @@
           <a:p>
             <a:fld id="{78C97017-6FC3-485B-9764-EAC9E56C1D49}" type="datetimeFigureOut">
               <a:rPr lang="en-US" smtClean="0"/>
-              <a:t>7/20/17</a:t>
+              <a:t>4/4/2018</a:t>
             </a:fld>
             <a:endParaRPr lang="en-US"/>
           </a:p>
@@ -1417,7 +1417,7 @@
           <a:p>
             <a:fld id="{78C97017-6FC3-485B-9764-EAC9E56C1D49}" type="datetimeFigureOut">
               <a:rPr lang="en-US" smtClean="0"/>
-              <a:t>7/20/17</a:t>
+              <a:t>4/4/2018</a:t>
             </a:fld>
             <a:endParaRPr lang="en-US"/>
           </a:p>
@@ -1702,7 +1702,7 @@
           <a:p>
             <a:fld id="{78C97017-6FC3-485B-9764-EAC9E56C1D49}" type="datetimeFigureOut">
               <a:rPr lang="en-US" smtClean="0"/>
-              <a:t>7/20/17</a:t>
+              <a:t>4/4/2018</a:t>
             </a:fld>
             <a:endParaRPr lang="en-US"/>
           </a:p>
@@ -2121,7 +2121,7 @@
           <a:p>
             <a:fld id="{78C97017-6FC3-485B-9764-EAC9E56C1D49}" type="datetimeFigureOut">
               <a:rPr lang="en-US" smtClean="0"/>
-              <a:t>7/20/17</a:t>
+              <a:t>4/4/2018</a:t>
             </a:fld>
             <a:endParaRPr lang="en-US"/>
           </a:p>
@@ -2238,7 +2238,7 @@
           <a:p>
             <a:fld id="{78C97017-6FC3-485B-9764-EAC9E56C1D49}" type="datetimeFigureOut">
               <a:rPr lang="en-US" smtClean="0"/>
-              <a:t>7/20/17</a:t>
+              <a:t>4/4/2018</a:t>
             </a:fld>
             <a:endParaRPr lang="en-US"/>
           </a:p>
@@ -2333,7 +2333,7 @@
           <a:p>
             <a:fld id="{78C97017-6FC3-485B-9764-EAC9E56C1D49}" type="datetimeFigureOut">
               <a:rPr lang="en-US" smtClean="0"/>
-              <a:t>7/20/17</a:t>
+              <a:t>4/4/2018</a:t>
             </a:fld>
             <a:endParaRPr lang="en-US"/>
           </a:p>
@@ -2608,7 +2608,7 @@
           <a:p>
             <a:fld id="{78C97017-6FC3-485B-9764-EAC9E56C1D49}" type="datetimeFigureOut">
               <a:rPr lang="en-US" smtClean="0"/>
-              <a:t>7/20/17</a:t>
+              <a:t>4/4/2018</a:t>
             </a:fld>
             <a:endParaRPr lang="en-US"/>
           </a:p>
@@ -2860,7 +2860,7 @@
           <a:p>
             <a:fld id="{78C97017-6FC3-485B-9764-EAC9E56C1D49}" type="datetimeFigureOut">
               <a:rPr lang="en-US" smtClean="0"/>
-              <a:t>7/20/17</a:t>
+              <a:t>4/4/2018</a:t>
             </a:fld>
             <a:endParaRPr lang="en-US"/>
           </a:p>
@@ -3071,7 +3071,7 @@
           <a:p>
             <a:fld id="{78C97017-6FC3-485B-9764-EAC9E56C1D49}" type="datetimeFigureOut">
               <a:rPr lang="en-US" smtClean="0"/>
-              <a:t>7/20/17</a:t>
+              <a:t>4/4/2018</a:t>
             </a:fld>
             <a:endParaRPr lang="en-US"/>
           </a:p>
@@ -5517,7 +5517,7 @@
           <p:cNvPr id="97" name="Rectangle 96">
             <a:extLst>
               <a:ext uri="{FF2B5EF4-FFF2-40B4-BE49-F238E27FC236}">
-                <a16:creationId xmlns="" xmlns:a16="http://schemas.microsoft.com/office/drawing/2014/main" id="{AADE6A0C-89AB-467B-8CEA-5FCF36CE0D21}"/>
+                <a16:creationId xmlns:a16="http://schemas.microsoft.com/office/drawing/2014/main" id="{AADE6A0C-89AB-467B-8CEA-5FCF36CE0D21}"/>
               </a:ext>
             </a:extLst>
           </p:cNvPr>
@@ -6215,160 +6215,6 @@
             <a:endParaRPr lang="en-US" sz="1050" dirty="0">
               <a:solidFill>
                 <a:schemeClr val="bg1"/>
-              </a:solidFill>
-            </a:endParaRPr>
-          </a:p>
-        </p:txBody>
-      </p:sp>
-      <p:sp>
-        <p:nvSpPr>
-          <p:cNvPr id="59" name="Rectangle 62"/>
-          <p:cNvSpPr/>
-          <p:nvPr/>
-        </p:nvSpPr>
-        <p:spPr>
-          <a:xfrm>
-            <a:off x="2334221" y="3058789"/>
-            <a:ext cx="758695" cy="346760"/>
-          </a:xfrm>
-          <a:prstGeom prst="rect">
-            <a:avLst/>
-          </a:prstGeom>
-          <a:solidFill>
-            <a:srgbClr val="0070C0"/>
-          </a:solidFill>
-          <a:ln w="19050">
-            <a:solidFill>
-              <a:srgbClr val="0070C0"/>
-            </a:solidFill>
-          </a:ln>
-          <a:effectLst/>
-        </p:spPr>
-        <p:style>
-          <a:lnRef idx="1">
-            <a:schemeClr val="accent2"/>
-          </a:lnRef>
-          <a:fillRef idx="2">
-            <a:schemeClr val="accent2"/>
-          </a:fillRef>
-          <a:effectRef idx="1">
-            <a:schemeClr val="accent2"/>
-          </a:effectRef>
-          <a:fontRef idx="minor">
-            <a:schemeClr val="dk1"/>
-          </a:fontRef>
-        </p:style>
-        <p:txBody>
-          <a:bodyPr rtlCol="0" anchor="ctr"/>
-          <a:lstStyle/>
-          <a:p>
-            <a:pPr algn="ctr"/>
-            <a:r>
-              <a:rPr lang="en-US" sz="1050" dirty="0" err="1" smtClean="0">
-                <a:solidFill>
-                  <a:schemeClr val="bg1"/>
-                </a:solidFill>
-              </a:rPr>
-              <a:t>UndoRedo</a:t>
-            </a:r>
-            <a:endParaRPr lang="en-US" sz="1050" dirty="0" smtClean="0">
-              <a:solidFill>
-                <a:schemeClr val="bg1"/>
-              </a:solidFill>
-            </a:endParaRPr>
-          </a:p>
-          <a:p>
-            <a:pPr algn="ctr"/>
-            <a:r>
-              <a:rPr lang="en-US" sz="1050" dirty="0" smtClean="0">
-                <a:solidFill>
-                  <a:schemeClr val="bg1"/>
-                </a:solidFill>
-              </a:rPr>
-              <a:t>Stack</a:t>
-            </a:r>
-            <a:endParaRPr lang="en-SG" sz="1050" dirty="0">
-              <a:solidFill>
-                <a:schemeClr val="bg1"/>
-              </a:solidFill>
-            </a:endParaRPr>
-          </a:p>
-        </p:txBody>
-      </p:sp>
-      <p:cxnSp>
-        <p:nvCxnSpPr>
-          <p:cNvPr id="61" name="Straight Arrow Connector 57"/>
-          <p:cNvCxnSpPr>
-            <a:endCxn id="59" idx="2"/>
-          </p:cNvCxnSpPr>
-          <p:nvPr/>
-        </p:nvCxnSpPr>
-        <p:spPr>
-          <a:xfrm flipV="1">
-            <a:off x="2713568" y="3405549"/>
-            <a:ext cx="1" cy="177981"/>
-          </a:xfrm>
-          <a:prstGeom prst="straightConnector1">
-            <a:avLst/>
-          </a:prstGeom>
-          <a:ln w="19050">
-            <a:solidFill>
-              <a:srgbClr val="0070C0"/>
-            </a:solidFill>
-            <a:headEnd type="none" w="med" len="med"/>
-            <a:tailEnd type="arrow" w="med" len="med"/>
-          </a:ln>
-          <a:effectLst/>
-        </p:spPr>
-        <p:style>
-          <a:lnRef idx="1">
-            <a:schemeClr val="accent2"/>
-          </a:lnRef>
-          <a:fillRef idx="2">
-            <a:schemeClr val="accent2"/>
-          </a:fillRef>
-          <a:effectRef idx="1">
-            <a:schemeClr val="accent2"/>
-          </a:effectRef>
-          <a:fontRef idx="minor">
-            <a:schemeClr val="dk1"/>
-          </a:fontRef>
-        </p:style>
-      </p:cxnSp>
-      <p:sp>
-        <p:nvSpPr>
-          <p:cNvPr id="63" name="TextBox 62"/>
-          <p:cNvSpPr txBox="1"/>
-          <p:nvPr/>
-        </p:nvSpPr>
-        <p:spPr>
-          <a:xfrm>
-            <a:off x="2724741" y="3418256"/>
-            <a:ext cx="131116" cy="230832"/>
-          </a:xfrm>
-          <a:prstGeom prst="rect">
-            <a:avLst/>
-          </a:prstGeom>
-          <a:noFill/>
-        </p:spPr>
-        <p:txBody>
-          <a:bodyPr wrap="square" lIns="0" tIns="0" rIns="0" bIns="0" rtlCol="0">
-            <a:noAutofit/>
-          </a:bodyPr>
-          <a:lstStyle/>
-          <a:p>
-            <a:pPr algn="r"/>
-            <a:r>
-              <a:rPr lang="en-US" sz="1100" dirty="0">
-                <a:solidFill>
-                  <a:srgbClr val="0070C0"/>
-                </a:solidFill>
-              </a:rPr>
-              <a:t>1</a:t>
-            </a:r>
-            <a:endParaRPr lang="en-SG" sz="1100" dirty="0">
-              <a:solidFill>
-                <a:srgbClr val="0070C0"/>
               </a:solidFill>
             </a:endParaRPr>
           </a:p>

</xml_diff>

<commit_message>
DeveloperGuide: update sections on UndoRedoStack
UndoRedoStack previously stores the UndoableCommands, and was in
LogicManager.

Since UndoRedoStack has been updated to store ReadOnlyAddressBook and
has been moved to Model instead, the sections on undo/redo feature and
Logic and Model component in DeveloperGuide is out of date.

Let's update the undo/redo feature section in DeveloperGuide to follow
the updated UndoRedoStack storing of AddressBook states, and the Logic
and Model component class diagrams involving UndoRedoStack.

UndoableCommand has also been removed from the codebase.

Let's also remove the `Structure of Commands in the Logic Component`
section under Logic component, and any references to UndoableCommand
in DeveloperGuide.
</commit_message>
<xml_diff>
--- a/docs/diagrams/LogicComponentClassDiagram.pptx
+++ b/docs/diagrams/LogicComponentClassDiagram.pptx
@@ -212,7 +212,7 @@
           <a:p>
             <a:fld id="{F5CC4B3F-88C1-4FFA-B1B6-F41C21DC6924}" type="datetimeFigureOut">
               <a:rPr lang="en-US" smtClean="0"/>
-              <a:t>7/20/17</a:t>
+              <a:t>4/4/2018</a:t>
             </a:fld>
             <a:endParaRPr lang="en-US"/>
           </a:p>
@@ -658,7 +658,7 @@
           <a:p>
             <a:fld id="{78C97017-6FC3-485B-9764-EAC9E56C1D49}" type="datetimeFigureOut">
               <a:rPr lang="en-US" smtClean="0"/>
-              <a:t>7/20/17</a:t>
+              <a:t>4/4/2018</a:t>
             </a:fld>
             <a:endParaRPr lang="en-US"/>
           </a:p>
@@ -826,7 +826,7 @@
           <a:p>
             <a:fld id="{78C97017-6FC3-485B-9764-EAC9E56C1D49}" type="datetimeFigureOut">
               <a:rPr lang="en-US" smtClean="0"/>
-              <a:t>7/20/17</a:t>
+              <a:t>4/4/2018</a:t>
             </a:fld>
             <a:endParaRPr lang="en-US"/>
           </a:p>
@@ -1004,7 +1004,7 @@
           <a:p>
             <a:fld id="{78C97017-6FC3-485B-9764-EAC9E56C1D49}" type="datetimeFigureOut">
               <a:rPr lang="en-US" smtClean="0"/>
-              <a:t>7/20/17</a:t>
+              <a:t>4/4/2018</a:t>
             </a:fld>
             <a:endParaRPr lang="en-US"/>
           </a:p>
@@ -1172,7 +1172,7 @@
           <a:p>
             <a:fld id="{78C97017-6FC3-485B-9764-EAC9E56C1D49}" type="datetimeFigureOut">
               <a:rPr lang="en-US" smtClean="0"/>
-              <a:t>7/20/17</a:t>
+              <a:t>4/4/2018</a:t>
             </a:fld>
             <a:endParaRPr lang="en-US"/>
           </a:p>
@@ -1417,7 +1417,7 @@
           <a:p>
             <a:fld id="{78C97017-6FC3-485B-9764-EAC9E56C1D49}" type="datetimeFigureOut">
               <a:rPr lang="en-US" smtClean="0"/>
-              <a:t>7/20/17</a:t>
+              <a:t>4/4/2018</a:t>
             </a:fld>
             <a:endParaRPr lang="en-US"/>
           </a:p>
@@ -1702,7 +1702,7 @@
           <a:p>
             <a:fld id="{78C97017-6FC3-485B-9764-EAC9E56C1D49}" type="datetimeFigureOut">
               <a:rPr lang="en-US" smtClean="0"/>
-              <a:t>7/20/17</a:t>
+              <a:t>4/4/2018</a:t>
             </a:fld>
             <a:endParaRPr lang="en-US"/>
           </a:p>
@@ -2121,7 +2121,7 @@
           <a:p>
             <a:fld id="{78C97017-6FC3-485B-9764-EAC9E56C1D49}" type="datetimeFigureOut">
               <a:rPr lang="en-US" smtClean="0"/>
-              <a:t>7/20/17</a:t>
+              <a:t>4/4/2018</a:t>
             </a:fld>
             <a:endParaRPr lang="en-US"/>
           </a:p>
@@ -2238,7 +2238,7 @@
           <a:p>
             <a:fld id="{78C97017-6FC3-485B-9764-EAC9E56C1D49}" type="datetimeFigureOut">
               <a:rPr lang="en-US" smtClean="0"/>
-              <a:t>7/20/17</a:t>
+              <a:t>4/4/2018</a:t>
             </a:fld>
             <a:endParaRPr lang="en-US"/>
           </a:p>
@@ -2333,7 +2333,7 @@
           <a:p>
             <a:fld id="{78C97017-6FC3-485B-9764-EAC9E56C1D49}" type="datetimeFigureOut">
               <a:rPr lang="en-US" smtClean="0"/>
-              <a:t>7/20/17</a:t>
+              <a:t>4/4/2018</a:t>
             </a:fld>
             <a:endParaRPr lang="en-US"/>
           </a:p>
@@ -2608,7 +2608,7 @@
           <a:p>
             <a:fld id="{78C97017-6FC3-485B-9764-EAC9E56C1D49}" type="datetimeFigureOut">
               <a:rPr lang="en-US" smtClean="0"/>
-              <a:t>7/20/17</a:t>
+              <a:t>4/4/2018</a:t>
             </a:fld>
             <a:endParaRPr lang="en-US"/>
           </a:p>
@@ -2860,7 +2860,7 @@
           <a:p>
             <a:fld id="{78C97017-6FC3-485B-9764-EAC9E56C1D49}" type="datetimeFigureOut">
               <a:rPr lang="en-US" smtClean="0"/>
-              <a:t>7/20/17</a:t>
+              <a:t>4/4/2018</a:t>
             </a:fld>
             <a:endParaRPr lang="en-US"/>
           </a:p>
@@ -3071,7 +3071,7 @@
           <a:p>
             <a:fld id="{78C97017-6FC3-485B-9764-EAC9E56C1D49}" type="datetimeFigureOut">
               <a:rPr lang="en-US" smtClean="0"/>
-              <a:t>7/20/17</a:t>
+              <a:t>4/4/2018</a:t>
             </a:fld>
             <a:endParaRPr lang="en-US"/>
           </a:p>
@@ -5517,7 +5517,7 @@
           <p:cNvPr id="97" name="Rectangle 96">
             <a:extLst>
               <a:ext uri="{FF2B5EF4-FFF2-40B4-BE49-F238E27FC236}">
-                <a16:creationId xmlns="" xmlns:a16="http://schemas.microsoft.com/office/drawing/2014/main" id="{AADE6A0C-89AB-467B-8CEA-5FCF36CE0D21}"/>
+                <a16:creationId xmlns:a16="http://schemas.microsoft.com/office/drawing/2014/main" id="{AADE6A0C-89AB-467B-8CEA-5FCF36CE0D21}"/>
               </a:ext>
             </a:extLst>
           </p:cNvPr>
@@ -6215,160 +6215,6 @@
             <a:endParaRPr lang="en-US" sz="1050" dirty="0">
               <a:solidFill>
                 <a:schemeClr val="bg1"/>
-              </a:solidFill>
-            </a:endParaRPr>
-          </a:p>
-        </p:txBody>
-      </p:sp>
-      <p:sp>
-        <p:nvSpPr>
-          <p:cNvPr id="59" name="Rectangle 62"/>
-          <p:cNvSpPr/>
-          <p:nvPr/>
-        </p:nvSpPr>
-        <p:spPr>
-          <a:xfrm>
-            <a:off x="2334221" y="3058789"/>
-            <a:ext cx="758695" cy="346760"/>
-          </a:xfrm>
-          <a:prstGeom prst="rect">
-            <a:avLst/>
-          </a:prstGeom>
-          <a:solidFill>
-            <a:srgbClr val="0070C0"/>
-          </a:solidFill>
-          <a:ln w="19050">
-            <a:solidFill>
-              <a:srgbClr val="0070C0"/>
-            </a:solidFill>
-          </a:ln>
-          <a:effectLst/>
-        </p:spPr>
-        <p:style>
-          <a:lnRef idx="1">
-            <a:schemeClr val="accent2"/>
-          </a:lnRef>
-          <a:fillRef idx="2">
-            <a:schemeClr val="accent2"/>
-          </a:fillRef>
-          <a:effectRef idx="1">
-            <a:schemeClr val="accent2"/>
-          </a:effectRef>
-          <a:fontRef idx="minor">
-            <a:schemeClr val="dk1"/>
-          </a:fontRef>
-        </p:style>
-        <p:txBody>
-          <a:bodyPr rtlCol="0" anchor="ctr"/>
-          <a:lstStyle/>
-          <a:p>
-            <a:pPr algn="ctr"/>
-            <a:r>
-              <a:rPr lang="en-US" sz="1050" dirty="0" err="1" smtClean="0">
-                <a:solidFill>
-                  <a:schemeClr val="bg1"/>
-                </a:solidFill>
-              </a:rPr>
-              <a:t>UndoRedo</a:t>
-            </a:r>
-            <a:endParaRPr lang="en-US" sz="1050" dirty="0" smtClean="0">
-              <a:solidFill>
-                <a:schemeClr val="bg1"/>
-              </a:solidFill>
-            </a:endParaRPr>
-          </a:p>
-          <a:p>
-            <a:pPr algn="ctr"/>
-            <a:r>
-              <a:rPr lang="en-US" sz="1050" dirty="0" smtClean="0">
-                <a:solidFill>
-                  <a:schemeClr val="bg1"/>
-                </a:solidFill>
-              </a:rPr>
-              <a:t>Stack</a:t>
-            </a:r>
-            <a:endParaRPr lang="en-SG" sz="1050" dirty="0">
-              <a:solidFill>
-                <a:schemeClr val="bg1"/>
-              </a:solidFill>
-            </a:endParaRPr>
-          </a:p>
-        </p:txBody>
-      </p:sp>
-      <p:cxnSp>
-        <p:nvCxnSpPr>
-          <p:cNvPr id="61" name="Straight Arrow Connector 57"/>
-          <p:cNvCxnSpPr>
-            <a:endCxn id="59" idx="2"/>
-          </p:cNvCxnSpPr>
-          <p:nvPr/>
-        </p:nvCxnSpPr>
-        <p:spPr>
-          <a:xfrm flipV="1">
-            <a:off x="2713568" y="3405549"/>
-            <a:ext cx="1" cy="177981"/>
-          </a:xfrm>
-          <a:prstGeom prst="straightConnector1">
-            <a:avLst/>
-          </a:prstGeom>
-          <a:ln w="19050">
-            <a:solidFill>
-              <a:srgbClr val="0070C0"/>
-            </a:solidFill>
-            <a:headEnd type="none" w="med" len="med"/>
-            <a:tailEnd type="arrow" w="med" len="med"/>
-          </a:ln>
-          <a:effectLst/>
-        </p:spPr>
-        <p:style>
-          <a:lnRef idx="1">
-            <a:schemeClr val="accent2"/>
-          </a:lnRef>
-          <a:fillRef idx="2">
-            <a:schemeClr val="accent2"/>
-          </a:fillRef>
-          <a:effectRef idx="1">
-            <a:schemeClr val="accent2"/>
-          </a:effectRef>
-          <a:fontRef idx="minor">
-            <a:schemeClr val="dk1"/>
-          </a:fontRef>
-        </p:style>
-      </p:cxnSp>
-      <p:sp>
-        <p:nvSpPr>
-          <p:cNvPr id="63" name="TextBox 62"/>
-          <p:cNvSpPr txBox="1"/>
-          <p:nvPr/>
-        </p:nvSpPr>
-        <p:spPr>
-          <a:xfrm>
-            <a:off x="2724741" y="3418256"/>
-            <a:ext cx="131116" cy="230832"/>
-          </a:xfrm>
-          <a:prstGeom prst="rect">
-            <a:avLst/>
-          </a:prstGeom>
-          <a:noFill/>
-        </p:spPr>
-        <p:txBody>
-          <a:bodyPr wrap="square" lIns="0" tIns="0" rIns="0" bIns="0" rtlCol="0">
-            <a:noAutofit/>
-          </a:bodyPr>
-          <a:lstStyle/>
-          <a:p>
-            <a:pPr algn="r"/>
-            <a:r>
-              <a:rPr lang="en-US" sz="1100" dirty="0">
-                <a:solidFill>
-                  <a:srgbClr val="0070C0"/>
-                </a:solidFill>
-              </a:rPr>
-              <a:t>1</a:t>
-            </a:r>
-            <a:endParaRPr lang="en-SG" sz="1100" dirty="0">
-              <a:solidFill>
-                <a:srgbClr val="0070C0"/>
               </a:solidFill>
             </a:endParaRPr>
           </a:p>

</xml_diff>

<commit_message>
Move undoRedoStack from LogicManager to Model
LogicManager handles the responsibility of pushing the address book
states into the undoRedoStack or to clear the redo-stack once we have
finished succesful execution of commands.

This causes unnecessary dependency on LogicManager to handle the undo
redo mechanism, and unnecessary coupling of the UndoRedoStack with
Command classes.

Let's move the responsibility of updating undoRedoStack from
LogicManager to Model, and update the DeveloperGuide to reflect
this change.

Following this change, commands that do not mutate the address book,
such as FindCommand and ListCommand, will no longer clear the redoable
address book states. This allows us to redo to pass when we undo
commands and execute a non-mutating command afterwards, which would
fail prior to this change.

Let's also update the DeveloperGuide to reflect this other change.
</commit_message>
<xml_diff>
--- a/docs/diagrams/LogicComponentClassDiagram.pptx
+++ b/docs/diagrams/LogicComponentClassDiagram.pptx
@@ -212,7 +212,7 @@
           <a:p>
             <a:fld id="{F5CC4B3F-88C1-4FFA-B1B6-F41C21DC6924}" type="datetimeFigureOut">
               <a:rPr lang="en-US" smtClean="0"/>
-              <a:t>7/20/17</a:t>
+              <a:t>4/16/2018</a:t>
             </a:fld>
             <a:endParaRPr lang="en-US"/>
           </a:p>
@@ -658,7 +658,7 @@
           <a:p>
             <a:fld id="{78C97017-6FC3-485B-9764-EAC9E56C1D49}" type="datetimeFigureOut">
               <a:rPr lang="en-US" smtClean="0"/>
-              <a:t>7/20/17</a:t>
+              <a:t>4/16/2018</a:t>
             </a:fld>
             <a:endParaRPr lang="en-US"/>
           </a:p>
@@ -826,7 +826,7 @@
           <a:p>
             <a:fld id="{78C97017-6FC3-485B-9764-EAC9E56C1D49}" type="datetimeFigureOut">
               <a:rPr lang="en-US" smtClean="0"/>
-              <a:t>7/20/17</a:t>
+              <a:t>4/16/2018</a:t>
             </a:fld>
             <a:endParaRPr lang="en-US"/>
           </a:p>
@@ -1004,7 +1004,7 @@
           <a:p>
             <a:fld id="{78C97017-6FC3-485B-9764-EAC9E56C1D49}" type="datetimeFigureOut">
               <a:rPr lang="en-US" smtClean="0"/>
-              <a:t>7/20/17</a:t>
+              <a:t>4/16/2018</a:t>
             </a:fld>
             <a:endParaRPr lang="en-US"/>
           </a:p>
@@ -1172,7 +1172,7 @@
           <a:p>
             <a:fld id="{78C97017-6FC3-485B-9764-EAC9E56C1D49}" type="datetimeFigureOut">
               <a:rPr lang="en-US" smtClean="0"/>
-              <a:t>7/20/17</a:t>
+              <a:t>4/16/2018</a:t>
             </a:fld>
             <a:endParaRPr lang="en-US"/>
           </a:p>
@@ -1417,7 +1417,7 @@
           <a:p>
             <a:fld id="{78C97017-6FC3-485B-9764-EAC9E56C1D49}" type="datetimeFigureOut">
               <a:rPr lang="en-US" smtClean="0"/>
-              <a:t>7/20/17</a:t>
+              <a:t>4/16/2018</a:t>
             </a:fld>
             <a:endParaRPr lang="en-US"/>
           </a:p>
@@ -1702,7 +1702,7 @@
           <a:p>
             <a:fld id="{78C97017-6FC3-485B-9764-EAC9E56C1D49}" type="datetimeFigureOut">
               <a:rPr lang="en-US" smtClean="0"/>
-              <a:t>7/20/17</a:t>
+              <a:t>4/16/2018</a:t>
             </a:fld>
             <a:endParaRPr lang="en-US"/>
           </a:p>
@@ -2121,7 +2121,7 @@
           <a:p>
             <a:fld id="{78C97017-6FC3-485B-9764-EAC9E56C1D49}" type="datetimeFigureOut">
               <a:rPr lang="en-US" smtClean="0"/>
-              <a:t>7/20/17</a:t>
+              <a:t>4/16/2018</a:t>
             </a:fld>
             <a:endParaRPr lang="en-US"/>
           </a:p>
@@ -2238,7 +2238,7 @@
           <a:p>
             <a:fld id="{78C97017-6FC3-485B-9764-EAC9E56C1D49}" type="datetimeFigureOut">
               <a:rPr lang="en-US" smtClean="0"/>
-              <a:t>7/20/17</a:t>
+              <a:t>4/16/2018</a:t>
             </a:fld>
             <a:endParaRPr lang="en-US"/>
           </a:p>
@@ -2333,7 +2333,7 @@
           <a:p>
             <a:fld id="{78C97017-6FC3-485B-9764-EAC9E56C1D49}" type="datetimeFigureOut">
               <a:rPr lang="en-US" smtClean="0"/>
-              <a:t>7/20/17</a:t>
+              <a:t>4/16/2018</a:t>
             </a:fld>
             <a:endParaRPr lang="en-US"/>
           </a:p>
@@ -2608,7 +2608,7 @@
           <a:p>
             <a:fld id="{78C97017-6FC3-485B-9764-EAC9E56C1D49}" type="datetimeFigureOut">
               <a:rPr lang="en-US" smtClean="0"/>
-              <a:t>7/20/17</a:t>
+              <a:t>4/16/2018</a:t>
             </a:fld>
             <a:endParaRPr lang="en-US"/>
           </a:p>
@@ -2860,7 +2860,7 @@
           <a:p>
             <a:fld id="{78C97017-6FC3-485B-9764-EAC9E56C1D49}" type="datetimeFigureOut">
               <a:rPr lang="en-US" smtClean="0"/>
-              <a:t>7/20/17</a:t>
+              <a:t>4/16/2018</a:t>
             </a:fld>
             <a:endParaRPr lang="en-US"/>
           </a:p>
@@ -3071,7 +3071,7 @@
           <a:p>
             <a:fld id="{78C97017-6FC3-485B-9764-EAC9E56C1D49}" type="datetimeFigureOut">
               <a:rPr lang="en-US" smtClean="0"/>
-              <a:t>7/20/17</a:t>
+              <a:t>4/16/2018</a:t>
             </a:fld>
             <a:endParaRPr lang="en-US"/>
           </a:p>
@@ -5517,7 +5517,7 @@
           <p:cNvPr id="97" name="Rectangle 96">
             <a:extLst>
               <a:ext uri="{FF2B5EF4-FFF2-40B4-BE49-F238E27FC236}">
-                <a16:creationId xmlns="" xmlns:a16="http://schemas.microsoft.com/office/drawing/2014/main" id="{AADE6A0C-89AB-467B-8CEA-5FCF36CE0D21}"/>
+                <a16:creationId xmlns:a16="http://schemas.microsoft.com/office/drawing/2014/main" id="{AADE6A0C-89AB-467B-8CEA-5FCF36CE0D21}"/>
               </a:ext>
             </a:extLst>
           </p:cNvPr>
@@ -6215,160 +6215,6 @@
             <a:endParaRPr lang="en-US" sz="1050" dirty="0">
               <a:solidFill>
                 <a:schemeClr val="bg1"/>
-              </a:solidFill>
-            </a:endParaRPr>
-          </a:p>
-        </p:txBody>
-      </p:sp>
-      <p:sp>
-        <p:nvSpPr>
-          <p:cNvPr id="59" name="Rectangle 62"/>
-          <p:cNvSpPr/>
-          <p:nvPr/>
-        </p:nvSpPr>
-        <p:spPr>
-          <a:xfrm>
-            <a:off x="2334221" y="3058789"/>
-            <a:ext cx="758695" cy="346760"/>
-          </a:xfrm>
-          <a:prstGeom prst="rect">
-            <a:avLst/>
-          </a:prstGeom>
-          <a:solidFill>
-            <a:srgbClr val="0070C0"/>
-          </a:solidFill>
-          <a:ln w="19050">
-            <a:solidFill>
-              <a:srgbClr val="0070C0"/>
-            </a:solidFill>
-          </a:ln>
-          <a:effectLst/>
-        </p:spPr>
-        <p:style>
-          <a:lnRef idx="1">
-            <a:schemeClr val="accent2"/>
-          </a:lnRef>
-          <a:fillRef idx="2">
-            <a:schemeClr val="accent2"/>
-          </a:fillRef>
-          <a:effectRef idx="1">
-            <a:schemeClr val="accent2"/>
-          </a:effectRef>
-          <a:fontRef idx="minor">
-            <a:schemeClr val="dk1"/>
-          </a:fontRef>
-        </p:style>
-        <p:txBody>
-          <a:bodyPr rtlCol="0" anchor="ctr"/>
-          <a:lstStyle/>
-          <a:p>
-            <a:pPr algn="ctr"/>
-            <a:r>
-              <a:rPr lang="en-US" sz="1050" dirty="0" err="1" smtClean="0">
-                <a:solidFill>
-                  <a:schemeClr val="bg1"/>
-                </a:solidFill>
-              </a:rPr>
-              <a:t>UndoRedo</a:t>
-            </a:r>
-            <a:endParaRPr lang="en-US" sz="1050" dirty="0" smtClean="0">
-              <a:solidFill>
-                <a:schemeClr val="bg1"/>
-              </a:solidFill>
-            </a:endParaRPr>
-          </a:p>
-          <a:p>
-            <a:pPr algn="ctr"/>
-            <a:r>
-              <a:rPr lang="en-US" sz="1050" dirty="0" smtClean="0">
-                <a:solidFill>
-                  <a:schemeClr val="bg1"/>
-                </a:solidFill>
-              </a:rPr>
-              <a:t>Stack</a:t>
-            </a:r>
-            <a:endParaRPr lang="en-SG" sz="1050" dirty="0">
-              <a:solidFill>
-                <a:schemeClr val="bg1"/>
-              </a:solidFill>
-            </a:endParaRPr>
-          </a:p>
-        </p:txBody>
-      </p:sp>
-      <p:cxnSp>
-        <p:nvCxnSpPr>
-          <p:cNvPr id="61" name="Straight Arrow Connector 57"/>
-          <p:cNvCxnSpPr>
-            <a:endCxn id="59" idx="2"/>
-          </p:cNvCxnSpPr>
-          <p:nvPr/>
-        </p:nvCxnSpPr>
-        <p:spPr>
-          <a:xfrm flipV="1">
-            <a:off x="2713568" y="3405549"/>
-            <a:ext cx="1" cy="177981"/>
-          </a:xfrm>
-          <a:prstGeom prst="straightConnector1">
-            <a:avLst/>
-          </a:prstGeom>
-          <a:ln w="19050">
-            <a:solidFill>
-              <a:srgbClr val="0070C0"/>
-            </a:solidFill>
-            <a:headEnd type="none" w="med" len="med"/>
-            <a:tailEnd type="arrow" w="med" len="med"/>
-          </a:ln>
-          <a:effectLst/>
-        </p:spPr>
-        <p:style>
-          <a:lnRef idx="1">
-            <a:schemeClr val="accent2"/>
-          </a:lnRef>
-          <a:fillRef idx="2">
-            <a:schemeClr val="accent2"/>
-          </a:fillRef>
-          <a:effectRef idx="1">
-            <a:schemeClr val="accent2"/>
-          </a:effectRef>
-          <a:fontRef idx="minor">
-            <a:schemeClr val="dk1"/>
-          </a:fontRef>
-        </p:style>
-      </p:cxnSp>
-      <p:sp>
-        <p:nvSpPr>
-          <p:cNvPr id="63" name="TextBox 62"/>
-          <p:cNvSpPr txBox="1"/>
-          <p:nvPr/>
-        </p:nvSpPr>
-        <p:spPr>
-          <a:xfrm>
-            <a:off x="2724741" y="3418256"/>
-            <a:ext cx="131116" cy="230832"/>
-          </a:xfrm>
-          <a:prstGeom prst="rect">
-            <a:avLst/>
-          </a:prstGeom>
-          <a:noFill/>
-        </p:spPr>
-        <p:txBody>
-          <a:bodyPr wrap="square" lIns="0" tIns="0" rIns="0" bIns="0" rtlCol="0">
-            <a:noAutofit/>
-          </a:bodyPr>
-          <a:lstStyle/>
-          <a:p>
-            <a:pPr algn="r"/>
-            <a:r>
-              <a:rPr lang="en-US" sz="1100" dirty="0">
-                <a:solidFill>
-                  <a:srgbClr val="0070C0"/>
-                </a:solidFill>
-              </a:rPr>
-              <a:t>1</a:t>
-            </a:r>
-            <a:endParaRPr lang="en-SG" sz="1100" dirty="0">
-              <a:solidFill>
-                <a:srgbClr val="0070C0"/>
               </a:solidFill>
             </a:endParaRPr>
           </a:p>

</xml_diff>

<commit_message>
DeveloperGuide: update section of UndoRedoStack to VersionedAddressBook
The app previously uses UndoRedoStack which stores the UndoableCommands
in LogicManager for the undo/redo mechanism.

Since the undo/redo machanism has been shifted to VersionedAddressBook
which stores ReadOnlyAddressBook in a List, and has been moved to Model
layer instead, the sections on undo/redo feature, Logic and Model
component in DeveloperGuide is out of date.

Also, commands that do not mutate the address book, such as
FindCommand and ListCommand, will no longer clear the redoable
address book states. This allows us to redo to pass when we undo
commands and execute a non-mutating command afterwards.

UndoableCommand has also been removed from the codebase.

Let's update the out of date sections which mention UndoRedoStack
in the DeveloperGuide to the updated VersionedAddressBook, how the
undo/redo mechanism works, and remove any reference
to UndoableCommand in DeveloperGuide.
</commit_message>
<xml_diff>
--- a/docs/diagrams/LogicComponentClassDiagram.pptx
+++ b/docs/diagrams/LogicComponentClassDiagram.pptx
@@ -212,7 +212,7 @@
           <a:p>
             <a:fld id="{F5CC4B3F-88C1-4FFA-B1B6-F41C21DC6924}" type="datetimeFigureOut">
               <a:rPr lang="en-US" smtClean="0"/>
-              <a:t>7/20/17</a:t>
+              <a:t>4/16/2018</a:t>
             </a:fld>
             <a:endParaRPr lang="en-US"/>
           </a:p>
@@ -658,7 +658,7 @@
           <a:p>
             <a:fld id="{78C97017-6FC3-485B-9764-EAC9E56C1D49}" type="datetimeFigureOut">
               <a:rPr lang="en-US" smtClean="0"/>
-              <a:t>7/20/17</a:t>
+              <a:t>4/16/2018</a:t>
             </a:fld>
             <a:endParaRPr lang="en-US"/>
           </a:p>
@@ -826,7 +826,7 @@
           <a:p>
             <a:fld id="{78C97017-6FC3-485B-9764-EAC9E56C1D49}" type="datetimeFigureOut">
               <a:rPr lang="en-US" smtClean="0"/>
-              <a:t>7/20/17</a:t>
+              <a:t>4/16/2018</a:t>
             </a:fld>
             <a:endParaRPr lang="en-US"/>
           </a:p>
@@ -1004,7 +1004,7 @@
           <a:p>
             <a:fld id="{78C97017-6FC3-485B-9764-EAC9E56C1D49}" type="datetimeFigureOut">
               <a:rPr lang="en-US" smtClean="0"/>
-              <a:t>7/20/17</a:t>
+              <a:t>4/16/2018</a:t>
             </a:fld>
             <a:endParaRPr lang="en-US"/>
           </a:p>
@@ -1172,7 +1172,7 @@
           <a:p>
             <a:fld id="{78C97017-6FC3-485B-9764-EAC9E56C1D49}" type="datetimeFigureOut">
               <a:rPr lang="en-US" smtClean="0"/>
-              <a:t>7/20/17</a:t>
+              <a:t>4/16/2018</a:t>
             </a:fld>
             <a:endParaRPr lang="en-US"/>
           </a:p>
@@ -1417,7 +1417,7 @@
           <a:p>
             <a:fld id="{78C97017-6FC3-485B-9764-EAC9E56C1D49}" type="datetimeFigureOut">
               <a:rPr lang="en-US" smtClean="0"/>
-              <a:t>7/20/17</a:t>
+              <a:t>4/16/2018</a:t>
             </a:fld>
             <a:endParaRPr lang="en-US"/>
           </a:p>
@@ -1702,7 +1702,7 @@
           <a:p>
             <a:fld id="{78C97017-6FC3-485B-9764-EAC9E56C1D49}" type="datetimeFigureOut">
               <a:rPr lang="en-US" smtClean="0"/>
-              <a:t>7/20/17</a:t>
+              <a:t>4/16/2018</a:t>
             </a:fld>
             <a:endParaRPr lang="en-US"/>
           </a:p>
@@ -2121,7 +2121,7 @@
           <a:p>
             <a:fld id="{78C97017-6FC3-485B-9764-EAC9E56C1D49}" type="datetimeFigureOut">
               <a:rPr lang="en-US" smtClean="0"/>
-              <a:t>7/20/17</a:t>
+              <a:t>4/16/2018</a:t>
             </a:fld>
             <a:endParaRPr lang="en-US"/>
           </a:p>
@@ -2238,7 +2238,7 @@
           <a:p>
             <a:fld id="{78C97017-6FC3-485B-9764-EAC9E56C1D49}" type="datetimeFigureOut">
               <a:rPr lang="en-US" smtClean="0"/>
-              <a:t>7/20/17</a:t>
+              <a:t>4/16/2018</a:t>
             </a:fld>
             <a:endParaRPr lang="en-US"/>
           </a:p>
@@ -2333,7 +2333,7 @@
           <a:p>
             <a:fld id="{78C97017-6FC3-485B-9764-EAC9E56C1D49}" type="datetimeFigureOut">
               <a:rPr lang="en-US" smtClean="0"/>
-              <a:t>7/20/17</a:t>
+              <a:t>4/16/2018</a:t>
             </a:fld>
             <a:endParaRPr lang="en-US"/>
           </a:p>
@@ -2608,7 +2608,7 @@
           <a:p>
             <a:fld id="{78C97017-6FC3-485B-9764-EAC9E56C1D49}" type="datetimeFigureOut">
               <a:rPr lang="en-US" smtClean="0"/>
-              <a:t>7/20/17</a:t>
+              <a:t>4/16/2018</a:t>
             </a:fld>
             <a:endParaRPr lang="en-US"/>
           </a:p>
@@ -2860,7 +2860,7 @@
           <a:p>
             <a:fld id="{78C97017-6FC3-485B-9764-EAC9E56C1D49}" type="datetimeFigureOut">
               <a:rPr lang="en-US" smtClean="0"/>
-              <a:t>7/20/17</a:t>
+              <a:t>4/16/2018</a:t>
             </a:fld>
             <a:endParaRPr lang="en-US"/>
           </a:p>
@@ -3071,7 +3071,7 @@
           <a:p>
             <a:fld id="{78C97017-6FC3-485B-9764-EAC9E56C1D49}" type="datetimeFigureOut">
               <a:rPr lang="en-US" smtClean="0"/>
-              <a:t>7/20/17</a:t>
+              <a:t>4/16/2018</a:t>
             </a:fld>
             <a:endParaRPr lang="en-US"/>
           </a:p>
@@ -5517,7 +5517,7 @@
           <p:cNvPr id="97" name="Rectangle 96">
             <a:extLst>
               <a:ext uri="{FF2B5EF4-FFF2-40B4-BE49-F238E27FC236}">
-                <a16:creationId xmlns="" xmlns:a16="http://schemas.microsoft.com/office/drawing/2014/main" id="{AADE6A0C-89AB-467B-8CEA-5FCF36CE0D21}"/>
+                <a16:creationId xmlns:a16="http://schemas.microsoft.com/office/drawing/2014/main" id="{AADE6A0C-89AB-467B-8CEA-5FCF36CE0D21}"/>
               </a:ext>
             </a:extLst>
           </p:cNvPr>
@@ -6215,160 +6215,6 @@
             <a:endParaRPr lang="en-US" sz="1050" dirty="0">
               <a:solidFill>
                 <a:schemeClr val="bg1"/>
-              </a:solidFill>
-            </a:endParaRPr>
-          </a:p>
-        </p:txBody>
-      </p:sp>
-      <p:sp>
-        <p:nvSpPr>
-          <p:cNvPr id="59" name="Rectangle 62"/>
-          <p:cNvSpPr/>
-          <p:nvPr/>
-        </p:nvSpPr>
-        <p:spPr>
-          <a:xfrm>
-            <a:off x="2334221" y="3058789"/>
-            <a:ext cx="758695" cy="346760"/>
-          </a:xfrm>
-          <a:prstGeom prst="rect">
-            <a:avLst/>
-          </a:prstGeom>
-          <a:solidFill>
-            <a:srgbClr val="0070C0"/>
-          </a:solidFill>
-          <a:ln w="19050">
-            <a:solidFill>
-              <a:srgbClr val="0070C0"/>
-            </a:solidFill>
-          </a:ln>
-          <a:effectLst/>
-        </p:spPr>
-        <p:style>
-          <a:lnRef idx="1">
-            <a:schemeClr val="accent2"/>
-          </a:lnRef>
-          <a:fillRef idx="2">
-            <a:schemeClr val="accent2"/>
-          </a:fillRef>
-          <a:effectRef idx="1">
-            <a:schemeClr val="accent2"/>
-          </a:effectRef>
-          <a:fontRef idx="minor">
-            <a:schemeClr val="dk1"/>
-          </a:fontRef>
-        </p:style>
-        <p:txBody>
-          <a:bodyPr rtlCol="0" anchor="ctr"/>
-          <a:lstStyle/>
-          <a:p>
-            <a:pPr algn="ctr"/>
-            <a:r>
-              <a:rPr lang="en-US" sz="1050" dirty="0" err="1" smtClean="0">
-                <a:solidFill>
-                  <a:schemeClr val="bg1"/>
-                </a:solidFill>
-              </a:rPr>
-              <a:t>UndoRedo</a:t>
-            </a:r>
-            <a:endParaRPr lang="en-US" sz="1050" dirty="0" smtClean="0">
-              <a:solidFill>
-                <a:schemeClr val="bg1"/>
-              </a:solidFill>
-            </a:endParaRPr>
-          </a:p>
-          <a:p>
-            <a:pPr algn="ctr"/>
-            <a:r>
-              <a:rPr lang="en-US" sz="1050" dirty="0" smtClean="0">
-                <a:solidFill>
-                  <a:schemeClr val="bg1"/>
-                </a:solidFill>
-              </a:rPr>
-              <a:t>Stack</a:t>
-            </a:r>
-            <a:endParaRPr lang="en-SG" sz="1050" dirty="0">
-              <a:solidFill>
-                <a:schemeClr val="bg1"/>
-              </a:solidFill>
-            </a:endParaRPr>
-          </a:p>
-        </p:txBody>
-      </p:sp>
-      <p:cxnSp>
-        <p:nvCxnSpPr>
-          <p:cNvPr id="61" name="Straight Arrow Connector 57"/>
-          <p:cNvCxnSpPr>
-            <a:endCxn id="59" idx="2"/>
-          </p:cNvCxnSpPr>
-          <p:nvPr/>
-        </p:nvCxnSpPr>
-        <p:spPr>
-          <a:xfrm flipV="1">
-            <a:off x="2713568" y="3405549"/>
-            <a:ext cx="1" cy="177981"/>
-          </a:xfrm>
-          <a:prstGeom prst="straightConnector1">
-            <a:avLst/>
-          </a:prstGeom>
-          <a:ln w="19050">
-            <a:solidFill>
-              <a:srgbClr val="0070C0"/>
-            </a:solidFill>
-            <a:headEnd type="none" w="med" len="med"/>
-            <a:tailEnd type="arrow" w="med" len="med"/>
-          </a:ln>
-          <a:effectLst/>
-        </p:spPr>
-        <p:style>
-          <a:lnRef idx="1">
-            <a:schemeClr val="accent2"/>
-          </a:lnRef>
-          <a:fillRef idx="2">
-            <a:schemeClr val="accent2"/>
-          </a:fillRef>
-          <a:effectRef idx="1">
-            <a:schemeClr val="accent2"/>
-          </a:effectRef>
-          <a:fontRef idx="minor">
-            <a:schemeClr val="dk1"/>
-          </a:fontRef>
-        </p:style>
-      </p:cxnSp>
-      <p:sp>
-        <p:nvSpPr>
-          <p:cNvPr id="63" name="TextBox 62"/>
-          <p:cNvSpPr txBox="1"/>
-          <p:nvPr/>
-        </p:nvSpPr>
-        <p:spPr>
-          <a:xfrm>
-            <a:off x="2724741" y="3418256"/>
-            <a:ext cx="131116" cy="230832"/>
-          </a:xfrm>
-          <a:prstGeom prst="rect">
-            <a:avLst/>
-          </a:prstGeom>
-          <a:noFill/>
-        </p:spPr>
-        <p:txBody>
-          <a:bodyPr wrap="square" lIns="0" tIns="0" rIns="0" bIns="0" rtlCol="0">
-            <a:noAutofit/>
-          </a:bodyPr>
-          <a:lstStyle/>
-          <a:p>
-            <a:pPr algn="r"/>
-            <a:r>
-              <a:rPr lang="en-US" sz="1100" dirty="0">
-                <a:solidFill>
-                  <a:srgbClr val="0070C0"/>
-                </a:solidFill>
-              </a:rPr>
-              <a:t>1</a:t>
-            </a:r>
-            <a:endParaRPr lang="en-SG" sz="1100" dirty="0">
-              <a:solidFill>
-                <a:srgbClr val="0070C0"/>
               </a:solidFill>
             </a:endParaRPr>
           </a:p>

</xml_diff>